<commit_message>
Working on refactoring backgroundWindow
</commit_message>
<xml_diff>
--- a/Beware/Content/designs.pptx
+++ b/Beware/Content/designs.pptx
@@ -8,6 +8,7 @@
     <p:sldId id="256" r:id="rId2"/>
     <p:sldId id="257" r:id="rId3"/>
     <p:sldId id="258" r:id="rId4"/>
+    <p:sldId id="259" r:id="rId5"/>
   </p:sldIdLst>
   <p:sldSz cx="12192000" cy="6858000"/>
   <p:notesSz cx="6858000" cy="9144000"/>
@@ -261,7 +262,7 @@
           <a:p>
             <a:fld id="{355FB770-CC93-4F24-BE14-030DA79629D9}" type="datetimeFigureOut">
               <a:rPr lang="en-US" smtClean="0"/>
-              <a:t>11/13/2022</a:t>
+              <a:t>11/16/2022</a:t>
             </a:fld>
             <a:endParaRPr lang="en-US"/>
           </a:p>
@@ -459,7 +460,7 @@
           <a:p>
             <a:fld id="{355FB770-CC93-4F24-BE14-030DA79629D9}" type="datetimeFigureOut">
               <a:rPr lang="en-US" smtClean="0"/>
-              <a:t>11/13/2022</a:t>
+              <a:t>11/16/2022</a:t>
             </a:fld>
             <a:endParaRPr lang="en-US"/>
           </a:p>
@@ -667,7 +668,7 @@
           <a:p>
             <a:fld id="{355FB770-CC93-4F24-BE14-030DA79629D9}" type="datetimeFigureOut">
               <a:rPr lang="en-US" smtClean="0"/>
-              <a:t>11/13/2022</a:t>
+              <a:t>11/16/2022</a:t>
             </a:fld>
             <a:endParaRPr lang="en-US"/>
           </a:p>
@@ -865,7 +866,7 @@
           <a:p>
             <a:fld id="{355FB770-CC93-4F24-BE14-030DA79629D9}" type="datetimeFigureOut">
               <a:rPr lang="en-US" smtClean="0"/>
-              <a:t>11/13/2022</a:t>
+              <a:t>11/16/2022</a:t>
             </a:fld>
             <a:endParaRPr lang="en-US"/>
           </a:p>
@@ -1140,7 +1141,7 @@
           <a:p>
             <a:fld id="{355FB770-CC93-4F24-BE14-030DA79629D9}" type="datetimeFigureOut">
               <a:rPr lang="en-US" smtClean="0"/>
-              <a:t>11/13/2022</a:t>
+              <a:t>11/16/2022</a:t>
             </a:fld>
             <a:endParaRPr lang="en-US"/>
           </a:p>
@@ -1405,7 +1406,7 @@
           <a:p>
             <a:fld id="{355FB770-CC93-4F24-BE14-030DA79629D9}" type="datetimeFigureOut">
               <a:rPr lang="en-US" smtClean="0"/>
-              <a:t>11/13/2022</a:t>
+              <a:t>11/16/2022</a:t>
             </a:fld>
             <a:endParaRPr lang="en-US"/>
           </a:p>
@@ -1817,7 +1818,7 @@
           <a:p>
             <a:fld id="{355FB770-CC93-4F24-BE14-030DA79629D9}" type="datetimeFigureOut">
               <a:rPr lang="en-US" smtClean="0"/>
-              <a:t>11/13/2022</a:t>
+              <a:t>11/16/2022</a:t>
             </a:fld>
             <a:endParaRPr lang="en-US"/>
           </a:p>
@@ -1958,7 +1959,7 @@
           <a:p>
             <a:fld id="{355FB770-CC93-4F24-BE14-030DA79629D9}" type="datetimeFigureOut">
               <a:rPr lang="en-US" smtClean="0"/>
-              <a:t>11/13/2022</a:t>
+              <a:t>11/16/2022</a:t>
             </a:fld>
             <a:endParaRPr lang="en-US"/>
           </a:p>
@@ -2071,7 +2072,7 @@
           <a:p>
             <a:fld id="{355FB770-CC93-4F24-BE14-030DA79629D9}" type="datetimeFigureOut">
               <a:rPr lang="en-US" smtClean="0"/>
-              <a:t>11/13/2022</a:t>
+              <a:t>11/16/2022</a:t>
             </a:fld>
             <a:endParaRPr lang="en-US"/>
           </a:p>
@@ -2382,7 +2383,7 @@
           <a:p>
             <a:fld id="{355FB770-CC93-4F24-BE14-030DA79629D9}" type="datetimeFigureOut">
               <a:rPr lang="en-US" smtClean="0"/>
-              <a:t>11/13/2022</a:t>
+              <a:t>11/16/2022</a:t>
             </a:fld>
             <a:endParaRPr lang="en-US"/>
           </a:p>
@@ -2670,7 +2671,7 @@
           <a:p>
             <a:fld id="{355FB770-CC93-4F24-BE14-030DA79629D9}" type="datetimeFigureOut">
               <a:rPr lang="en-US" smtClean="0"/>
-              <a:t>11/13/2022</a:t>
+              <a:t>11/16/2022</a:t>
             </a:fld>
             <a:endParaRPr lang="en-US"/>
           </a:p>
@@ -2911,7 +2912,7 @@
           <a:p>
             <a:fld id="{355FB770-CC93-4F24-BE14-030DA79629D9}" type="datetimeFigureOut">
               <a:rPr lang="en-US" smtClean="0"/>
-              <a:t>11/13/2022</a:t>
+              <a:t>11/16/2022</a:t>
             </a:fld>
             <a:endParaRPr lang="en-US"/>
           </a:p>
@@ -17295,10 +17296,723 @@
           </p:txBody>
         </p:sp>
       </p:grpSp>
+      <p:sp>
+        <p:nvSpPr>
+          <p:cNvPr id="3" name="TextBox 2">
+            <a:extLst>
+              <a:ext uri="{FF2B5EF4-FFF2-40B4-BE49-F238E27FC236}">
+                <a16:creationId xmlns:a16="http://schemas.microsoft.com/office/drawing/2014/main" id="{06C7D425-6F3B-8BE2-1871-5F526C396009}"/>
+              </a:ext>
+            </a:extLst>
+          </p:cNvPr>
+          <p:cNvSpPr txBox="1"/>
+          <p:nvPr/>
+        </p:nvSpPr>
+        <p:spPr>
+          <a:xfrm>
+            <a:off x="3048000" y="3244334"/>
+            <a:ext cx="6096000" cy="369332"/>
+          </a:xfrm>
+          <a:prstGeom prst="rect">
+            <a:avLst/>
+          </a:prstGeom>
+          <a:noFill/>
+        </p:spPr>
+        <p:txBody>
+          <a:bodyPr wrap="square">
+            <a:spAutoFit/>
+          </a:bodyPr>
+          <a:lstStyle/>
+          <a:p>
+            <a:r>
+              <a:rPr lang="en-US" sz="1800" dirty="0" err="1">
+                <a:solidFill>
+                  <a:srgbClr val="000000"/>
+                </a:solidFill>
+                <a:latin typeface="Consolas" panose="020B0609020204030204" pitchFamily="49" charset="0"/>
+              </a:rPr>
+              <a:t>DrawableGameComponent</a:t>
+            </a:r>
+            <a:endParaRPr lang="en-US" dirty="0"/>
+          </a:p>
+        </p:txBody>
+      </p:sp>
     </p:spTree>
     <p:extLst>
       <p:ext uri="{BB962C8B-B14F-4D97-AF65-F5344CB8AC3E}">
         <p14:creationId xmlns:p14="http://schemas.microsoft.com/office/powerpoint/2010/main" val="4177674139"/>
+      </p:ext>
+    </p:extLst>
+  </p:cSld>
+  <p:clrMapOvr>
+    <a:masterClrMapping/>
+  </p:clrMapOvr>
+</p:sld>
+</file>
+
+<file path=ppt/slides/slide4.xml><?xml version="1.0" encoding="utf-8"?>
+<p:sld xmlns:a="http://schemas.openxmlformats.org/drawingml/2006/main" xmlns:r="http://schemas.openxmlformats.org/officeDocument/2006/relationships" xmlns:p="http://schemas.openxmlformats.org/presentationml/2006/main">
+  <p:cSld>
+    <p:spTree>
+      <p:nvGrpSpPr>
+        <p:cNvPr id="1" name=""/>
+        <p:cNvGrpSpPr/>
+        <p:nvPr/>
+      </p:nvGrpSpPr>
+      <p:grpSpPr>
+        <a:xfrm>
+          <a:off x="0" y="0"/>
+          <a:ext cx="0" cy="0"/>
+          <a:chOff x="0" y="0"/>
+          <a:chExt cx="0" cy="0"/>
+        </a:xfrm>
+      </p:grpSpPr>
+      <p:grpSp>
+        <p:nvGrpSpPr>
+          <p:cNvPr id="10" name="Group 9">
+            <a:extLst>
+              <a:ext uri="{FF2B5EF4-FFF2-40B4-BE49-F238E27FC236}">
+                <a16:creationId xmlns:a16="http://schemas.microsoft.com/office/drawing/2014/main" id="{BC93CD59-454F-3EFE-484F-5F0A803F8B10}"/>
+              </a:ext>
+            </a:extLst>
+          </p:cNvPr>
+          <p:cNvGrpSpPr/>
+          <p:nvPr/>
+        </p:nvGrpSpPr>
+        <p:grpSpPr>
+          <a:xfrm>
+            <a:off x="609600" y="0"/>
+            <a:ext cx="5486400" cy="3429000"/>
+            <a:chOff x="609600" y="0"/>
+            <a:chExt cx="5486400" cy="3429000"/>
+          </a:xfrm>
+        </p:grpSpPr>
+        <p:sp>
+          <p:nvSpPr>
+            <p:cNvPr id="4" name="Rectangle 3">
+              <a:extLst>
+                <a:ext uri="{FF2B5EF4-FFF2-40B4-BE49-F238E27FC236}">
+                  <a16:creationId xmlns:a16="http://schemas.microsoft.com/office/drawing/2014/main" id="{042740F2-ABDB-2859-9EB9-EA5A9D1669E8}"/>
+                </a:ext>
+              </a:extLst>
+            </p:cNvPr>
+            <p:cNvSpPr/>
+            <p:nvPr/>
+          </p:nvSpPr>
+          <p:spPr>
+            <a:xfrm>
+              <a:off x="609600" y="0"/>
+              <a:ext cx="5486400" cy="3429000"/>
+            </a:xfrm>
+            <a:prstGeom prst="rect">
+              <a:avLst/>
+            </a:prstGeom>
+          </p:spPr>
+          <p:style>
+            <a:lnRef idx="2">
+              <a:schemeClr val="accent1">
+                <a:shade val="50000"/>
+              </a:schemeClr>
+            </a:lnRef>
+            <a:fillRef idx="1">
+              <a:schemeClr val="accent1"/>
+            </a:fillRef>
+            <a:effectRef idx="0">
+              <a:schemeClr val="accent1"/>
+            </a:effectRef>
+            <a:fontRef idx="minor">
+              <a:schemeClr val="lt1"/>
+            </a:fontRef>
+          </p:style>
+          <p:txBody>
+            <a:bodyPr rtlCol="0" anchor="ctr"/>
+            <a:lstStyle/>
+            <a:p>
+              <a:pPr algn="ctr"/>
+              <a:endParaRPr lang="en-US"/>
+            </a:p>
+          </p:txBody>
+        </p:sp>
+        <p:sp>
+          <p:nvSpPr>
+            <p:cNvPr id="5" name="Rectangle 4">
+              <a:extLst>
+                <a:ext uri="{FF2B5EF4-FFF2-40B4-BE49-F238E27FC236}">
+                  <a16:creationId xmlns:a16="http://schemas.microsoft.com/office/drawing/2014/main" id="{8DBB6DB4-8FF6-18B0-DE1A-3D2E090ECA3F}"/>
+                </a:ext>
+              </a:extLst>
+            </p:cNvPr>
+            <p:cNvSpPr/>
+            <p:nvPr/>
+          </p:nvSpPr>
+          <p:spPr>
+            <a:xfrm>
+              <a:off x="609600" y="0"/>
+              <a:ext cx="932329" cy="3429000"/>
+            </a:xfrm>
+            <a:prstGeom prst="rect">
+              <a:avLst/>
+            </a:prstGeom>
+            <a:solidFill>
+              <a:schemeClr val="accent2"/>
+            </a:solidFill>
+            <a:ln>
+              <a:solidFill>
+                <a:schemeClr val="accent2"/>
+              </a:solidFill>
+            </a:ln>
+          </p:spPr>
+          <p:style>
+            <a:lnRef idx="2">
+              <a:schemeClr val="accent1">
+                <a:shade val="50000"/>
+              </a:schemeClr>
+            </a:lnRef>
+            <a:fillRef idx="1">
+              <a:schemeClr val="accent1"/>
+            </a:fillRef>
+            <a:effectRef idx="0">
+              <a:schemeClr val="accent1"/>
+            </a:effectRef>
+            <a:fontRef idx="minor">
+              <a:schemeClr val="lt1"/>
+            </a:fontRef>
+          </p:style>
+          <p:txBody>
+            <a:bodyPr rtlCol="0" anchor="ctr"/>
+            <a:lstStyle/>
+            <a:p>
+              <a:pPr algn="ctr"/>
+              <a:endParaRPr lang="en-US"/>
+            </a:p>
+          </p:txBody>
+        </p:sp>
+        <p:sp>
+          <p:nvSpPr>
+            <p:cNvPr id="6" name="Rectangle 5">
+              <a:extLst>
+                <a:ext uri="{FF2B5EF4-FFF2-40B4-BE49-F238E27FC236}">
+                  <a16:creationId xmlns:a16="http://schemas.microsoft.com/office/drawing/2014/main" id="{11573062-5F0B-CCCD-D445-B7CB4AC2D03C}"/>
+                </a:ext>
+              </a:extLst>
+            </p:cNvPr>
+            <p:cNvSpPr/>
+            <p:nvPr/>
+          </p:nvSpPr>
+          <p:spPr>
+            <a:xfrm>
+              <a:off x="5163671" y="0"/>
+              <a:ext cx="932329" cy="3429000"/>
+            </a:xfrm>
+            <a:prstGeom prst="rect">
+              <a:avLst/>
+            </a:prstGeom>
+            <a:solidFill>
+              <a:srgbClr val="7030A0"/>
+            </a:solidFill>
+            <a:ln>
+              <a:solidFill>
+                <a:srgbClr val="7030A0"/>
+              </a:solidFill>
+            </a:ln>
+          </p:spPr>
+          <p:style>
+            <a:lnRef idx="2">
+              <a:schemeClr val="accent1">
+                <a:shade val="50000"/>
+              </a:schemeClr>
+            </a:lnRef>
+            <a:fillRef idx="1">
+              <a:schemeClr val="accent1"/>
+            </a:fillRef>
+            <a:effectRef idx="0">
+              <a:schemeClr val="accent1"/>
+            </a:effectRef>
+            <a:fontRef idx="minor">
+              <a:schemeClr val="lt1"/>
+            </a:fontRef>
+          </p:style>
+          <p:txBody>
+            <a:bodyPr rtlCol="0" anchor="ctr"/>
+            <a:lstStyle/>
+            <a:p>
+              <a:pPr algn="ctr"/>
+              <a:endParaRPr lang="en-US"/>
+            </a:p>
+          </p:txBody>
+        </p:sp>
+        <p:sp>
+          <p:nvSpPr>
+            <p:cNvPr id="7" name="Rectangle 6">
+              <a:extLst>
+                <a:ext uri="{FF2B5EF4-FFF2-40B4-BE49-F238E27FC236}">
+                  <a16:creationId xmlns:a16="http://schemas.microsoft.com/office/drawing/2014/main" id="{6135AAA9-AC67-0B31-008C-A7957BB44ECB}"/>
+                </a:ext>
+              </a:extLst>
+            </p:cNvPr>
+            <p:cNvSpPr/>
+            <p:nvPr/>
+          </p:nvSpPr>
+          <p:spPr>
+            <a:xfrm>
+              <a:off x="1541929" y="3110752"/>
+              <a:ext cx="3621742" cy="318247"/>
+            </a:xfrm>
+            <a:prstGeom prst="rect">
+              <a:avLst/>
+            </a:prstGeom>
+            <a:solidFill>
+              <a:srgbClr val="00B050"/>
+            </a:solidFill>
+            <a:ln>
+              <a:solidFill>
+                <a:srgbClr val="00B050"/>
+              </a:solidFill>
+            </a:ln>
+          </p:spPr>
+          <p:style>
+            <a:lnRef idx="2">
+              <a:schemeClr val="accent1">
+                <a:shade val="50000"/>
+              </a:schemeClr>
+            </a:lnRef>
+            <a:fillRef idx="1">
+              <a:schemeClr val="accent1"/>
+            </a:fillRef>
+            <a:effectRef idx="0">
+              <a:schemeClr val="accent1"/>
+            </a:effectRef>
+            <a:fontRef idx="minor">
+              <a:schemeClr val="lt1"/>
+            </a:fontRef>
+          </p:style>
+          <p:txBody>
+            <a:bodyPr rtlCol="0" anchor="ctr"/>
+            <a:lstStyle/>
+            <a:p>
+              <a:pPr algn="ctr"/>
+              <a:endParaRPr lang="en-US"/>
+            </a:p>
+          </p:txBody>
+        </p:sp>
+        <p:pic>
+          <p:nvPicPr>
+            <p:cNvPr id="8" name="Picture 7" descr="Shape, icon&#10;&#10;Description automatically generated">
+              <a:extLst>
+                <a:ext uri="{FF2B5EF4-FFF2-40B4-BE49-F238E27FC236}">
+                  <a16:creationId xmlns:a16="http://schemas.microsoft.com/office/drawing/2014/main" id="{C66268D6-4118-B69B-E6E4-EE090246AAC1}"/>
+                </a:ext>
+              </a:extLst>
+            </p:cNvPr>
+            <p:cNvPicPr>
+              <a:picLocks noChangeAspect="1"/>
+            </p:cNvPicPr>
+            <p:nvPr/>
+          </p:nvPicPr>
+          <p:blipFill>
+            <a:blip r:embed="rId2">
+              <a:clrChange>
+                <a:clrFrom>
+                  <a:srgbClr val="FFFFFF"/>
+                </a:clrFrom>
+                <a:clrTo>
+                  <a:srgbClr val="FFFFFF">
+                    <a:alpha val="0"/>
+                  </a:srgbClr>
+                </a:clrTo>
+              </a:clrChange>
+              <a:extLst>
+                <a:ext uri="{28A0092B-C50C-407E-A947-70E740481C1C}">
+                  <a14:useLocalDpi xmlns:a14="http://schemas.microsoft.com/office/drawing/2010/main" val="0"/>
+                </a:ext>
+              </a:extLst>
+            </a:blip>
+            <a:stretch>
+              <a:fillRect/>
+            </a:stretch>
+          </p:blipFill>
+          <p:spPr>
+            <a:xfrm>
+              <a:off x="791536" y="435592"/>
+              <a:ext cx="568456" cy="568456"/>
+            </a:xfrm>
+            <a:prstGeom prst="rect">
+              <a:avLst/>
+            </a:prstGeom>
+          </p:spPr>
+        </p:pic>
+        <p:pic>
+          <p:nvPicPr>
+            <p:cNvPr id="9" name="Picture 8" descr="A picture containing queen&#10;&#10;Description automatically generated">
+              <a:extLst>
+                <a:ext uri="{FF2B5EF4-FFF2-40B4-BE49-F238E27FC236}">
+                  <a16:creationId xmlns:a16="http://schemas.microsoft.com/office/drawing/2014/main" id="{F4F995E9-CD56-4581-BB84-984AE1BD4127}"/>
+                </a:ext>
+              </a:extLst>
+            </p:cNvPr>
+            <p:cNvPicPr>
+              <a:picLocks noChangeAspect="1"/>
+            </p:cNvPicPr>
+            <p:nvPr/>
+          </p:nvPicPr>
+          <p:blipFill>
+            <a:blip r:embed="rId3">
+              <a:clrChange>
+                <a:clrFrom>
+                  <a:srgbClr val="FFFFFF"/>
+                </a:clrFrom>
+                <a:clrTo>
+                  <a:srgbClr val="FFFFFF">
+                    <a:alpha val="0"/>
+                  </a:srgbClr>
+                </a:clrTo>
+              </a:clrChange>
+              <a:extLst>
+                <a:ext uri="{28A0092B-C50C-407E-A947-70E740481C1C}">
+                  <a14:useLocalDpi xmlns:a14="http://schemas.microsoft.com/office/drawing/2010/main" val="0"/>
+                </a:ext>
+              </a:extLst>
+            </a:blip>
+            <a:stretch>
+              <a:fillRect/>
+            </a:stretch>
+          </p:blipFill>
+          <p:spPr>
+            <a:xfrm>
+              <a:off x="5332780" y="435592"/>
+              <a:ext cx="568456" cy="568456"/>
+            </a:xfrm>
+            <a:prstGeom prst="rect">
+              <a:avLst/>
+            </a:prstGeom>
+          </p:spPr>
+        </p:pic>
+      </p:grpSp>
+      <p:grpSp>
+        <p:nvGrpSpPr>
+          <p:cNvPr id="18" name="Group 17">
+            <a:extLst>
+              <a:ext uri="{FF2B5EF4-FFF2-40B4-BE49-F238E27FC236}">
+                <a16:creationId xmlns:a16="http://schemas.microsoft.com/office/drawing/2014/main" id="{EA85B2D6-8775-4D5D-FF78-9E505E5DB9F0}"/>
+              </a:ext>
+            </a:extLst>
+          </p:cNvPr>
+          <p:cNvGrpSpPr/>
+          <p:nvPr/>
+        </p:nvGrpSpPr>
+        <p:grpSpPr>
+          <a:xfrm>
+            <a:off x="6400800" y="2537012"/>
+            <a:ext cx="5486400" cy="3429000"/>
+            <a:chOff x="6400800" y="2537012"/>
+            <a:chExt cx="5486400" cy="3429000"/>
+          </a:xfrm>
+        </p:grpSpPr>
+        <p:sp>
+          <p:nvSpPr>
+            <p:cNvPr id="12" name="Rectangle 11">
+              <a:extLst>
+                <a:ext uri="{FF2B5EF4-FFF2-40B4-BE49-F238E27FC236}">
+                  <a16:creationId xmlns:a16="http://schemas.microsoft.com/office/drawing/2014/main" id="{C1FBB932-252C-1AD3-0C7D-0E8A30A264F8}"/>
+                </a:ext>
+              </a:extLst>
+            </p:cNvPr>
+            <p:cNvSpPr/>
+            <p:nvPr/>
+          </p:nvSpPr>
+          <p:spPr>
+            <a:xfrm>
+              <a:off x="6400800" y="2537012"/>
+              <a:ext cx="5486400" cy="3429000"/>
+            </a:xfrm>
+            <a:prstGeom prst="rect">
+              <a:avLst/>
+            </a:prstGeom>
+          </p:spPr>
+          <p:style>
+            <a:lnRef idx="2">
+              <a:schemeClr val="accent1">
+                <a:shade val="50000"/>
+              </a:schemeClr>
+            </a:lnRef>
+            <a:fillRef idx="1">
+              <a:schemeClr val="accent1"/>
+            </a:fillRef>
+            <a:effectRef idx="0">
+              <a:schemeClr val="accent1"/>
+            </a:effectRef>
+            <a:fontRef idx="minor">
+              <a:schemeClr val="lt1"/>
+            </a:fontRef>
+          </p:style>
+          <p:txBody>
+            <a:bodyPr rtlCol="0" anchor="ctr"/>
+            <a:lstStyle/>
+            <a:p>
+              <a:pPr algn="ctr"/>
+              <a:endParaRPr lang="en-US"/>
+            </a:p>
+          </p:txBody>
+        </p:sp>
+        <p:sp>
+          <p:nvSpPr>
+            <p:cNvPr id="14" name="Rectangle 13">
+              <a:extLst>
+                <a:ext uri="{FF2B5EF4-FFF2-40B4-BE49-F238E27FC236}">
+                  <a16:creationId xmlns:a16="http://schemas.microsoft.com/office/drawing/2014/main" id="{CD00C14B-84E4-B684-75F9-C03D8D4E587E}"/>
+                </a:ext>
+              </a:extLst>
+            </p:cNvPr>
+            <p:cNvSpPr/>
+            <p:nvPr/>
+          </p:nvSpPr>
+          <p:spPr>
+            <a:xfrm>
+              <a:off x="7333129" y="5100918"/>
+              <a:ext cx="4554071" cy="865094"/>
+            </a:xfrm>
+            <a:prstGeom prst="rect">
+              <a:avLst/>
+            </a:prstGeom>
+            <a:solidFill>
+              <a:srgbClr val="7030A0"/>
+            </a:solidFill>
+            <a:ln>
+              <a:solidFill>
+                <a:srgbClr val="7030A0"/>
+              </a:solidFill>
+            </a:ln>
+          </p:spPr>
+          <p:style>
+            <a:lnRef idx="2">
+              <a:schemeClr val="accent1">
+                <a:shade val="50000"/>
+              </a:schemeClr>
+            </a:lnRef>
+            <a:fillRef idx="1">
+              <a:schemeClr val="accent1"/>
+            </a:fillRef>
+            <a:effectRef idx="0">
+              <a:schemeClr val="accent1"/>
+            </a:effectRef>
+            <a:fontRef idx="minor">
+              <a:schemeClr val="lt1"/>
+            </a:fontRef>
+          </p:style>
+          <p:txBody>
+            <a:bodyPr rtlCol="0" anchor="ctr"/>
+            <a:lstStyle/>
+            <a:p>
+              <a:pPr algn="ctr"/>
+              <a:endParaRPr lang="en-US"/>
+            </a:p>
+          </p:txBody>
+        </p:sp>
+        <p:sp>
+          <p:nvSpPr>
+            <p:cNvPr id="15" name="Rectangle 14">
+              <a:extLst>
+                <a:ext uri="{FF2B5EF4-FFF2-40B4-BE49-F238E27FC236}">
+                  <a16:creationId xmlns:a16="http://schemas.microsoft.com/office/drawing/2014/main" id="{8EBD7C5D-4F73-C422-8CF4-3936905B7D25}"/>
+                </a:ext>
+              </a:extLst>
+            </p:cNvPr>
+            <p:cNvSpPr/>
+            <p:nvPr/>
+          </p:nvSpPr>
+          <p:spPr>
+            <a:xfrm>
+              <a:off x="7333128" y="4782671"/>
+              <a:ext cx="4554071" cy="318247"/>
+            </a:xfrm>
+            <a:prstGeom prst="rect">
+              <a:avLst/>
+            </a:prstGeom>
+            <a:solidFill>
+              <a:srgbClr val="00B050"/>
+            </a:solidFill>
+            <a:ln>
+              <a:solidFill>
+                <a:srgbClr val="00B050"/>
+              </a:solidFill>
+            </a:ln>
+          </p:spPr>
+          <p:style>
+            <a:lnRef idx="2">
+              <a:schemeClr val="accent1">
+                <a:shade val="50000"/>
+              </a:schemeClr>
+            </a:lnRef>
+            <a:fillRef idx="1">
+              <a:schemeClr val="accent1"/>
+            </a:fillRef>
+            <a:effectRef idx="0">
+              <a:schemeClr val="accent1"/>
+            </a:effectRef>
+            <a:fontRef idx="minor">
+              <a:schemeClr val="lt1"/>
+            </a:fontRef>
+          </p:style>
+          <p:txBody>
+            <a:bodyPr rtlCol="0" anchor="ctr"/>
+            <a:lstStyle/>
+            <a:p>
+              <a:pPr algn="ctr"/>
+              <a:endParaRPr lang="en-US"/>
+            </a:p>
+          </p:txBody>
+        </p:sp>
+        <p:pic>
+          <p:nvPicPr>
+            <p:cNvPr id="16" name="Picture 15" descr="Shape, icon&#10;&#10;Description automatically generated">
+              <a:extLst>
+                <a:ext uri="{FF2B5EF4-FFF2-40B4-BE49-F238E27FC236}">
+                  <a16:creationId xmlns:a16="http://schemas.microsoft.com/office/drawing/2014/main" id="{2DA8C226-7E5B-4F60-8BCD-E69FA2F2AC64}"/>
+                </a:ext>
+              </a:extLst>
+            </p:cNvPr>
+            <p:cNvPicPr>
+              <a:picLocks noChangeAspect="1"/>
+            </p:cNvPicPr>
+            <p:nvPr/>
+          </p:nvPicPr>
+          <p:blipFill>
+            <a:blip r:embed="rId2">
+              <a:clrChange>
+                <a:clrFrom>
+                  <a:srgbClr val="FFFFFF"/>
+                </a:clrFrom>
+                <a:clrTo>
+                  <a:srgbClr val="FFFFFF">
+                    <a:alpha val="0"/>
+                  </a:srgbClr>
+                </a:clrTo>
+              </a:clrChange>
+              <a:extLst>
+                <a:ext uri="{28A0092B-C50C-407E-A947-70E740481C1C}">
+                  <a14:useLocalDpi xmlns:a14="http://schemas.microsoft.com/office/drawing/2010/main" val="0"/>
+                </a:ext>
+              </a:extLst>
+            </a:blip>
+            <a:stretch>
+              <a:fillRect/>
+            </a:stretch>
+          </p:blipFill>
+          <p:spPr>
+            <a:xfrm>
+              <a:off x="7637929" y="5249237"/>
+              <a:ext cx="568456" cy="568456"/>
+            </a:xfrm>
+            <a:prstGeom prst="rect">
+              <a:avLst/>
+            </a:prstGeom>
+          </p:spPr>
+        </p:pic>
+        <p:pic>
+          <p:nvPicPr>
+            <p:cNvPr id="17" name="Picture 16" descr="A picture containing queen&#10;&#10;Description automatically generated">
+              <a:extLst>
+                <a:ext uri="{FF2B5EF4-FFF2-40B4-BE49-F238E27FC236}">
+                  <a16:creationId xmlns:a16="http://schemas.microsoft.com/office/drawing/2014/main" id="{BBFDFA68-AD9C-8504-96A1-5FD26D7BC6DC}"/>
+                </a:ext>
+              </a:extLst>
+            </p:cNvPr>
+            <p:cNvPicPr>
+              <a:picLocks noChangeAspect="1"/>
+            </p:cNvPicPr>
+            <p:nvPr/>
+          </p:nvPicPr>
+          <p:blipFill>
+            <a:blip r:embed="rId3">
+              <a:clrChange>
+                <a:clrFrom>
+                  <a:srgbClr val="FFFFFF"/>
+                </a:clrFrom>
+                <a:clrTo>
+                  <a:srgbClr val="FFFFFF">
+                    <a:alpha val="0"/>
+                  </a:srgbClr>
+                </a:clrTo>
+              </a:clrChange>
+              <a:extLst>
+                <a:ext uri="{28A0092B-C50C-407E-A947-70E740481C1C}">
+                  <a14:useLocalDpi xmlns:a14="http://schemas.microsoft.com/office/drawing/2010/main" val="0"/>
+                </a:ext>
+              </a:extLst>
+            </a:blip>
+            <a:stretch>
+              <a:fillRect/>
+            </a:stretch>
+          </p:blipFill>
+          <p:spPr>
+            <a:xfrm>
+              <a:off x="11039618" y="5249237"/>
+              <a:ext cx="568456" cy="568456"/>
+            </a:xfrm>
+            <a:prstGeom prst="rect">
+              <a:avLst/>
+            </a:prstGeom>
+          </p:spPr>
+        </p:pic>
+        <p:sp>
+          <p:nvSpPr>
+            <p:cNvPr id="13" name="Rectangle 12">
+              <a:extLst>
+                <a:ext uri="{FF2B5EF4-FFF2-40B4-BE49-F238E27FC236}">
+                  <a16:creationId xmlns:a16="http://schemas.microsoft.com/office/drawing/2014/main" id="{8015612E-3D72-A7F2-02AF-81C666B91ABF}"/>
+                </a:ext>
+              </a:extLst>
+            </p:cNvPr>
+            <p:cNvSpPr/>
+            <p:nvPr/>
+          </p:nvSpPr>
+          <p:spPr>
+            <a:xfrm>
+              <a:off x="6400800" y="2537012"/>
+              <a:ext cx="932329" cy="3429000"/>
+            </a:xfrm>
+            <a:prstGeom prst="rect">
+              <a:avLst/>
+            </a:prstGeom>
+            <a:solidFill>
+              <a:schemeClr val="accent2"/>
+            </a:solidFill>
+            <a:ln>
+              <a:solidFill>
+                <a:schemeClr val="accent2"/>
+              </a:solidFill>
+            </a:ln>
+          </p:spPr>
+          <p:style>
+            <a:lnRef idx="2">
+              <a:schemeClr val="accent1">
+                <a:shade val="50000"/>
+              </a:schemeClr>
+            </a:lnRef>
+            <a:fillRef idx="1">
+              <a:schemeClr val="accent1"/>
+            </a:fillRef>
+            <a:effectRef idx="0">
+              <a:schemeClr val="accent1"/>
+            </a:effectRef>
+            <a:fontRef idx="minor">
+              <a:schemeClr val="lt1"/>
+            </a:fontRef>
+          </p:style>
+          <p:txBody>
+            <a:bodyPr rtlCol="0" anchor="ctr"/>
+            <a:lstStyle/>
+            <a:p>
+              <a:pPr algn="ctr"/>
+              <a:endParaRPr lang="en-US"/>
+            </a:p>
+          </p:txBody>
+        </p:sp>
+      </p:grpSp>
+    </p:spTree>
+    <p:extLst>
+      <p:ext uri="{BB962C8B-B14F-4D97-AF65-F5344CB8AC3E}">
+        <p14:creationId xmlns:p14="http://schemas.microsoft.com/office/powerpoint/2010/main" val="2826619180"/>
       </p:ext>
     </p:extLst>
   </p:cSld>

</xml_diff>

<commit_message>
Refactored menu selection. Pulled logic into Helpers class. Turned ScoreKeeper and TimeKeeper into static classes.
</commit_message>
<xml_diff>
--- a/Beware/Content/designs.pptx
+++ b/Beware/Content/designs.pptx
@@ -262,7 +262,7 @@
           <a:p>
             <a:fld id="{355FB770-CC93-4F24-BE14-030DA79629D9}" type="datetimeFigureOut">
               <a:rPr lang="en-US" smtClean="0"/>
-              <a:t>11/16/2022</a:t>
+              <a:t>11/17/2022</a:t>
             </a:fld>
             <a:endParaRPr lang="en-US"/>
           </a:p>
@@ -460,7 +460,7 @@
           <a:p>
             <a:fld id="{355FB770-CC93-4F24-BE14-030DA79629D9}" type="datetimeFigureOut">
               <a:rPr lang="en-US" smtClean="0"/>
-              <a:t>11/16/2022</a:t>
+              <a:t>11/17/2022</a:t>
             </a:fld>
             <a:endParaRPr lang="en-US"/>
           </a:p>
@@ -668,7 +668,7 @@
           <a:p>
             <a:fld id="{355FB770-CC93-4F24-BE14-030DA79629D9}" type="datetimeFigureOut">
               <a:rPr lang="en-US" smtClean="0"/>
-              <a:t>11/16/2022</a:t>
+              <a:t>11/17/2022</a:t>
             </a:fld>
             <a:endParaRPr lang="en-US"/>
           </a:p>
@@ -866,7 +866,7 @@
           <a:p>
             <a:fld id="{355FB770-CC93-4F24-BE14-030DA79629D9}" type="datetimeFigureOut">
               <a:rPr lang="en-US" smtClean="0"/>
-              <a:t>11/16/2022</a:t>
+              <a:t>11/17/2022</a:t>
             </a:fld>
             <a:endParaRPr lang="en-US"/>
           </a:p>
@@ -1141,7 +1141,7 @@
           <a:p>
             <a:fld id="{355FB770-CC93-4F24-BE14-030DA79629D9}" type="datetimeFigureOut">
               <a:rPr lang="en-US" smtClean="0"/>
-              <a:t>11/16/2022</a:t>
+              <a:t>11/17/2022</a:t>
             </a:fld>
             <a:endParaRPr lang="en-US"/>
           </a:p>
@@ -1406,7 +1406,7 @@
           <a:p>
             <a:fld id="{355FB770-CC93-4F24-BE14-030DA79629D9}" type="datetimeFigureOut">
               <a:rPr lang="en-US" smtClean="0"/>
-              <a:t>11/16/2022</a:t>
+              <a:t>11/17/2022</a:t>
             </a:fld>
             <a:endParaRPr lang="en-US"/>
           </a:p>
@@ -1818,7 +1818,7 @@
           <a:p>
             <a:fld id="{355FB770-CC93-4F24-BE14-030DA79629D9}" type="datetimeFigureOut">
               <a:rPr lang="en-US" smtClean="0"/>
-              <a:t>11/16/2022</a:t>
+              <a:t>11/17/2022</a:t>
             </a:fld>
             <a:endParaRPr lang="en-US"/>
           </a:p>
@@ -1959,7 +1959,7 @@
           <a:p>
             <a:fld id="{355FB770-CC93-4F24-BE14-030DA79629D9}" type="datetimeFigureOut">
               <a:rPr lang="en-US" smtClean="0"/>
-              <a:t>11/16/2022</a:t>
+              <a:t>11/17/2022</a:t>
             </a:fld>
             <a:endParaRPr lang="en-US"/>
           </a:p>
@@ -2072,7 +2072,7 @@
           <a:p>
             <a:fld id="{355FB770-CC93-4F24-BE14-030DA79629D9}" type="datetimeFigureOut">
               <a:rPr lang="en-US" smtClean="0"/>
-              <a:t>11/16/2022</a:t>
+              <a:t>11/17/2022</a:t>
             </a:fld>
             <a:endParaRPr lang="en-US"/>
           </a:p>
@@ -2383,7 +2383,7 @@
           <a:p>
             <a:fld id="{355FB770-CC93-4F24-BE14-030DA79629D9}" type="datetimeFigureOut">
               <a:rPr lang="en-US" smtClean="0"/>
-              <a:t>11/16/2022</a:t>
+              <a:t>11/17/2022</a:t>
             </a:fld>
             <a:endParaRPr lang="en-US"/>
           </a:p>
@@ -2671,7 +2671,7 @@
           <a:p>
             <a:fld id="{355FB770-CC93-4F24-BE14-030DA79629D9}" type="datetimeFigureOut">
               <a:rPr lang="en-US" smtClean="0"/>
-              <a:t>11/16/2022</a:t>
+              <a:t>11/17/2022</a:t>
             </a:fld>
             <a:endParaRPr lang="en-US"/>
           </a:p>
@@ -2912,7 +2912,7 @@
           <a:p>
             <a:fld id="{355FB770-CC93-4F24-BE14-030DA79629D9}" type="datetimeFigureOut">
               <a:rPr lang="en-US" smtClean="0"/>
-              <a:t>11/16/2022</a:t>
+              <a:t>11/17/2022</a:t>
             </a:fld>
             <a:endParaRPr lang="en-US"/>
           </a:p>
@@ -17702,7 +17702,7 @@
         </p:nvGrpSpPr>
         <p:grpSpPr>
           <a:xfrm>
-            <a:off x="6400800" y="2537012"/>
+            <a:off x="6354041" y="0"/>
             <a:ext cx="5486400" cy="3429000"/>
             <a:chOff x="6400800" y="2537012"/>
             <a:chExt cx="5486400" cy="3429000"/>
@@ -18008,6 +18008,273 @@
             </a:p>
           </p:txBody>
         </p:sp>
+      </p:grpSp>
+      <p:grpSp>
+        <p:nvGrpSpPr>
+          <p:cNvPr id="23" name="Group 22">
+            <a:extLst>
+              <a:ext uri="{FF2B5EF4-FFF2-40B4-BE49-F238E27FC236}">
+                <a16:creationId xmlns:a16="http://schemas.microsoft.com/office/drawing/2014/main" id="{68A5430B-B7EC-2F22-52D8-9A7ADD4A4401}"/>
+              </a:ext>
+            </a:extLst>
+          </p:cNvPr>
+          <p:cNvGrpSpPr/>
+          <p:nvPr/>
+        </p:nvGrpSpPr>
+        <p:grpSpPr>
+          <a:xfrm>
+            <a:off x="609600" y="3971058"/>
+            <a:ext cx="5486400" cy="2211533"/>
+            <a:chOff x="609600" y="3971058"/>
+            <a:chExt cx="5486400" cy="2211533"/>
+          </a:xfrm>
+        </p:grpSpPr>
+        <p:sp>
+          <p:nvSpPr>
+            <p:cNvPr id="3" name="Rectangle 2">
+              <a:extLst>
+                <a:ext uri="{FF2B5EF4-FFF2-40B4-BE49-F238E27FC236}">
+                  <a16:creationId xmlns:a16="http://schemas.microsoft.com/office/drawing/2014/main" id="{6C291D7B-DADD-2054-DC67-28537CA6F56B}"/>
+                </a:ext>
+              </a:extLst>
+            </p:cNvPr>
+            <p:cNvSpPr/>
+            <p:nvPr/>
+          </p:nvSpPr>
+          <p:spPr>
+            <a:xfrm>
+              <a:off x="609600" y="3971059"/>
+              <a:ext cx="5486400" cy="2211532"/>
+            </a:xfrm>
+            <a:prstGeom prst="rect">
+              <a:avLst/>
+            </a:prstGeom>
+          </p:spPr>
+          <p:style>
+            <a:lnRef idx="2">
+              <a:schemeClr val="accent1">
+                <a:shade val="50000"/>
+              </a:schemeClr>
+            </a:lnRef>
+            <a:fillRef idx="1">
+              <a:schemeClr val="accent1"/>
+            </a:fillRef>
+            <a:effectRef idx="0">
+              <a:schemeClr val="accent1"/>
+            </a:effectRef>
+            <a:fontRef idx="minor">
+              <a:schemeClr val="lt1"/>
+            </a:fontRef>
+          </p:style>
+          <p:txBody>
+            <a:bodyPr rtlCol="0" anchor="ctr"/>
+            <a:lstStyle/>
+            <a:p>
+              <a:pPr algn="ctr"/>
+              <a:endParaRPr lang="en-US"/>
+            </a:p>
+          </p:txBody>
+        </p:sp>
+        <p:sp>
+          <p:nvSpPr>
+            <p:cNvPr id="11" name="Rectangle 10">
+              <a:extLst>
+                <a:ext uri="{FF2B5EF4-FFF2-40B4-BE49-F238E27FC236}">
+                  <a16:creationId xmlns:a16="http://schemas.microsoft.com/office/drawing/2014/main" id="{C56C7F6E-F9F5-1248-E8D1-436B575D382A}"/>
+                </a:ext>
+              </a:extLst>
+            </p:cNvPr>
+            <p:cNvSpPr/>
+            <p:nvPr/>
+          </p:nvSpPr>
+          <p:spPr>
+            <a:xfrm>
+              <a:off x="5163671" y="3971058"/>
+              <a:ext cx="932329" cy="2211531"/>
+            </a:xfrm>
+            <a:prstGeom prst="rect">
+              <a:avLst/>
+            </a:prstGeom>
+            <a:solidFill>
+              <a:srgbClr val="7030A0"/>
+            </a:solidFill>
+            <a:ln>
+              <a:solidFill>
+                <a:srgbClr val="7030A0"/>
+              </a:solidFill>
+            </a:ln>
+          </p:spPr>
+          <p:style>
+            <a:lnRef idx="2">
+              <a:schemeClr val="accent1">
+                <a:shade val="50000"/>
+              </a:schemeClr>
+            </a:lnRef>
+            <a:fillRef idx="1">
+              <a:schemeClr val="accent1"/>
+            </a:fillRef>
+            <a:effectRef idx="0">
+              <a:schemeClr val="accent1"/>
+            </a:effectRef>
+            <a:fontRef idx="minor">
+              <a:schemeClr val="lt1"/>
+            </a:fontRef>
+          </p:style>
+          <p:txBody>
+            <a:bodyPr rtlCol="0" anchor="ctr"/>
+            <a:lstStyle/>
+            <a:p>
+              <a:pPr algn="ctr"/>
+              <a:endParaRPr lang="en-US"/>
+            </a:p>
+          </p:txBody>
+        </p:sp>
+        <p:pic>
+          <p:nvPicPr>
+            <p:cNvPr id="21" name="Picture 20" descr="A picture containing queen&#10;&#10;Description automatically generated">
+              <a:extLst>
+                <a:ext uri="{FF2B5EF4-FFF2-40B4-BE49-F238E27FC236}">
+                  <a16:creationId xmlns:a16="http://schemas.microsoft.com/office/drawing/2014/main" id="{BA228A09-6708-0E4D-8B85-0CE71967CD72}"/>
+                </a:ext>
+              </a:extLst>
+            </p:cNvPr>
+            <p:cNvPicPr>
+              <a:picLocks noChangeAspect="1"/>
+            </p:cNvPicPr>
+            <p:nvPr/>
+          </p:nvPicPr>
+          <p:blipFill>
+            <a:blip r:embed="rId3">
+              <a:clrChange>
+                <a:clrFrom>
+                  <a:srgbClr val="FFFFFF"/>
+                </a:clrFrom>
+                <a:clrTo>
+                  <a:srgbClr val="FFFFFF">
+                    <a:alpha val="0"/>
+                  </a:srgbClr>
+                </a:clrTo>
+              </a:clrChange>
+              <a:extLst>
+                <a:ext uri="{28A0092B-C50C-407E-A947-70E740481C1C}">
+                  <a14:useLocalDpi xmlns:a14="http://schemas.microsoft.com/office/drawing/2010/main" val="0"/>
+                </a:ext>
+              </a:extLst>
+            </a:blip>
+            <a:stretch>
+              <a:fillRect/>
+            </a:stretch>
+          </p:blipFill>
+          <p:spPr>
+            <a:xfrm>
+              <a:off x="5345607" y="4340134"/>
+              <a:ext cx="568456" cy="568456"/>
+            </a:xfrm>
+            <a:prstGeom prst="rect">
+              <a:avLst/>
+            </a:prstGeom>
+          </p:spPr>
+        </p:pic>
+        <p:sp>
+          <p:nvSpPr>
+            <p:cNvPr id="22" name="Rectangle 21">
+              <a:extLst>
+                <a:ext uri="{FF2B5EF4-FFF2-40B4-BE49-F238E27FC236}">
+                  <a16:creationId xmlns:a16="http://schemas.microsoft.com/office/drawing/2014/main" id="{BDAD8853-192D-FC84-B490-8A088189EEDB}"/>
+                </a:ext>
+              </a:extLst>
+            </p:cNvPr>
+            <p:cNvSpPr/>
+            <p:nvPr/>
+          </p:nvSpPr>
+          <p:spPr>
+            <a:xfrm>
+              <a:off x="609600" y="3971059"/>
+              <a:ext cx="932329" cy="2211532"/>
+            </a:xfrm>
+            <a:prstGeom prst="rect">
+              <a:avLst/>
+            </a:prstGeom>
+            <a:solidFill>
+              <a:schemeClr val="accent2"/>
+            </a:solidFill>
+            <a:ln>
+              <a:solidFill>
+                <a:schemeClr val="accent2"/>
+              </a:solidFill>
+            </a:ln>
+          </p:spPr>
+          <p:style>
+            <a:lnRef idx="2">
+              <a:schemeClr val="accent1">
+                <a:shade val="50000"/>
+              </a:schemeClr>
+            </a:lnRef>
+            <a:fillRef idx="1">
+              <a:schemeClr val="accent1"/>
+            </a:fillRef>
+            <a:effectRef idx="0">
+              <a:schemeClr val="accent1"/>
+            </a:effectRef>
+            <a:fontRef idx="minor">
+              <a:schemeClr val="lt1"/>
+            </a:fontRef>
+          </p:style>
+          <p:txBody>
+            <a:bodyPr rtlCol="0" anchor="ctr"/>
+            <a:lstStyle/>
+            <a:p>
+              <a:pPr algn="ctr"/>
+              <a:endParaRPr lang="en-US"/>
+            </a:p>
+          </p:txBody>
+        </p:sp>
+        <p:pic>
+          <p:nvPicPr>
+            <p:cNvPr id="20" name="Picture 19" descr="Shape, icon&#10;&#10;Description automatically generated">
+              <a:extLst>
+                <a:ext uri="{FF2B5EF4-FFF2-40B4-BE49-F238E27FC236}">
+                  <a16:creationId xmlns:a16="http://schemas.microsoft.com/office/drawing/2014/main" id="{CFB5A9B4-EAD3-BE2C-AC62-0D2F02D1E00D}"/>
+                </a:ext>
+              </a:extLst>
+            </p:cNvPr>
+            <p:cNvPicPr>
+              <a:picLocks noChangeAspect="1"/>
+            </p:cNvPicPr>
+            <p:nvPr/>
+          </p:nvPicPr>
+          <p:blipFill>
+            <a:blip r:embed="rId2">
+              <a:clrChange>
+                <a:clrFrom>
+                  <a:srgbClr val="FFFFFF"/>
+                </a:clrFrom>
+                <a:clrTo>
+                  <a:srgbClr val="FFFFFF">
+                    <a:alpha val="0"/>
+                  </a:srgbClr>
+                </a:clrTo>
+              </a:clrChange>
+              <a:extLst>
+                <a:ext uri="{28A0092B-C50C-407E-A947-70E740481C1C}">
+                  <a14:useLocalDpi xmlns:a14="http://schemas.microsoft.com/office/drawing/2010/main" val="0"/>
+                </a:ext>
+              </a:extLst>
+            </a:blip>
+            <a:stretch>
+              <a:fillRect/>
+            </a:stretch>
+          </p:blipFill>
+          <p:spPr>
+            <a:xfrm>
+              <a:off x="791536" y="4340134"/>
+              <a:ext cx="568456" cy="568456"/>
+            </a:xfrm>
+            <a:prstGeom prst="rect">
+              <a:avLst/>
+            </a:prstGeom>
+          </p:spPr>
+        </p:pic>
       </p:grpSp>
     </p:spTree>
     <p:extLst>

</xml_diff>

<commit_message>
Adding auido controls. Trying new ideas for the commands.
</commit_message>
<xml_diff>
--- a/Beware/Content/designs.pptx
+++ b/Beware/Content/designs.pptx
@@ -262,7 +262,7 @@
           <a:p>
             <a:fld id="{355FB770-CC93-4F24-BE14-030DA79629D9}" type="datetimeFigureOut">
               <a:rPr lang="en-US" smtClean="0"/>
-              <a:t>11/17/2022</a:t>
+              <a:t>11/18/2022</a:t>
             </a:fld>
             <a:endParaRPr lang="en-US"/>
           </a:p>
@@ -460,7 +460,7 @@
           <a:p>
             <a:fld id="{355FB770-CC93-4F24-BE14-030DA79629D9}" type="datetimeFigureOut">
               <a:rPr lang="en-US" smtClean="0"/>
-              <a:t>11/17/2022</a:t>
+              <a:t>11/18/2022</a:t>
             </a:fld>
             <a:endParaRPr lang="en-US"/>
           </a:p>
@@ -668,7 +668,7 @@
           <a:p>
             <a:fld id="{355FB770-CC93-4F24-BE14-030DA79629D9}" type="datetimeFigureOut">
               <a:rPr lang="en-US" smtClean="0"/>
-              <a:t>11/17/2022</a:t>
+              <a:t>11/18/2022</a:t>
             </a:fld>
             <a:endParaRPr lang="en-US"/>
           </a:p>
@@ -866,7 +866,7 @@
           <a:p>
             <a:fld id="{355FB770-CC93-4F24-BE14-030DA79629D9}" type="datetimeFigureOut">
               <a:rPr lang="en-US" smtClean="0"/>
-              <a:t>11/17/2022</a:t>
+              <a:t>11/18/2022</a:t>
             </a:fld>
             <a:endParaRPr lang="en-US"/>
           </a:p>
@@ -1141,7 +1141,7 @@
           <a:p>
             <a:fld id="{355FB770-CC93-4F24-BE14-030DA79629D9}" type="datetimeFigureOut">
               <a:rPr lang="en-US" smtClean="0"/>
-              <a:t>11/17/2022</a:t>
+              <a:t>11/18/2022</a:t>
             </a:fld>
             <a:endParaRPr lang="en-US"/>
           </a:p>
@@ -1406,7 +1406,7 @@
           <a:p>
             <a:fld id="{355FB770-CC93-4F24-BE14-030DA79629D9}" type="datetimeFigureOut">
               <a:rPr lang="en-US" smtClean="0"/>
-              <a:t>11/17/2022</a:t>
+              <a:t>11/18/2022</a:t>
             </a:fld>
             <a:endParaRPr lang="en-US"/>
           </a:p>
@@ -1818,7 +1818,7 @@
           <a:p>
             <a:fld id="{355FB770-CC93-4F24-BE14-030DA79629D9}" type="datetimeFigureOut">
               <a:rPr lang="en-US" smtClean="0"/>
-              <a:t>11/17/2022</a:t>
+              <a:t>11/18/2022</a:t>
             </a:fld>
             <a:endParaRPr lang="en-US"/>
           </a:p>
@@ -1959,7 +1959,7 @@
           <a:p>
             <a:fld id="{355FB770-CC93-4F24-BE14-030DA79629D9}" type="datetimeFigureOut">
               <a:rPr lang="en-US" smtClean="0"/>
-              <a:t>11/17/2022</a:t>
+              <a:t>11/18/2022</a:t>
             </a:fld>
             <a:endParaRPr lang="en-US"/>
           </a:p>
@@ -2072,7 +2072,7 @@
           <a:p>
             <a:fld id="{355FB770-CC93-4F24-BE14-030DA79629D9}" type="datetimeFigureOut">
               <a:rPr lang="en-US" smtClean="0"/>
-              <a:t>11/17/2022</a:t>
+              <a:t>11/18/2022</a:t>
             </a:fld>
             <a:endParaRPr lang="en-US"/>
           </a:p>
@@ -2383,7 +2383,7 @@
           <a:p>
             <a:fld id="{355FB770-CC93-4F24-BE14-030DA79629D9}" type="datetimeFigureOut">
               <a:rPr lang="en-US" smtClean="0"/>
-              <a:t>11/17/2022</a:t>
+              <a:t>11/18/2022</a:t>
             </a:fld>
             <a:endParaRPr lang="en-US"/>
           </a:p>
@@ -2671,7 +2671,7 @@
           <a:p>
             <a:fld id="{355FB770-CC93-4F24-BE14-030DA79629D9}" type="datetimeFigureOut">
               <a:rPr lang="en-US" smtClean="0"/>
-              <a:t>11/17/2022</a:t>
+              <a:t>11/18/2022</a:t>
             </a:fld>
             <a:endParaRPr lang="en-US"/>
           </a:p>
@@ -2912,7 +2912,7 @@
           <a:p>
             <a:fld id="{355FB770-CC93-4F24-BE14-030DA79629D9}" type="datetimeFigureOut">
               <a:rPr lang="en-US" smtClean="0"/>
-              <a:t>11/17/2022</a:t>
+              <a:t>11/18/2022</a:t>
             </a:fld>
             <a:endParaRPr lang="en-US"/>
           </a:p>
@@ -6631,6 +6631,414 @@
           </a:prstGeom>
         </p:spPr>
       </p:pic>
+      <p:grpSp>
+        <p:nvGrpSpPr>
+          <p:cNvPr id="72" name="Group 71">
+            <a:extLst>
+              <a:ext uri="{FF2B5EF4-FFF2-40B4-BE49-F238E27FC236}">
+                <a16:creationId xmlns:a16="http://schemas.microsoft.com/office/drawing/2014/main" id="{9B0B4C49-8237-F6C6-9C56-6BCDD571B756}"/>
+              </a:ext>
+            </a:extLst>
+          </p:cNvPr>
+          <p:cNvGrpSpPr/>
+          <p:nvPr/>
+        </p:nvGrpSpPr>
+        <p:grpSpPr>
+          <a:xfrm>
+            <a:off x="9770292" y="1584614"/>
+            <a:ext cx="1022165" cy="1022165"/>
+            <a:chOff x="9770292" y="1584614"/>
+            <a:chExt cx="1022165" cy="1022165"/>
+          </a:xfrm>
+        </p:grpSpPr>
+        <p:sp>
+          <p:nvSpPr>
+            <p:cNvPr id="8" name="Oval 7">
+              <a:extLst>
+                <a:ext uri="{FF2B5EF4-FFF2-40B4-BE49-F238E27FC236}">
+                  <a16:creationId xmlns:a16="http://schemas.microsoft.com/office/drawing/2014/main" id="{6AE365E1-10E1-EEC6-2267-B0BB964E8F61}"/>
+                </a:ext>
+              </a:extLst>
+            </p:cNvPr>
+            <p:cNvSpPr/>
+            <p:nvPr/>
+          </p:nvSpPr>
+          <p:spPr>
+            <a:xfrm>
+              <a:off x="9770292" y="1584614"/>
+              <a:ext cx="1022165" cy="1022165"/>
+            </a:xfrm>
+            <a:prstGeom prst="ellipse">
+              <a:avLst/>
+            </a:prstGeom>
+            <a:ln w="57150">
+              <a:solidFill>
+                <a:srgbClr val="FF0000"/>
+              </a:solidFill>
+            </a:ln>
+          </p:spPr>
+          <p:style>
+            <a:lnRef idx="2">
+              <a:schemeClr val="accent1">
+                <a:shade val="50000"/>
+              </a:schemeClr>
+            </a:lnRef>
+            <a:fillRef idx="1">
+              <a:schemeClr val="accent1"/>
+            </a:fillRef>
+            <a:effectRef idx="0">
+              <a:schemeClr val="accent1"/>
+            </a:effectRef>
+            <a:fontRef idx="minor">
+              <a:schemeClr val="lt1"/>
+            </a:fontRef>
+          </p:style>
+          <p:txBody>
+            <a:bodyPr rtlCol="0" anchor="ctr"/>
+            <a:lstStyle/>
+            <a:p>
+              <a:pPr algn="ctr"/>
+              <a:endParaRPr lang="en-US"/>
+            </a:p>
+          </p:txBody>
+        </p:sp>
+        <p:grpSp>
+          <p:nvGrpSpPr>
+            <p:cNvPr id="71" name="Group 70">
+              <a:extLst>
+                <a:ext uri="{FF2B5EF4-FFF2-40B4-BE49-F238E27FC236}">
+                  <a16:creationId xmlns:a16="http://schemas.microsoft.com/office/drawing/2014/main" id="{0B5E2FD3-ACFB-FE8C-9811-4E4247B628D9}"/>
+                </a:ext>
+              </a:extLst>
+            </p:cNvPr>
+            <p:cNvGrpSpPr/>
+            <p:nvPr/>
+          </p:nvGrpSpPr>
+          <p:grpSpPr>
+            <a:xfrm>
+              <a:off x="9948315" y="1886472"/>
+              <a:ext cx="666118" cy="430307"/>
+              <a:chOff x="9009273" y="681361"/>
+              <a:chExt cx="666118" cy="430307"/>
+            </a:xfrm>
+          </p:grpSpPr>
+          <p:grpSp>
+            <p:nvGrpSpPr>
+              <p:cNvPr id="9" name="Group 8">
+                <a:extLst>
+                  <a:ext uri="{FF2B5EF4-FFF2-40B4-BE49-F238E27FC236}">
+                    <a16:creationId xmlns:a16="http://schemas.microsoft.com/office/drawing/2014/main" id="{B5D99BF4-AC60-568D-5731-63EC3830B839}"/>
+                  </a:ext>
+                </a:extLst>
+              </p:cNvPr>
+              <p:cNvGrpSpPr/>
+              <p:nvPr/>
+            </p:nvGrpSpPr>
+            <p:grpSpPr>
+              <a:xfrm>
+                <a:off x="9009273" y="681361"/>
+                <a:ext cx="418559" cy="430307"/>
+                <a:chOff x="9063318" y="734667"/>
+                <a:chExt cx="418559" cy="430307"/>
+              </a:xfrm>
+            </p:grpSpPr>
+            <p:sp>
+              <p:nvSpPr>
+                <p:cNvPr id="6" name="Rectangle 5">
+                  <a:extLst>
+                    <a:ext uri="{FF2B5EF4-FFF2-40B4-BE49-F238E27FC236}">
+                      <a16:creationId xmlns:a16="http://schemas.microsoft.com/office/drawing/2014/main" id="{1AD3C549-25A9-A1F9-6A2E-76DC699CF68A}"/>
+                    </a:ext>
+                  </a:extLst>
+                </p:cNvPr>
+                <p:cNvSpPr/>
+                <p:nvPr/>
+              </p:nvSpPr>
+              <p:spPr>
+                <a:xfrm>
+                  <a:off x="9063318" y="851647"/>
+                  <a:ext cx="233082" cy="188259"/>
+                </a:xfrm>
+                <a:prstGeom prst="rect">
+                  <a:avLst/>
+                </a:prstGeom>
+                <a:solidFill>
+                  <a:schemeClr val="bg1">
+                    <a:lumMod val="95000"/>
+                  </a:schemeClr>
+                </a:solidFill>
+                <a:ln>
+                  <a:solidFill>
+                    <a:schemeClr val="bg1">
+                      <a:lumMod val="95000"/>
+                    </a:schemeClr>
+                  </a:solidFill>
+                </a:ln>
+              </p:spPr>
+              <p:style>
+                <a:lnRef idx="2">
+                  <a:schemeClr val="accent1">
+                    <a:shade val="50000"/>
+                  </a:schemeClr>
+                </a:lnRef>
+                <a:fillRef idx="1">
+                  <a:schemeClr val="accent1"/>
+                </a:fillRef>
+                <a:effectRef idx="0">
+                  <a:schemeClr val="accent1"/>
+                </a:effectRef>
+                <a:fontRef idx="minor">
+                  <a:schemeClr val="lt1"/>
+                </a:fontRef>
+              </p:style>
+              <p:txBody>
+                <a:bodyPr rtlCol="0" anchor="ctr"/>
+                <a:lstStyle/>
+                <a:p>
+                  <a:pPr algn="ctr"/>
+                  <a:endParaRPr lang="en-US"/>
+                </a:p>
+              </p:txBody>
+            </p:sp>
+            <p:sp>
+              <p:nvSpPr>
+                <p:cNvPr id="7" name="Isosceles Triangle 6">
+                  <a:extLst>
+                    <a:ext uri="{FF2B5EF4-FFF2-40B4-BE49-F238E27FC236}">
+                      <a16:creationId xmlns:a16="http://schemas.microsoft.com/office/drawing/2014/main" id="{443825EB-19B8-A611-292B-5AC4ED72CC16}"/>
+                    </a:ext>
+                  </a:extLst>
+                </p:cNvPr>
+                <p:cNvSpPr/>
+                <p:nvPr/>
+              </p:nvSpPr>
+              <p:spPr>
+                <a:xfrm rot="16200000">
+                  <a:off x="9081246" y="764343"/>
+                  <a:ext cx="430307" cy="370955"/>
+                </a:xfrm>
+                <a:prstGeom prst="triangle">
+                  <a:avLst/>
+                </a:prstGeom>
+                <a:solidFill>
+                  <a:schemeClr val="bg1">
+                    <a:lumMod val="95000"/>
+                  </a:schemeClr>
+                </a:solidFill>
+                <a:ln>
+                  <a:solidFill>
+                    <a:schemeClr val="bg1">
+                      <a:lumMod val="95000"/>
+                    </a:schemeClr>
+                  </a:solidFill>
+                </a:ln>
+              </p:spPr>
+              <p:style>
+                <a:lnRef idx="2">
+                  <a:schemeClr val="accent1">
+                    <a:shade val="50000"/>
+                  </a:schemeClr>
+                </a:lnRef>
+                <a:fillRef idx="1">
+                  <a:schemeClr val="accent1"/>
+                </a:fillRef>
+                <a:effectRef idx="0">
+                  <a:schemeClr val="accent1"/>
+                </a:effectRef>
+                <a:fontRef idx="minor">
+                  <a:schemeClr val="lt1"/>
+                </a:fontRef>
+              </p:style>
+              <p:txBody>
+                <a:bodyPr rtlCol="0" anchor="ctr"/>
+                <a:lstStyle/>
+                <a:p>
+                  <a:pPr algn="ctr"/>
+                  <a:endParaRPr lang="en-US"/>
+                </a:p>
+              </p:txBody>
+            </p:sp>
+          </p:grpSp>
+          <p:cxnSp>
+            <p:nvCxnSpPr>
+              <p:cNvPr id="21" name="Straight Connector 20">
+                <a:extLst>
+                  <a:ext uri="{FF2B5EF4-FFF2-40B4-BE49-F238E27FC236}">
+                    <a16:creationId xmlns:a16="http://schemas.microsoft.com/office/drawing/2014/main" id="{6B493E17-FB87-F38E-96DC-03C50096A253}"/>
+                  </a:ext>
+                </a:extLst>
+              </p:cNvPr>
+              <p:cNvCxnSpPr/>
+              <p:nvPr/>
+            </p:nvCxnSpPr>
+            <p:spPr>
+              <a:xfrm>
+                <a:off x="9523354" y="884470"/>
+                <a:ext cx="143435" cy="0"/>
+              </a:xfrm>
+              <a:prstGeom prst="line">
+                <a:avLst/>
+              </a:prstGeom>
+              <a:ln w="57150">
+                <a:solidFill>
+                  <a:schemeClr val="bg1">
+                    <a:lumMod val="95000"/>
+                  </a:schemeClr>
+                </a:solidFill>
+              </a:ln>
+            </p:spPr>
+            <p:style>
+              <a:lnRef idx="1">
+                <a:schemeClr val="accent1"/>
+              </a:lnRef>
+              <a:fillRef idx="0">
+                <a:schemeClr val="accent1"/>
+              </a:fillRef>
+              <a:effectRef idx="0">
+                <a:schemeClr val="accent1"/>
+              </a:effectRef>
+              <a:fontRef idx="minor">
+                <a:schemeClr val="tx1"/>
+              </a:fontRef>
+            </p:style>
+          </p:cxnSp>
+          <p:cxnSp>
+            <p:nvCxnSpPr>
+              <p:cNvPr id="67" name="Straight Connector 66">
+                <a:extLst>
+                  <a:ext uri="{FF2B5EF4-FFF2-40B4-BE49-F238E27FC236}">
+                    <a16:creationId xmlns:a16="http://schemas.microsoft.com/office/drawing/2014/main" id="{0E6BE381-90F2-7AFD-214E-1C5BF03CD89B}"/>
+                  </a:ext>
+                </a:extLst>
+              </p:cNvPr>
+              <p:cNvCxnSpPr>
+                <a:cxnSpLocks/>
+              </p:cNvCxnSpPr>
+              <p:nvPr/>
+            </p:nvCxnSpPr>
+            <p:spPr>
+              <a:xfrm rot="900000">
+                <a:off x="9523353" y="1023318"/>
+                <a:ext cx="143435" cy="0"/>
+              </a:xfrm>
+              <a:prstGeom prst="line">
+                <a:avLst/>
+              </a:prstGeom>
+              <a:ln w="57150">
+                <a:solidFill>
+                  <a:schemeClr val="bg1">
+                    <a:lumMod val="95000"/>
+                  </a:schemeClr>
+                </a:solidFill>
+              </a:ln>
+            </p:spPr>
+            <p:style>
+              <a:lnRef idx="1">
+                <a:schemeClr val="accent1"/>
+              </a:lnRef>
+              <a:fillRef idx="0">
+                <a:schemeClr val="accent1"/>
+              </a:fillRef>
+              <a:effectRef idx="0">
+                <a:schemeClr val="accent1"/>
+              </a:effectRef>
+              <a:fontRef idx="minor">
+                <a:schemeClr val="tx1"/>
+              </a:fontRef>
+            </p:style>
+          </p:cxnSp>
+          <p:cxnSp>
+            <p:nvCxnSpPr>
+              <p:cNvPr id="68" name="Straight Connector 67">
+                <a:extLst>
+                  <a:ext uri="{FF2B5EF4-FFF2-40B4-BE49-F238E27FC236}">
+                    <a16:creationId xmlns:a16="http://schemas.microsoft.com/office/drawing/2014/main" id="{08538531-612D-DB76-0C72-BA75E8C84114}"/>
+                  </a:ext>
+                </a:extLst>
+              </p:cNvPr>
+              <p:cNvCxnSpPr>
+                <a:cxnSpLocks/>
+              </p:cNvCxnSpPr>
+              <p:nvPr/>
+            </p:nvCxnSpPr>
+            <p:spPr>
+              <a:xfrm rot="-900000">
+                <a:off x="9531956" y="745623"/>
+                <a:ext cx="143435" cy="0"/>
+              </a:xfrm>
+              <a:prstGeom prst="line">
+                <a:avLst/>
+              </a:prstGeom>
+              <a:ln w="57150">
+                <a:solidFill>
+                  <a:schemeClr val="bg1">
+                    <a:lumMod val="95000"/>
+                  </a:schemeClr>
+                </a:solidFill>
+              </a:ln>
+            </p:spPr>
+            <p:style>
+              <a:lnRef idx="1">
+                <a:schemeClr val="accent1"/>
+              </a:lnRef>
+              <a:fillRef idx="0">
+                <a:schemeClr val="accent1"/>
+              </a:fillRef>
+              <a:effectRef idx="0">
+                <a:schemeClr val="accent1"/>
+              </a:effectRef>
+              <a:fontRef idx="minor">
+                <a:schemeClr val="tx1"/>
+              </a:fontRef>
+            </p:style>
+          </p:cxnSp>
+        </p:grpSp>
+        <p:cxnSp>
+          <p:nvCxnSpPr>
+            <p:cNvPr id="12" name="Straight Connector 11">
+              <a:extLst>
+                <a:ext uri="{FF2B5EF4-FFF2-40B4-BE49-F238E27FC236}">
+                  <a16:creationId xmlns:a16="http://schemas.microsoft.com/office/drawing/2014/main" id="{49D5A841-EA8F-8283-C3A5-D9C2C8D95F10}"/>
+                </a:ext>
+              </a:extLst>
+            </p:cNvPr>
+            <p:cNvCxnSpPr>
+              <a:cxnSpLocks/>
+              <a:stCxn id="8" idx="3"/>
+              <a:endCxn id="8" idx="7"/>
+            </p:cNvCxnSpPr>
+            <p:nvPr/>
+          </p:nvCxnSpPr>
+          <p:spPr>
+            <a:xfrm flipV="1">
+              <a:off x="9919985" y="1734307"/>
+              <a:ext cx="722779" cy="722779"/>
+            </a:xfrm>
+            <a:prstGeom prst="line">
+              <a:avLst/>
+            </a:prstGeom>
+            <a:ln w="57150">
+              <a:solidFill>
+                <a:srgbClr val="FF0000"/>
+              </a:solidFill>
+            </a:ln>
+          </p:spPr>
+          <p:style>
+            <a:lnRef idx="1">
+              <a:schemeClr val="accent1"/>
+            </a:lnRef>
+            <a:fillRef idx="0">
+              <a:schemeClr val="accent1"/>
+            </a:fillRef>
+            <a:effectRef idx="0">
+              <a:schemeClr val="accent1"/>
+            </a:effectRef>
+            <a:fontRef idx="minor">
+              <a:schemeClr val="tx1"/>
+            </a:fontRef>
+          </p:style>
+        </p:cxnSp>
+      </p:grpSp>
     </p:spTree>
     <p:extLst>
       <p:ext uri="{BB962C8B-B14F-4D97-AF65-F5344CB8AC3E}">

</xml_diff>

<commit_message>
Added some contect pictures. Working on the Nintendo Switch layout.
</commit_message>
<xml_diff>
--- a/Beware/Content/designs.pptx
+++ b/Beware/Content/designs.pptx
@@ -9,6 +9,7 @@
     <p:sldId id="257" r:id="rId3"/>
     <p:sldId id="258" r:id="rId4"/>
     <p:sldId id="259" r:id="rId5"/>
+    <p:sldId id="260" r:id="rId6"/>
   </p:sldIdLst>
   <p:sldSz cx="12192000" cy="6858000"/>
   <p:notesSz cx="6858000" cy="9144000"/>
@@ -262,7 +263,7 @@
           <a:p>
             <a:fld id="{355FB770-CC93-4F24-BE14-030DA79629D9}" type="datetimeFigureOut">
               <a:rPr lang="en-US" smtClean="0"/>
-              <a:t>11/18/2022</a:t>
+              <a:t>11/19/2022</a:t>
             </a:fld>
             <a:endParaRPr lang="en-US"/>
           </a:p>
@@ -460,7 +461,7 @@
           <a:p>
             <a:fld id="{355FB770-CC93-4F24-BE14-030DA79629D9}" type="datetimeFigureOut">
               <a:rPr lang="en-US" smtClean="0"/>
-              <a:t>11/18/2022</a:t>
+              <a:t>11/19/2022</a:t>
             </a:fld>
             <a:endParaRPr lang="en-US"/>
           </a:p>
@@ -668,7 +669,7 @@
           <a:p>
             <a:fld id="{355FB770-CC93-4F24-BE14-030DA79629D9}" type="datetimeFigureOut">
               <a:rPr lang="en-US" smtClean="0"/>
-              <a:t>11/18/2022</a:t>
+              <a:t>11/19/2022</a:t>
             </a:fld>
             <a:endParaRPr lang="en-US"/>
           </a:p>
@@ -866,7 +867,7 @@
           <a:p>
             <a:fld id="{355FB770-CC93-4F24-BE14-030DA79629D9}" type="datetimeFigureOut">
               <a:rPr lang="en-US" smtClean="0"/>
-              <a:t>11/18/2022</a:t>
+              <a:t>11/19/2022</a:t>
             </a:fld>
             <a:endParaRPr lang="en-US"/>
           </a:p>
@@ -1141,7 +1142,7 @@
           <a:p>
             <a:fld id="{355FB770-CC93-4F24-BE14-030DA79629D9}" type="datetimeFigureOut">
               <a:rPr lang="en-US" smtClean="0"/>
-              <a:t>11/18/2022</a:t>
+              <a:t>11/19/2022</a:t>
             </a:fld>
             <a:endParaRPr lang="en-US"/>
           </a:p>
@@ -1406,7 +1407,7 @@
           <a:p>
             <a:fld id="{355FB770-CC93-4F24-BE14-030DA79629D9}" type="datetimeFigureOut">
               <a:rPr lang="en-US" smtClean="0"/>
-              <a:t>11/18/2022</a:t>
+              <a:t>11/19/2022</a:t>
             </a:fld>
             <a:endParaRPr lang="en-US"/>
           </a:p>
@@ -1818,7 +1819,7 @@
           <a:p>
             <a:fld id="{355FB770-CC93-4F24-BE14-030DA79629D9}" type="datetimeFigureOut">
               <a:rPr lang="en-US" smtClean="0"/>
-              <a:t>11/18/2022</a:t>
+              <a:t>11/19/2022</a:t>
             </a:fld>
             <a:endParaRPr lang="en-US"/>
           </a:p>
@@ -1959,7 +1960,7 @@
           <a:p>
             <a:fld id="{355FB770-CC93-4F24-BE14-030DA79629D9}" type="datetimeFigureOut">
               <a:rPr lang="en-US" smtClean="0"/>
-              <a:t>11/18/2022</a:t>
+              <a:t>11/19/2022</a:t>
             </a:fld>
             <a:endParaRPr lang="en-US"/>
           </a:p>
@@ -2072,7 +2073,7 @@
           <a:p>
             <a:fld id="{355FB770-CC93-4F24-BE14-030DA79629D9}" type="datetimeFigureOut">
               <a:rPr lang="en-US" smtClean="0"/>
-              <a:t>11/18/2022</a:t>
+              <a:t>11/19/2022</a:t>
             </a:fld>
             <a:endParaRPr lang="en-US"/>
           </a:p>
@@ -2383,7 +2384,7 @@
           <a:p>
             <a:fld id="{355FB770-CC93-4F24-BE14-030DA79629D9}" type="datetimeFigureOut">
               <a:rPr lang="en-US" smtClean="0"/>
-              <a:t>11/18/2022</a:t>
+              <a:t>11/19/2022</a:t>
             </a:fld>
             <a:endParaRPr lang="en-US"/>
           </a:p>
@@ -2671,7 +2672,7 @@
           <a:p>
             <a:fld id="{355FB770-CC93-4F24-BE14-030DA79629D9}" type="datetimeFigureOut">
               <a:rPr lang="en-US" smtClean="0"/>
-              <a:t>11/18/2022</a:t>
+              <a:t>11/19/2022</a:t>
             </a:fld>
             <a:endParaRPr lang="en-US"/>
           </a:p>
@@ -2912,7 +2913,7 @@
           <a:p>
             <a:fld id="{355FB770-CC93-4F24-BE14-030DA79629D9}" type="datetimeFigureOut">
               <a:rPr lang="en-US" smtClean="0"/>
-              <a:t>11/18/2022</a:t>
+              <a:t>11/19/2022</a:t>
             </a:fld>
             <a:endParaRPr lang="en-US"/>
           </a:p>
@@ -16968,128 +16969,107 @@
           </a:p>
         </p:txBody>
       </p:sp>
-      <p:grpSp>
-        <p:nvGrpSpPr>
-          <p:cNvPr id="42" name="Group 41">
+      <p:sp>
+        <p:nvSpPr>
+          <p:cNvPr id="30" name="Oval 29">
             <a:extLst>
               <a:ext uri="{FF2B5EF4-FFF2-40B4-BE49-F238E27FC236}">
-                <a16:creationId xmlns:a16="http://schemas.microsoft.com/office/drawing/2014/main" id="{495C6344-3621-3F01-E4BD-80379E05F4F2}"/>
+                <a16:creationId xmlns:a16="http://schemas.microsoft.com/office/drawing/2014/main" id="{C51D0639-415F-839B-04EC-406FA5F159C1}"/>
               </a:ext>
             </a:extLst>
           </p:cNvPr>
-          <p:cNvGrpSpPr/>
+          <p:cNvSpPr/>
           <p:nvPr/>
-        </p:nvGrpSpPr>
-        <p:grpSpPr>
+        </p:nvSpPr>
+        <p:spPr>
           <a:xfrm>
-            <a:off x="3583442" y="2315077"/>
+            <a:off x="1899840" y="1939596"/>
             <a:ext cx="1031806" cy="1031806"/>
-            <a:chOff x="3583442" y="2315077"/>
-            <a:chExt cx="1031806" cy="1031806"/>
           </a:xfrm>
-        </p:grpSpPr>
-        <p:sp>
-          <p:nvSpPr>
-            <p:cNvPr id="30" name="Oval 29">
-              <a:extLst>
-                <a:ext uri="{FF2B5EF4-FFF2-40B4-BE49-F238E27FC236}">
-                  <a16:creationId xmlns:a16="http://schemas.microsoft.com/office/drawing/2014/main" id="{C51D0639-415F-839B-04EC-406FA5F159C1}"/>
-                </a:ext>
-              </a:extLst>
-            </p:cNvPr>
-            <p:cNvSpPr/>
-            <p:nvPr/>
-          </p:nvSpPr>
-          <p:spPr>
-            <a:xfrm>
-              <a:off x="3583442" y="2315077"/>
-              <a:ext cx="1031806" cy="1031806"/>
-            </a:xfrm>
-            <a:prstGeom prst="ellipse">
-              <a:avLst/>
-            </a:prstGeom>
-            <a:scene3d>
-              <a:camera prst="orthographicFront"/>
-              <a:lightRig rig="flat" dir="t"/>
-            </a:scene3d>
-            <a:sp3d extrusionH="190500">
-              <a:bevelT w="190500" h="190500" prst="softRound"/>
-            </a:sp3d>
-          </p:spPr>
-          <p:style>
-            <a:lnRef idx="2">
-              <a:schemeClr val="dk1">
-                <a:shade val="50000"/>
-              </a:schemeClr>
-            </a:lnRef>
-            <a:fillRef idx="1">
-              <a:schemeClr val="dk1"/>
-            </a:fillRef>
-            <a:effectRef idx="0">
-              <a:schemeClr val="dk1"/>
-            </a:effectRef>
-            <a:fontRef idx="minor">
-              <a:schemeClr val="lt1"/>
-            </a:fontRef>
-          </p:style>
-          <p:txBody>
-            <a:bodyPr rtlCol="0" anchor="ctr"/>
-            <a:lstStyle/>
-            <a:p>
-              <a:pPr algn="ctr"/>
-              <a:endParaRPr lang="en-US"/>
-            </a:p>
-          </p:txBody>
-        </p:sp>
-        <p:sp>
-          <p:nvSpPr>
-            <p:cNvPr id="39" name="TextBox 38">
-              <a:extLst>
-                <a:ext uri="{FF2B5EF4-FFF2-40B4-BE49-F238E27FC236}">
-                  <a16:creationId xmlns:a16="http://schemas.microsoft.com/office/drawing/2014/main" id="{E773CA0B-37C6-E2ED-FC38-3233AD10AF74}"/>
-                </a:ext>
-              </a:extLst>
-            </p:cNvPr>
-            <p:cNvSpPr txBox="1"/>
-            <p:nvPr/>
-          </p:nvSpPr>
-          <p:spPr>
-            <a:xfrm>
-              <a:off x="3887588" y="2446260"/>
-              <a:ext cx="423514" cy="769441"/>
-            </a:xfrm>
-            <a:prstGeom prst="rect">
-              <a:avLst/>
-            </a:prstGeom>
-            <a:noFill/>
-          </p:spPr>
-          <p:txBody>
-            <a:bodyPr wrap="none" rtlCol="0">
-              <a:spAutoFit/>
-            </a:bodyPr>
-            <a:lstStyle/>
-            <a:p>
-              <a:r>
-                <a:rPr lang="en-US" sz="4400" b="1" dirty="0">
-                  <a:solidFill>
-                    <a:schemeClr val="bg2">
-                      <a:lumMod val="90000"/>
-                    </a:schemeClr>
-                  </a:solidFill>
-                </a:rPr>
-                <a:t>L</a:t>
-              </a:r>
-              <a:endParaRPr lang="en-US" sz="2000" b="1" dirty="0">
+          <a:prstGeom prst="ellipse">
+            <a:avLst/>
+          </a:prstGeom>
+          <a:scene3d>
+            <a:camera prst="orthographicFront"/>
+            <a:lightRig rig="flat" dir="t"/>
+          </a:scene3d>
+          <a:sp3d extrusionH="190500">
+            <a:bevelT w="190500" h="190500" prst="softRound"/>
+          </a:sp3d>
+        </p:spPr>
+        <p:style>
+          <a:lnRef idx="2">
+            <a:schemeClr val="dk1">
+              <a:shade val="50000"/>
+            </a:schemeClr>
+          </a:lnRef>
+          <a:fillRef idx="1">
+            <a:schemeClr val="dk1"/>
+          </a:fillRef>
+          <a:effectRef idx="0">
+            <a:schemeClr val="dk1"/>
+          </a:effectRef>
+          <a:fontRef idx="minor">
+            <a:schemeClr val="lt1"/>
+          </a:fontRef>
+        </p:style>
+        <p:txBody>
+          <a:bodyPr rtlCol="0" anchor="ctr"/>
+          <a:lstStyle/>
+          <a:p>
+            <a:pPr algn="ctr"/>
+            <a:endParaRPr lang="en-US"/>
+          </a:p>
+        </p:txBody>
+      </p:sp>
+      <p:sp>
+        <p:nvSpPr>
+          <p:cNvPr id="39" name="TextBox 38">
+            <a:extLst>
+              <a:ext uri="{FF2B5EF4-FFF2-40B4-BE49-F238E27FC236}">
+                <a16:creationId xmlns:a16="http://schemas.microsoft.com/office/drawing/2014/main" id="{E773CA0B-37C6-E2ED-FC38-3233AD10AF74}"/>
+              </a:ext>
+            </a:extLst>
+          </p:cNvPr>
+          <p:cNvSpPr txBox="1"/>
+          <p:nvPr/>
+        </p:nvSpPr>
+        <p:spPr>
+          <a:xfrm>
+            <a:off x="2203986" y="2070779"/>
+            <a:ext cx="423514" cy="769441"/>
+          </a:xfrm>
+          <a:prstGeom prst="rect">
+            <a:avLst/>
+          </a:prstGeom>
+          <a:noFill/>
+        </p:spPr>
+        <p:txBody>
+          <a:bodyPr wrap="none" rtlCol="0">
+            <a:spAutoFit/>
+          </a:bodyPr>
+          <a:lstStyle/>
+          <a:p>
+            <a:r>
+              <a:rPr lang="en-US" sz="4400" b="1" dirty="0">
                 <a:solidFill>
                   <a:schemeClr val="bg2">
                     <a:lumMod val="90000"/>
                   </a:schemeClr>
                 </a:solidFill>
-              </a:endParaRPr>
-            </a:p>
-          </p:txBody>
-        </p:sp>
-      </p:grpSp>
+              </a:rPr>
+              <a:t>L</a:t>
+            </a:r>
+            <a:endParaRPr lang="en-US" sz="2000" b="1" dirty="0">
+              <a:solidFill>
+                <a:schemeClr val="bg2">
+                  <a:lumMod val="90000"/>
+                </a:schemeClr>
+              </a:solidFill>
+            </a:endParaRPr>
+          </a:p>
+        </p:txBody>
+      </p:sp>
       <p:grpSp>
         <p:nvGrpSpPr>
           <p:cNvPr id="43" name="Group 42">
@@ -17704,47 +17684,6 @@
           </p:txBody>
         </p:sp>
       </p:grpSp>
-      <p:sp>
-        <p:nvSpPr>
-          <p:cNvPr id="3" name="TextBox 2">
-            <a:extLst>
-              <a:ext uri="{FF2B5EF4-FFF2-40B4-BE49-F238E27FC236}">
-                <a16:creationId xmlns:a16="http://schemas.microsoft.com/office/drawing/2014/main" id="{06C7D425-6F3B-8BE2-1871-5F526C396009}"/>
-              </a:ext>
-            </a:extLst>
-          </p:cNvPr>
-          <p:cNvSpPr txBox="1"/>
-          <p:nvPr/>
-        </p:nvSpPr>
-        <p:spPr>
-          <a:xfrm>
-            <a:off x="3048000" y="3244334"/>
-            <a:ext cx="6096000" cy="369332"/>
-          </a:xfrm>
-          <a:prstGeom prst="rect">
-            <a:avLst/>
-          </a:prstGeom>
-          <a:noFill/>
-        </p:spPr>
-        <p:txBody>
-          <a:bodyPr wrap="square">
-            <a:spAutoFit/>
-          </a:bodyPr>
-          <a:lstStyle/>
-          <a:p>
-            <a:r>
-              <a:rPr lang="en-US" sz="1800" dirty="0" err="1">
-                <a:solidFill>
-                  <a:srgbClr val="000000"/>
-                </a:solidFill>
-                <a:latin typeface="Consolas" panose="020B0609020204030204" pitchFamily="49" charset="0"/>
-              </a:rPr>
-              <a:t>DrawableGameComponent</a:t>
-            </a:r>
-            <a:endParaRPr lang="en-US" dirty="0"/>
-          </a:p>
-        </p:txBody>
-      </p:sp>
     </p:spTree>
     <p:extLst>
       <p:ext uri="{BB962C8B-B14F-4D97-AF65-F5344CB8AC3E}">
@@ -18697,6 +18636,1054 @@
 </p:sld>
 </file>
 
+<file path=ppt/slides/slide5.xml><?xml version="1.0" encoding="utf-8"?>
+<p:sld xmlns:a="http://schemas.openxmlformats.org/drawingml/2006/main" xmlns:r="http://schemas.openxmlformats.org/officeDocument/2006/relationships" xmlns:p="http://schemas.openxmlformats.org/presentationml/2006/main">
+  <p:cSld>
+    <p:spTree>
+      <p:nvGrpSpPr>
+        <p:cNvPr id="1" name=""/>
+        <p:cNvGrpSpPr/>
+        <p:nvPr/>
+      </p:nvGrpSpPr>
+      <p:grpSpPr>
+        <a:xfrm>
+          <a:off x="0" y="0"/>
+          <a:ext cx="0" cy="0"/>
+          <a:chOff x="0" y="0"/>
+          <a:chExt cx="0" cy="0"/>
+        </a:xfrm>
+      </p:grpSpPr>
+      <p:pic>
+        <p:nvPicPr>
+          <p:cNvPr id="1026" name="Picture 2">
+            <a:extLst>
+              <a:ext uri="{FF2B5EF4-FFF2-40B4-BE49-F238E27FC236}">
+                <a16:creationId xmlns:a16="http://schemas.microsoft.com/office/drawing/2014/main" id="{11516E27-A5FD-2E37-2216-EF4EDE26CD5B}"/>
+              </a:ext>
+            </a:extLst>
+          </p:cNvPr>
+          <p:cNvPicPr>
+            <a:picLocks noChangeAspect="1" noChangeArrowheads="1"/>
+          </p:cNvPicPr>
+          <p:nvPr/>
+        </p:nvPicPr>
+        <p:blipFill>
+          <a:blip r:embed="rId2">
+            <a:extLst>
+              <a:ext uri="{28A0092B-C50C-407E-A947-70E740481C1C}">
+                <a14:useLocalDpi xmlns:a14="http://schemas.microsoft.com/office/drawing/2010/main" val="0"/>
+              </a:ext>
+            </a:extLst>
+          </a:blip>
+          <a:srcRect/>
+          <a:stretch>
+            <a:fillRect/>
+          </a:stretch>
+        </p:blipFill>
+        <p:spPr bwMode="auto">
+          <a:xfrm rot="665913">
+            <a:off x="5375246" y="1773092"/>
+            <a:ext cx="7812472" cy="4393100"/>
+          </a:xfrm>
+          <a:prstGeom prst="rect">
+            <a:avLst/>
+          </a:prstGeom>
+          <a:noFill/>
+          <a:extLst>
+            <a:ext uri="{909E8E84-426E-40DD-AFC4-6F175D3DCCD1}">
+              <a14:hiddenFill xmlns:a14="http://schemas.microsoft.com/office/drawing/2010/main">
+                <a:solidFill>
+                  <a:srgbClr val="FFFFFF"/>
+                </a:solidFill>
+              </a14:hiddenFill>
+            </a:ext>
+          </a:extLst>
+        </p:spPr>
+      </p:pic>
+      <p:cxnSp>
+        <p:nvCxnSpPr>
+          <p:cNvPr id="5" name="Straight Connector 4">
+            <a:extLst>
+              <a:ext uri="{FF2B5EF4-FFF2-40B4-BE49-F238E27FC236}">
+                <a16:creationId xmlns:a16="http://schemas.microsoft.com/office/drawing/2014/main" id="{BF5B32D7-D767-85EF-280E-E8FBD53AF6D8}"/>
+              </a:ext>
+            </a:extLst>
+          </p:cNvPr>
+          <p:cNvCxnSpPr>
+            <a:cxnSpLocks/>
+          </p:cNvCxnSpPr>
+          <p:nvPr/>
+        </p:nvCxnSpPr>
+        <p:spPr>
+          <a:xfrm>
+            <a:off x="717261" y="2154671"/>
+            <a:ext cx="10177896" cy="0"/>
+          </a:xfrm>
+          <a:prstGeom prst="line">
+            <a:avLst/>
+          </a:prstGeom>
+          <a:ln w="19050"/>
+        </p:spPr>
+        <p:style>
+          <a:lnRef idx="1">
+            <a:schemeClr val="accent1"/>
+          </a:lnRef>
+          <a:fillRef idx="0">
+            <a:schemeClr val="accent1"/>
+          </a:fillRef>
+          <a:effectRef idx="0">
+            <a:schemeClr val="accent1"/>
+          </a:effectRef>
+          <a:fontRef idx="minor">
+            <a:schemeClr val="tx1"/>
+          </a:fontRef>
+        </p:style>
+      </p:cxnSp>
+      <p:pic>
+        <p:nvPicPr>
+          <p:cNvPr id="14" name="Picture 13" descr="Shape&#10;&#10;Description automatically generated">
+            <a:extLst>
+              <a:ext uri="{FF2B5EF4-FFF2-40B4-BE49-F238E27FC236}">
+                <a16:creationId xmlns:a16="http://schemas.microsoft.com/office/drawing/2014/main" id="{07BAF46B-9DFB-4454-3269-40E29D6A07FB}"/>
+              </a:ext>
+            </a:extLst>
+          </p:cNvPr>
+          <p:cNvPicPr>
+            <a:picLocks noChangeAspect="1"/>
+          </p:cNvPicPr>
+          <p:nvPr/>
+        </p:nvPicPr>
+        <p:blipFill rotWithShape="1">
+          <a:blip r:embed="rId3">
+            <a:extLst>
+              <a:ext uri="{28A0092B-C50C-407E-A947-70E740481C1C}">
+                <a14:useLocalDpi xmlns:a14="http://schemas.microsoft.com/office/drawing/2010/main" val="0"/>
+              </a:ext>
+            </a:extLst>
+          </a:blip>
+          <a:srcRect l="30554"/>
+          <a:stretch/>
+        </p:blipFill>
+        <p:spPr>
+          <a:xfrm>
+            <a:off x="3425455" y="2568403"/>
+            <a:ext cx="823611" cy="2601909"/>
+          </a:xfrm>
+          <a:prstGeom prst="rect">
+            <a:avLst/>
+          </a:prstGeom>
+        </p:spPr>
+      </p:pic>
+      <p:grpSp>
+        <p:nvGrpSpPr>
+          <p:cNvPr id="21" name="Group 20">
+            <a:extLst>
+              <a:ext uri="{FF2B5EF4-FFF2-40B4-BE49-F238E27FC236}">
+                <a16:creationId xmlns:a16="http://schemas.microsoft.com/office/drawing/2014/main" id="{2E91E446-426A-42E4-950E-74508DA56D80}"/>
+              </a:ext>
+            </a:extLst>
+          </p:cNvPr>
+          <p:cNvGrpSpPr/>
+          <p:nvPr/>
+        </p:nvGrpSpPr>
+        <p:grpSpPr>
+          <a:xfrm>
+            <a:off x="3507465" y="2676395"/>
+            <a:ext cx="137160" cy="137160"/>
+            <a:chOff x="4570207" y="2421815"/>
+            <a:chExt cx="137160" cy="137160"/>
+          </a:xfrm>
+        </p:grpSpPr>
+        <p:cxnSp>
+          <p:nvCxnSpPr>
+            <p:cNvPr id="19" name="Straight Connector 18">
+              <a:extLst>
+                <a:ext uri="{FF2B5EF4-FFF2-40B4-BE49-F238E27FC236}">
+                  <a16:creationId xmlns:a16="http://schemas.microsoft.com/office/drawing/2014/main" id="{D535C009-42AF-9C13-5A2A-1ADAF50E65A1}"/>
+                </a:ext>
+              </a:extLst>
+            </p:cNvPr>
+            <p:cNvCxnSpPr>
+              <a:cxnSpLocks/>
+            </p:cNvCxnSpPr>
+            <p:nvPr/>
+          </p:nvCxnSpPr>
+          <p:spPr>
+            <a:xfrm>
+              <a:off x="4570207" y="2490395"/>
+              <a:ext cx="137160" cy="0"/>
+            </a:xfrm>
+            <a:prstGeom prst="line">
+              <a:avLst/>
+            </a:prstGeom>
+            <a:ln w="38100">
+              <a:solidFill>
+                <a:schemeClr val="tx1"/>
+              </a:solidFill>
+            </a:ln>
+          </p:spPr>
+          <p:style>
+            <a:lnRef idx="1">
+              <a:schemeClr val="accent1"/>
+            </a:lnRef>
+            <a:fillRef idx="0">
+              <a:schemeClr val="accent1"/>
+            </a:fillRef>
+            <a:effectRef idx="0">
+              <a:schemeClr val="accent1"/>
+            </a:effectRef>
+            <a:fontRef idx="minor">
+              <a:schemeClr val="tx1"/>
+            </a:fontRef>
+          </p:style>
+        </p:cxnSp>
+        <p:cxnSp>
+          <p:nvCxnSpPr>
+            <p:cNvPr id="20" name="Straight Connector 19">
+              <a:extLst>
+                <a:ext uri="{FF2B5EF4-FFF2-40B4-BE49-F238E27FC236}">
+                  <a16:creationId xmlns:a16="http://schemas.microsoft.com/office/drawing/2014/main" id="{27BB585F-916B-8935-DDC7-C449848EE9D5}"/>
+                </a:ext>
+              </a:extLst>
+            </p:cNvPr>
+            <p:cNvCxnSpPr>
+              <a:cxnSpLocks/>
+            </p:cNvCxnSpPr>
+            <p:nvPr/>
+          </p:nvCxnSpPr>
+          <p:spPr>
+            <a:xfrm rot="5400000">
+              <a:off x="4570207" y="2490395"/>
+              <a:ext cx="137160" cy="0"/>
+            </a:xfrm>
+            <a:prstGeom prst="line">
+              <a:avLst/>
+            </a:prstGeom>
+            <a:ln w="38100">
+              <a:solidFill>
+                <a:schemeClr val="tx1"/>
+              </a:solidFill>
+            </a:ln>
+          </p:spPr>
+          <p:style>
+            <a:lnRef idx="1">
+              <a:schemeClr val="accent1"/>
+            </a:lnRef>
+            <a:fillRef idx="0">
+              <a:schemeClr val="accent1"/>
+            </a:fillRef>
+            <a:effectRef idx="0">
+              <a:schemeClr val="accent1"/>
+            </a:effectRef>
+            <a:fontRef idx="minor">
+              <a:schemeClr val="tx1"/>
+            </a:fontRef>
+          </p:style>
+        </p:cxnSp>
+      </p:grpSp>
+      <p:pic>
+        <p:nvPicPr>
+          <p:cNvPr id="12" name="Picture 11" descr="Shape, rectangle&#10;&#10;Description automatically generated">
+            <a:extLst>
+              <a:ext uri="{FF2B5EF4-FFF2-40B4-BE49-F238E27FC236}">
+                <a16:creationId xmlns:a16="http://schemas.microsoft.com/office/drawing/2014/main" id="{63FBE19A-BC1B-5686-6583-5C40FB783B2B}"/>
+              </a:ext>
+            </a:extLst>
+          </p:cNvPr>
+          <p:cNvPicPr>
+            <a:picLocks noChangeAspect="1"/>
+          </p:cNvPicPr>
+          <p:nvPr/>
+        </p:nvPicPr>
+        <p:blipFill rotWithShape="1">
+          <a:blip r:embed="rId4">
+            <a:extLst>
+              <a:ext uri="{28A0092B-C50C-407E-A947-70E740481C1C}">
+                <a14:useLocalDpi xmlns:a14="http://schemas.microsoft.com/office/drawing/2010/main" val="0"/>
+              </a:ext>
+            </a:extLst>
+          </a:blip>
+          <a:srcRect l="1" r="31482"/>
+          <a:stretch/>
+        </p:blipFill>
+        <p:spPr>
+          <a:xfrm>
+            <a:off x="2561233" y="2568403"/>
+            <a:ext cx="812586" cy="2601909"/>
+          </a:xfrm>
+          <a:prstGeom prst="rect">
+            <a:avLst/>
+          </a:prstGeom>
+        </p:spPr>
+      </p:pic>
+      <p:cxnSp>
+        <p:nvCxnSpPr>
+          <p:cNvPr id="17" name="Straight Connector 16">
+            <a:extLst>
+              <a:ext uri="{FF2B5EF4-FFF2-40B4-BE49-F238E27FC236}">
+                <a16:creationId xmlns:a16="http://schemas.microsoft.com/office/drawing/2014/main" id="{B7571977-67C0-3875-7063-196A528E19E9}"/>
+              </a:ext>
+            </a:extLst>
+          </p:cNvPr>
+          <p:cNvCxnSpPr>
+            <a:cxnSpLocks/>
+          </p:cNvCxnSpPr>
+          <p:nvPr/>
+        </p:nvCxnSpPr>
+        <p:spPr>
+          <a:xfrm>
+            <a:off x="3164523" y="2744975"/>
+            <a:ext cx="137160" cy="0"/>
+          </a:xfrm>
+          <a:prstGeom prst="line">
+            <a:avLst/>
+          </a:prstGeom>
+          <a:ln w="38100">
+            <a:solidFill>
+              <a:schemeClr val="tx1"/>
+            </a:solidFill>
+          </a:ln>
+        </p:spPr>
+        <p:style>
+          <a:lnRef idx="1">
+            <a:schemeClr val="accent1"/>
+          </a:lnRef>
+          <a:fillRef idx="0">
+            <a:schemeClr val="accent1"/>
+          </a:fillRef>
+          <a:effectRef idx="0">
+            <a:schemeClr val="accent1"/>
+          </a:effectRef>
+          <a:fontRef idx="minor">
+            <a:schemeClr val="tx1"/>
+          </a:fontRef>
+        </p:style>
+      </p:cxnSp>
+      <p:sp>
+        <p:nvSpPr>
+          <p:cNvPr id="22" name="Rectangle 21">
+            <a:extLst>
+              <a:ext uri="{FF2B5EF4-FFF2-40B4-BE49-F238E27FC236}">
+                <a16:creationId xmlns:a16="http://schemas.microsoft.com/office/drawing/2014/main" id="{6746F3B4-BF44-DC04-BC0A-6AD0E6FACBDC}"/>
+              </a:ext>
+            </a:extLst>
+          </p:cNvPr>
+          <p:cNvSpPr/>
+          <p:nvPr/>
+        </p:nvSpPr>
+        <p:spPr>
+          <a:xfrm>
+            <a:off x="3024675" y="4429800"/>
+            <a:ext cx="172122" cy="172122"/>
+          </a:xfrm>
+          <a:prstGeom prst="rect">
+            <a:avLst/>
+          </a:prstGeom>
+          <a:solidFill>
+            <a:schemeClr val="tx1"/>
+          </a:solidFill>
+          <a:ln>
+            <a:solidFill>
+              <a:schemeClr val="tx1"/>
+            </a:solidFill>
+          </a:ln>
+        </p:spPr>
+        <p:style>
+          <a:lnRef idx="2">
+            <a:schemeClr val="accent1">
+              <a:shade val="50000"/>
+            </a:schemeClr>
+          </a:lnRef>
+          <a:fillRef idx="1">
+            <a:schemeClr val="accent1"/>
+          </a:fillRef>
+          <a:effectRef idx="0">
+            <a:schemeClr val="accent1"/>
+          </a:effectRef>
+          <a:fontRef idx="minor">
+            <a:schemeClr val="lt1"/>
+          </a:fontRef>
+        </p:style>
+        <p:txBody>
+          <a:bodyPr rtlCol="0" anchor="ctr"/>
+          <a:lstStyle/>
+          <a:p>
+            <a:pPr algn="ctr"/>
+            <a:endParaRPr lang="en-US"/>
+          </a:p>
+        </p:txBody>
+      </p:sp>
+      <p:sp>
+        <p:nvSpPr>
+          <p:cNvPr id="23" name="Oval 22">
+            <a:extLst>
+              <a:ext uri="{FF2B5EF4-FFF2-40B4-BE49-F238E27FC236}">
+                <a16:creationId xmlns:a16="http://schemas.microsoft.com/office/drawing/2014/main" id="{BE17A69A-27A9-882F-BA50-425443190D2C}"/>
+              </a:ext>
+            </a:extLst>
+          </p:cNvPr>
+          <p:cNvSpPr/>
+          <p:nvPr/>
+        </p:nvSpPr>
+        <p:spPr>
+          <a:xfrm>
+            <a:off x="3600646" y="4429800"/>
+            <a:ext cx="167300" cy="167300"/>
+          </a:xfrm>
+          <a:prstGeom prst="ellipse">
+            <a:avLst/>
+          </a:prstGeom>
+          <a:solidFill>
+            <a:schemeClr val="tx1"/>
+          </a:solidFill>
+          <a:ln>
+            <a:solidFill>
+              <a:schemeClr val="tx1"/>
+            </a:solidFill>
+          </a:ln>
+        </p:spPr>
+        <p:style>
+          <a:lnRef idx="2">
+            <a:schemeClr val="accent1">
+              <a:shade val="50000"/>
+            </a:schemeClr>
+          </a:lnRef>
+          <a:fillRef idx="1">
+            <a:schemeClr val="accent1"/>
+          </a:fillRef>
+          <a:effectRef idx="0">
+            <a:schemeClr val="accent1"/>
+          </a:effectRef>
+          <a:fontRef idx="minor">
+            <a:schemeClr val="lt1"/>
+          </a:fontRef>
+        </p:style>
+        <p:txBody>
+          <a:bodyPr rtlCol="0" anchor="ctr"/>
+          <a:lstStyle/>
+          <a:p>
+            <a:pPr algn="ctr"/>
+            <a:endParaRPr lang="en-US"/>
+          </a:p>
+        </p:txBody>
+      </p:sp>
+      <p:sp>
+        <p:nvSpPr>
+          <p:cNvPr id="2" name="Oval 1">
+            <a:extLst>
+              <a:ext uri="{FF2B5EF4-FFF2-40B4-BE49-F238E27FC236}">
+                <a16:creationId xmlns:a16="http://schemas.microsoft.com/office/drawing/2014/main" id="{1A30873E-8B2D-AF83-091D-C2401A61CDAE}"/>
+              </a:ext>
+            </a:extLst>
+          </p:cNvPr>
+          <p:cNvSpPr/>
+          <p:nvPr/>
+        </p:nvSpPr>
+        <p:spPr>
+          <a:xfrm>
+            <a:off x="239202" y="3278415"/>
+            <a:ext cx="824964" cy="824964"/>
+          </a:xfrm>
+          <a:prstGeom prst="ellipse">
+            <a:avLst/>
+          </a:prstGeom>
+          <a:scene3d>
+            <a:camera prst="orthographicFront"/>
+            <a:lightRig rig="flat" dir="t"/>
+          </a:scene3d>
+          <a:sp3d extrusionH="190500">
+            <a:bevelT w="190500" h="190500" prst="softRound"/>
+          </a:sp3d>
+        </p:spPr>
+        <p:style>
+          <a:lnRef idx="2">
+            <a:schemeClr val="dk1">
+              <a:shade val="50000"/>
+            </a:schemeClr>
+          </a:lnRef>
+          <a:fillRef idx="1">
+            <a:schemeClr val="dk1"/>
+          </a:fillRef>
+          <a:effectRef idx="0">
+            <a:schemeClr val="dk1"/>
+          </a:effectRef>
+          <a:fontRef idx="minor">
+            <a:schemeClr val="lt1"/>
+          </a:fontRef>
+        </p:style>
+        <p:txBody>
+          <a:bodyPr rtlCol="0" anchor="ctr"/>
+          <a:lstStyle/>
+          <a:p>
+            <a:pPr algn="ctr"/>
+            <a:endParaRPr lang="en-US"/>
+          </a:p>
+        </p:txBody>
+      </p:sp>
+      <p:grpSp>
+        <p:nvGrpSpPr>
+          <p:cNvPr id="37" name="Group 36">
+            <a:extLst>
+              <a:ext uri="{FF2B5EF4-FFF2-40B4-BE49-F238E27FC236}">
+                <a16:creationId xmlns:a16="http://schemas.microsoft.com/office/drawing/2014/main" id="{51891042-5FA9-95B6-C623-914223E9EA40}"/>
+              </a:ext>
+            </a:extLst>
+          </p:cNvPr>
+          <p:cNvGrpSpPr/>
+          <p:nvPr/>
+        </p:nvGrpSpPr>
+        <p:grpSpPr>
+          <a:xfrm>
+            <a:off x="1529122" y="5986365"/>
+            <a:ext cx="359555" cy="400110"/>
+            <a:chOff x="1727878" y="5823296"/>
+            <a:chExt cx="359555" cy="400110"/>
+          </a:xfrm>
+        </p:grpSpPr>
+        <p:sp>
+          <p:nvSpPr>
+            <p:cNvPr id="11" name="Oval 10">
+              <a:extLst>
+                <a:ext uri="{FF2B5EF4-FFF2-40B4-BE49-F238E27FC236}">
+                  <a16:creationId xmlns:a16="http://schemas.microsoft.com/office/drawing/2014/main" id="{5FF4DF80-D95F-0D86-0EFF-269675A963DC}"/>
+                </a:ext>
+              </a:extLst>
+            </p:cNvPr>
+            <p:cNvSpPr/>
+            <p:nvPr/>
+          </p:nvSpPr>
+          <p:spPr>
+            <a:xfrm>
+              <a:off x="1727878" y="5843574"/>
+              <a:ext cx="359555" cy="359555"/>
+            </a:xfrm>
+            <a:prstGeom prst="ellipse">
+              <a:avLst/>
+            </a:prstGeom>
+            <a:scene3d>
+              <a:camera prst="orthographicFront"/>
+              <a:lightRig rig="balanced" dir="t"/>
+            </a:scene3d>
+            <a:sp3d extrusionH="127000" prstMaterial="plastic">
+              <a:bevelT w="127000" h="127000"/>
+              <a:extrusionClr>
+                <a:schemeClr val="bg1">
+                  <a:lumMod val="95000"/>
+                </a:schemeClr>
+              </a:extrusionClr>
+            </a:sp3d>
+          </p:spPr>
+          <p:style>
+            <a:lnRef idx="2">
+              <a:schemeClr val="dk1">
+                <a:shade val="50000"/>
+              </a:schemeClr>
+            </a:lnRef>
+            <a:fillRef idx="1">
+              <a:schemeClr val="dk1"/>
+            </a:fillRef>
+            <a:effectRef idx="0">
+              <a:schemeClr val="dk1"/>
+            </a:effectRef>
+            <a:fontRef idx="minor">
+              <a:schemeClr val="lt1"/>
+            </a:fontRef>
+          </p:style>
+          <p:txBody>
+            <a:bodyPr rtlCol="0" anchor="ctr"/>
+            <a:lstStyle/>
+            <a:p>
+              <a:pPr algn="ctr"/>
+              <a:endParaRPr lang="en-US" sz="2000">
+                <a:solidFill>
+                  <a:schemeClr val="bg1">
+                    <a:lumMod val="95000"/>
+                  </a:schemeClr>
+                </a:solidFill>
+              </a:endParaRPr>
+            </a:p>
+          </p:txBody>
+        </p:sp>
+        <p:sp>
+          <p:nvSpPr>
+            <p:cNvPr id="13" name="TextBox 12">
+              <a:extLst>
+                <a:ext uri="{FF2B5EF4-FFF2-40B4-BE49-F238E27FC236}">
+                  <a16:creationId xmlns:a16="http://schemas.microsoft.com/office/drawing/2014/main" id="{0ECAA89B-3318-5AF4-53C2-A1DDF8439BB0}"/>
+                </a:ext>
+              </a:extLst>
+            </p:cNvPr>
+            <p:cNvSpPr txBox="1"/>
+            <p:nvPr/>
+          </p:nvSpPr>
+          <p:spPr>
+            <a:xfrm>
+              <a:off x="1737576" y="5823296"/>
+              <a:ext cx="340158" cy="400110"/>
+            </a:xfrm>
+            <a:prstGeom prst="rect">
+              <a:avLst/>
+            </a:prstGeom>
+            <a:noFill/>
+          </p:spPr>
+          <p:txBody>
+            <a:bodyPr wrap="none" rtlCol="0">
+              <a:spAutoFit/>
+            </a:bodyPr>
+            <a:lstStyle/>
+            <a:p>
+              <a:pPr algn="ctr"/>
+              <a:r>
+                <a:rPr lang="en-US" sz="2000" b="1" dirty="0">
+                  <a:solidFill>
+                    <a:schemeClr val="bg1">
+                      <a:lumMod val="95000"/>
+                    </a:schemeClr>
+                  </a:solidFill>
+                </a:rPr>
+                <a:t>A</a:t>
+              </a:r>
+            </a:p>
+          </p:txBody>
+        </p:sp>
+      </p:grpSp>
+      <p:sp>
+        <p:nvSpPr>
+          <p:cNvPr id="16" name="Oval 15">
+            <a:extLst>
+              <a:ext uri="{FF2B5EF4-FFF2-40B4-BE49-F238E27FC236}">
+                <a16:creationId xmlns:a16="http://schemas.microsoft.com/office/drawing/2014/main" id="{A1075626-A1DB-6581-DC36-BDB5A0FA160F}"/>
+              </a:ext>
+            </a:extLst>
+          </p:cNvPr>
+          <p:cNvSpPr/>
+          <p:nvPr/>
+        </p:nvSpPr>
+        <p:spPr>
+          <a:xfrm>
+            <a:off x="2139793" y="5596533"/>
+            <a:ext cx="359555" cy="359555"/>
+          </a:xfrm>
+          <a:prstGeom prst="ellipse">
+            <a:avLst/>
+          </a:prstGeom>
+          <a:scene3d>
+            <a:camera prst="orthographicFront"/>
+            <a:lightRig rig="balanced" dir="t"/>
+          </a:scene3d>
+          <a:sp3d extrusionH="127000" prstMaterial="plastic">
+            <a:bevelT w="127000" h="127000"/>
+            <a:extrusionClr>
+              <a:schemeClr val="bg1">
+                <a:lumMod val="95000"/>
+              </a:schemeClr>
+            </a:extrusionClr>
+          </a:sp3d>
+        </p:spPr>
+        <p:style>
+          <a:lnRef idx="2">
+            <a:schemeClr val="dk1">
+              <a:shade val="50000"/>
+            </a:schemeClr>
+          </a:lnRef>
+          <a:fillRef idx="1">
+            <a:schemeClr val="dk1"/>
+          </a:fillRef>
+          <a:effectRef idx="0">
+            <a:schemeClr val="dk1"/>
+          </a:effectRef>
+          <a:fontRef idx="minor">
+            <a:schemeClr val="lt1"/>
+          </a:fontRef>
+        </p:style>
+        <p:txBody>
+          <a:bodyPr rtlCol="0" anchor="ctr"/>
+          <a:lstStyle/>
+          <a:p>
+            <a:pPr algn="ctr"/>
+            <a:endParaRPr lang="en-US" sz="2000">
+              <a:solidFill>
+                <a:schemeClr val="bg1">
+                  <a:lumMod val="95000"/>
+                </a:schemeClr>
+              </a:solidFill>
+            </a:endParaRPr>
+          </a:p>
+        </p:txBody>
+      </p:sp>
+      <p:sp>
+        <p:nvSpPr>
+          <p:cNvPr id="18" name="TextBox 17">
+            <a:extLst>
+              <a:ext uri="{FF2B5EF4-FFF2-40B4-BE49-F238E27FC236}">
+                <a16:creationId xmlns:a16="http://schemas.microsoft.com/office/drawing/2014/main" id="{DD898C9E-5D97-66E2-21FD-C193CD3F3A6E}"/>
+              </a:ext>
+            </a:extLst>
+          </p:cNvPr>
+          <p:cNvSpPr txBox="1"/>
+          <p:nvPr/>
+        </p:nvSpPr>
+        <p:spPr>
+          <a:xfrm>
+            <a:off x="2155102" y="5576255"/>
+            <a:ext cx="328936" cy="400110"/>
+          </a:xfrm>
+          <a:prstGeom prst="rect">
+            <a:avLst/>
+          </a:prstGeom>
+          <a:noFill/>
+        </p:spPr>
+        <p:txBody>
+          <a:bodyPr wrap="none" rtlCol="0">
+            <a:spAutoFit/>
+          </a:bodyPr>
+          <a:lstStyle/>
+          <a:p>
+            <a:pPr algn="ctr"/>
+            <a:r>
+              <a:rPr lang="en-US" sz="2000" b="1" dirty="0">
+                <a:solidFill>
+                  <a:schemeClr val="bg1">
+                    <a:lumMod val="95000"/>
+                  </a:schemeClr>
+                </a:solidFill>
+              </a:rPr>
+              <a:t>B</a:t>
+            </a:r>
+          </a:p>
+        </p:txBody>
+      </p:sp>
+      <p:grpSp>
+        <p:nvGrpSpPr>
+          <p:cNvPr id="35" name="Group 34">
+            <a:extLst>
+              <a:ext uri="{FF2B5EF4-FFF2-40B4-BE49-F238E27FC236}">
+                <a16:creationId xmlns:a16="http://schemas.microsoft.com/office/drawing/2014/main" id="{EC931B36-902C-1FC4-3336-75E29155C61D}"/>
+              </a:ext>
+            </a:extLst>
+          </p:cNvPr>
+          <p:cNvGrpSpPr/>
+          <p:nvPr/>
+        </p:nvGrpSpPr>
+        <p:grpSpPr>
+          <a:xfrm>
+            <a:off x="962060" y="5570422"/>
+            <a:ext cx="359555" cy="400110"/>
+            <a:chOff x="1102273" y="5173712"/>
+            <a:chExt cx="359555" cy="400110"/>
+          </a:xfrm>
+        </p:grpSpPr>
+        <p:sp>
+          <p:nvSpPr>
+            <p:cNvPr id="25" name="Oval 24">
+              <a:extLst>
+                <a:ext uri="{FF2B5EF4-FFF2-40B4-BE49-F238E27FC236}">
+                  <a16:creationId xmlns:a16="http://schemas.microsoft.com/office/drawing/2014/main" id="{AE52DE2D-2FC3-323F-33C5-441AF314B7EB}"/>
+                </a:ext>
+              </a:extLst>
+            </p:cNvPr>
+            <p:cNvSpPr/>
+            <p:nvPr/>
+          </p:nvSpPr>
+          <p:spPr>
+            <a:xfrm>
+              <a:off x="1102273" y="5193990"/>
+              <a:ext cx="359555" cy="359555"/>
+            </a:xfrm>
+            <a:prstGeom prst="ellipse">
+              <a:avLst/>
+            </a:prstGeom>
+            <a:scene3d>
+              <a:camera prst="orthographicFront"/>
+              <a:lightRig rig="balanced" dir="t"/>
+            </a:scene3d>
+            <a:sp3d extrusionH="127000" prstMaterial="plastic">
+              <a:bevelT w="127000" h="127000"/>
+              <a:extrusionClr>
+                <a:schemeClr val="bg1">
+                  <a:lumMod val="95000"/>
+                </a:schemeClr>
+              </a:extrusionClr>
+            </a:sp3d>
+          </p:spPr>
+          <p:style>
+            <a:lnRef idx="2">
+              <a:schemeClr val="dk1">
+                <a:shade val="50000"/>
+              </a:schemeClr>
+            </a:lnRef>
+            <a:fillRef idx="1">
+              <a:schemeClr val="dk1"/>
+            </a:fillRef>
+            <a:effectRef idx="0">
+              <a:schemeClr val="dk1"/>
+            </a:effectRef>
+            <a:fontRef idx="minor">
+              <a:schemeClr val="lt1"/>
+            </a:fontRef>
+          </p:style>
+          <p:txBody>
+            <a:bodyPr rtlCol="0" anchor="ctr"/>
+            <a:lstStyle/>
+            <a:p>
+              <a:pPr algn="ctr"/>
+              <a:endParaRPr lang="en-US" sz="2000">
+                <a:solidFill>
+                  <a:schemeClr val="bg1">
+                    <a:lumMod val="95000"/>
+                  </a:schemeClr>
+                </a:solidFill>
+              </a:endParaRPr>
+            </a:p>
+          </p:txBody>
+        </p:sp>
+        <p:sp>
+          <p:nvSpPr>
+            <p:cNvPr id="26" name="TextBox 25">
+              <a:extLst>
+                <a:ext uri="{FF2B5EF4-FFF2-40B4-BE49-F238E27FC236}">
+                  <a16:creationId xmlns:a16="http://schemas.microsoft.com/office/drawing/2014/main" id="{9BFAEAF8-9DF0-5691-C068-1F4C3990084D}"/>
+                </a:ext>
+              </a:extLst>
+            </p:cNvPr>
+            <p:cNvSpPr txBox="1"/>
+            <p:nvPr/>
+          </p:nvSpPr>
+          <p:spPr>
+            <a:xfrm>
+              <a:off x="1119185" y="5173712"/>
+              <a:ext cx="325730" cy="400110"/>
+            </a:xfrm>
+            <a:prstGeom prst="rect">
+              <a:avLst/>
+            </a:prstGeom>
+            <a:noFill/>
+          </p:spPr>
+          <p:txBody>
+            <a:bodyPr wrap="none" rtlCol="0">
+              <a:spAutoFit/>
+            </a:bodyPr>
+            <a:lstStyle/>
+            <a:p>
+              <a:pPr algn="ctr"/>
+              <a:r>
+                <a:rPr lang="en-US" sz="2000" b="1" dirty="0">
+                  <a:solidFill>
+                    <a:schemeClr val="bg1">
+                      <a:lumMod val="95000"/>
+                    </a:schemeClr>
+                  </a:solidFill>
+                </a:rPr>
+                <a:t>X</a:t>
+              </a:r>
+            </a:p>
+          </p:txBody>
+        </p:sp>
+      </p:grpSp>
+      <p:grpSp>
+        <p:nvGrpSpPr>
+          <p:cNvPr id="36" name="Group 35">
+            <a:extLst>
+              <a:ext uri="{FF2B5EF4-FFF2-40B4-BE49-F238E27FC236}">
+                <a16:creationId xmlns:a16="http://schemas.microsoft.com/office/drawing/2014/main" id="{5A7F622C-2AD2-8703-AAD1-949B6081326B}"/>
+              </a:ext>
+            </a:extLst>
+          </p:cNvPr>
+          <p:cNvGrpSpPr/>
+          <p:nvPr/>
+        </p:nvGrpSpPr>
+        <p:grpSpPr>
+          <a:xfrm>
+            <a:off x="1508202" y="5170312"/>
+            <a:ext cx="359555" cy="400110"/>
+            <a:chOff x="1722267" y="4709373"/>
+            <a:chExt cx="359555" cy="400110"/>
+          </a:xfrm>
+        </p:grpSpPr>
+        <p:sp>
+          <p:nvSpPr>
+            <p:cNvPr id="28" name="Oval 27">
+              <a:extLst>
+                <a:ext uri="{FF2B5EF4-FFF2-40B4-BE49-F238E27FC236}">
+                  <a16:creationId xmlns:a16="http://schemas.microsoft.com/office/drawing/2014/main" id="{026E4813-FD99-C7B1-E3D0-B84DD126A1BF}"/>
+                </a:ext>
+              </a:extLst>
+            </p:cNvPr>
+            <p:cNvSpPr/>
+            <p:nvPr/>
+          </p:nvSpPr>
+          <p:spPr>
+            <a:xfrm>
+              <a:off x="1722267" y="4729651"/>
+              <a:ext cx="359555" cy="359555"/>
+            </a:xfrm>
+            <a:prstGeom prst="ellipse">
+              <a:avLst/>
+            </a:prstGeom>
+            <a:scene3d>
+              <a:camera prst="orthographicFront"/>
+              <a:lightRig rig="balanced" dir="t"/>
+            </a:scene3d>
+            <a:sp3d extrusionH="127000" prstMaterial="plastic">
+              <a:bevelT w="127000" h="127000"/>
+              <a:extrusionClr>
+                <a:schemeClr val="bg1">
+                  <a:lumMod val="95000"/>
+                </a:schemeClr>
+              </a:extrusionClr>
+            </a:sp3d>
+          </p:spPr>
+          <p:style>
+            <a:lnRef idx="2">
+              <a:schemeClr val="dk1">
+                <a:shade val="50000"/>
+              </a:schemeClr>
+            </a:lnRef>
+            <a:fillRef idx="1">
+              <a:schemeClr val="dk1"/>
+            </a:fillRef>
+            <a:effectRef idx="0">
+              <a:schemeClr val="dk1"/>
+            </a:effectRef>
+            <a:fontRef idx="minor">
+              <a:schemeClr val="lt1"/>
+            </a:fontRef>
+          </p:style>
+          <p:txBody>
+            <a:bodyPr rtlCol="0" anchor="ctr"/>
+            <a:lstStyle/>
+            <a:p>
+              <a:pPr algn="ctr"/>
+              <a:endParaRPr lang="en-US" sz="2000">
+                <a:solidFill>
+                  <a:schemeClr val="bg1">
+                    <a:lumMod val="95000"/>
+                  </a:schemeClr>
+                </a:solidFill>
+              </a:endParaRPr>
+            </a:p>
+          </p:txBody>
+        </p:sp>
+        <p:sp>
+          <p:nvSpPr>
+            <p:cNvPr id="29" name="TextBox 28">
+              <a:extLst>
+                <a:ext uri="{FF2B5EF4-FFF2-40B4-BE49-F238E27FC236}">
+                  <a16:creationId xmlns:a16="http://schemas.microsoft.com/office/drawing/2014/main" id="{1F1EF2E4-12DB-045A-2F63-855A489C9DDE}"/>
+                </a:ext>
+              </a:extLst>
+            </p:cNvPr>
+            <p:cNvSpPr txBox="1"/>
+            <p:nvPr/>
+          </p:nvSpPr>
+          <p:spPr>
+            <a:xfrm>
+              <a:off x="1743187" y="4709373"/>
+              <a:ext cx="317715" cy="400110"/>
+            </a:xfrm>
+            <a:prstGeom prst="rect">
+              <a:avLst/>
+            </a:prstGeom>
+            <a:noFill/>
+          </p:spPr>
+          <p:txBody>
+            <a:bodyPr wrap="none" rtlCol="0">
+              <a:spAutoFit/>
+            </a:bodyPr>
+            <a:lstStyle/>
+            <a:p>
+              <a:pPr algn="ctr"/>
+              <a:r>
+                <a:rPr lang="en-US" sz="2000" b="1" dirty="0">
+                  <a:solidFill>
+                    <a:schemeClr val="bg1">
+                      <a:lumMod val="95000"/>
+                    </a:schemeClr>
+                  </a:solidFill>
+                </a:rPr>
+                <a:t>Y</a:t>
+              </a:r>
+            </a:p>
+          </p:txBody>
+        </p:sp>
+      </p:grpSp>
+      <p:sp>
+        <p:nvSpPr>
+          <p:cNvPr id="31" name="Oval 30">
+            <a:extLst>
+              <a:ext uri="{FF2B5EF4-FFF2-40B4-BE49-F238E27FC236}">
+                <a16:creationId xmlns:a16="http://schemas.microsoft.com/office/drawing/2014/main" id="{5F19C167-D004-BC81-CD5E-C60223595F47}"/>
+              </a:ext>
+            </a:extLst>
+          </p:cNvPr>
+          <p:cNvSpPr/>
+          <p:nvPr/>
+        </p:nvSpPr>
+        <p:spPr>
+          <a:xfrm>
+            <a:off x="1304702" y="3721102"/>
+            <a:ext cx="359555" cy="359555"/>
+          </a:xfrm>
+          <a:prstGeom prst="ellipse">
+            <a:avLst/>
+          </a:prstGeom>
+          <a:scene3d>
+            <a:camera prst="orthographicFront"/>
+            <a:lightRig rig="balanced" dir="t"/>
+          </a:scene3d>
+          <a:sp3d extrusionH="127000" prstMaterial="plastic">
+            <a:bevelT w="127000" h="127000"/>
+            <a:extrusionClr>
+              <a:schemeClr val="bg1">
+                <a:lumMod val="95000"/>
+              </a:schemeClr>
+            </a:extrusionClr>
+          </a:sp3d>
+        </p:spPr>
+        <p:style>
+          <a:lnRef idx="2">
+            <a:schemeClr val="dk1">
+              <a:shade val="50000"/>
+            </a:schemeClr>
+          </a:lnRef>
+          <a:fillRef idx="1">
+            <a:schemeClr val="dk1"/>
+          </a:fillRef>
+          <a:effectRef idx="0">
+            <a:schemeClr val="dk1"/>
+          </a:effectRef>
+          <a:fontRef idx="minor">
+            <a:schemeClr val="lt1"/>
+          </a:fontRef>
+        </p:style>
+        <p:txBody>
+          <a:bodyPr rtlCol="0" anchor="ctr"/>
+          <a:lstStyle/>
+          <a:p>
+            <a:pPr algn="ctr"/>
+            <a:endParaRPr lang="en-US">
+              <a:solidFill>
+                <a:schemeClr val="bg1">
+                  <a:lumMod val="95000"/>
+                </a:schemeClr>
+              </a:solidFill>
+            </a:endParaRPr>
+          </a:p>
+        </p:txBody>
+      </p:sp>
+    </p:spTree>
+    <p:extLst>
+      <p:ext uri="{BB962C8B-B14F-4D97-AF65-F5344CB8AC3E}">
+        <p14:creationId xmlns:p14="http://schemas.microsoft.com/office/powerpoint/2010/main" val="511094190"/>
+      </p:ext>
+    </p:extLst>
+  </p:cSld>
+  <p:clrMapOvr>
+    <a:masterClrMapping/>
+  </p:clrMapOvr>
+</p:sld>
+</file>
+
 <file path=ppt/theme/theme1.xml><?xml version="1.0" encoding="utf-8"?>
 <a:theme xmlns:a="http://schemas.openxmlformats.org/drawingml/2006/main" name="Office Theme">
   <a:themeElements>

</xml_diff>

<commit_message>
Refactored layout3 to mimic Nintendo Switch.
</commit_message>
<xml_diff>
--- a/Beware/Content/designs.pptx
+++ b/Beware/Content/designs.pptx
@@ -263,7 +263,7 @@
           <a:p>
             <a:fld id="{355FB770-CC93-4F24-BE14-030DA79629D9}" type="datetimeFigureOut">
               <a:rPr lang="en-US" smtClean="0"/>
-              <a:t>11/19/2022</a:t>
+              <a:t>11/21/2022</a:t>
             </a:fld>
             <a:endParaRPr lang="en-US"/>
           </a:p>
@@ -461,7 +461,7 @@
           <a:p>
             <a:fld id="{355FB770-CC93-4F24-BE14-030DA79629D9}" type="datetimeFigureOut">
               <a:rPr lang="en-US" smtClean="0"/>
-              <a:t>11/19/2022</a:t>
+              <a:t>11/21/2022</a:t>
             </a:fld>
             <a:endParaRPr lang="en-US"/>
           </a:p>
@@ -669,7 +669,7 @@
           <a:p>
             <a:fld id="{355FB770-CC93-4F24-BE14-030DA79629D9}" type="datetimeFigureOut">
               <a:rPr lang="en-US" smtClean="0"/>
-              <a:t>11/19/2022</a:t>
+              <a:t>11/21/2022</a:t>
             </a:fld>
             <a:endParaRPr lang="en-US"/>
           </a:p>
@@ -867,7 +867,7 @@
           <a:p>
             <a:fld id="{355FB770-CC93-4F24-BE14-030DA79629D9}" type="datetimeFigureOut">
               <a:rPr lang="en-US" smtClean="0"/>
-              <a:t>11/19/2022</a:t>
+              <a:t>11/21/2022</a:t>
             </a:fld>
             <a:endParaRPr lang="en-US"/>
           </a:p>
@@ -1142,7 +1142,7 @@
           <a:p>
             <a:fld id="{355FB770-CC93-4F24-BE14-030DA79629D9}" type="datetimeFigureOut">
               <a:rPr lang="en-US" smtClean="0"/>
-              <a:t>11/19/2022</a:t>
+              <a:t>11/21/2022</a:t>
             </a:fld>
             <a:endParaRPr lang="en-US"/>
           </a:p>
@@ -1407,7 +1407,7 @@
           <a:p>
             <a:fld id="{355FB770-CC93-4F24-BE14-030DA79629D9}" type="datetimeFigureOut">
               <a:rPr lang="en-US" smtClean="0"/>
-              <a:t>11/19/2022</a:t>
+              <a:t>11/21/2022</a:t>
             </a:fld>
             <a:endParaRPr lang="en-US"/>
           </a:p>
@@ -1819,7 +1819,7 @@
           <a:p>
             <a:fld id="{355FB770-CC93-4F24-BE14-030DA79629D9}" type="datetimeFigureOut">
               <a:rPr lang="en-US" smtClean="0"/>
-              <a:t>11/19/2022</a:t>
+              <a:t>11/21/2022</a:t>
             </a:fld>
             <a:endParaRPr lang="en-US"/>
           </a:p>
@@ -1960,7 +1960,7 @@
           <a:p>
             <a:fld id="{355FB770-CC93-4F24-BE14-030DA79629D9}" type="datetimeFigureOut">
               <a:rPr lang="en-US" smtClean="0"/>
-              <a:t>11/19/2022</a:t>
+              <a:t>11/21/2022</a:t>
             </a:fld>
             <a:endParaRPr lang="en-US"/>
           </a:p>
@@ -2073,7 +2073,7 @@
           <a:p>
             <a:fld id="{355FB770-CC93-4F24-BE14-030DA79629D9}" type="datetimeFigureOut">
               <a:rPr lang="en-US" smtClean="0"/>
-              <a:t>11/19/2022</a:t>
+              <a:t>11/21/2022</a:t>
             </a:fld>
             <a:endParaRPr lang="en-US"/>
           </a:p>
@@ -2384,7 +2384,7 @@
           <a:p>
             <a:fld id="{355FB770-CC93-4F24-BE14-030DA79629D9}" type="datetimeFigureOut">
               <a:rPr lang="en-US" smtClean="0"/>
-              <a:t>11/19/2022</a:t>
+              <a:t>11/21/2022</a:t>
             </a:fld>
             <a:endParaRPr lang="en-US"/>
           </a:p>
@@ -2672,7 +2672,7 @@
           <a:p>
             <a:fld id="{355FB770-CC93-4F24-BE14-030DA79629D9}" type="datetimeFigureOut">
               <a:rPr lang="en-US" smtClean="0"/>
-              <a:t>11/19/2022</a:t>
+              <a:t>11/21/2022</a:t>
             </a:fld>
             <a:endParaRPr lang="en-US"/>
           </a:p>
@@ -2913,7 +2913,7 @@
           <a:p>
             <a:fld id="{355FB770-CC93-4F24-BE14-030DA79629D9}" type="datetimeFigureOut">
               <a:rPr lang="en-US" smtClean="0"/>
-              <a:t>11/19/2022</a:t>
+              <a:t>11/21/2022</a:t>
             </a:fld>
             <a:endParaRPr lang="en-US"/>
           </a:p>
@@ -18653,6 +18653,60 @@
           <a:chExt cx="0" cy="0"/>
         </a:xfrm>
       </p:grpSpPr>
+      <p:sp>
+        <p:nvSpPr>
+          <p:cNvPr id="3" name="Oval 2">
+            <a:extLst>
+              <a:ext uri="{FF2B5EF4-FFF2-40B4-BE49-F238E27FC236}">
+                <a16:creationId xmlns:a16="http://schemas.microsoft.com/office/drawing/2014/main" id="{0702D4C7-0AC0-7EBE-3B50-218B1D103F67}"/>
+              </a:ext>
+            </a:extLst>
+          </p:cNvPr>
+          <p:cNvSpPr/>
+          <p:nvPr/>
+        </p:nvSpPr>
+        <p:spPr>
+          <a:xfrm>
+            <a:off x="877022" y="471525"/>
+            <a:ext cx="1061133" cy="1061133"/>
+          </a:xfrm>
+          <a:prstGeom prst="ellipse">
+            <a:avLst/>
+          </a:prstGeom>
+          <a:noFill/>
+          <a:ln w="19050">
+            <a:solidFill>
+              <a:schemeClr val="bg1">
+                <a:lumMod val="65000"/>
+              </a:schemeClr>
+            </a:solidFill>
+          </a:ln>
+        </p:spPr>
+        <p:style>
+          <a:lnRef idx="2">
+            <a:schemeClr val="accent1">
+              <a:shade val="50000"/>
+            </a:schemeClr>
+          </a:lnRef>
+          <a:fillRef idx="1">
+            <a:schemeClr val="accent1"/>
+          </a:fillRef>
+          <a:effectRef idx="0">
+            <a:schemeClr val="accent1"/>
+          </a:effectRef>
+          <a:fontRef idx="minor">
+            <a:schemeClr val="lt1"/>
+          </a:fontRef>
+        </p:style>
+        <p:txBody>
+          <a:bodyPr rtlCol="0" anchor="ctr"/>
+          <a:lstStyle/>
+          <a:p>
+            <a:pPr algn="ctr"/>
+            <a:endParaRPr lang="en-US"/>
+          </a:p>
+        </p:txBody>
+      </p:sp>
       <p:pic>
         <p:nvPicPr>
           <p:cNvPr id="1026" name="Picture 2">
@@ -19081,7 +19135,7 @@
         </p:nvSpPr>
         <p:spPr>
           <a:xfrm>
-            <a:off x="239202" y="3278415"/>
+            <a:off x="1113191" y="589609"/>
             <a:ext cx="824964" cy="824964"/>
           </a:xfrm>
           <a:prstGeom prst="ellipse">
@@ -19621,7 +19675,7 @@
         </p:nvSpPr>
         <p:spPr>
           <a:xfrm>
-            <a:off x="1304702" y="3721102"/>
+            <a:off x="1220854" y="3721449"/>
             <a:ext cx="359555" cy="359555"/>
           </a:xfrm>
           <a:prstGeom prst="ellipse">
@@ -19668,6 +19722,511 @@
                 </a:schemeClr>
               </a:solidFill>
             </a:endParaRPr>
+          </a:p>
+        </p:txBody>
+      </p:sp>
+      <p:sp>
+        <p:nvSpPr>
+          <p:cNvPr id="4" name="Isosceles Triangle 3">
+            <a:extLst>
+              <a:ext uri="{FF2B5EF4-FFF2-40B4-BE49-F238E27FC236}">
+                <a16:creationId xmlns:a16="http://schemas.microsoft.com/office/drawing/2014/main" id="{63512D13-4081-91A3-AE73-E1F25B3D1857}"/>
+              </a:ext>
+            </a:extLst>
+          </p:cNvPr>
+          <p:cNvSpPr/>
+          <p:nvPr/>
+        </p:nvSpPr>
+        <p:spPr>
+          <a:xfrm>
+            <a:off x="1504240" y="2353200"/>
+            <a:ext cx="198313" cy="170959"/>
+          </a:xfrm>
+          <a:prstGeom prst="triangle">
+            <a:avLst/>
+          </a:prstGeom>
+          <a:ln/>
+        </p:spPr>
+        <p:style>
+          <a:lnRef idx="2">
+            <a:schemeClr val="dk1"/>
+          </a:lnRef>
+          <a:fillRef idx="1">
+            <a:schemeClr val="lt1"/>
+          </a:fillRef>
+          <a:effectRef idx="0">
+            <a:schemeClr val="dk1"/>
+          </a:effectRef>
+          <a:fontRef idx="minor">
+            <a:schemeClr val="dk1"/>
+          </a:fontRef>
+        </p:style>
+        <p:txBody>
+          <a:bodyPr rtlCol="0" anchor="ctr"/>
+          <a:lstStyle/>
+          <a:p>
+            <a:pPr algn="ctr"/>
+            <a:endParaRPr lang="en-US"/>
+          </a:p>
+        </p:txBody>
+      </p:sp>
+      <p:sp>
+        <p:nvSpPr>
+          <p:cNvPr id="6" name="Isosceles Triangle 5">
+            <a:extLst>
+              <a:ext uri="{FF2B5EF4-FFF2-40B4-BE49-F238E27FC236}">
+                <a16:creationId xmlns:a16="http://schemas.microsoft.com/office/drawing/2014/main" id="{0F45E1C1-AC08-467D-8461-B9CF5EB3F601}"/>
+              </a:ext>
+            </a:extLst>
+          </p:cNvPr>
+          <p:cNvSpPr/>
+          <p:nvPr/>
+        </p:nvSpPr>
+        <p:spPr>
+          <a:xfrm>
+            <a:off x="1789520" y="3036968"/>
+            <a:ext cx="198313" cy="170959"/>
+          </a:xfrm>
+          <a:prstGeom prst="triangle">
+            <a:avLst/>
+          </a:prstGeom>
+        </p:spPr>
+        <p:style>
+          <a:lnRef idx="0">
+            <a:schemeClr val="accent2"/>
+          </a:lnRef>
+          <a:fillRef idx="3">
+            <a:schemeClr val="accent2"/>
+          </a:fillRef>
+          <a:effectRef idx="3">
+            <a:schemeClr val="accent2"/>
+          </a:effectRef>
+          <a:fontRef idx="minor">
+            <a:schemeClr val="lt1"/>
+          </a:fontRef>
+        </p:style>
+        <p:txBody>
+          <a:bodyPr rtlCol="0" anchor="ctr"/>
+          <a:lstStyle/>
+          <a:p>
+            <a:pPr algn="ctr"/>
+            <a:endParaRPr lang="en-US"/>
+          </a:p>
+        </p:txBody>
+      </p:sp>
+      <p:sp>
+        <p:nvSpPr>
+          <p:cNvPr id="7" name="TextBox 6">
+            <a:extLst>
+              <a:ext uri="{FF2B5EF4-FFF2-40B4-BE49-F238E27FC236}">
+                <a16:creationId xmlns:a16="http://schemas.microsoft.com/office/drawing/2014/main" id="{ABD0AEA4-7874-63CF-E186-FD2DF3184764}"/>
+              </a:ext>
+            </a:extLst>
+          </p:cNvPr>
+          <p:cNvSpPr txBox="1"/>
+          <p:nvPr/>
+        </p:nvSpPr>
+        <p:spPr>
+          <a:xfrm>
+            <a:off x="7920908" y="214191"/>
+            <a:ext cx="324128" cy="400110"/>
+          </a:xfrm>
+          <a:prstGeom prst="rect">
+            <a:avLst/>
+          </a:prstGeom>
+          <a:noFill/>
+        </p:spPr>
+        <p:txBody>
+          <a:bodyPr wrap="none" rtlCol="0">
+            <a:spAutoFit/>
+          </a:bodyPr>
+          <a:lstStyle/>
+          <a:p>
+            <a:pPr algn="ctr"/>
+            <a:r>
+              <a:rPr lang="en-US" sz="2000" b="1" spc="50" dirty="0">
+                <a:ln w="9525" cmpd="sng">
+                  <a:solidFill>
+                    <a:schemeClr val="accent1"/>
+                  </a:solidFill>
+                  <a:prstDash val="solid"/>
+                </a:ln>
+                <a:solidFill>
+                  <a:srgbClr val="70AD47">
+                    <a:tint val="1000"/>
+                  </a:srgbClr>
+                </a:solidFill>
+                <a:effectLst>
+                  <a:glow rad="38100">
+                    <a:schemeClr val="accent1">
+                      <a:alpha val="40000"/>
+                    </a:schemeClr>
+                  </a:glow>
+                </a:effectLst>
+                <a:latin typeface="Bauhaus 93" panose="04030905020B02020C02" pitchFamily="82" charset="0"/>
+              </a:rPr>
+              <a:t>Y</a:t>
+            </a:r>
+          </a:p>
+        </p:txBody>
+      </p:sp>
+      <p:sp>
+        <p:nvSpPr>
+          <p:cNvPr id="8" name="TextBox 7">
+            <a:extLst>
+              <a:ext uri="{FF2B5EF4-FFF2-40B4-BE49-F238E27FC236}">
+                <a16:creationId xmlns:a16="http://schemas.microsoft.com/office/drawing/2014/main" id="{8C03131D-5912-16C7-FBA7-5952378A2A4B}"/>
+              </a:ext>
+            </a:extLst>
+          </p:cNvPr>
+          <p:cNvSpPr txBox="1"/>
+          <p:nvPr/>
+        </p:nvSpPr>
+        <p:spPr>
+          <a:xfrm>
+            <a:off x="3467981" y="457944"/>
+            <a:ext cx="346570" cy="400110"/>
+          </a:xfrm>
+          <a:prstGeom prst="rect">
+            <a:avLst/>
+          </a:prstGeom>
+          <a:noFill/>
+        </p:spPr>
+        <p:txBody>
+          <a:bodyPr wrap="none" rtlCol="0">
+            <a:spAutoFit/>
+          </a:bodyPr>
+          <a:lstStyle/>
+          <a:p>
+            <a:r>
+              <a:rPr lang="en-US" sz="2000" b="1" dirty="0">
+                <a:ln w="22225">
+                  <a:solidFill>
+                    <a:schemeClr val="accent2"/>
+                  </a:solidFill>
+                  <a:prstDash val="solid"/>
+                </a:ln>
+                <a:solidFill>
+                  <a:schemeClr val="accent2">
+                    <a:lumMod val="40000"/>
+                    <a:lumOff val="60000"/>
+                  </a:schemeClr>
+                </a:solidFill>
+              </a:rPr>
+              <a:t>A</a:t>
+            </a:r>
+          </a:p>
+        </p:txBody>
+      </p:sp>
+      <p:sp>
+        <p:nvSpPr>
+          <p:cNvPr id="9" name="TextBox 8">
+            <a:extLst>
+              <a:ext uri="{FF2B5EF4-FFF2-40B4-BE49-F238E27FC236}">
+                <a16:creationId xmlns:a16="http://schemas.microsoft.com/office/drawing/2014/main" id="{8D8403A4-C1D3-BCAD-1ABE-7A6E68BEDF75}"/>
+              </a:ext>
+            </a:extLst>
+          </p:cNvPr>
+          <p:cNvSpPr txBox="1"/>
+          <p:nvPr/>
+        </p:nvSpPr>
+        <p:spPr>
+          <a:xfrm>
+            <a:off x="7533333" y="189010"/>
+            <a:ext cx="346570" cy="400110"/>
+          </a:xfrm>
+          <a:prstGeom prst="rect">
+            <a:avLst/>
+          </a:prstGeom>
+          <a:noFill/>
+        </p:spPr>
+        <p:txBody>
+          <a:bodyPr wrap="none" rtlCol="0">
+            <a:spAutoFit/>
+          </a:bodyPr>
+          <a:lstStyle/>
+          <a:p>
+            <a:pPr algn="ctr"/>
+            <a:r>
+              <a:rPr lang="en-US" sz="2000" b="1" spc="50" dirty="0">
+                <a:ln w="9525" cmpd="sng">
+                  <a:solidFill>
+                    <a:schemeClr val="accent1"/>
+                  </a:solidFill>
+                  <a:prstDash val="solid"/>
+                </a:ln>
+                <a:solidFill>
+                  <a:srgbClr val="70AD47">
+                    <a:tint val="1000"/>
+                  </a:srgbClr>
+                </a:solidFill>
+                <a:effectLst>
+                  <a:glow rad="38100">
+                    <a:schemeClr val="accent1">
+                      <a:alpha val="40000"/>
+                    </a:schemeClr>
+                  </a:glow>
+                </a:effectLst>
+                <a:latin typeface="Bauhaus 93" panose="04030905020B02020C02" pitchFamily="82" charset="0"/>
+              </a:rPr>
+              <a:t>A</a:t>
+            </a:r>
+          </a:p>
+        </p:txBody>
+      </p:sp>
+      <p:sp>
+        <p:nvSpPr>
+          <p:cNvPr id="10" name="TextBox 9">
+            <a:extLst>
+              <a:ext uri="{FF2B5EF4-FFF2-40B4-BE49-F238E27FC236}">
+                <a16:creationId xmlns:a16="http://schemas.microsoft.com/office/drawing/2014/main" id="{BE1DBEC1-FAA9-1490-9429-DB54547B6E9E}"/>
+              </a:ext>
+            </a:extLst>
+          </p:cNvPr>
+          <p:cNvSpPr txBox="1"/>
+          <p:nvPr/>
+        </p:nvSpPr>
+        <p:spPr>
+          <a:xfrm>
+            <a:off x="3127494" y="423474"/>
+            <a:ext cx="346570" cy="400110"/>
+          </a:xfrm>
+          <a:prstGeom prst="rect">
+            <a:avLst/>
+          </a:prstGeom>
+          <a:noFill/>
+        </p:spPr>
+        <p:txBody>
+          <a:bodyPr wrap="none" rtlCol="0">
+            <a:spAutoFit/>
+          </a:bodyPr>
+          <a:lstStyle/>
+          <a:p>
+            <a:r>
+              <a:rPr lang="en-US" sz="2000" b="1" dirty="0">
+                <a:ln w="22225">
+                  <a:solidFill>
+                    <a:schemeClr val="accent2"/>
+                  </a:solidFill>
+                  <a:prstDash val="solid"/>
+                </a:ln>
+                <a:solidFill>
+                  <a:schemeClr val="accent2">
+                    <a:lumMod val="40000"/>
+                    <a:lumOff val="60000"/>
+                  </a:schemeClr>
+                </a:solidFill>
+              </a:rPr>
+              <a:t>A</a:t>
+            </a:r>
+          </a:p>
+        </p:txBody>
+      </p:sp>
+      <p:sp>
+        <p:nvSpPr>
+          <p:cNvPr id="15" name="TextBox 14">
+            <a:extLst>
+              <a:ext uri="{FF2B5EF4-FFF2-40B4-BE49-F238E27FC236}">
+                <a16:creationId xmlns:a16="http://schemas.microsoft.com/office/drawing/2014/main" id="{F0A98727-82A6-68C5-C4FF-B9C7655AD10A}"/>
+              </a:ext>
+            </a:extLst>
+          </p:cNvPr>
+          <p:cNvSpPr txBox="1"/>
+          <p:nvPr/>
+        </p:nvSpPr>
+        <p:spPr>
+          <a:xfrm>
+            <a:off x="8028214" y="634579"/>
+            <a:ext cx="319318" cy="400110"/>
+          </a:xfrm>
+          <a:prstGeom prst="rect">
+            <a:avLst/>
+          </a:prstGeom>
+          <a:noFill/>
+        </p:spPr>
+        <p:txBody>
+          <a:bodyPr wrap="none" rtlCol="0">
+            <a:spAutoFit/>
+          </a:bodyPr>
+          <a:lstStyle/>
+          <a:p>
+            <a:pPr algn="ctr"/>
+            <a:r>
+              <a:rPr lang="en-US" sz="2000" b="1" spc="50" dirty="0">
+                <a:ln w="9525" cmpd="sng">
+                  <a:solidFill>
+                    <a:schemeClr val="accent1"/>
+                  </a:solidFill>
+                  <a:prstDash val="solid"/>
+                </a:ln>
+                <a:solidFill>
+                  <a:srgbClr val="70AD47">
+                    <a:tint val="1000"/>
+                  </a:srgbClr>
+                </a:solidFill>
+                <a:effectLst>
+                  <a:glow rad="38100">
+                    <a:schemeClr val="accent1">
+                      <a:alpha val="40000"/>
+                    </a:schemeClr>
+                  </a:glow>
+                </a:effectLst>
+                <a:latin typeface="Bauhaus 93" panose="04030905020B02020C02" pitchFamily="82" charset="0"/>
+              </a:rPr>
+              <a:t>X</a:t>
+            </a:r>
+          </a:p>
+        </p:txBody>
+      </p:sp>
+      <p:sp>
+        <p:nvSpPr>
+          <p:cNvPr id="24" name="TextBox 23">
+            <a:extLst>
+              <a:ext uri="{FF2B5EF4-FFF2-40B4-BE49-F238E27FC236}">
+                <a16:creationId xmlns:a16="http://schemas.microsoft.com/office/drawing/2014/main" id="{353FF2CE-262C-06DD-42C1-3A5291929138}"/>
+              </a:ext>
+            </a:extLst>
+          </p:cNvPr>
+          <p:cNvSpPr txBox="1"/>
+          <p:nvPr/>
+        </p:nvSpPr>
+        <p:spPr>
+          <a:xfrm>
+            <a:off x="3620381" y="610344"/>
+            <a:ext cx="346570" cy="400110"/>
+          </a:xfrm>
+          <a:prstGeom prst="rect">
+            <a:avLst/>
+          </a:prstGeom>
+          <a:noFill/>
+        </p:spPr>
+        <p:txBody>
+          <a:bodyPr wrap="none" rtlCol="0">
+            <a:spAutoFit/>
+          </a:bodyPr>
+          <a:lstStyle/>
+          <a:p>
+            <a:r>
+              <a:rPr lang="en-US" sz="2000" b="1" dirty="0">
+                <a:ln w="22225">
+                  <a:solidFill>
+                    <a:schemeClr val="accent2"/>
+                  </a:solidFill>
+                  <a:prstDash val="solid"/>
+                </a:ln>
+                <a:solidFill>
+                  <a:schemeClr val="accent2">
+                    <a:lumMod val="40000"/>
+                    <a:lumOff val="60000"/>
+                  </a:schemeClr>
+                </a:solidFill>
+              </a:rPr>
+              <a:t>A</a:t>
+            </a:r>
+          </a:p>
+        </p:txBody>
+      </p:sp>
+      <p:sp>
+        <p:nvSpPr>
+          <p:cNvPr id="27" name="TextBox 26">
+            <a:extLst>
+              <a:ext uri="{FF2B5EF4-FFF2-40B4-BE49-F238E27FC236}">
+                <a16:creationId xmlns:a16="http://schemas.microsoft.com/office/drawing/2014/main" id="{3BC4D4DA-D262-E68A-D78F-529A0D8E3D60}"/>
+              </a:ext>
+            </a:extLst>
+          </p:cNvPr>
+          <p:cNvSpPr txBox="1"/>
+          <p:nvPr/>
+        </p:nvSpPr>
+        <p:spPr>
+          <a:xfrm>
+            <a:off x="7562287" y="823584"/>
+            <a:ext cx="346570" cy="400110"/>
+          </a:xfrm>
+          <a:prstGeom prst="rect">
+            <a:avLst/>
+          </a:prstGeom>
+          <a:noFill/>
+        </p:spPr>
+        <p:txBody>
+          <a:bodyPr wrap="none" rtlCol="0">
+            <a:spAutoFit/>
+          </a:bodyPr>
+          <a:lstStyle/>
+          <a:p>
+            <a:pPr algn="ctr"/>
+            <a:r>
+              <a:rPr lang="en-US" sz="2000" b="1" spc="50" dirty="0">
+                <a:ln w="9525" cmpd="sng">
+                  <a:solidFill>
+                    <a:schemeClr val="accent1"/>
+                  </a:solidFill>
+                  <a:prstDash val="solid"/>
+                </a:ln>
+                <a:solidFill>
+                  <a:srgbClr val="70AD47">
+                    <a:tint val="1000"/>
+                  </a:srgbClr>
+                </a:solidFill>
+                <a:effectLst>
+                  <a:glow rad="38100">
+                    <a:schemeClr val="accent1">
+                      <a:alpha val="40000"/>
+                    </a:schemeClr>
+                  </a:glow>
+                </a:effectLst>
+                <a:latin typeface="Bauhaus 93" panose="04030905020B02020C02" pitchFamily="82" charset="0"/>
+              </a:rPr>
+              <a:t>B</a:t>
+            </a:r>
+          </a:p>
+        </p:txBody>
+      </p:sp>
+      <p:sp>
+        <p:nvSpPr>
+          <p:cNvPr id="30" name="TextBox 29">
+            <a:extLst>
+              <a:ext uri="{FF2B5EF4-FFF2-40B4-BE49-F238E27FC236}">
+                <a16:creationId xmlns:a16="http://schemas.microsoft.com/office/drawing/2014/main" id="{94964A86-B3F2-F6C6-5C4B-4D38CA7DA6EE}"/>
+              </a:ext>
+            </a:extLst>
+          </p:cNvPr>
+          <p:cNvSpPr txBox="1"/>
+          <p:nvPr/>
+        </p:nvSpPr>
+        <p:spPr>
+          <a:xfrm>
+            <a:off x="3254076" y="601873"/>
+            <a:ext cx="346570" cy="400110"/>
+          </a:xfrm>
+          <a:prstGeom prst="rect">
+            <a:avLst/>
+          </a:prstGeom>
+          <a:noFill/>
+        </p:spPr>
+        <p:txBody>
+          <a:bodyPr wrap="none" rtlCol="0">
+            <a:spAutoFit/>
+          </a:bodyPr>
+          <a:lstStyle/>
+          <a:p>
+            <a:r>
+              <a:rPr lang="en-US" sz="2000" b="1" dirty="0">
+                <a:ln w="22225">
+                  <a:solidFill>
+                    <a:schemeClr val="accent2"/>
+                  </a:solidFill>
+                  <a:prstDash val="solid"/>
+                </a:ln>
+                <a:solidFill>
+                  <a:schemeClr val="accent2">
+                    <a:lumMod val="40000"/>
+                    <a:lumOff val="60000"/>
+                  </a:schemeClr>
+                </a:solidFill>
+              </a:rPr>
+              <a:t>A</a:t>
+            </a:r>
           </a:p>
         </p:txBody>
       </p:sp>

</xml_diff>

<commit_message>
Refactored playerSettingsLogic. Now displays the generic commands. Refactored how lists are displayed.
</commit_message>
<xml_diff>
--- a/Beware/Content/designs.pptx
+++ b/Beware/Content/designs.pptx
@@ -263,7 +263,7 @@
           <a:p>
             <a:fld id="{355FB770-CC93-4F24-BE14-030DA79629D9}" type="datetimeFigureOut">
               <a:rPr lang="en-US" smtClean="0"/>
-              <a:t>11/21/2022</a:t>
+              <a:t>11/25/2022</a:t>
             </a:fld>
             <a:endParaRPr lang="en-US"/>
           </a:p>
@@ -461,7 +461,7 @@
           <a:p>
             <a:fld id="{355FB770-CC93-4F24-BE14-030DA79629D9}" type="datetimeFigureOut">
               <a:rPr lang="en-US" smtClean="0"/>
-              <a:t>11/21/2022</a:t>
+              <a:t>11/25/2022</a:t>
             </a:fld>
             <a:endParaRPr lang="en-US"/>
           </a:p>
@@ -669,7 +669,7 @@
           <a:p>
             <a:fld id="{355FB770-CC93-4F24-BE14-030DA79629D9}" type="datetimeFigureOut">
               <a:rPr lang="en-US" smtClean="0"/>
-              <a:t>11/21/2022</a:t>
+              <a:t>11/25/2022</a:t>
             </a:fld>
             <a:endParaRPr lang="en-US"/>
           </a:p>
@@ -867,7 +867,7 @@
           <a:p>
             <a:fld id="{355FB770-CC93-4F24-BE14-030DA79629D9}" type="datetimeFigureOut">
               <a:rPr lang="en-US" smtClean="0"/>
-              <a:t>11/21/2022</a:t>
+              <a:t>11/25/2022</a:t>
             </a:fld>
             <a:endParaRPr lang="en-US"/>
           </a:p>
@@ -1142,7 +1142,7 @@
           <a:p>
             <a:fld id="{355FB770-CC93-4F24-BE14-030DA79629D9}" type="datetimeFigureOut">
               <a:rPr lang="en-US" smtClean="0"/>
-              <a:t>11/21/2022</a:t>
+              <a:t>11/25/2022</a:t>
             </a:fld>
             <a:endParaRPr lang="en-US"/>
           </a:p>
@@ -1407,7 +1407,7 @@
           <a:p>
             <a:fld id="{355FB770-CC93-4F24-BE14-030DA79629D9}" type="datetimeFigureOut">
               <a:rPr lang="en-US" smtClean="0"/>
-              <a:t>11/21/2022</a:t>
+              <a:t>11/25/2022</a:t>
             </a:fld>
             <a:endParaRPr lang="en-US"/>
           </a:p>
@@ -1819,7 +1819,7 @@
           <a:p>
             <a:fld id="{355FB770-CC93-4F24-BE14-030DA79629D9}" type="datetimeFigureOut">
               <a:rPr lang="en-US" smtClean="0"/>
-              <a:t>11/21/2022</a:t>
+              <a:t>11/25/2022</a:t>
             </a:fld>
             <a:endParaRPr lang="en-US"/>
           </a:p>
@@ -1960,7 +1960,7 @@
           <a:p>
             <a:fld id="{355FB770-CC93-4F24-BE14-030DA79629D9}" type="datetimeFigureOut">
               <a:rPr lang="en-US" smtClean="0"/>
-              <a:t>11/21/2022</a:t>
+              <a:t>11/25/2022</a:t>
             </a:fld>
             <a:endParaRPr lang="en-US"/>
           </a:p>
@@ -2073,7 +2073,7 @@
           <a:p>
             <a:fld id="{355FB770-CC93-4F24-BE14-030DA79629D9}" type="datetimeFigureOut">
               <a:rPr lang="en-US" smtClean="0"/>
-              <a:t>11/21/2022</a:t>
+              <a:t>11/25/2022</a:t>
             </a:fld>
             <a:endParaRPr lang="en-US"/>
           </a:p>
@@ -2384,7 +2384,7 @@
           <a:p>
             <a:fld id="{355FB770-CC93-4F24-BE14-030DA79629D9}" type="datetimeFigureOut">
               <a:rPr lang="en-US" smtClean="0"/>
-              <a:t>11/21/2022</a:t>
+              <a:t>11/25/2022</a:t>
             </a:fld>
             <a:endParaRPr lang="en-US"/>
           </a:p>
@@ -2672,7 +2672,7 @@
           <a:p>
             <a:fld id="{355FB770-CC93-4F24-BE14-030DA79629D9}" type="datetimeFigureOut">
               <a:rPr lang="en-US" smtClean="0"/>
-              <a:t>11/21/2022</a:t>
+              <a:t>11/25/2022</a:t>
             </a:fld>
             <a:endParaRPr lang="en-US"/>
           </a:p>
@@ -2913,7 +2913,7 @@
           <a:p>
             <a:fld id="{355FB770-CC93-4F24-BE14-030DA79629D9}" type="datetimeFigureOut">
               <a:rPr lang="en-US" smtClean="0"/>
-              <a:t>11/21/2022</a:t>
+              <a:t>11/25/2022</a:t>
             </a:fld>
             <a:endParaRPr lang="en-US"/>
           </a:p>
@@ -15865,7 +15865,7 @@
           <p:spPr>
             <a:xfrm>
               <a:off x="5282698" y="5022392"/>
-              <a:ext cx="1341118" cy="584775"/>
+              <a:ext cx="1341118" cy="523220"/>
             </a:xfrm>
             <a:prstGeom prst="rect">
               <a:avLst/>
@@ -15887,7 +15887,7 @@
             <a:p>
               <a:pPr algn="ctr"/>
               <a:r>
-                <a:rPr lang="en-US" sz="3200" b="1" dirty="0">
+                <a:rPr lang="en-US" sz="2800" b="1" dirty="0">
                   <a:ln w="22225">
                     <a:solidFill>
                       <a:schemeClr val="accent2"/>
@@ -15903,7 +15903,7 @@
                 </a:rPr>
                 <a:t>Space</a:t>
               </a:r>
-              <a:endParaRPr lang="en-US" sz="2400" b="1" dirty="0">
+              <a:endParaRPr lang="en-US" sz="2000" b="1" dirty="0">
                 <a:ln w="22225">
                   <a:solidFill>
                     <a:schemeClr val="accent2"/>

</xml_diff>

<commit_message>
Saved updated designs in ppt.
</commit_message>
<xml_diff>
--- a/Beware/Content/designs.pptx
+++ b/Beware/Content/designs.pptx
@@ -263,7 +263,7 @@
           <a:p>
             <a:fld id="{355FB770-CC93-4F24-BE14-030DA79629D9}" type="datetimeFigureOut">
               <a:rPr lang="en-US" smtClean="0"/>
-              <a:t>11/25/2022</a:t>
+              <a:t>11/27/2022</a:t>
             </a:fld>
             <a:endParaRPr lang="en-US"/>
           </a:p>
@@ -461,7 +461,7 @@
           <a:p>
             <a:fld id="{355FB770-CC93-4F24-BE14-030DA79629D9}" type="datetimeFigureOut">
               <a:rPr lang="en-US" smtClean="0"/>
-              <a:t>11/25/2022</a:t>
+              <a:t>11/27/2022</a:t>
             </a:fld>
             <a:endParaRPr lang="en-US"/>
           </a:p>
@@ -669,7 +669,7 @@
           <a:p>
             <a:fld id="{355FB770-CC93-4F24-BE14-030DA79629D9}" type="datetimeFigureOut">
               <a:rPr lang="en-US" smtClean="0"/>
-              <a:t>11/25/2022</a:t>
+              <a:t>11/27/2022</a:t>
             </a:fld>
             <a:endParaRPr lang="en-US"/>
           </a:p>
@@ -867,7 +867,7 @@
           <a:p>
             <a:fld id="{355FB770-CC93-4F24-BE14-030DA79629D9}" type="datetimeFigureOut">
               <a:rPr lang="en-US" smtClean="0"/>
-              <a:t>11/25/2022</a:t>
+              <a:t>11/27/2022</a:t>
             </a:fld>
             <a:endParaRPr lang="en-US"/>
           </a:p>
@@ -1142,7 +1142,7 @@
           <a:p>
             <a:fld id="{355FB770-CC93-4F24-BE14-030DA79629D9}" type="datetimeFigureOut">
               <a:rPr lang="en-US" smtClean="0"/>
-              <a:t>11/25/2022</a:t>
+              <a:t>11/27/2022</a:t>
             </a:fld>
             <a:endParaRPr lang="en-US"/>
           </a:p>
@@ -1407,7 +1407,7 @@
           <a:p>
             <a:fld id="{355FB770-CC93-4F24-BE14-030DA79629D9}" type="datetimeFigureOut">
               <a:rPr lang="en-US" smtClean="0"/>
-              <a:t>11/25/2022</a:t>
+              <a:t>11/27/2022</a:t>
             </a:fld>
             <a:endParaRPr lang="en-US"/>
           </a:p>
@@ -1819,7 +1819,7 @@
           <a:p>
             <a:fld id="{355FB770-CC93-4F24-BE14-030DA79629D9}" type="datetimeFigureOut">
               <a:rPr lang="en-US" smtClean="0"/>
-              <a:t>11/25/2022</a:t>
+              <a:t>11/27/2022</a:t>
             </a:fld>
             <a:endParaRPr lang="en-US"/>
           </a:p>
@@ -1960,7 +1960,7 @@
           <a:p>
             <a:fld id="{355FB770-CC93-4F24-BE14-030DA79629D9}" type="datetimeFigureOut">
               <a:rPr lang="en-US" smtClean="0"/>
-              <a:t>11/25/2022</a:t>
+              <a:t>11/27/2022</a:t>
             </a:fld>
             <a:endParaRPr lang="en-US"/>
           </a:p>
@@ -2073,7 +2073,7 @@
           <a:p>
             <a:fld id="{355FB770-CC93-4F24-BE14-030DA79629D9}" type="datetimeFigureOut">
               <a:rPr lang="en-US" smtClean="0"/>
-              <a:t>11/25/2022</a:t>
+              <a:t>11/27/2022</a:t>
             </a:fld>
             <a:endParaRPr lang="en-US"/>
           </a:p>
@@ -2384,7 +2384,7 @@
           <a:p>
             <a:fld id="{355FB770-CC93-4F24-BE14-030DA79629D9}" type="datetimeFigureOut">
               <a:rPr lang="en-US" smtClean="0"/>
-              <a:t>11/25/2022</a:t>
+              <a:t>11/27/2022</a:t>
             </a:fld>
             <a:endParaRPr lang="en-US"/>
           </a:p>
@@ -2672,7 +2672,7 @@
           <a:p>
             <a:fld id="{355FB770-CC93-4F24-BE14-030DA79629D9}" type="datetimeFigureOut">
               <a:rPr lang="en-US" smtClean="0"/>
-              <a:t>11/25/2022</a:t>
+              <a:t>11/27/2022</a:t>
             </a:fld>
             <a:endParaRPr lang="en-US"/>
           </a:p>
@@ -2913,7 +2913,7 @@
           <a:p>
             <a:fld id="{355FB770-CC93-4F24-BE14-030DA79629D9}" type="datetimeFigureOut">
               <a:rPr lang="en-US" smtClean="0"/>
-              <a:t>11/25/2022</a:t>
+              <a:t>11/27/2022</a:t>
             </a:fld>
             <a:endParaRPr lang="en-US"/>
           </a:p>
@@ -15921,6 +15921,340 @@
           </p:txBody>
         </p:sp>
       </p:grpSp>
+      <p:grpSp>
+        <p:nvGrpSpPr>
+          <p:cNvPr id="5" name="Group 4">
+            <a:extLst>
+              <a:ext uri="{FF2B5EF4-FFF2-40B4-BE49-F238E27FC236}">
+                <a16:creationId xmlns:a16="http://schemas.microsoft.com/office/drawing/2014/main" id="{BEBBE8CC-A6EE-BC10-0D9F-FEE51AD080F8}"/>
+              </a:ext>
+            </a:extLst>
+          </p:cNvPr>
+          <p:cNvGrpSpPr/>
+          <p:nvPr/>
+        </p:nvGrpSpPr>
+        <p:grpSpPr>
+          <a:xfrm>
+            <a:off x="3116941" y="4328424"/>
+            <a:ext cx="597477" cy="707886"/>
+            <a:chOff x="1667741" y="698136"/>
+            <a:chExt cx="597477" cy="707886"/>
+          </a:xfrm>
+        </p:grpSpPr>
+        <p:sp>
+          <p:nvSpPr>
+            <p:cNvPr id="90" name="Rectangle: Rounded Corners 89">
+              <a:extLst>
+                <a:ext uri="{FF2B5EF4-FFF2-40B4-BE49-F238E27FC236}">
+                  <a16:creationId xmlns:a16="http://schemas.microsoft.com/office/drawing/2014/main" id="{314BCB11-D81F-CBFC-5FE9-44633D902F4F}"/>
+                </a:ext>
+              </a:extLst>
+            </p:cNvPr>
+            <p:cNvSpPr/>
+            <p:nvPr/>
+          </p:nvSpPr>
+          <p:spPr>
+            <a:xfrm>
+              <a:off x="1667741" y="753341"/>
+              <a:ext cx="597477" cy="597477"/>
+            </a:xfrm>
+            <a:prstGeom prst="roundRect">
+              <a:avLst/>
+            </a:prstGeom>
+            <a:scene3d>
+              <a:camera prst="orthographicFront"/>
+              <a:lightRig rig="threePt" dir="t"/>
+            </a:scene3d>
+            <a:sp3d>
+              <a:bevelT w="139700" h="139700" prst="divot"/>
+            </a:sp3d>
+          </p:spPr>
+          <p:style>
+            <a:lnRef idx="0">
+              <a:schemeClr val="accent3"/>
+            </a:lnRef>
+            <a:fillRef idx="3">
+              <a:schemeClr val="accent3"/>
+            </a:fillRef>
+            <a:effectRef idx="3">
+              <a:schemeClr val="accent3"/>
+            </a:effectRef>
+            <a:fontRef idx="minor">
+              <a:schemeClr val="lt1"/>
+            </a:fontRef>
+          </p:style>
+          <p:txBody>
+            <a:bodyPr rtlCol="0" anchor="t"/>
+            <a:lstStyle/>
+            <a:p>
+              <a:pPr algn="ctr"/>
+              <a:endParaRPr lang="en-US" sz="1600" b="1" dirty="0">
+                <a:ln w="12700">
+                  <a:solidFill>
+                    <a:schemeClr val="accent1"/>
+                  </a:solidFill>
+                  <a:prstDash val="solid"/>
+                </a:ln>
+                <a:pattFill prst="pct50">
+                  <a:fgClr>
+                    <a:schemeClr val="accent1"/>
+                  </a:fgClr>
+                  <a:bgClr>
+                    <a:schemeClr val="accent1">
+                      <a:lumMod val="20000"/>
+                      <a:lumOff val="80000"/>
+                    </a:schemeClr>
+                  </a:bgClr>
+                </a:pattFill>
+                <a:effectLst>
+                  <a:outerShdw dist="38100" dir="2640000" algn="bl" rotWithShape="0">
+                    <a:schemeClr val="accent1"/>
+                  </a:outerShdw>
+                </a:effectLst>
+                <a:latin typeface="OCR A Extended" panose="02010509020102010303" pitchFamily="50" charset="0"/>
+                <a:cs typeface="Posterama" panose="020B0504020200020000" pitchFamily="34" charset="0"/>
+              </a:endParaRPr>
+            </a:p>
+          </p:txBody>
+        </p:sp>
+        <p:sp>
+          <p:nvSpPr>
+            <p:cNvPr id="96" name="TextBox 95">
+              <a:extLst>
+                <a:ext uri="{FF2B5EF4-FFF2-40B4-BE49-F238E27FC236}">
+                  <a16:creationId xmlns:a16="http://schemas.microsoft.com/office/drawing/2014/main" id="{0F0741B2-6460-B3C4-E221-2085D1DB8065}"/>
+                </a:ext>
+              </a:extLst>
+            </p:cNvPr>
+            <p:cNvSpPr txBox="1"/>
+            <p:nvPr/>
+          </p:nvSpPr>
+          <p:spPr>
+            <a:xfrm>
+              <a:off x="1744303" y="698136"/>
+              <a:ext cx="444353" cy="707886"/>
+            </a:xfrm>
+            <a:prstGeom prst="rect">
+              <a:avLst/>
+            </a:prstGeom>
+            <a:noFill/>
+          </p:spPr>
+          <p:txBody>
+            <a:bodyPr wrap="none" rtlCol="0">
+              <a:spAutoFit/>
+              <a:scene3d>
+                <a:camera prst="orthographicFront"/>
+                <a:lightRig rig="threePt" dir="t"/>
+              </a:scene3d>
+              <a:sp3d extrusionH="57150">
+                <a:bevelT w="82550" h="38100" prst="coolSlant"/>
+              </a:sp3d>
+            </a:bodyPr>
+            <a:lstStyle/>
+            <a:p>
+              <a:pPr algn="ctr"/>
+              <a:r>
+                <a:rPr lang="en-US" sz="4000" b="1" dirty="0">
+                  <a:ln w="22225">
+                    <a:solidFill>
+                      <a:schemeClr val="accent2"/>
+                    </a:solidFill>
+                    <a:prstDash val="solid"/>
+                  </a:ln>
+                  <a:solidFill>
+                    <a:schemeClr val="accent2">
+                      <a:lumMod val="40000"/>
+                      <a:lumOff val="60000"/>
+                    </a:schemeClr>
+                  </a:solidFill>
+                </a:rPr>
+                <a:t>+</a:t>
+              </a:r>
+              <a:endParaRPr lang="en-US" b="1" dirty="0">
+                <a:ln w="22225">
+                  <a:solidFill>
+                    <a:schemeClr val="accent2"/>
+                  </a:solidFill>
+                  <a:prstDash val="solid"/>
+                </a:ln>
+                <a:solidFill>
+                  <a:schemeClr val="accent2">
+                    <a:lumMod val="40000"/>
+                    <a:lumOff val="60000"/>
+                  </a:schemeClr>
+                </a:solidFill>
+              </a:endParaRPr>
+            </a:p>
+          </p:txBody>
+        </p:sp>
+      </p:grpSp>
+      <p:grpSp>
+        <p:nvGrpSpPr>
+          <p:cNvPr id="99" name="Group 98">
+            <a:extLst>
+              <a:ext uri="{FF2B5EF4-FFF2-40B4-BE49-F238E27FC236}">
+                <a16:creationId xmlns:a16="http://schemas.microsoft.com/office/drawing/2014/main" id="{555ABB8D-C4DA-5F25-6606-80EAE5C85BE1}"/>
+              </a:ext>
+            </a:extLst>
+          </p:cNvPr>
+          <p:cNvGrpSpPr/>
+          <p:nvPr/>
+        </p:nvGrpSpPr>
+        <p:grpSpPr>
+          <a:xfrm>
+            <a:off x="4438343" y="4939428"/>
+            <a:ext cx="1631977" cy="597477"/>
+            <a:chOff x="5137269" y="5016041"/>
+            <a:chExt cx="1631977" cy="597477"/>
+          </a:xfrm>
+        </p:grpSpPr>
+        <p:sp>
+          <p:nvSpPr>
+            <p:cNvPr id="132" name="Rectangle: Rounded Corners 131">
+              <a:extLst>
+                <a:ext uri="{FF2B5EF4-FFF2-40B4-BE49-F238E27FC236}">
+                  <a16:creationId xmlns:a16="http://schemas.microsoft.com/office/drawing/2014/main" id="{EE7D6C6A-B7CF-EE7D-5E5C-4CCA9A317B72}"/>
+                </a:ext>
+              </a:extLst>
+            </p:cNvPr>
+            <p:cNvSpPr/>
+            <p:nvPr/>
+          </p:nvSpPr>
+          <p:spPr>
+            <a:xfrm>
+              <a:off x="5137269" y="5016041"/>
+              <a:ext cx="1631977" cy="597477"/>
+            </a:xfrm>
+            <a:prstGeom prst="roundRect">
+              <a:avLst/>
+            </a:prstGeom>
+            <a:scene3d>
+              <a:camera prst="orthographicFront"/>
+              <a:lightRig rig="threePt" dir="t"/>
+            </a:scene3d>
+            <a:sp3d>
+              <a:bevelT w="139700" h="139700" prst="divot"/>
+            </a:sp3d>
+          </p:spPr>
+          <p:style>
+            <a:lnRef idx="0">
+              <a:schemeClr val="accent3"/>
+            </a:lnRef>
+            <a:fillRef idx="3">
+              <a:schemeClr val="accent3"/>
+            </a:fillRef>
+            <a:effectRef idx="3">
+              <a:schemeClr val="accent3"/>
+            </a:effectRef>
+            <a:fontRef idx="minor">
+              <a:schemeClr val="lt1"/>
+            </a:fontRef>
+          </p:style>
+          <p:txBody>
+            <a:bodyPr rtlCol="0" anchor="t"/>
+            <a:lstStyle/>
+            <a:p>
+              <a:pPr algn="ctr"/>
+              <a:endParaRPr lang="en-US" sz="1600" b="1" dirty="0">
+                <a:ln w="12700">
+                  <a:solidFill>
+                    <a:schemeClr val="accent1"/>
+                  </a:solidFill>
+                  <a:prstDash val="solid"/>
+                </a:ln>
+                <a:pattFill prst="pct50">
+                  <a:fgClr>
+                    <a:schemeClr val="accent1"/>
+                  </a:fgClr>
+                  <a:bgClr>
+                    <a:schemeClr val="accent1">
+                      <a:lumMod val="20000"/>
+                      <a:lumOff val="80000"/>
+                    </a:schemeClr>
+                  </a:bgClr>
+                </a:pattFill>
+                <a:effectLst>
+                  <a:outerShdw dist="38100" dir="2640000" algn="bl" rotWithShape="0">
+                    <a:schemeClr val="accent1"/>
+                  </a:outerShdw>
+                </a:effectLst>
+                <a:latin typeface="OCR A Extended" panose="02010509020102010303" pitchFamily="50" charset="0"/>
+                <a:cs typeface="Posterama" panose="020B0504020200020000" pitchFamily="34" charset="0"/>
+              </a:endParaRPr>
+            </a:p>
+          </p:txBody>
+        </p:sp>
+        <p:sp>
+          <p:nvSpPr>
+            <p:cNvPr id="166" name="TextBox 165">
+              <a:extLst>
+                <a:ext uri="{FF2B5EF4-FFF2-40B4-BE49-F238E27FC236}">
+                  <a16:creationId xmlns:a16="http://schemas.microsoft.com/office/drawing/2014/main" id="{FE20954B-F08C-502C-A555-28BF6C52EB42}"/>
+                </a:ext>
+              </a:extLst>
+            </p:cNvPr>
+            <p:cNvSpPr txBox="1"/>
+            <p:nvPr/>
+          </p:nvSpPr>
+          <p:spPr>
+            <a:xfrm>
+              <a:off x="5282698" y="5022392"/>
+              <a:ext cx="1341118" cy="523220"/>
+            </a:xfrm>
+            <a:prstGeom prst="rect">
+              <a:avLst/>
+            </a:prstGeom>
+            <a:noFill/>
+          </p:spPr>
+          <p:txBody>
+            <a:bodyPr wrap="square" rtlCol="0">
+              <a:spAutoFit/>
+              <a:scene3d>
+                <a:camera prst="orthographicFront"/>
+                <a:lightRig rig="threePt" dir="t"/>
+              </a:scene3d>
+              <a:sp3d extrusionH="57150">
+                <a:bevelT w="82550" h="38100" prst="coolSlant"/>
+              </a:sp3d>
+            </a:bodyPr>
+            <a:lstStyle/>
+            <a:p>
+              <a:pPr algn="ctr"/>
+              <a:r>
+                <a:rPr lang="en-US" sz="2800" b="1" dirty="0">
+                  <a:ln w="22225">
+                    <a:solidFill>
+                      <a:schemeClr val="accent2"/>
+                    </a:solidFill>
+                    <a:prstDash val="solid"/>
+                  </a:ln>
+                  <a:solidFill>
+                    <a:schemeClr val="accent2">
+                      <a:lumMod val="40000"/>
+                      <a:lumOff val="60000"/>
+                    </a:schemeClr>
+                  </a:solidFill>
+                </a:rPr>
+                <a:t>Enter</a:t>
+              </a:r>
+              <a:endParaRPr lang="en-US" sz="2000" b="1" dirty="0">
+                <a:ln w="22225">
+                  <a:solidFill>
+                    <a:schemeClr val="accent2"/>
+                  </a:solidFill>
+                  <a:prstDash val="solid"/>
+                </a:ln>
+                <a:solidFill>
+                  <a:schemeClr val="accent2">
+                    <a:lumMod val="40000"/>
+                    <a:lumOff val="60000"/>
+                  </a:schemeClr>
+                </a:solidFill>
+              </a:endParaRPr>
+            </a:p>
+          </p:txBody>
+        </p:sp>
+      </p:grpSp>
     </p:spTree>
     <p:extLst>
       <p:ext uri="{BB962C8B-B14F-4D97-AF65-F5344CB8AC3E}">

</xml_diff>

<commit_message>
User now able to change player settings. Working on refactoring audio controls.
</commit_message>
<xml_diff>
--- a/Beware/Content/designs.pptx
+++ b/Beware/Content/designs.pptx
@@ -263,7 +263,7 @@
           <a:p>
             <a:fld id="{355FB770-CC93-4F24-BE14-030DA79629D9}" type="datetimeFigureOut">
               <a:rPr lang="en-US" smtClean="0"/>
-              <a:t>11/27/2022</a:t>
+              <a:t>11/28/2022</a:t>
             </a:fld>
             <a:endParaRPr lang="en-US"/>
           </a:p>
@@ -461,7 +461,7 @@
           <a:p>
             <a:fld id="{355FB770-CC93-4F24-BE14-030DA79629D9}" type="datetimeFigureOut">
               <a:rPr lang="en-US" smtClean="0"/>
-              <a:t>11/27/2022</a:t>
+              <a:t>11/28/2022</a:t>
             </a:fld>
             <a:endParaRPr lang="en-US"/>
           </a:p>
@@ -669,7 +669,7 @@
           <a:p>
             <a:fld id="{355FB770-CC93-4F24-BE14-030DA79629D9}" type="datetimeFigureOut">
               <a:rPr lang="en-US" smtClean="0"/>
-              <a:t>11/27/2022</a:t>
+              <a:t>11/28/2022</a:t>
             </a:fld>
             <a:endParaRPr lang="en-US"/>
           </a:p>
@@ -867,7 +867,7 @@
           <a:p>
             <a:fld id="{355FB770-CC93-4F24-BE14-030DA79629D9}" type="datetimeFigureOut">
               <a:rPr lang="en-US" smtClean="0"/>
-              <a:t>11/27/2022</a:t>
+              <a:t>11/28/2022</a:t>
             </a:fld>
             <a:endParaRPr lang="en-US"/>
           </a:p>
@@ -1142,7 +1142,7 @@
           <a:p>
             <a:fld id="{355FB770-CC93-4F24-BE14-030DA79629D9}" type="datetimeFigureOut">
               <a:rPr lang="en-US" smtClean="0"/>
-              <a:t>11/27/2022</a:t>
+              <a:t>11/28/2022</a:t>
             </a:fld>
             <a:endParaRPr lang="en-US"/>
           </a:p>
@@ -1407,7 +1407,7 @@
           <a:p>
             <a:fld id="{355FB770-CC93-4F24-BE14-030DA79629D9}" type="datetimeFigureOut">
               <a:rPr lang="en-US" smtClean="0"/>
-              <a:t>11/27/2022</a:t>
+              <a:t>11/28/2022</a:t>
             </a:fld>
             <a:endParaRPr lang="en-US"/>
           </a:p>
@@ -1819,7 +1819,7 @@
           <a:p>
             <a:fld id="{355FB770-CC93-4F24-BE14-030DA79629D9}" type="datetimeFigureOut">
               <a:rPr lang="en-US" smtClean="0"/>
-              <a:t>11/27/2022</a:t>
+              <a:t>11/28/2022</a:t>
             </a:fld>
             <a:endParaRPr lang="en-US"/>
           </a:p>
@@ -1960,7 +1960,7 @@
           <a:p>
             <a:fld id="{355FB770-CC93-4F24-BE14-030DA79629D9}" type="datetimeFigureOut">
               <a:rPr lang="en-US" smtClean="0"/>
-              <a:t>11/27/2022</a:t>
+              <a:t>11/28/2022</a:t>
             </a:fld>
             <a:endParaRPr lang="en-US"/>
           </a:p>
@@ -2073,7 +2073,7 @@
           <a:p>
             <a:fld id="{355FB770-CC93-4F24-BE14-030DA79629D9}" type="datetimeFigureOut">
               <a:rPr lang="en-US" smtClean="0"/>
-              <a:t>11/27/2022</a:t>
+              <a:t>11/28/2022</a:t>
             </a:fld>
             <a:endParaRPr lang="en-US"/>
           </a:p>
@@ -2384,7 +2384,7 @@
           <a:p>
             <a:fld id="{355FB770-CC93-4F24-BE14-030DA79629D9}" type="datetimeFigureOut">
               <a:rPr lang="en-US" smtClean="0"/>
-              <a:t>11/27/2022</a:t>
+              <a:t>11/28/2022</a:t>
             </a:fld>
             <a:endParaRPr lang="en-US"/>
           </a:p>
@@ -2672,7 +2672,7 @@
           <a:p>
             <a:fld id="{355FB770-CC93-4F24-BE14-030DA79629D9}" type="datetimeFigureOut">
               <a:rPr lang="en-US" smtClean="0"/>
-              <a:t>11/27/2022</a:t>
+              <a:t>11/28/2022</a:t>
             </a:fld>
             <a:endParaRPr lang="en-US"/>
           </a:p>
@@ -2913,7 +2913,7 @@
           <a:p>
             <a:fld id="{355FB770-CC93-4F24-BE14-030DA79629D9}" type="datetimeFigureOut">
               <a:rPr lang="en-US" smtClean="0"/>
-              <a:t>11/27/2022</a:t>
+              <a:t>11/28/2022</a:t>
             </a:fld>
             <a:endParaRPr lang="en-US"/>
           </a:p>
@@ -17250,61 +17250,6 @@
       </p:grpSp>
       <p:sp>
         <p:nvSpPr>
-          <p:cNvPr id="32" name="Cross 31">
-            <a:extLst>
-              <a:ext uri="{FF2B5EF4-FFF2-40B4-BE49-F238E27FC236}">
-                <a16:creationId xmlns:a16="http://schemas.microsoft.com/office/drawing/2014/main" id="{F1F400DC-ACE8-D066-B0B1-1A8F69F876A3}"/>
-              </a:ext>
-            </a:extLst>
-          </p:cNvPr>
-          <p:cNvSpPr/>
-          <p:nvPr/>
-        </p:nvSpPr>
-        <p:spPr>
-          <a:xfrm>
-            <a:off x="5051751" y="3398734"/>
-            <a:ext cx="1031806" cy="1031806"/>
-          </a:xfrm>
-          <a:prstGeom prst="plus">
-            <a:avLst>
-              <a:gd name="adj" fmla="val 31936"/>
-            </a:avLst>
-          </a:prstGeom>
-          <a:scene3d>
-            <a:camera prst="orthographicFront"/>
-            <a:lightRig rig="brightRoom" dir="t"/>
-          </a:scene3d>
-          <a:sp3d extrusionH="127000">
-            <a:bevelT w="127000" h="88900" prst="softRound"/>
-          </a:sp3d>
-        </p:spPr>
-        <p:style>
-          <a:lnRef idx="2">
-            <a:schemeClr val="dk1">
-              <a:shade val="50000"/>
-            </a:schemeClr>
-          </a:lnRef>
-          <a:fillRef idx="1">
-            <a:schemeClr val="dk1"/>
-          </a:fillRef>
-          <a:effectRef idx="0">
-            <a:schemeClr val="dk1"/>
-          </a:effectRef>
-          <a:fontRef idx="minor">
-            <a:schemeClr val="lt1"/>
-          </a:fontRef>
-        </p:style>
-        <p:txBody>
-          <a:bodyPr rtlCol="0" anchor="ctr"/>
-          <a:lstStyle/>
-          <a:p>
-            <a:pPr algn="ctr"/>
-            <a:endParaRPr lang="en-US"/>
-          </a:p>
-        </p:txBody>
-      </p:sp>
-      <p:sp>
-        <p:nvSpPr>
           <p:cNvPr id="30" name="Oval 29">
             <a:extLst>
               <a:ext uri="{FF2B5EF4-FFF2-40B4-BE49-F238E27FC236}">
@@ -18018,6 +17963,305 @@
           </p:txBody>
         </p:sp>
       </p:grpSp>
+      <p:sp>
+        <p:nvSpPr>
+          <p:cNvPr id="3" name="Flowchart: Off-page Connector 2">
+            <a:extLst>
+              <a:ext uri="{FF2B5EF4-FFF2-40B4-BE49-F238E27FC236}">
+                <a16:creationId xmlns:a16="http://schemas.microsoft.com/office/drawing/2014/main" id="{FFD249B6-8B63-F68E-B91A-85DD2810BCCA}"/>
+              </a:ext>
+            </a:extLst>
+          </p:cNvPr>
+          <p:cNvSpPr/>
+          <p:nvPr/>
+        </p:nvSpPr>
+        <p:spPr>
+          <a:xfrm rot="16200000">
+            <a:off x="3446610" y="3976551"/>
+            <a:ext cx="376518" cy="395336"/>
+          </a:xfrm>
+          <a:prstGeom prst="flowChartOffpageConnector">
+            <a:avLst/>
+          </a:prstGeom>
+          <a:solidFill>
+            <a:srgbClr val="FF0000"/>
+          </a:solidFill>
+          <a:ln>
+            <a:solidFill>
+              <a:srgbClr val="FF0000"/>
+            </a:solidFill>
+          </a:ln>
+          <a:scene3d>
+            <a:camera prst="orthographicFront"/>
+            <a:lightRig rig="threePt" dir="t"/>
+          </a:scene3d>
+          <a:sp3d>
+            <a:bevelT prst="angle"/>
+          </a:sp3d>
+        </p:spPr>
+        <p:style>
+          <a:lnRef idx="2">
+            <a:schemeClr val="accent1">
+              <a:shade val="50000"/>
+            </a:schemeClr>
+          </a:lnRef>
+          <a:fillRef idx="1">
+            <a:schemeClr val="accent1"/>
+          </a:fillRef>
+          <a:effectRef idx="0">
+            <a:schemeClr val="accent1"/>
+          </a:effectRef>
+          <a:fontRef idx="minor">
+            <a:schemeClr val="lt1"/>
+          </a:fontRef>
+        </p:style>
+        <p:txBody>
+          <a:bodyPr rtlCol="0" anchor="ctr"/>
+          <a:lstStyle/>
+          <a:p>
+            <a:pPr algn="ctr"/>
+            <a:endParaRPr lang="en-US"/>
+          </a:p>
+        </p:txBody>
+      </p:sp>
+      <p:sp>
+        <p:nvSpPr>
+          <p:cNvPr id="4" name="Flowchart: Off-page Connector 3">
+            <a:extLst>
+              <a:ext uri="{FF2B5EF4-FFF2-40B4-BE49-F238E27FC236}">
+                <a16:creationId xmlns:a16="http://schemas.microsoft.com/office/drawing/2014/main" id="{D77E7FAB-E395-AD72-9927-5A9EFCE6E084}"/>
+              </a:ext>
+            </a:extLst>
+          </p:cNvPr>
+          <p:cNvSpPr/>
+          <p:nvPr/>
+        </p:nvSpPr>
+        <p:spPr>
+          <a:xfrm rot="10800000">
+            <a:off x="4872955" y="5647914"/>
+            <a:ext cx="377541" cy="411266"/>
+          </a:xfrm>
+          <a:prstGeom prst="flowChartOffpageConnector">
+            <a:avLst/>
+          </a:prstGeom>
+          <a:solidFill>
+            <a:srgbClr val="FF0000"/>
+          </a:solidFill>
+          <a:ln>
+            <a:solidFill>
+              <a:srgbClr val="FF0000"/>
+            </a:solidFill>
+          </a:ln>
+          <a:scene3d>
+            <a:camera prst="orthographicFront"/>
+            <a:lightRig rig="threePt" dir="t"/>
+          </a:scene3d>
+          <a:sp3d>
+            <a:bevelT prst="angle"/>
+          </a:sp3d>
+        </p:spPr>
+        <p:style>
+          <a:lnRef idx="2">
+            <a:schemeClr val="accent1">
+              <a:shade val="50000"/>
+            </a:schemeClr>
+          </a:lnRef>
+          <a:fillRef idx="1">
+            <a:schemeClr val="accent1"/>
+          </a:fillRef>
+          <a:effectRef idx="0">
+            <a:schemeClr val="accent1"/>
+          </a:effectRef>
+          <a:fontRef idx="minor">
+            <a:schemeClr val="lt1"/>
+          </a:fontRef>
+        </p:style>
+        <p:txBody>
+          <a:bodyPr rtlCol="0" anchor="ctr"/>
+          <a:lstStyle/>
+          <a:p>
+            <a:pPr algn="ctr"/>
+            <a:endParaRPr lang="en-US"/>
+          </a:p>
+        </p:txBody>
+      </p:sp>
+      <p:sp>
+        <p:nvSpPr>
+          <p:cNvPr id="32" name="Cross 31">
+            <a:extLst>
+              <a:ext uri="{FF2B5EF4-FFF2-40B4-BE49-F238E27FC236}">
+                <a16:creationId xmlns:a16="http://schemas.microsoft.com/office/drawing/2014/main" id="{F1F400DC-ACE8-D066-B0B1-1A8F69F876A3}"/>
+              </a:ext>
+            </a:extLst>
+          </p:cNvPr>
+          <p:cNvSpPr/>
+          <p:nvPr/>
+        </p:nvSpPr>
+        <p:spPr>
+          <a:xfrm>
+            <a:off x="5078637" y="3438393"/>
+            <a:ext cx="1031806" cy="1031806"/>
+          </a:xfrm>
+          <a:prstGeom prst="plus">
+            <a:avLst>
+              <a:gd name="adj" fmla="val 31936"/>
+            </a:avLst>
+          </a:prstGeom>
+          <a:scene3d>
+            <a:camera prst="orthographicFront"/>
+            <a:lightRig rig="brightRoom" dir="t"/>
+          </a:scene3d>
+          <a:sp3d extrusionH="127000">
+            <a:bevelT w="127000" h="88900" prst="softRound"/>
+          </a:sp3d>
+        </p:spPr>
+        <p:style>
+          <a:lnRef idx="2">
+            <a:schemeClr val="dk1">
+              <a:shade val="50000"/>
+            </a:schemeClr>
+          </a:lnRef>
+          <a:fillRef idx="1">
+            <a:schemeClr val="dk1"/>
+          </a:fillRef>
+          <a:effectRef idx="0">
+            <a:schemeClr val="dk1"/>
+          </a:effectRef>
+          <a:fontRef idx="minor">
+            <a:schemeClr val="lt1"/>
+          </a:fontRef>
+        </p:style>
+        <p:txBody>
+          <a:bodyPr rtlCol="0" anchor="ctr"/>
+          <a:lstStyle/>
+          <a:p>
+            <a:pPr algn="ctr"/>
+            <a:endParaRPr lang="en-US"/>
+          </a:p>
+        </p:txBody>
+      </p:sp>
+      <p:sp>
+        <p:nvSpPr>
+          <p:cNvPr id="2" name="Flowchart: Off-page Connector 1">
+            <a:extLst>
+              <a:ext uri="{FF2B5EF4-FFF2-40B4-BE49-F238E27FC236}">
+                <a16:creationId xmlns:a16="http://schemas.microsoft.com/office/drawing/2014/main" id="{35B7D9E2-556D-C2AC-6E79-B8C3D6CA99A5}"/>
+              </a:ext>
+            </a:extLst>
+          </p:cNvPr>
+          <p:cNvSpPr/>
+          <p:nvPr/>
+        </p:nvSpPr>
+        <p:spPr>
+          <a:xfrm>
+            <a:off x="4149364" y="3279289"/>
+            <a:ext cx="384828" cy="411266"/>
+          </a:xfrm>
+          <a:prstGeom prst="flowChartOffpageConnector">
+            <a:avLst/>
+          </a:prstGeom>
+          <a:solidFill>
+            <a:srgbClr val="FF0000"/>
+          </a:solidFill>
+          <a:ln>
+            <a:solidFill>
+              <a:srgbClr val="FF0000"/>
+            </a:solidFill>
+          </a:ln>
+          <a:scene3d>
+            <a:camera prst="orthographicFront"/>
+            <a:lightRig rig="threePt" dir="t"/>
+          </a:scene3d>
+          <a:sp3d>
+            <a:bevelT prst="angle"/>
+          </a:sp3d>
+        </p:spPr>
+        <p:style>
+          <a:lnRef idx="2">
+            <a:schemeClr val="accent1">
+              <a:shade val="50000"/>
+            </a:schemeClr>
+          </a:lnRef>
+          <a:fillRef idx="1">
+            <a:schemeClr val="accent1"/>
+          </a:fillRef>
+          <a:effectRef idx="0">
+            <a:schemeClr val="accent1"/>
+          </a:effectRef>
+          <a:fontRef idx="minor">
+            <a:schemeClr val="lt1"/>
+          </a:fontRef>
+        </p:style>
+        <p:txBody>
+          <a:bodyPr rtlCol="0" anchor="ctr"/>
+          <a:lstStyle/>
+          <a:p>
+            <a:pPr algn="ctr"/>
+            <a:endParaRPr lang="en-US"/>
+          </a:p>
+        </p:txBody>
+      </p:sp>
+      <p:sp>
+        <p:nvSpPr>
+          <p:cNvPr id="19" name="Flowchart: Off-page Connector 18">
+            <a:extLst>
+              <a:ext uri="{FF2B5EF4-FFF2-40B4-BE49-F238E27FC236}">
+                <a16:creationId xmlns:a16="http://schemas.microsoft.com/office/drawing/2014/main" id="{F5130F7D-6F3A-12EB-8D0C-F18B7C6C1010}"/>
+              </a:ext>
+            </a:extLst>
+          </p:cNvPr>
+          <p:cNvSpPr/>
+          <p:nvPr/>
+        </p:nvSpPr>
+        <p:spPr>
+          <a:xfrm rot="5400000">
+            <a:off x="5722733" y="3747233"/>
+            <a:ext cx="376087" cy="395336"/>
+          </a:xfrm>
+          <a:prstGeom prst="flowChartOffpageConnector">
+            <a:avLst/>
+          </a:prstGeom>
+          <a:solidFill>
+            <a:srgbClr val="FF0000"/>
+          </a:solidFill>
+          <a:ln>
+            <a:solidFill>
+              <a:srgbClr val="FF0000"/>
+            </a:solidFill>
+          </a:ln>
+          <a:scene3d>
+            <a:camera prst="orthographicFront"/>
+            <a:lightRig rig="threePt" dir="t"/>
+          </a:scene3d>
+          <a:sp3d>
+            <a:bevelT prst="angle"/>
+          </a:sp3d>
+        </p:spPr>
+        <p:style>
+          <a:lnRef idx="2">
+            <a:schemeClr val="accent1">
+              <a:shade val="50000"/>
+            </a:schemeClr>
+          </a:lnRef>
+          <a:fillRef idx="1">
+            <a:schemeClr val="accent1"/>
+          </a:fillRef>
+          <a:effectRef idx="0">
+            <a:schemeClr val="accent1"/>
+          </a:effectRef>
+          <a:fontRef idx="minor">
+            <a:schemeClr val="lt1"/>
+          </a:fontRef>
+        </p:style>
+        <p:txBody>
+          <a:bodyPr rtlCol="0" anchor="ctr"/>
+          <a:lstStyle/>
+          <a:p>
+            <a:pPr algn="ctr"/>
+            <a:endParaRPr lang="en-US"/>
+          </a:p>
+        </p:txBody>
+      </p:sp>
     </p:spTree>
     <p:extLst>
       <p:ext uri="{BB962C8B-B14F-4D97-AF65-F5344CB8AC3E}">

</xml_diff>

<commit_message>
Separated player gun into different class. Refactored the behaviours for gun class.
</commit_message>
<xml_diff>
--- a/Beware/Content/designs.pptx
+++ b/Beware/Content/designs.pptx
@@ -10,6 +10,7 @@
     <p:sldId id="258" r:id="rId4"/>
     <p:sldId id="259" r:id="rId5"/>
     <p:sldId id="260" r:id="rId6"/>
+    <p:sldId id="261" r:id="rId7"/>
   </p:sldIdLst>
   <p:sldSz cx="12192000" cy="6858000"/>
   <p:notesSz cx="6858000" cy="9144000"/>
@@ -263,7 +264,7 @@
           <a:p>
             <a:fld id="{355FB770-CC93-4F24-BE14-030DA79629D9}" type="datetimeFigureOut">
               <a:rPr lang="en-US" smtClean="0"/>
-              <a:t>11/28/2022</a:t>
+              <a:t>12/15/2022</a:t>
             </a:fld>
             <a:endParaRPr lang="en-US"/>
           </a:p>
@@ -461,7 +462,7 @@
           <a:p>
             <a:fld id="{355FB770-CC93-4F24-BE14-030DA79629D9}" type="datetimeFigureOut">
               <a:rPr lang="en-US" smtClean="0"/>
-              <a:t>11/28/2022</a:t>
+              <a:t>12/15/2022</a:t>
             </a:fld>
             <a:endParaRPr lang="en-US"/>
           </a:p>
@@ -669,7 +670,7 @@
           <a:p>
             <a:fld id="{355FB770-CC93-4F24-BE14-030DA79629D9}" type="datetimeFigureOut">
               <a:rPr lang="en-US" smtClean="0"/>
-              <a:t>11/28/2022</a:t>
+              <a:t>12/15/2022</a:t>
             </a:fld>
             <a:endParaRPr lang="en-US"/>
           </a:p>
@@ -867,7 +868,7 @@
           <a:p>
             <a:fld id="{355FB770-CC93-4F24-BE14-030DA79629D9}" type="datetimeFigureOut">
               <a:rPr lang="en-US" smtClean="0"/>
-              <a:t>11/28/2022</a:t>
+              <a:t>12/15/2022</a:t>
             </a:fld>
             <a:endParaRPr lang="en-US"/>
           </a:p>
@@ -941,7 +942,7 @@
 </file>
 
 <file path=ppt/slideLayouts/slideLayout3.xml><?xml version="1.0" encoding="utf-8"?>
-<p:sldLayout xmlns:a="http://schemas.openxmlformats.org/drawingml/2006/main" xmlns:r="http://schemas.openxmlformats.org/officeDocument/2006/relationships" xmlns:p="http://schemas.openxmlformats.org/presentationml/2006/main" type="secHead" preserve="1">
+<p:sldLayout xmlns:a="http://schemas.openxmlformats.org/drawingml/2006/main" xmlns:r="http://schemas.openxmlformats.org/officeDocument/2006/relationships" xmlns:p="http://schemas.openxmlformats.org/presentationml/2006/main" preserve="1" userDrawn="1">
   <p:cSld name="Section Header">
     <p:spTree>
       <p:nvGrpSpPr>
@@ -959,245 +960,46 @@
       </p:grpSpPr>
       <p:sp>
         <p:nvSpPr>
-          <p:cNvPr id="2" name="Title 1">
+          <p:cNvPr id="7" name="Rectangle 6">
             <a:extLst>
               <a:ext uri="{FF2B5EF4-FFF2-40B4-BE49-F238E27FC236}">
-                <a16:creationId xmlns:a16="http://schemas.microsoft.com/office/drawing/2014/main" id="{10B4858F-0CDF-9772-494B-42950EE1D0BC}"/>
+                <a16:creationId xmlns:a16="http://schemas.microsoft.com/office/drawing/2014/main" id="{1E762353-FC55-C5D0-9EDF-0B96CAA50042}"/>
               </a:ext>
             </a:extLst>
           </p:cNvPr>
-          <p:cNvSpPr>
-            <a:spLocks noGrp="1"/>
-          </p:cNvSpPr>
-          <p:nvPr>
-            <p:ph type="title"/>
-          </p:nvPr>
+          <p:cNvSpPr/>
+          <p:nvPr userDrawn="1"/>
         </p:nvSpPr>
         <p:spPr>
           <a:xfrm>
-            <a:off x="831850" y="1709738"/>
-            <a:ext cx="10515600" cy="2852737"/>
+            <a:off x="0" y="0"/>
+            <a:ext cx="12192000" cy="6858000"/>
           </a:xfrm>
+          <a:prstGeom prst="rect">
+            <a:avLst/>
+          </a:prstGeom>
         </p:spPr>
+        <p:style>
+          <a:lnRef idx="2">
+            <a:schemeClr val="accent1">
+              <a:shade val="50000"/>
+            </a:schemeClr>
+          </a:lnRef>
+          <a:fillRef idx="1">
+            <a:schemeClr val="accent1"/>
+          </a:fillRef>
+          <a:effectRef idx="0">
+            <a:schemeClr val="accent1"/>
+          </a:effectRef>
+          <a:fontRef idx="minor">
+            <a:schemeClr val="lt1"/>
+          </a:fontRef>
+        </p:style>
         <p:txBody>
-          <a:bodyPr anchor="b"/>
-          <a:lstStyle>
-            <a:lvl1pPr>
-              <a:defRPr sz="6000"/>
-            </a:lvl1pPr>
-          </a:lstStyle>
-          <a:p>
-            <a:r>
-              <a:rPr lang="en-US"/>
-              <a:t>Click to edit Master title style</a:t>
-            </a:r>
-          </a:p>
-        </p:txBody>
-      </p:sp>
-      <p:sp>
-        <p:nvSpPr>
-          <p:cNvPr id="3" name="Text Placeholder 2">
-            <a:extLst>
-              <a:ext uri="{FF2B5EF4-FFF2-40B4-BE49-F238E27FC236}">
-                <a16:creationId xmlns:a16="http://schemas.microsoft.com/office/drawing/2014/main" id="{CEF2006E-6107-C79B-6F92-85D500E28025}"/>
-              </a:ext>
-            </a:extLst>
-          </p:cNvPr>
-          <p:cNvSpPr>
-            <a:spLocks noGrp="1"/>
-          </p:cNvSpPr>
-          <p:nvPr>
-            <p:ph type="body" idx="1"/>
-          </p:nvPr>
-        </p:nvSpPr>
-        <p:spPr>
-          <a:xfrm>
-            <a:off x="831850" y="4589463"/>
-            <a:ext cx="10515600" cy="1500187"/>
-          </a:xfrm>
-        </p:spPr>
-        <p:txBody>
-          <a:bodyPr/>
-          <a:lstStyle>
-            <a:lvl1pPr marL="0" indent="0">
-              <a:buNone/>
-              <a:defRPr sz="2400">
-                <a:solidFill>
-                  <a:schemeClr val="tx1">
-                    <a:tint val="75000"/>
-                  </a:schemeClr>
-                </a:solidFill>
-              </a:defRPr>
-            </a:lvl1pPr>
-            <a:lvl2pPr marL="457200" indent="0">
-              <a:buNone/>
-              <a:defRPr sz="2000">
-                <a:solidFill>
-                  <a:schemeClr val="tx1">
-                    <a:tint val="75000"/>
-                  </a:schemeClr>
-                </a:solidFill>
-              </a:defRPr>
-            </a:lvl2pPr>
-            <a:lvl3pPr marL="914400" indent="0">
-              <a:buNone/>
-              <a:defRPr sz="1800">
-                <a:solidFill>
-                  <a:schemeClr val="tx1">
-                    <a:tint val="75000"/>
-                  </a:schemeClr>
-                </a:solidFill>
-              </a:defRPr>
-            </a:lvl3pPr>
-            <a:lvl4pPr marL="1371600" indent="0">
-              <a:buNone/>
-              <a:defRPr sz="1600">
-                <a:solidFill>
-                  <a:schemeClr val="tx1">
-                    <a:tint val="75000"/>
-                  </a:schemeClr>
-                </a:solidFill>
-              </a:defRPr>
-            </a:lvl4pPr>
-            <a:lvl5pPr marL="1828800" indent="0">
-              <a:buNone/>
-              <a:defRPr sz="1600">
-                <a:solidFill>
-                  <a:schemeClr val="tx1">
-                    <a:tint val="75000"/>
-                  </a:schemeClr>
-                </a:solidFill>
-              </a:defRPr>
-            </a:lvl5pPr>
-            <a:lvl6pPr marL="2286000" indent="0">
-              <a:buNone/>
-              <a:defRPr sz="1600">
-                <a:solidFill>
-                  <a:schemeClr val="tx1">
-                    <a:tint val="75000"/>
-                  </a:schemeClr>
-                </a:solidFill>
-              </a:defRPr>
-            </a:lvl6pPr>
-            <a:lvl7pPr marL="2743200" indent="0">
-              <a:buNone/>
-              <a:defRPr sz="1600">
-                <a:solidFill>
-                  <a:schemeClr val="tx1">
-                    <a:tint val="75000"/>
-                  </a:schemeClr>
-                </a:solidFill>
-              </a:defRPr>
-            </a:lvl7pPr>
-            <a:lvl8pPr marL="3200400" indent="0">
-              <a:buNone/>
-              <a:defRPr sz="1600">
-                <a:solidFill>
-                  <a:schemeClr val="tx1">
-                    <a:tint val="75000"/>
-                  </a:schemeClr>
-                </a:solidFill>
-              </a:defRPr>
-            </a:lvl8pPr>
-            <a:lvl9pPr marL="3657600" indent="0">
-              <a:buNone/>
-              <a:defRPr sz="1600">
-                <a:solidFill>
-                  <a:schemeClr val="tx1">
-                    <a:tint val="75000"/>
-                  </a:schemeClr>
-                </a:solidFill>
-              </a:defRPr>
-            </a:lvl9pPr>
-          </a:lstStyle>
-          <a:p>
-            <a:pPr lvl="0"/>
-            <a:r>
-              <a:rPr lang="en-US"/>
-              <a:t>Click to edit Master text styles</a:t>
-            </a:r>
-          </a:p>
-        </p:txBody>
-      </p:sp>
-      <p:sp>
-        <p:nvSpPr>
-          <p:cNvPr id="4" name="Date Placeholder 3">
-            <a:extLst>
-              <a:ext uri="{FF2B5EF4-FFF2-40B4-BE49-F238E27FC236}">
-                <a16:creationId xmlns:a16="http://schemas.microsoft.com/office/drawing/2014/main" id="{B626E31D-D0F2-B6D3-F71E-AD4F81EA05FA}"/>
-              </a:ext>
-            </a:extLst>
-          </p:cNvPr>
-          <p:cNvSpPr>
-            <a:spLocks noGrp="1"/>
-          </p:cNvSpPr>
-          <p:nvPr>
-            <p:ph type="dt" sz="half" idx="10"/>
-          </p:nvPr>
-        </p:nvSpPr>
-        <p:spPr/>
-        <p:txBody>
-          <a:bodyPr/>
+          <a:bodyPr rtlCol="0" anchor="ctr"/>
           <a:lstStyle/>
           <a:p>
-            <a:fld id="{355FB770-CC93-4F24-BE14-030DA79629D9}" type="datetimeFigureOut">
-              <a:rPr lang="en-US" smtClean="0"/>
-              <a:t>11/28/2022</a:t>
-            </a:fld>
-            <a:endParaRPr lang="en-US"/>
-          </a:p>
-        </p:txBody>
-      </p:sp>
-      <p:sp>
-        <p:nvSpPr>
-          <p:cNvPr id="5" name="Footer Placeholder 4">
-            <a:extLst>
-              <a:ext uri="{FF2B5EF4-FFF2-40B4-BE49-F238E27FC236}">
-                <a16:creationId xmlns:a16="http://schemas.microsoft.com/office/drawing/2014/main" id="{50EADCAE-7203-84BB-61B7-93EC6EABA57D}"/>
-              </a:ext>
-            </a:extLst>
-          </p:cNvPr>
-          <p:cNvSpPr>
-            <a:spLocks noGrp="1"/>
-          </p:cNvSpPr>
-          <p:nvPr>
-            <p:ph type="ftr" sz="quarter" idx="11"/>
-          </p:nvPr>
-        </p:nvSpPr>
-        <p:spPr/>
-        <p:txBody>
-          <a:bodyPr/>
-          <a:lstStyle/>
-          <a:p>
-            <a:endParaRPr lang="en-US"/>
-          </a:p>
-        </p:txBody>
-      </p:sp>
-      <p:sp>
-        <p:nvSpPr>
-          <p:cNvPr id="6" name="Slide Number Placeholder 5">
-            <a:extLst>
-              <a:ext uri="{FF2B5EF4-FFF2-40B4-BE49-F238E27FC236}">
-                <a16:creationId xmlns:a16="http://schemas.microsoft.com/office/drawing/2014/main" id="{FE3A3E4E-FD29-A33B-8EC7-CBC882AF0AAD}"/>
-              </a:ext>
-            </a:extLst>
-          </p:cNvPr>
-          <p:cNvSpPr>
-            <a:spLocks noGrp="1"/>
-          </p:cNvSpPr>
-          <p:nvPr>
-            <p:ph type="sldNum" sz="quarter" idx="12"/>
-          </p:nvPr>
-        </p:nvSpPr>
-        <p:spPr/>
-        <p:txBody>
-          <a:bodyPr/>
-          <a:lstStyle/>
-          <a:p>
-            <a:fld id="{B22764A1-FE93-45F8-B2E2-E88BDCDEF08F}" type="slidenum">
-              <a:rPr lang="en-US" smtClean="0"/>
-              <a:t>‹#›</a:t>
-            </a:fld>
+            <a:pPr algn="ctr"/>
             <a:endParaRPr lang="en-US"/>
           </a:p>
         </p:txBody>
@@ -1407,7 +1209,7 @@
           <a:p>
             <a:fld id="{355FB770-CC93-4F24-BE14-030DA79629D9}" type="datetimeFigureOut">
               <a:rPr lang="en-US" smtClean="0"/>
-              <a:t>11/28/2022</a:t>
+              <a:t>12/15/2022</a:t>
             </a:fld>
             <a:endParaRPr lang="en-US"/>
           </a:p>
@@ -1819,7 +1621,7 @@
           <a:p>
             <a:fld id="{355FB770-CC93-4F24-BE14-030DA79629D9}" type="datetimeFigureOut">
               <a:rPr lang="en-US" smtClean="0"/>
-              <a:t>11/28/2022</a:t>
+              <a:t>12/15/2022</a:t>
             </a:fld>
             <a:endParaRPr lang="en-US"/>
           </a:p>
@@ -1960,7 +1762,7 @@
           <a:p>
             <a:fld id="{355FB770-CC93-4F24-BE14-030DA79629D9}" type="datetimeFigureOut">
               <a:rPr lang="en-US" smtClean="0"/>
-              <a:t>11/28/2022</a:t>
+              <a:t>12/15/2022</a:t>
             </a:fld>
             <a:endParaRPr lang="en-US"/>
           </a:p>
@@ -2073,7 +1875,7 @@
           <a:p>
             <a:fld id="{355FB770-CC93-4F24-BE14-030DA79629D9}" type="datetimeFigureOut">
               <a:rPr lang="en-US" smtClean="0"/>
-              <a:t>11/28/2022</a:t>
+              <a:t>12/15/2022</a:t>
             </a:fld>
             <a:endParaRPr lang="en-US"/>
           </a:p>
@@ -2384,7 +2186,7 @@
           <a:p>
             <a:fld id="{355FB770-CC93-4F24-BE14-030DA79629D9}" type="datetimeFigureOut">
               <a:rPr lang="en-US" smtClean="0"/>
-              <a:t>11/28/2022</a:t>
+              <a:t>12/15/2022</a:t>
             </a:fld>
             <a:endParaRPr lang="en-US"/>
           </a:p>
@@ -2672,7 +2474,7 @@
           <a:p>
             <a:fld id="{355FB770-CC93-4F24-BE14-030DA79629D9}" type="datetimeFigureOut">
               <a:rPr lang="en-US" smtClean="0"/>
-              <a:t>11/28/2022</a:t>
+              <a:t>12/15/2022</a:t>
             </a:fld>
             <a:endParaRPr lang="en-US"/>
           </a:p>
@@ -2913,7 +2715,7 @@
           <a:p>
             <a:fld id="{355FB770-CC93-4F24-BE14-030DA79629D9}" type="datetimeFigureOut">
               <a:rPr lang="en-US" smtClean="0"/>
-              <a:t>11/28/2022</a:t>
+              <a:t>12/15/2022</a:t>
             </a:fld>
             <a:endParaRPr lang="en-US"/>
           </a:p>
@@ -7040,6 +6842,42 @@
           </p:style>
         </p:cxnSp>
       </p:grpSp>
+      <p:pic>
+        <p:nvPicPr>
+          <p:cNvPr id="14" name="Picture 13">
+            <a:extLst>
+              <a:ext uri="{FF2B5EF4-FFF2-40B4-BE49-F238E27FC236}">
+                <a16:creationId xmlns:a16="http://schemas.microsoft.com/office/drawing/2014/main" id="{6B8C5D5C-3BDA-9746-9FA1-3E0EF4C77711}"/>
+              </a:ext>
+            </a:extLst>
+          </p:cNvPr>
+          <p:cNvPicPr>
+            <a:picLocks noChangeAspect="1"/>
+          </p:cNvPicPr>
+          <p:nvPr/>
+        </p:nvPicPr>
+        <p:blipFill>
+          <a:blip r:embed="rId4">
+            <a:extLst>
+              <a:ext uri="{28A0092B-C50C-407E-A947-70E740481C1C}">
+                <a14:useLocalDpi xmlns:a14="http://schemas.microsoft.com/office/drawing/2010/main" val="0"/>
+              </a:ext>
+            </a:extLst>
+          </a:blip>
+          <a:stretch>
+            <a:fillRect/>
+          </a:stretch>
+        </p:blipFill>
+        <p:spPr>
+          <a:xfrm>
+            <a:off x="-464433" y="3562116"/>
+            <a:ext cx="381053" cy="381053"/>
+          </a:xfrm>
+          <a:prstGeom prst="rect">
+            <a:avLst/>
+          </a:prstGeom>
+        </p:spPr>
+      </p:pic>
     </p:spTree>
     <p:extLst>
       <p:ext uri="{BB962C8B-B14F-4D97-AF65-F5344CB8AC3E}">
@@ -20821,6 +20659,309 @@
 </p:sld>
 </file>
 
+<file path=ppt/slides/slide6.xml><?xml version="1.0" encoding="utf-8"?>
+<p:sld xmlns:a="http://schemas.openxmlformats.org/drawingml/2006/main" xmlns:r="http://schemas.openxmlformats.org/officeDocument/2006/relationships" xmlns:p="http://schemas.openxmlformats.org/presentationml/2006/main">
+  <p:cSld>
+    <p:spTree>
+      <p:nvGrpSpPr>
+        <p:cNvPr id="1" name=""/>
+        <p:cNvGrpSpPr/>
+        <p:nvPr/>
+      </p:nvGrpSpPr>
+      <p:grpSpPr>
+        <a:xfrm>
+          <a:off x="0" y="0"/>
+          <a:ext cx="0" cy="0"/>
+          <a:chOff x="0" y="0"/>
+          <a:chExt cx="0" cy="0"/>
+        </a:xfrm>
+      </p:grpSpPr>
+      <p:pic>
+        <p:nvPicPr>
+          <p:cNvPr id="4" name="Picture 3">
+            <a:extLst>
+              <a:ext uri="{FF2B5EF4-FFF2-40B4-BE49-F238E27FC236}">
+                <a16:creationId xmlns:a16="http://schemas.microsoft.com/office/drawing/2014/main" id="{06BB2606-D1E7-1759-4F8D-5594F27DE99F}"/>
+              </a:ext>
+            </a:extLst>
+          </p:cNvPr>
+          <p:cNvPicPr>
+            <a:picLocks noChangeAspect="1"/>
+          </p:cNvPicPr>
+          <p:nvPr/>
+        </p:nvPicPr>
+        <p:blipFill>
+          <a:blip r:embed="rId2">
+            <a:extLst>
+              <a:ext uri="{28A0092B-C50C-407E-A947-70E740481C1C}">
+                <a14:useLocalDpi xmlns:a14="http://schemas.microsoft.com/office/drawing/2010/main" val="0"/>
+              </a:ext>
+            </a:extLst>
+          </a:blip>
+          <a:stretch>
+            <a:fillRect/>
+          </a:stretch>
+        </p:blipFill>
+        <p:spPr>
+          <a:xfrm>
+            <a:off x="2413238" y="2567034"/>
+            <a:ext cx="381053" cy="381053"/>
+          </a:xfrm>
+          <a:prstGeom prst="rect">
+            <a:avLst/>
+          </a:prstGeom>
+        </p:spPr>
+      </p:pic>
+      <p:grpSp>
+        <p:nvGrpSpPr>
+          <p:cNvPr id="10" name="Group 9">
+            <a:extLst>
+              <a:ext uri="{FF2B5EF4-FFF2-40B4-BE49-F238E27FC236}">
+                <a16:creationId xmlns:a16="http://schemas.microsoft.com/office/drawing/2014/main" id="{5C2F10EC-4660-5D2D-AC81-0E90EB58D4DA}"/>
+              </a:ext>
+            </a:extLst>
+          </p:cNvPr>
+          <p:cNvGrpSpPr/>
+          <p:nvPr/>
+        </p:nvGrpSpPr>
+        <p:grpSpPr>
+          <a:xfrm>
+            <a:off x="5313829" y="2508554"/>
+            <a:ext cx="321432" cy="116960"/>
+            <a:chOff x="4107033" y="2948087"/>
+            <a:chExt cx="321432" cy="116960"/>
+          </a:xfrm>
+        </p:grpSpPr>
+        <p:sp>
+          <p:nvSpPr>
+            <p:cNvPr id="7" name="Flowchart: Merge 6">
+              <a:extLst>
+                <a:ext uri="{FF2B5EF4-FFF2-40B4-BE49-F238E27FC236}">
+                  <a16:creationId xmlns:a16="http://schemas.microsoft.com/office/drawing/2014/main" id="{C1A8EF32-9AB3-8C50-40BB-DB275FF070FB}"/>
+                </a:ext>
+              </a:extLst>
+            </p:cNvPr>
+            <p:cNvSpPr/>
+            <p:nvPr/>
+          </p:nvSpPr>
+          <p:spPr>
+            <a:xfrm rot="16200000">
+              <a:off x="4318867" y="2955449"/>
+              <a:ext cx="58480" cy="160715"/>
+            </a:xfrm>
+            <a:prstGeom prst="flowChartMerge">
+              <a:avLst/>
+            </a:prstGeom>
+            <a:solidFill>
+              <a:schemeClr val="bg1"/>
+            </a:solidFill>
+            <a:ln>
+              <a:solidFill>
+                <a:schemeClr val="bg1"/>
+              </a:solidFill>
+            </a:ln>
+          </p:spPr>
+          <p:style>
+            <a:lnRef idx="2">
+              <a:schemeClr val="accent1">
+                <a:shade val="50000"/>
+              </a:schemeClr>
+            </a:lnRef>
+            <a:fillRef idx="1">
+              <a:schemeClr val="accent1"/>
+            </a:fillRef>
+            <a:effectRef idx="0">
+              <a:schemeClr val="accent1"/>
+            </a:effectRef>
+            <a:fontRef idx="minor">
+              <a:schemeClr val="lt1"/>
+            </a:fontRef>
+          </p:style>
+          <p:txBody>
+            <a:bodyPr rtlCol="0" anchor="ctr"/>
+            <a:lstStyle/>
+            <a:p>
+              <a:pPr algn="ctr"/>
+              <a:endParaRPr lang="en-US"/>
+            </a:p>
+          </p:txBody>
+        </p:sp>
+        <p:sp>
+          <p:nvSpPr>
+            <p:cNvPr id="8" name="Flowchart: Merge 7">
+              <a:extLst>
+                <a:ext uri="{FF2B5EF4-FFF2-40B4-BE49-F238E27FC236}">
+                  <a16:creationId xmlns:a16="http://schemas.microsoft.com/office/drawing/2014/main" id="{2EBFD843-C7C3-FB8A-D4A1-11ED2D4E5637}"/>
+                </a:ext>
+              </a:extLst>
+            </p:cNvPr>
+            <p:cNvSpPr/>
+            <p:nvPr/>
+          </p:nvSpPr>
+          <p:spPr>
+            <a:xfrm rot="16200000">
+              <a:off x="4318867" y="2896969"/>
+              <a:ext cx="58480" cy="160716"/>
+            </a:xfrm>
+            <a:prstGeom prst="flowChartMerge">
+              <a:avLst/>
+            </a:prstGeom>
+            <a:solidFill>
+              <a:schemeClr val="bg1"/>
+            </a:solidFill>
+            <a:ln>
+              <a:solidFill>
+                <a:schemeClr val="bg1"/>
+              </a:solidFill>
+            </a:ln>
+          </p:spPr>
+          <p:style>
+            <a:lnRef idx="2">
+              <a:schemeClr val="accent1">
+                <a:shade val="50000"/>
+              </a:schemeClr>
+            </a:lnRef>
+            <a:fillRef idx="1">
+              <a:schemeClr val="accent1"/>
+            </a:fillRef>
+            <a:effectRef idx="0">
+              <a:schemeClr val="accent1"/>
+            </a:effectRef>
+            <a:fontRef idx="minor">
+              <a:schemeClr val="lt1"/>
+            </a:fontRef>
+          </p:style>
+          <p:txBody>
+            <a:bodyPr rtlCol="0" anchor="ctr"/>
+            <a:lstStyle/>
+            <a:p>
+              <a:pPr algn="ctr"/>
+              <a:endParaRPr lang="en-US"/>
+            </a:p>
+          </p:txBody>
+        </p:sp>
+        <p:sp>
+          <p:nvSpPr>
+            <p:cNvPr id="9" name="Rectangle 8">
+              <a:extLst>
+                <a:ext uri="{FF2B5EF4-FFF2-40B4-BE49-F238E27FC236}">
+                  <a16:creationId xmlns:a16="http://schemas.microsoft.com/office/drawing/2014/main" id="{64FD0989-5F0A-BD5E-D361-D9F3977A8564}"/>
+                </a:ext>
+              </a:extLst>
+            </p:cNvPr>
+            <p:cNvSpPr/>
+            <p:nvPr/>
+          </p:nvSpPr>
+          <p:spPr>
+            <a:xfrm>
+              <a:off x="4107033" y="2948087"/>
+              <a:ext cx="160716" cy="116960"/>
+            </a:xfrm>
+            <a:prstGeom prst="rect">
+              <a:avLst/>
+            </a:prstGeom>
+            <a:solidFill>
+              <a:schemeClr val="bg1"/>
+            </a:solidFill>
+            <a:ln>
+              <a:solidFill>
+                <a:schemeClr val="bg1"/>
+              </a:solidFill>
+            </a:ln>
+          </p:spPr>
+          <p:style>
+            <a:lnRef idx="2">
+              <a:schemeClr val="accent1">
+                <a:shade val="50000"/>
+              </a:schemeClr>
+            </a:lnRef>
+            <a:fillRef idx="1">
+              <a:schemeClr val="accent1"/>
+            </a:fillRef>
+            <a:effectRef idx="0">
+              <a:schemeClr val="accent1"/>
+            </a:effectRef>
+            <a:fontRef idx="minor">
+              <a:schemeClr val="lt1"/>
+            </a:fontRef>
+          </p:style>
+          <p:txBody>
+            <a:bodyPr rtlCol="0" anchor="ctr"/>
+            <a:lstStyle/>
+            <a:p>
+              <a:pPr algn="ctr"/>
+              <a:endParaRPr lang="en-US"/>
+            </a:p>
+          </p:txBody>
+        </p:sp>
+      </p:grpSp>
+      <p:sp>
+        <p:nvSpPr>
+          <p:cNvPr id="14" name="Rectangle 13">
+            <a:extLst>
+              <a:ext uri="{FF2B5EF4-FFF2-40B4-BE49-F238E27FC236}">
+                <a16:creationId xmlns:a16="http://schemas.microsoft.com/office/drawing/2014/main" id="{B99A484C-00E6-3E27-D02B-CF244A3E9E5C}"/>
+              </a:ext>
+            </a:extLst>
+          </p:cNvPr>
+          <p:cNvSpPr/>
+          <p:nvPr/>
+        </p:nvSpPr>
+        <p:spPr>
+          <a:xfrm>
+            <a:off x="2512528" y="2708489"/>
+            <a:ext cx="281763" cy="98141"/>
+          </a:xfrm>
+          <a:prstGeom prst="rect">
+            <a:avLst/>
+          </a:prstGeom>
+          <a:solidFill>
+            <a:schemeClr val="bg1"/>
+          </a:solidFill>
+          <a:ln>
+            <a:solidFill>
+              <a:schemeClr val="bg1"/>
+            </a:solidFill>
+          </a:ln>
+        </p:spPr>
+        <p:style>
+          <a:lnRef idx="2">
+            <a:schemeClr val="accent1">
+              <a:shade val="50000"/>
+            </a:schemeClr>
+          </a:lnRef>
+          <a:fillRef idx="1">
+            <a:schemeClr val="accent1"/>
+          </a:fillRef>
+          <a:effectRef idx="0">
+            <a:schemeClr val="accent1"/>
+          </a:effectRef>
+          <a:fontRef idx="minor">
+            <a:schemeClr val="lt1"/>
+          </a:fontRef>
+        </p:style>
+        <p:txBody>
+          <a:bodyPr rtlCol="0" anchor="ctr"/>
+          <a:lstStyle/>
+          <a:p>
+            <a:pPr algn="ctr"/>
+            <a:endParaRPr lang="en-US"/>
+          </a:p>
+        </p:txBody>
+      </p:sp>
+    </p:spTree>
+    <p:extLst>
+      <p:ext uri="{BB962C8B-B14F-4D97-AF65-F5344CB8AC3E}">
+        <p14:creationId xmlns:p14="http://schemas.microsoft.com/office/powerpoint/2010/main" val="2127159950"/>
+      </p:ext>
+    </p:extLst>
+  </p:cSld>
+  <p:clrMapOvr>
+    <a:masterClrMapping/>
+  </p:clrMapOvr>
+</p:sld>
+</file>
+
 <file path=ppt/theme/theme1.xml><?xml version="1.0" encoding="utf-8"?>
 <a:theme xmlns:a="http://schemas.openxmlformats.org/drawingml/2006/main" name="Office Theme">
   <a:themeElements>

</xml_diff>

<commit_message>
Added playerShield class and associated behaviour. Added a bulletManager class to separate plaery and enemy bullets. Added ShieldHealth class derived from Health class.
</commit_message>
<xml_diff>
--- a/Beware/Content/designs.pptx
+++ b/Beware/Content/designs.pptx
@@ -264,7 +264,7 @@
           <a:p>
             <a:fld id="{355FB770-CC93-4F24-BE14-030DA79629D9}" type="datetimeFigureOut">
               <a:rPr lang="en-US" smtClean="0"/>
-              <a:t>12/15/2022</a:t>
+              <a:t>12/16/2022</a:t>
             </a:fld>
             <a:endParaRPr lang="en-US"/>
           </a:p>
@@ -462,7 +462,7 @@
           <a:p>
             <a:fld id="{355FB770-CC93-4F24-BE14-030DA79629D9}" type="datetimeFigureOut">
               <a:rPr lang="en-US" smtClean="0"/>
-              <a:t>12/15/2022</a:t>
+              <a:t>12/16/2022</a:t>
             </a:fld>
             <a:endParaRPr lang="en-US"/>
           </a:p>
@@ -670,7 +670,7 @@
           <a:p>
             <a:fld id="{355FB770-CC93-4F24-BE14-030DA79629D9}" type="datetimeFigureOut">
               <a:rPr lang="en-US" smtClean="0"/>
-              <a:t>12/15/2022</a:t>
+              <a:t>12/16/2022</a:t>
             </a:fld>
             <a:endParaRPr lang="en-US"/>
           </a:p>
@@ -868,7 +868,7 @@
           <a:p>
             <a:fld id="{355FB770-CC93-4F24-BE14-030DA79629D9}" type="datetimeFigureOut">
               <a:rPr lang="en-US" smtClean="0"/>
-              <a:t>12/15/2022</a:t>
+              <a:t>12/16/2022</a:t>
             </a:fld>
             <a:endParaRPr lang="en-US"/>
           </a:p>
@@ -1209,7 +1209,7 @@
           <a:p>
             <a:fld id="{355FB770-CC93-4F24-BE14-030DA79629D9}" type="datetimeFigureOut">
               <a:rPr lang="en-US" smtClean="0"/>
-              <a:t>12/15/2022</a:t>
+              <a:t>12/16/2022</a:t>
             </a:fld>
             <a:endParaRPr lang="en-US"/>
           </a:p>
@@ -1621,7 +1621,7 @@
           <a:p>
             <a:fld id="{355FB770-CC93-4F24-BE14-030DA79629D9}" type="datetimeFigureOut">
               <a:rPr lang="en-US" smtClean="0"/>
-              <a:t>12/15/2022</a:t>
+              <a:t>12/16/2022</a:t>
             </a:fld>
             <a:endParaRPr lang="en-US"/>
           </a:p>
@@ -1762,7 +1762,7 @@
           <a:p>
             <a:fld id="{355FB770-CC93-4F24-BE14-030DA79629D9}" type="datetimeFigureOut">
               <a:rPr lang="en-US" smtClean="0"/>
-              <a:t>12/15/2022</a:t>
+              <a:t>12/16/2022</a:t>
             </a:fld>
             <a:endParaRPr lang="en-US"/>
           </a:p>
@@ -1875,7 +1875,7 @@
           <a:p>
             <a:fld id="{355FB770-CC93-4F24-BE14-030DA79629D9}" type="datetimeFigureOut">
               <a:rPr lang="en-US" smtClean="0"/>
-              <a:t>12/15/2022</a:t>
+              <a:t>12/16/2022</a:t>
             </a:fld>
             <a:endParaRPr lang="en-US"/>
           </a:p>
@@ -2186,7 +2186,7 @@
           <a:p>
             <a:fld id="{355FB770-CC93-4F24-BE14-030DA79629D9}" type="datetimeFigureOut">
               <a:rPr lang="en-US" smtClean="0"/>
-              <a:t>12/15/2022</a:t>
+              <a:t>12/16/2022</a:t>
             </a:fld>
             <a:endParaRPr lang="en-US"/>
           </a:p>
@@ -2474,7 +2474,7 @@
           <a:p>
             <a:fld id="{355FB770-CC93-4F24-BE14-030DA79629D9}" type="datetimeFigureOut">
               <a:rPr lang="en-US" smtClean="0"/>
-              <a:t>12/15/2022</a:t>
+              <a:t>12/16/2022</a:t>
             </a:fld>
             <a:endParaRPr lang="en-US"/>
           </a:p>
@@ -2715,7 +2715,7 @@
           <a:p>
             <a:fld id="{355FB770-CC93-4F24-BE14-030DA79629D9}" type="datetimeFigureOut">
               <a:rPr lang="en-US" smtClean="0"/>
-              <a:t>12/15/2022</a:t>
+              <a:t>12/16/2022</a:t>
             </a:fld>
             <a:endParaRPr lang="en-US"/>
           </a:p>
@@ -6878,6 +6878,58 @@
           </a:prstGeom>
         </p:spPr>
       </p:pic>
+      <p:sp>
+        <p:nvSpPr>
+          <p:cNvPr id="10" name="Oval 9">
+            <a:extLst>
+              <a:ext uri="{FF2B5EF4-FFF2-40B4-BE49-F238E27FC236}">
+                <a16:creationId xmlns:a16="http://schemas.microsoft.com/office/drawing/2014/main" id="{9E1C22B5-2835-0973-2F93-4BDB7D9A707E}"/>
+              </a:ext>
+            </a:extLst>
+          </p:cNvPr>
+          <p:cNvSpPr/>
+          <p:nvPr/>
+        </p:nvSpPr>
+        <p:spPr>
+          <a:xfrm>
+            <a:off x="5428893" y="-371286"/>
+            <a:ext cx="914400" cy="914400"/>
+          </a:xfrm>
+          <a:prstGeom prst="ellipse">
+            <a:avLst/>
+          </a:prstGeom>
+          <a:noFill/>
+          <a:ln w="57150">
+            <a:solidFill>
+              <a:schemeClr val="bg1"/>
+            </a:solidFill>
+          </a:ln>
+        </p:spPr>
+        <p:style>
+          <a:lnRef idx="2">
+            <a:schemeClr val="accent1">
+              <a:shade val="50000"/>
+            </a:schemeClr>
+          </a:lnRef>
+          <a:fillRef idx="1">
+            <a:schemeClr val="accent1"/>
+          </a:fillRef>
+          <a:effectRef idx="0">
+            <a:schemeClr val="accent1"/>
+          </a:effectRef>
+          <a:fontRef idx="minor">
+            <a:schemeClr val="lt1"/>
+          </a:fontRef>
+        </p:style>
+        <p:txBody>
+          <a:bodyPr rtlCol="0" anchor="ctr"/>
+          <a:lstStyle/>
+          <a:p>
+            <a:pPr algn="ctr"/>
+            <a:endParaRPr lang="en-US"/>
+          </a:p>
+        </p:txBody>
+      </p:sp>
     </p:spTree>
     <p:extLst>
       <p:ext uri="{BB962C8B-B14F-4D97-AF65-F5344CB8AC3E}">

</xml_diff>

<commit_message>
Removed all key inputs for gameplay. Refactored PlayerSettings. Refactored behaviours.
</commit_message>
<xml_diff>
--- a/Beware/Content/designs.pptx
+++ b/Beware/Content/designs.pptx
@@ -8,9 +8,11 @@
     <p:sldId id="256" r:id="rId2"/>
     <p:sldId id="257" r:id="rId3"/>
     <p:sldId id="258" r:id="rId4"/>
-    <p:sldId id="259" r:id="rId5"/>
-    <p:sldId id="260" r:id="rId6"/>
-    <p:sldId id="261" r:id="rId7"/>
+    <p:sldId id="262" r:id="rId5"/>
+    <p:sldId id="263" r:id="rId6"/>
+    <p:sldId id="259" r:id="rId7"/>
+    <p:sldId id="260" r:id="rId8"/>
+    <p:sldId id="261" r:id="rId9"/>
   </p:sldIdLst>
   <p:sldSz cx="12192000" cy="6858000"/>
   <p:notesSz cx="6858000" cy="9144000"/>
@@ -264,7 +266,7 @@
           <a:p>
             <a:fld id="{355FB770-CC93-4F24-BE14-030DA79629D9}" type="datetimeFigureOut">
               <a:rPr lang="en-US" smtClean="0"/>
-              <a:t>12/16/2022</a:t>
+              <a:t>12/17/2022</a:t>
             </a:fld>
             <a:endParaRPr lang="en-US"/>
           </a:p>
@@ -462,7 +464,7 @@
           <a:p>
             <a:fld id="{355FB770-CC93-4F24-BE14-030DA79629D9}" type="datetimeFigureOut">
               <a:rPr lang="en-US" smtClean="0"/>
-              <a:t>12/16/2022</a:t>
+              <a:t>12/17/2022</a:t>
             </a:fld>
             <a:endParaRPr lang="en-US"/>
           </a:p>
@@ -670,7 +672,7 @@
           <a:p>
             <a:fld id="{355FB770-CC93-4F24-BE14-030DA79629D9}" type="datetimeFigureOut">
               <a:rPr lang="en-US" smtClean="0"/>
-              <a:t>12/16/2022</a:t>
+              <a:t>12/17/2022</a:t>
             </a:fld>
             <a:endParaRPr lang="en-US"/>
           </a:p>
@@ -868,7 +870,7 @@
           <a:p>
             <a:fld id="{355FB770-CC93-4F24-BE14-030DA79629D9}" type="datetimeFigureOut">
               <a:rPr lang="en-US" smtClean="0"/>
-              <a:t>12/16/2022</a:t>
+              <a:t>12/17/2022</a:t>
             </a:fld>
             <a:endParaRPr lang="en-US"/>
           </a:p>
@@ -1018,7 +1020,7 @@
 </file>
 
 <file path=ppt/slideLayouts/slideLayout4.xml><?xml version="1.0" encoding="utf-8"?>
-<p:sldLayout xmlns:a="http://schemas.openxmlformats.org/drawingml/2006/main" xmlns:r="http://schemas.openxmlformats.org/officeDocument/2006/relationships" xmlns:p="http://schemas.openxmlformats.org/presentationml/2006/main" type="twoObj" preserve="1">
+<p:sldLayout xmlns:a="http://schemas.openxmlformats.org/drawingml/2006/main" xmlns:r="http://schemas.openxmlformats.org/officeDocument/2006/relationships" xmlns:p="http://schemas.openxmlformats.org/presentationml/2006/main" preserve="1" userDrawn="1">
   <p:cSld name="Two Content">
     <p:spTree>
       <p:nvGrpSpPr>
@@ -1034,241 +1036,61 @@
           <a:chExt cx="0" cy="0"/>
         </a:xfrm>
       </p:grpSpPr>
-      <p:sp>
-        <p:nvSpPr>
-          <p:cNvPr id="2" name="Title 1">
+      <p:pic>
+        <p:nvPicPr>
+          <p:cNvPr id="8" name="Picture 8" descr="See the source image">
             <a:extLst>
               <a:ext uri="{FF2B5EF4-FFF2-40B4-BE49-F238E27FC236}">
-                <a16:creationId xmlns:a16="http://schemas.microsoft.com/office/drawing/2014/main" id="{2424F651-8A03-936E-6236-2D4FC9CB9609}"/>
+                <a16:creationId xmlns:a16="http://schemas.microsoft.com/office/drawing/2014/main" id="{45C1EF4A-FECC-58AD-7F60-817BCF4FAD51}"/>
               </a:ext>
             </a:extLst>
           </p:cNvPr>
-          <p:cNvSpPr>
-            <a:spLocks noGrp="1"/>
-          </p:cNvSpPr>
-          <p:nvPr>
-            <p:ph type="title"/>
-          </p:nvPr>
-        </p:nvSpPr>
-        <p:spPr/>
-        <p:txBody>
-          <a:bodyPr/>
-          <a:lstStyle/>
-          <a:p>
-            <a:r>
-              <a:rPr lang="en-US"/>
-              <a:t>Click to edit Master title style</a:t>
-            </a:r>
-          </a:p>
-        </p:txBody>
-      </p:sp>
-      <p:sp>
-        <p:nvSpPr>
-          <p:cNvPr id="3" name="Content Placeholder 2">
-            <a:extLst>
-              <a:ext uri="{FF2B5EF4-FFF2-40B4-BE49-F238E27FC236}">
-                <a16:creationId xmlns:a16="http://schemas.microsoft.com/office/drawing/2014/main" id="{C01135FB-E7B9-C5CE-607F-B31288C82F92}"/>
-              </a:ext>
-            </a:extLst>
-          </p:cNvPr>
-          <p:cNvSpPr>
-            <a:spLocks noGrp="1"/>
-          </p:cNvSpPr>
-          <p:nvPr>
-            <p:ph sz="half" idx="1"/>
-          </p:nvPr>
-        </p:nvSpPr>
-        <p:spPr>
+          <p:cNvPicPr>
+            <a:picLocks noChangeAspect="1" noChangeArrowheads="1"/>
+          </p:cNvPicPr>
+          <p:nvPr userDrawn="1"/>
+        </p:nvPicPr>
+        <p:blipFill rotWithShape="1">
+          <a:blip r:embed="rId2">
+            <a:clrChange>
+              <a:clrFrom>
+                <a:srgbClr val="F0F0F0"/>
+              </a:clrFrom>
+              <a:clrTo>
+                <a:srgbClr val="F0F0F0">
+                  <a:alpha val="0"/>
+                </a:srgbClr>
+              </a:clrTo>
+            </a:clrChange>
+            <a:extLst>
+              <a:ext uri="{28A0092B-C50C-407E-A947-70E740481C1C}">
+                <a14:useLocalDpi xmlns:a14="http://schemas.microsoft.com/office/drawing/2010/main" val="0"/>
+              </a:ext>
+            </a:extLst>
+          </a:blip>
+          <a:srcRect t="10808" b="42345"/>
+          <a:stretch/>
+        </p:blipFill>
+        <p:spPr bwMode="auto">
           <a:xfrm>
-            <a:off x="838200" y="1825625"/>
-            <a:ext cx="5181600" cy="4351338"/>
+            <a:off x="1214375" y="652800"/>
+            <a:ext cx="10423102" cy="5736586"/>
           </a:xfrm>
+          <a:prstGeom prst="rect">
+            <a:avLst/>
+          </a:prstGeom>
+          <a:noFill/>
+          <a:extLst>
+            <a:ext uri="{909E8E84-426E-40DD-AFC4-6F175D3DCCD1}">
+              <a14:hiddenFill xmlns:a14="http://schemas.microsoft.com/office/drawing/2010/main">
+                <a:solidFill>
+                  <a:srgbClr val="FFFFFF"/>
+                </a:solidFill>
+              </a14:hiddenFill>
+            </a:ext>
+          </a:extLst>
         </p:spPr>
-        <p:txBody>
-          <a:bodyPr/>
-          <a:lstStyle/>
-          <a:p>
-            <a:pPr lvl="0"/>
-            <a:r>
-              <a:rPr lang="en-US"/>
-              <a:t>Click to edit Master text styles</a:t>
-            </a:r>
-          </a:p>
-          <a:p>
-            <a:pPr lvl="1"/>
-            <a:r>
-              <a:rPr lang="en-US"/>
-              <a:t>Second level</a:t>
-            </a:r>
-          </a:p>
-          <a:p>
-            <a:pPr lvl="2"/>
-            <a:r>
-              <a:rPr lang="en-US"/>
-              <a:t>Third level</a:t>
-            </a:r>
-          </a:p>
-          <a:p>
-            <a:pPr lvl="3"/>
-            <a:r>
-              <a:rPr lang="en-US"/>
-              <a:t>Fourth level</a:t>
-            </a:r>
-          </a:p>
-          <a:p>
-            <a:pPr lvl="4"/>
-            <a:r>
-              <a:rPr lang="en-US"/>
-              <a:t>Fifth level</a:t>
-            </a:r>
-          </a:p>
-        </p:txBody>
-      </p:sp>
-      <p:sp>
-        <p:nvSpPr>
-          <p:cNvPr id="4" name="Content Placeholder 3">
-            <a:extLst>
-              <a:ext uri="{FF2B5EF4-FFF2-40B4-BE49-F238E27FC236}">
-                <a16:creationId xmlns:a16="http://schemas.microsoft.com/office/drawing/2014/main" id="{DA6197EB-49A9-8E6B-5FB1-0E609106C356}"/>
-              </a:ext>
-            </a:extLst>
-          </p:cNvPr>
-          <p:cNvSpPr>
-            <a:spLocks noGrp="1"/>
-          </p:cNvSpPr>
-          <p:nvPr>
-            <p:ph sz="half" idx="2"/>
-          </p:nvPr>
-        </p:nvSpPr>
-        <p:spPr>
-          <a:xfrm>
-            <a:off x="6172200" y="1825625"/>
-            <a:ext cx="5181600" cy="4351338"/>
-          </a:xfrm>
-        </p:spPr>
-        <p:txBody>
-          <a:bodyPr/>
-          <a:lstStyle/>
-          <a:p>
-            <a:pPr lvl="0"/>
-            <a:r>
-              <a:rPr lang="en-US"/>
-              <a:t>Click to edit Master text styles</a:t>
-            </a:r>
-          </a:p>
-          <a:p>
-            <a:pPr lvl="1"/>
-            <a:r>
-              <a:rPr lang="en-US"/>
-              <a:t>Second level</a:t>
-            </a:r>
-          </a:p>
-          <a:p>
-            <a:pPr lvl="2"/>
-            <a:r>
-              <a:rPr lang="en-US"/>
-              <a:t>Third level</a:t>
-            </a:r>
-          </a:p>
-          <a:p>
-            <a:pPr lvl="3"/>
-            <a:r>
-              <a:rPr lang="en-US"/>
-              <a:t>Fourth level</a:t>
-            </a:r>
-          </a:p>
-          <a:p>
-            <a:pPr lvl="4"/>
-            <a:r>
-              <a:rPr lang="en-US"/>
-              <a:t>Fifth level</a:t>
-            </a:r>
-          </a:p>
-        </p:txBody>
-      </p:sp>
-      <p:sp>
-        <p:nvSpPr>
-          <p:cNvPr id="5" name="Date Placeholder 4">
-            <a:extLst>
-              <a:ext uri="{FF2B5EF4-FFF2-40B4-BE49-F238E27FC236}">
-                <a16:creationId xmlns:a16="http://schemas.microsoft.com/office/drawing/2014/main" id="{F49BD7EF-7526-2709-9951-2A576AA39B9F}"/>
-              </a:ext>
-            </a:extLst>
-          </p:cNvPr>
-          <p:cNvSpPr>
-            <a:spLocks noGrp="1"/>
-          </p:cNvSpPr>
-          <p:nvPr>
-            <p:ph type="dt" sz="half" idx="10"/>
-          </p:nvPr>
-        </p:nvSpPr>
-        <p:spPr/>
-        <p:txBody>
-          <a:bodyPr/>
-          <a:lstStyle/>
-          <a:p>
-            <a:fld id="{355FB770-CC93-4F24-BE14-030DA79629D9}" type="datetimeFigureOut">
-              <a:rPr lang="en-US" smtClean="0"/>
-              <a:t>12/16/2022</a:t>
-            </a:fld>
-            <a:endParaRPr lang="en-US"/>
-          </a:p>
-        </p:txBody>
-      </p:sp>
-      <p:sp>
-        <p:nvSpPr>
-          <p:cNvPr id="6" name="Footer Placeholder 5">
-            <a:extLst>
-              <a:ext uri="{FF2B5EF4-FFF2-40B4-BE49-F238E27FC236}">
-                <a16:creationId xmlns:a16="http://schemas.microsoft.com/office/drawing/2014/main" id="{9848DB20-ADBA-BDF9-36B9-843988CBBC63}"/>
-              </a:ext>
-            </a:extLst>
-          </p:cNvPr>
-          <p:cNvSpPr>
-            <a:spLocks noGrp="1"/>
-          </p:cNvSpPr>
-          <p:nvPr>
-            <p:ph type="ftr" sz="quarter" idx="11"/>
-          </p:nvPr>
-        </p:nvSpPr>
-        <p:spPr/>
-        <p:txBody>
-          <a:bodyPr/>
-          <a:lstStyle/>
-          <a:p>
-            <a:endParaRPr lang="en-US"/>
-          </a:p>
-        </p:txBody>
-      </p:sp>
-      <p:sp>
-        <p:nvSpPr>
-          <p:cNvPr id="7" name="Slide Number Placeholder 6">
-            <a:extLst>
-              <a:ext uri="{FF2B5EF4-FFF2-40B4-BE49-F238E27FC236}">
-                <a16:creationId xmlns:a16="http://schemas.microsoft.com/office/drawing/2014/main" id="{CD7A6732-EE14-A0B2-1160-77C4A24E65D4}"/>
-              </a:ext>
-            </a:extLst>
-          </p:cNvPr>
-          <p:cNvSpPr>
-            <a:spLocks noGrp="1"/>
-          </p:cNvSpPr>
-          <p:nvPr>
-            <p:ph type="sldNum" sz="quarter" idx="12"/>
-          </p:nvPr>
-        </p:nvSpPr>
-        <p:spPr/>
-        <p:txBody>
-          <a:bodyPr/>
-          <a:lstStyle/>
-          <a:p>
-            <a:fld id="{B22764A1-FE93-45F8-B2E2-E88BDCDEF08F}" type="slidenum">
-              <a:rPr lang="en-US" smtClean="0"/>
-              <a:t>‹#›</a:t>
-            </a:fld>
-            <a:endParaRPr lang="en-US"/>
-          </a:p>
-        </p:txBody>
-      </p:sp>
+      </p:pic>
     </p:spTree>
     <p:extLst>
       <p:ext uri="{BB962C8B-B14F-4D97-AF65-F5344CB8AC3E}">
@@ -1621,7 +1443,7 @@
           <a:p>
             <a:fld id="{355FB770-CC93-4F24-BE14-030DA79629D9}" type="datetimeFigureOut">
               <a:rPr lang="en-US" smtClean="0"/>
-              <a:t>12/16/2022</a:t>
+              <a:t>12/17/2022</a:t>
             </a:fld>
             <a:endParaRPr lang="en-US"/>
           </a:p>
@@ -1762,7 +1584,7 @@
           <a:p>
             <a:fld id="{355FB770-CC93-4F24-BE14-030DA79629D9}" type="datetimeFigureOut">
               <a:rPr lang="en-US" smtClean="0"/>
-              <a:t>12/16/2022</a:t>
+              <a:t>12/17/2022</a:t>
             </a:fld>
             <a:endParaRPr lang="en-US"/>
           </a:p>
@@ -1875,7 +1697,7 @@
           <a:p>
             <a:fld id="{355FB770-CC93-4F24-BE14-030DA79629D9}" type="datetimeFigureOut">
               <a:rPr lang="en-US" smtClean="0"/>
-              <a:t>12/16/2022</a:t>
+              <a:t>12/17/2022</a:t>
             </a:fld>
             <a:endParaRPr lang="en-US"/>
           </a:p>
@@ -2186,7 +2008,7 @@
           <a:p>
             <a:fld id="{355FB770-CC93-4F24-BE14-030DA79629D9}" type="datetimeFigureOut">
               <a:rPr lang="en-US" smtClean="0"/>
-              <a:t>12/16/2022</a:t>
+              <a:t>12/17/2022</a:t>
             </a:fld>
             <a:endParaRPr lang="en-US"/>
           </a:p>
@@ -2474,7 +2296,7 @@
           <a:p>
             <a:fld id="{355FB770-CC93-4F24-BE14-030DA79629D9}" type="datetimeFigureOut">
               <a:rPr lang="en-US" smtClean="0"/>
-              <a:t>12/16/2022</a:t>
+              <a:t>12/17/2022</a:t>
             </a:fld>
             <a:endParaRPr lang="en-US"/>
           </a:p>
@@ -2715,7 +2537,7 @@
           <a:p>
             <a:fld id="{355FB770-CC93-4F24-BE14-030DA79629D9}" type="datetimeFigureOut">
               <a:rPr lang="en-US" smtClean="0"/>
-              <a:t>12/16/2022</a:t>
+              <a:t>12/17/2022</a:t>
             </a:fld>
             <a:endParaRPr lang="en-US"/>
           </a:p>
@@ -16175,12 +15997,67 @@
           <a:chExt cx="0" cy="0"/>
         </a:xfrm>
       </p:grpSpPr>
+      <p:pic>
+        <p:nvPicPr>
+          <p:cNvPr id="1032" name="Picture 8" descr="See the source image">
+            <a:extLst>
+              <a:ext uri="{FF2B5EF4-FFF2-40B4-BE49-F238E27FC236}">
+                <a16:creationId xmlns:a16="http://schemas.microsoft.com/office/drawing/2014/main" id="{8AC779A1-CE09-0213-1399-4474B07B41D6}"/>
+              </a:ext>
+            </a:extLst>
+          </p:cNvPr>
+          <p:cNvPicPr>
+            <a:picLocks noChangeAspect="1" noChangeArrowheads="1"/>
+          </p:cNvPicPr>
+          <p:nvPr/>
+        </p:nvPicPr>
+        <p:blipFill rotWithShape="1">
+          <a:blip r:embed="rId2">
+            <a:clrChange>
+              <a:clrFrom>
+                <a:srgbClr val="F0F0F0"/>
+              </a:clrFrom>
+              <a:clrTo>
+                <a:srgbClr val="F0F0F0">
+                  <a:alpha val="0"/>
+                </a:srgbClr>
+              </a:clrTo>
+            </a:clrChange>
+            <a:extLst>
+              <a:ext uri="{28A0092B-C50C-407E-A947-70E740481C1C}">
+                <a14:useLocalDpi xmlns:a14="http://schemas.microsoft.com/office/drawing/2010/main" val="0"/>
+              </a:ext>
+            </a:extLst>
+          </a:blip>
+          <a:srcRect/>
+          <a:stretch/>
+        </p:blipFill>
+        <p:spPr bwMode="auto">
+          <a:xfrm>
+            <a:off x="1670238" y="183020"/>
+            <a:ext cx="9326027" cy="5736586"/>
+          </a:xfrm>
+          <a:prstGeom prst="rect">
+            <a:avLst/>
+          </a:prstGeom>
+          <a:noFill/>
+          <a:extLst>
+            <a:ext uri="{909E8E84-426E-40DD-AFC4-6F175D3DCCD1}">
+              <a14:hiddenFill xmlns:a14="http://schemas.microsoft.com/office/drawing/2010/main">
+                <a:solidFill>
+                  <a:srgbClr val="FFFFFF"/>
+                </a:solidFill>
+              </a14:hiddenFill>
+            </a:ext>
+          </a:extLst>
+        </p:spPr>
+      </p:pic>
       <p:grpSp>
         <p:nvGrpSpPr>
-          <p:cNvPr id="7" name="Group 6">
+          <p:cNvPr id="53" name="Group 52">
             <a:extLst>
               <a:ext uri="{FF2B5EF4-FFF2-40B4-BE49-F238E27FC236}">
-                <a16:creationId xmlns:a16="http://schemas.microsoft.com/office/drawing/2014/main" id="{9A7DACCE-B07D-9CBD-3D38-130DDE97F3D6}"/>
+                <a16:creationId xmlns:a16="http://schemas.microsoft.com/office/drawing/2014/main" id="{F90B930C-518E-C99F-5685-D70DFA3F271F}"/>
               </a:ext>
             </a:extLst>
           </p:cNvPr>
@@ -16189,10 +16066,10 @@
         </p:nvGrpSpPr>
         <p:grpSpPr>
           <a:xfrm>
-            <a:off x="8600095" y="3429000"/>
-            <a:ext cx="467590" cy="646331"/>
-            <a:chOff x="7287278" y="1520684"/>
-            <a:chExt cx="467590" cy="646331"/>
+            <a:off x="11115894" y="3906339"/>
+            <a:ext cx="610035" cy="610035"/>
+            <a:chOff x="8557988" y="3332840"/>
+            <a:chExt cx="610035" cy="610035"/>
           </a:xfrm>
         </p:grpSpPr>
         <p:sp>
@@ -16209,8 +16086,8 @@
           </p:nvSpPr>
           <p:spPr>
             <a:xfrm>
-              <a:off x="7287278" y="1610054"/>
-              <a:ext cx="467590" cy="467590"/>
+              <a:off x="8557988" y="3332840"/>
+              <a:ext cx="610035" cy="610035"/>
             </a:xfrm>
             <a:prstGeom prst="ellipse">
               <a:avLst/>
@@ -16249,7 +16126,7 @@
             <a:lstStyle/>
             <a:p>
               <a:pPr algn="ctr"/>
-              <a:endParaRPr lang="en-US"/>
+              <a:endParaRPr lang="en-US" sz="3200"/>
             </a:p>
           </p:txBody>
         </p:sp>
@@ -16267,8 +16144,8 @@
           </p:nvSpPr>
           <p:spPr>
             <a:xfrm>
-              <a:off x="7288477" y="1520684"/>
-              <a:ext cx="465192" cy="646331"/>
+              <a:off x="8646439" y="3345470"/>
+              <a:ext cx="433132" cy="584775"/>
             </a:xfrm>
             <a:prstGeom prst="rect">
               <a:avLst/>
@@ -16283,7 +16160,7 @@
             <a:p>
               <a:pPr algn="ctr"/>
               <a:r>
-                <a:rPr lang="en-US" sz="3600" b="1" dirty="0">
+                <a:rPr lang="en-US" sz="3200" b="1" dirty="0">
                   <a:solidFill>
                     <a:schemeClr val="accent6">
                       <a:lumMod val="60000"/>
@@ -16299,10 +16176,10 @@
       </p:grpSp>
       <p:grpSp>
         <p:nvGrpSpPr>
-          <p:cNvPr id="8" name="Group 7">
+          <p:cNvPr id="46" name="Group 45">
             <a:extLst>
               <a:ext uri="{FF2B5EF4-FFF2-40B4-BE49-F238E27FC236}">
-                <a16:creationId xmlns:a16="http://schemas.microsoft.com/office/drawing/2014/main" id="{638EE5EC-8E31-7009-077D-7E9A2B5772FB}"/>
+                <a16:creationId xmlns:a16="http://schemas.microsoft.com/office/drawing/2014/main" id="{1050E8E7-8E98-6EF6-B1E0-BBB11543AD06}"/>
               </a:ext>
             </a:extLst>
           </p:cNvPr>
@@ -16311,10 +16188,10 @@
         </p:nvGrpSpPr>
         <p:grpSpPr>
           <a:xfrm>
-            <a:off x="9275010" y="2872039"/>
-            <a:ext cx="467590" cy="646331"/>
-            <a:chOff x="7287278" y="1520684"/>
-            <a:chExt cx="467590" cy="646331"/>
+            <a:off x="10810877" y="2923688"/>
+            <a:ext cx="610035" cy="610035"/>
+            <a:chOff x="9232903" y="2775879"/>
+            <a:chExt cx="610035" cy="610035"/>
           </a:xfrm>
         </p:grpSpPr>
         <p:sp>
@@ -16331,8 +16208,8 @@
           </p:nvSpPr>
           <p:spPr>
             <a:xfrm>
-              <a:off x="7287278" y="1610054"/>
-              <a:ext cx="467590" cy="467590"/>
+              <a:off x="9232903" y="2775879"/>
+              <a:ext cx="610035" cy="610035"/>
             </a:xfrm>
             <a:prstGeom prst="ellipse">
               <a:avLst/>
@@ -16371,7 +16248,7 @@
             <a:lstStyle/>
             <a:p>
               <a:pPr algn="ctr"/>
-              <a:endParaRPr lang="en-US"/>
+              <a:endParaRPr lang="en-US" sz="3200"/>
             </a:p>
           </p:txBody>
         </p:sp>
@@ -16389,8 +16266,8 @@
           </p:nvSpPr>
           <p:spPr>
             <a:xfrm>
-              <a:off x="7299698" y="1520684"/>
-              <a:ext cx="442750" cy="646331"/>
+              <a:off x="9330171" y="2788509"/>
+              <a:ext cx="415498" cy="584775"/>
             </a:xfrm>
             <a:prstGeom prst="rect">
               <a:avLst/>
@@ -16405,7 +16282,7 @@
             <a:p>
               <a:pPr algn="ctr"/>
               <a:r>
-                <a:rPr lang="en-US" sz="3600" b="1" dirty="0">
+                <a:rPr lang="en-US" sz="3200" b="1" dirty="0">
                   <a:solidFill>
                     <a:srgbClr val="FF0000"/>
                   </a:solidFill>
@@ -16418,10 +16295,10 @@
       </p:grpSp>
       <p:grpSp>
         <p:nvGrpSpPr>
-          <p:cNvPr id="11" name="Group 10">
+          <p:cNvPr id="54" name="Group 53">
             <a:extLst>
               <a:ext uri="{FF2B5EF4-FFF2-40B4-BE49-F238E27FC236}">
-                <a16:creationId xmlns:a16="http://schemas.microsoft.com/office/drawing/2014/main" id="{6F7A9CF8-CC1C-51C7-50CC-14FB30822E03}"/>
+                <a16:creationId xmlns:a16="http://schemas.microsoft.com/office/drawing/2014/main" id="{2B8722B0-C60D-EC6F-97CD-7E900B32CFFB}"/>
               </a:ext>
             </a:extLst>
           </p:cNvPr>
@@ -16430,10 +16307,10 @@
         </p:nvGrpSpPr>
         <p:grpSpPr>
           <a:xfrm>
-            <a:off x="8027644" y="2872038"/>
-            <a:ext cx="467590" cy="646331"/>
-            <a:chOff x="7287278" y="1520684"/>
-            <a:chExt cx="467590" cy="646331"/>
+            <a:off x="11115894" y="4868625"/>
+            <a:ext cx="610035" cy="610035"/>
+            <a:chOff x="7985537" y="2775878"/>
+            <a:chExt cx="610035" cy="610035"/>
           </a:xfrm>
         </p:grpSpPr>
         <p:sp>
@@ -16450,8 +16327,8 @@
           </p:nvSpPr>
           <p:spPr>
             <a:xfrm>
-              <a:off x="7287278" y="1610054"/>
-              <a:ext cx="467590" cy="467590"/>
+              <a:off x="7985537" y="2775878"/>
+              <a:ext cx="610035" cy="610035"/>
             </a:xfrm>
             <a:prstGeom prst="ellipse">
               <a:avLst/>
@@ -16490,7 +16367,7 @@
             <a:lstStyle/>
             <a:p>
               <a:pPr algn="ctr"/>
-              <a:endParaRPr lang="en-US"/>
+              <a:endParaRPr lang="en-US" sz="3200"/>
             </a:p>
           </p:txBody>
         </p:sp>
@@ -16508,8 +16385,8 @@
           </p:nvSpPr>
           <p:spPr>
             <a:xfrm>
-              <a:off x="7301301" y="1520684"/>
-              <a:ext cx="439543" cy="646331"/>
+              <a:off x="8085209" y="2788508"/>
+              <a:ext cx="410690" cy="584775"/>
             </a:xfrm>
             <a:prstGeom prst="rect">
               <a:avLst/>
@@ -16524,7 +16401,7 @@
             <a:p>
               <a:pPr algn="ctr"/>
               <a:r>
-                <a:rPr lang="en-US" sz="3600" b="1" dirty="0">
+                <a:rPr lang="en-US" sz="3200" b="1" dirty="0">
                   <a:solidFill>
                     <a:schemeClr val="accent1">
                       <a:lumMod val="60000"/>
@@ -16540,10 +16417,10 @@
       </p:grpSp>
       <p:grpSp>
         <p:nvGrpSpPr>
-          <p:cNvPr id="14" name="Group 13">
+          <p:cNvPr id="45" name="Group 44">
             <a:extLst>
               <a:ext uri="{FF2B5EF4-FFF2-40B4-BE49-F238E27FC236}">
-                <a16:creationId xmlns:a16="http://schemas.microsoft.com/office/drawing/2014/main" id="{A91EF976-4784-4B1F-D5EE-7F7093B0FAF2}"/>
+                <a16:creationId xmlns:a16="http://schemas.microsoft.com/office/drawing/2014/main" id="{C7D6F6A7-E89A-0352-E242-F33B691AAE80}"/>
               </a:ext>
             </a:extLst>
           </p:cNvPr>
@@ -16552,10 +16429,10 @@
         </p:nvGrpSpPr>
         <p:grpSpPr>
           <a:xfrm>
-            <a:off x="8600095" y="2315077"/>
-            <a:ext cx="467590" cy="646331"/>
-            <a:chOff x="7287278" y="1520684"/>
-            <a:chExt cx="467590" cy="646331"/>
+            <a:off x="9003584" y="2441278"/>
+            <a:ext cx="610035" cy="610035"/>
+            <a:chOff x="8324193" y="1578527"/>
+            <a:chExt cx="610035" cy="610035"/>
           </a:xfrm>
         </p:grpSpPr>
         <p:sp>
@@ -16572,8 +16449,8 @@
           </p:nvSpPr>
           <p:spPr>
             <a:xfrm>
-              <a:off x="7287278" y="1610054"/>
-              <a:ext cx="467590" cy="467590"/>
+              <a:off x="8324193" y="1578527"/>
+              <a:ext cx="610035" cy="610035"/>
             </a:xfrm>
             <a:prstGeom prst="ellipse">
               <a:avLst/>
@@ -16612,7 +16489,7 @@
             <a:lstStyle/>
             <a:p>
               <a:pPr algn="ctr"/>
-              <a:endParaRPr lang="en-US"/>
+              <a:endParaRPr lang="en-US" sz="3200"/>
             </a:p>
           </p:txBody>
         </p:sp>
@@ -16630,8 +16507,8 @@
           </p:nvSpPr>
           <p:spPr>
             <a:xfrm>
-              <a:off x="7308515" y="1520684"/>
-              <a:ext cx="425116" cy="646331"/>
+              <a:off x="8430277" y="1591157"/>
+              <a:ext cx="397866" cy="584775"/>
             </a:xfrm>
             <a:prstGeom prst="rect">
               <a:avLst/>
@@ -16646,7 +16523,7 @@
             <a:p>
               <a:pPr algn="ctr"/>
               <a:r>
-                <a:rPr lang="en-US" sz="3600" b="1" dirty="0">
+                <a:rPr lang="en-US" sz="3200" b="1" dirty="0">
                   <a:solidFill>
                     <a:srgbClr val="FFFF00"/>
                   </a:solidFill>
@@ -16671,7 +16548,7 @@
         </p:nvGrpSpPr>
         <p:grpSpPr>
           <a:xfrm>
-            <a:off x="6732887" y="2248688"/>
+            <a:off x="7577447" y="2101117"/>
             <a:ext cx="425115" cy="425115"/>
             <a:chOff x="7144367" y="2404447"/>
             <a:chExt cx="425115" cy="425115"/>
@@ -16895,7 +16772,7 @@
         </p:nvGrpSpPr>
         <p:grpSpPr>
           <a:xfrm>
-            <a:off x="5339081" y="2236336"/>
+            <a:off x="5670814" y="2121338"/>
             <a:ext cx="425115" cy="425115"/>
             <a:chOff x="5722756" y="2389750"/>
             <a:chExt cx="425115" cy="425115"/>
@@ -17138,113 +17015,12 @@
           </p:sp>
         </p:grpSp>
       </p:grpSp>
-      <p:sp>
-        <p:nvSpPr>
-          <p:cNvPr id="30" name="Oval 29">
-            <a:extLst>
-              <a:ext uri="{FF2B5EF4-FFF2-40B4-BE49-F238E27FC236}">
-                <a16:creationId xmlns:a16="http://schemas.microsoft.com/office/drawing/2014/main" id="{C51D0639-415F-839B-04EC-406FA5F159C1}"/>
-              </a:ext>
-            </a:extLst>
-          </p:cNvPr>
-          <p:cNvSpPr/>
-          <p:nvPr/>
-        </p:nvSpPr>
-        <p:spPr>
-          <a:xfrm>
-            <a:off x="1899840" y="1939596"/>
-            <a:ext cx="1031806" cy="1031806"/>
-          </a:xfrm>
-          <a:prstGeom prst="ellipse">
-            <a:avLst/>
-          </a:prstGeom>
-          <a:scene3d>
-            <a:camera prst="orthographicFront"/>
-            <a:lightRig rig="flat" dir="t"/>
-          </a:scene3d>
-          <a:sp3d extrusionH="190500">
-            <a:bevelT w="190500" h="190500" prst="softRound"/>
-          </a:sp3d>
-        </p:spPr>
-        <p:style>
-          <a:lnRef idx="2">
-            <a:schemeClr val="dk1">
-              <a:shade val="50000"/>
-            </a:schemeClr>
-          </a:lnRef>
-          <a:fillRef idx="1">
-            <a:schemeClr val="dk1"/>
-          </a:fillRef>
-          <a:effectRef idx="0">
-            <a:schemeClr val="dk1"/>
-          </a:effectRef>
-          <a:fontRef idx="minor">
-            <a:schemeClr val="lt1"/>
-          </a:fontRef>
-        </p:style>
-        <p:txBody>
-          <a:bodyPr rtlCol="0" anchor="ctr"/>
-          <a:lstStyle/>
-          <a:p>
-            <a:pPr algn="ctr"/>
-            <a:endParaRPr lang="en-US"/>
-          </a:p>
-        </p:txBody>
-      </p:sp>
-      <p:sp>
-        <p:nvSpPr>
-          <p:cNvPr id="39" name="TextBox 38">
-            <a:extLst>
-              <a:ext uri="{FF2B5EF4-FFF2-40B4-BE49-F238E27FC236}">
-                <a16:creationId xmlns:a16="http://schemas.microsoft.com/office/drawing/2014/main" id="{E773CA0B-37C6-E2ED-FC38-3233AD10AF74}"/>
-              </a:ext>
-            </a:extLst>
-          </p:cNvPr>
-          <p:cNvSpPr txBox="1"/>
-          <p:nvPr/>
-        </p:nvSpPr>
-        <p:spPr>
-          <a:xfrm>
-            <a:off x="2203986" y="2070779"/>
-            <a:ext cx="423514" cy="769441"/>
-          </a:xfrm>
-          <a:prstGeom prst="rect">
-            <a:avLst/>
-          </a:prstGeom>
-          <a:noFill/>
-        </p:spPr>
-        <p:txBody>
-          <a:bodyPr wrap="none" rtlCol="0">
-            <a:spAutoFit/>
-          </a:bodyPr>
-          <a:lstStyle/>
-          <a:p>
-            <a:r>
-              <a:rPr lang="en-US" sz="4400" b="1" dirty="0">
-                <a:solidFill>
-                  <a:schemeClr val="bg2">
-                    <a:lumMod val="90000"/>
-                  </a:schemeClr>
-                </a:solidFill>
-              </a:rPr>
-              <a:t>L</a:t>
-            </a:r>
-            <a:endParaRPr lang="en-US" sz="2000" b="1" dirty="0">
-              <a:solidFill>
-                <a:schemeClr val="bg2">
-                  <a:lumMod val="90000"/>
-                </a:schemeClr>
-              </a:solidFill>
-            </a:endParaRPr>
-          </a:p>
-        </p:txBody>
-      </p:sp>
       <p:grpSp>
         <p:nvGrpSpPr>
-          <p:cNvPr id="43" name="Group 42">
+          <p:cNvPr id="42" name="Group 41">
             <a:extLst>
               <a:ext uri="{FF2B5EF4-FFF2-40B4-BE49-F238E27FC236}">
-                <a16:creationId xmlns:a16="http://schemas.microsoft.com/office/drawing/2014/main" id="{F7B82716-57C1-9A7F-2482-E99C6A9130B4}"/>
+                <a16:creationId xmlns:a16="http://schemas.microsoft.com/office/drawing/2014/main" id="{335937A6-DA88-7351-2E6C-353EBED7D49E}"/>
               </a:ext>
             </a:extLst>
           </p:cNvPr>
@@ -17253,7 +17029,129 @@
         </p:nvGrpSpPr>
         <p:grpSpPr>
           <a:xfrm>
-            <a:off x="6889777" y="3656148"/>
+            <a:off x="3161409" y="3216718"/>
+            <a:ext cx="1031806" cy="1031806"/>
+            <a:chOff x="1899840" y="1939596"/>
+            <a:chExt cx="1031806" cy="1031806"/>
+          </a:xfrm>
+        </p:grpSpPr>
+        <p:sp>
+          <p:nvSpPr>
+            <p:cNvPr id="30" name="Oval 29">
+              <a:extLst>
+                <a:ext uri="{FF2B5EF4-FFF2-40B4-BE49-F238E27FC236}">
+                  <a16:creationId xmlns:a16="http://schemas.microsoft.com/office/drawing/2014/main" id="{C51D0639-415F-839B-04EC-406FA5F159C1}"/>
+                </a:ext>
+              </a:extLst>
+            </p:cNvPr>
+            <p:cNvSpPr/>
+            <p:nvPr/>
+          </p:nvSpPr>
+          <p:spPr>
+            <a:xfrm>
+              <a:off x="1899840" y="1939596"/>
+              <a:ext cx="1031806" cy="1031806"/>
+            </a:xfrm>
+            <a:prstGeom prst="ellipse">
+              <a:avLst/>
+            </a:prstGeom>
+            <a:scene3d>
+              <a:camera prst="orthographicFront"/>
+              <a:lightRig rig="flat" dir="t"/>
+            </a:scene3d>
+            <a:sp3d extrusionH="190500">
+              <a:bevelT w="190500" h="190500" prst="softRound"/>
+            </a:sp3d>
+          </p:spPr>
+          <p:style>
+            <a:lnRef idx="2">
+              <a:schemeClr val="dk1">
+                <a:shade val="50000"/>
+              </a:schemeClr>
+            </a:lnRef>
+            <a:fillRef idx="1">
+              <a:schemeClr val="dk1"/>
+            </a:fillRef>
+            <a:effectRef idx="0">
+              <a:schemeClr val="dk1"/>
+            </a:effectRef>
+            <a:fontRef idx="minor">
+              <a:schemeClr val="lt1"/>
+            </a:fontRef>
+          </p:style>
+          <p:txBody>
+            <a:bodyPr rtlCol="0" anchor="ctr"/>
+            <a:lstStyle/>
+            <a:p>
+              <a:pPr algn="ctr"/>
+              <a:endParaRPr lang="en-US"/>
+            </a:p>
+          </p:txBody>
+        </p:sp>
+        <p:sp>
+          <p:nvSpPr>
+            <p:cNvPr id="39" name="TextBox 38">
+              <a:extLst>
+                <a:ext uri="{FF2B5EF4-FFF2-40B4-BE49-F238E27FC236}">
+                  <a16:creationId xmlns:a16="http://schemas.microsoft.com/office/drawing/2014/main" id="{E773CA0B-37C6-E2ED-FC38-3233AD10AF74}"/>
+                </a:ext>
+              </a:extLst>
+            </p:cNvPr>
+            <p:cNvSpPr txBox="1"/>
+            <p:nvPr/>
+          </p:nvSpPr>
+          <p:spPr>
+            <a:xfrm>
+              <a:off x="2203986" y="2070779"/>
+              <a:ext cx="423514" cy="769441"/>
+            </a:xfrm>
+            <a:prstGeom prst="rect">
+              <a:avLst/>
+            </a:prstGeom>
+            <a:noFill/>
+          </p:spPr>
+          <p:txBody>
+            <a:bodyPr wrap="none" rtlCol="0">
+              <a:spAutoFit/>
+            </a:bodyPr>
+            <a:lstStyle/>
+            <a:p>
+              <a:r>
+                <a:rPr lang="en-US" sz="4400" b="1" dirty="0">
+                  <a:solidFill>
+                    <a:schemeClr val="bg2">
+                      <a:lumMod val="90000"/>
+                    </a:schemeClr>
+                  </a:solidFill>
+                </a:rPr>
+                <a:t>L</a:t>
+              </a:r>
+              <a:endParaRPr lang="en-US" sz="2000" b="1" dirty="0">
+                <a:solidFill>
+                  <a:schemeClr val="bg2">
+                    <a:lumMod val="90000"/>
+                  </a:schemeClr>
+                </a:solidFill>
+              </a:endParaRPr>
+            </a:p>
+          </p:txBody>
+        </p:sp>
+      </p:grpSp>
+      <p:grpSp>
+        <p:nvGrpSpPr>
+          <p:cNvPr id="43" name="Group 42">
+            <a:extLst>
+              <a:ext uri="{FF2B5EF4-FFF2-40B4-BE49-F238E27FC236}">
+                <a16:creationId xmlns:a16="http://schemas.microsoft.com/office/drawing/2014/main" id="{F7B82716-57C1-9A7F-2482-E99C6A9130B4}"/>
+              </a:ext>
+            </a:extLst>
+          </p:cNvPr>
+          <p:cNvGrpSpPr/>
+          <p:nvPr/>
+        </p:nvGrpSpPr>
+        <p:grpSpPr>
+          <a:xfrm>
+            <a:off x="7274100" y="4555765"/>
             <a:ext cx="1031806" cy="1031806"/>
             <a:chOff x="6889777" y="3656148"/>
             <a:chExt cx="1031806" cy="1031806"/>
@@ -17375,7 +17273,7 @@
         </p:nvGrpSpPr>
         <p:grpSpPr>
           <a:xfrm>
-            <a:off x="3634869" y="1097550"/>
+            <a:off x="774029" y="2239760"/>
             <a:ext cx="1227908" cy="523220"/>
             <a:chOff x="3634869" y="1097550"/>
             <a:chExt cx="1227908" cy="523220"/>
@@ -17498,7 +17396,7 @@
         </p:nvGrpSpPr>
         <p:grpSpPr>
           <a:xfrm>
-            <a:off x="8047103" y="1126147"/>
+            <a:off x="10676622" y="1825613"/>
             <a:ext cx="1227908" cy="523220"/>
             <a:chOff x="8047103" y="1126147"/>
             <a:chExt cx="1227908" cy="523220"/>
@@ -17621,7 +17519,7 @@
         </p:nvGrpSpPr>
         <p:grpSpPr>
           <a:xfrm>
-            <a:off x="3714646" y="117972"/>
+            <a:off x="803193" y="801869"/>
             <a:ext cx="555171" cy="914400"/>
             <a:chOff x="3714646" y="117972"/>
             <a:chExt cx="555171" cy="914400"/>
@@ -17744,7 +17642,7 @@
         </p:nvGrpSpPr>
         <p:grpSpPr>
           <a:xfrm>
-            <a:off x="8661057" y="139799"/>
+            <a:off x="11290576" y="839265"/>
             <a:ext cx="561051" cy="914400"/>
             <a:chOff x="8672641" y="192371"/>
             <a:chExt cx="561051" cy="914400"/>
@@ -17867,7 +17765,7 @@
         </p:nvSpPr>
         <p:spPr>
           <a:xfrm rot="16200000">
-            <a:off x="3446610" y="3976551"/>
+            <a:off x="936747" y="4605151"/>
             <a:ext cx="376518" cy="395336"/>
           </a:xfrm>
           <a:prstGeom prst="flowChartOffpageConnector">
@@ -17928,7 +17826,7 @@
         </p:nvSpPr>
         <p:spPr>
           <a:xfrm rot="10800000">
-            <a:off x="4872955" y="5647914"/>
+            <a:off x="1324263" y="5992035"/>
             <a:ext cx="377541" cy="411266"/>
           </a:xfrm>
           <a:prstGeom prst="flowChartOffpageConnector">
@@ -17989,8 +17887,8 @@
         </p:nvSpPr>
         <p:spPr>
           <a:xfrm>
-            <a:off x="5078637" y="3438393"/>
-            <a:ext cx="1031806" cy="1031806"/>
+            <a:off x="4509560" y="4248524"/>
+            <a:ext cx="1243641" cy="1243641"/>
           </a:xfrm>
           <a:prstGeom prst="plus">
             <a:avLst>
@@ -18044,7 +17942,7 @@
         </p:nvSpPr>
         <p:spPr>
           <a:xfrm>
-            <a:off x="4149364" y="3279289"/>
+            <a:off x="1320620" y="4017252"/>
             <a:ext cx="384828" cy="411266"/>
           </a:xfrm>
           <a:prstGeom prst="flowChartOffpageConnector">
@@ -18105,7 +18003,7 @@
         </p:nvSpPr>
         <p:spPr>
           <a:xfrm rot="5400000">
-            <a:off x="5722733" y="3747233"/>
+            <a:off x="1132576" y="5381593"/>
             <a:ext cx="376087" cy="395336"/>
           </a:xfrm>
           <a:prstGeom prst="flowChartOffpageConnector">
@@ -18166,6 +18064,1101 @@
 </file>
 
 <file path=ppt/slides/slide4.xml><?xml version="1.0" encoding="utf-8"?>
+<p:sld xmlns:a="http://schemas.openxmlformats.org/drawingml/2006/main" xmlns:r="http://schemas.openxmlformats.org/officeDocument/2006/relationships" xmlns:p="http://schemas.openxmlformats.org/presentationml/2006/main">
+  <p:cSld>
+    <p:spTree>
+      <p:nvGrpSpPr>
+        <p:cNvPr id="1" name=""/>
+        <p:cNvGrpSpPr/>
+        <p:nvPr/>
+      </p:nvGrpSpPr>
+      <p:grpSpPr>
+        <a:xfrm>
+          <a:off x="0" y="0"/>
+          <a:ext cx="0" cy="0"/>
+          <a:chOff x="0" y="0"/>
+          <a:chExt cx="0" cy="0"/>
+        </a:xfrm>
+      </p:grpSpPr>
+      <p:sp>
+        <p:nvSpPr>
+          <p:cNvPr id="1049" name="Rectangle 1048">
+            <a:extLst>
+              <a:ext uri="{FF2B5EF4-FFF2-40B4-BE49-F238E27FC236}">
+                <a16:creationId xmlns:a16="http://schemas.microsoft.com/office/drawing/2014/main" id="{9A694FAB-C35B-2553-7098-79B86B44E072}"/>
+              </a:ext>
+            </a:extLst>
+          </p:cNvPr>
+          <p:cNvSpPr/>
+          <p:nvPr/>
+        </p:nvSpPr>
+        <p:spPr>
+          <a:xfrm>
+            <a:off x="7962900" y="4252912"/>
+            <a:ext cx="252414" cy="355923"/>
+          </a:xfrm>
+          <a:prstGeom prst="rect">
+            <a:avLst/>
+          </a:prstGeom>
+          <a:ln>
+            <a:noFill/>
+          </a:ln>
+        </p:spPr>
+        <p:style>
+          <a:lnRef idx="2">
+            <a:schemeClr val="accent1">
+              <a:shade val="50000"/>
+            </a:schemeClr>
+          </a:lnRef>
+          <a:fillRef idx="1">
+            <a:schemeClr val="accent1"/>
+          </a:fillRef>
+          <a:effectRef idx="0">
+            <a:schemeClr val="accent1"/>
+          </a:effectRef>
+          <a:fontRef idx="minor">
+            <a:schemeClr val="lt1"/>
+          </a:fontRef>
+        </p:style>
+        <p:txBody>
+          <a:bodyPr rtlCol="0" anchor="ctr"/>
+          <a:lstStyle/>
+          <a:p>
+            <a:pPr algn="ctr"/>
+            <a:endParaRPr lang="en-US"/>
+          </a:p>
+        </p:txBody>
+      </p:sp>
+      <p:sp>
+        <p:nvSpPr>
+          <p:cNvPr id="1050" name="Rectangle 1049">
+            <a:extLst>
+              <a:ext uri="{FF2B5EF4-FFF2-40B4-BE49-F238E27FC236}">
+                <a16:creationId xmlns:a16="http://schemas.microsoft.com/office/drawing/2014/main" id="{70119718-B95C-FE05-ACF8-004643F33378}"/>
+              </a:ext>
+            </a:extLst>
+          </p:cNvPr>
+          <p:cNvSpPr/>
+          <p:nvPr/>
+        </p:nvSpPr>
+        <p:spPr>
+          <a:xfrm>
+            <a:off x="6257924" y="3676650"/>
+            <a:ext cx="900113" cy="461963"/>
+          </a:xfrm>
+          <a:prstGeom prst="rect">
+            <a:avLst/>
+          </a:prstGeom>
+          <a:ln>
+            <a:noFill/>
+          </a:ln>
+        </p:spPr>
+        <p:style>
+          <a:lnRef idx="2">
+            <a:schemeClr val="accent1">
+              <a:shade val="50000"/>
+            </a:schemeClr>
+          </a:lnRef>
+          <a:fillRef idx="1">
+            <a:schemeClr val="accent1"/>
+          </a:fillRef>
+          <a:effectRef idx="0">
+            <a:schemeClr val="accent1"/>
+          </a:effectRef>
+          <a:fontRef idx="minor">
+            <a:schemeClr val="lt1"/>
+          </a:fontRef>
+        </p:style>
+        <p:txBody>
+          <a:bodyPr rtlCol="0" anchor="ctr"/>
+          <a:lstStyle/>
+          <a:p>
+            <a:pPr algn="ctr"/>
+            <a:endParaRPr lang="en-US"/>
+          </a:p>
+        </p:txBody>
+      </p:sp>
+      <p:sp>
+        <p:nvSpPr>
+          <p:cNvPr id="1052" name="Rectangle 1051">
+            <a:extLst>
+              <a:ext uri="{FF2B5EF4-FFF2-40B4-BE49-F238E27FC236}">
+                <a16:creationId xmlns:a16="http://schemas.microsoft.com/office/drawing/2014/main" id="{7E0E2F24-2375-B97E-3CB9-CA0FCF76FE11}"/>
+              </a:ext>
+            </a:extLst>
+          </p:cNvPr>
+          <p:cNvSpPr/>
+          <p:nvPr/>
+        </p:nvSpPr>
+        <p:spPr>
+          <a:xfrm>
+            <a:off x="4836370" y="3833812"/>
+            <a:ext cx="292843" cy="304801"/>
+          </a:xfrm>
+          <a:prstGeom prst="rect">
+            <a:avLst/>
+          </a:prstGeom>
+          <a:ln>
+            <a:noFill/>
+          </a:ln>
+        </p:spPr>
+        <p:style>
+          <a:lnRef idx="2">
+            <a:schemeClr val="accent1">
+              <a:shade val="50000"/>
+            </a:schemeClr>
+          </a:lnRef>
+          <a:fillRef idx="1">
+            <a:schemeClr val="accent1"/>
+          </a:fillRef>
+          <a:effectRef idx="0">
+            <a:schemeClr val="accent1"/>
+          </a:effectRef>
+          <a:fontRef idx="minor">
+            <a:schemeClr val="lt1"/>
+          </a:fontRef>
+        </p:style>
+        <p:txBody>
+          <a:bodyPr rtlCol="0" anchor="ctr"/>
+          <a:lstStyle/>
+          <a:p>
+            <a:pPr algn="ctr"/>
+            <a:endParaRPr lang="en-US"/>
+          </a:p>
+        </p:txBody>
+      </p:sp>
+      <p:pic>
+        <p:nvPicPr>
+          <p:cNvPr id="1059" name="Picture 1058" descr="Icon&#10;&#10;Description automatically generated">
+            <a:extLst>
+              <a:ext uri="{FF2B5EF4-FFF2-40B4-BE49-F238E27FC236}">
+                <a16:creationId xmlns:a16="http://schemas.microsoft.com/office/drawing/2014/main" id="{EF10EC48-36E7-DA90-6FE1-3467724203B5}"/>
+              </a:ext>
+            </a:extLst>
+          </p:cNvPr>
+          <p:cNvPicPr>
+            <a:picLocks noChangeAspect="1"/>
+          </p:cNvPicPr>
+          <p:nvPr/>
+        </p:nvPicPr>
+        <p:blipFill>
+          <a:blip r:embed="rId2">
+            <a:extLst>
+              <a:ext uri="{28A0092B-C50C-407E-A947-70E740481C1C}">
+                <a14:useLocalDpi xmlns:a14="http://schemas.microsoft.com/office/drawing/2010/main" val="0"/>
+              </a:ext>
+            </a:extLst>
+          </a:blip>
+          <a:stretch>
+            <a:fillRect/>
+          </a:stretch>
+        </p:blipFill>
+        <p:spPr>
+          <a:xfrm>
+            <a:off x="2259568" y="1521847"/>
+            <a:ext cx="6678394" cy="4458430"/>
+          </a:xfrm>
+          <a:prstGeom prst="rect">
+            <a:avLst/>
+          </a:prstGeom>
+        </p:spPr>
+      </p:pic>
+      <p:cxnSp>
+        <p:nvCxnSpPr>
+          <p:cNvPr id="1061" name="Straight Connector 1060">
+            <a:extLst>
+              <a:ext uri="{FF2B5EF4-FFF2-40B4-BE49-F238E27FC236}">
+                <a16:creationId xmlns:a16="http://schemas.microsoft.com/office/drawing/2014/main" id="{B52DAF22-6C28-9BF7-3DDB-79035EEF3214}"/>
+              </a:ext>
+            </a:extLst>
+          </p:cNvPr>
+          <p:cNvCxnSpPr>
+            <a:cxnSpLocks/>
+          </p:cNvCxnSpPr>
+          <p:nvPr/>
+        </p:nvCxnSpPr>
+        <p:spPr>
+          <a:xfrm>
+            <a:off x="7962900" y="2881470"/>
+            <a:ext cx="1638300" cy="0"/>
+          </a:xfrm>
+          <a:prstGeom prst="line">
+            <a:avLst/>
+          </a:prstGeom>
+          <a:ln w="38100">
+            <a:solidFill>
+              <a:srgbClr val="7030A0"/>
+            </a:solidFill>
+          </a:ln>
+        </p:spPr>
+        <p:style>
+          <a:lnRef idx="1">
+            <a:schemeClr val="accent1"/>
+          </a:lnRef>
+          <a:fillRef idx="0">
+            <a:schemeClr val="accent1"/>
+          </a:fillRef>
+          <a:effectRef idx="0">
+            <a:schemeClr val="accent1"/>
+          </a:effectRef>
+          <a:fontRef idx="minor">
+            <a:schemeClr val="tx1"/>
+          </a:fontRef>
+        </p:style>
+      </p:cxnSp>
+      <p:cxnSp>
+        <p:nvCxnSpPr>
+          <p:cNvPr id="1063" name="Straight Connector 1062">
+            <a:extLst>
+              <a:ext uri="{FF2B5EF4-FFF2-40B4-BE49-F238E27FC236}">
+                <a16:creationId xmlns:a16="http://schemas.microsoft.com/office/drawing/2014/main" id="{7C72D710-5F2F-D95C-D321-793C10C46E3A}"/>
+              </a:ext>
+            </a:extLst>
+          </p:cNvPr>
+          <p:cNvCxnSpPr>
+            <a:cxnSpLocks/>
+          </p:cNvCxnSpPr>
+          <p:nvPr/>
+        </p:nvCxnSpPr>
+        <p:spPr>
+          <a:xfrm>
+            <a:off x="7547741" y="2413760"/>
+            <a:ext cx="1964121" cy="0"/>
+          </a:xfrm>
+          <a:prstGeom prst="line">
+            <a:avLst/>
+          </a:prstGeom>
+          <a:ln w="38100">
+            <a:solidFill>
+              <a:srgbClr val="7030A0"/>
+            </a:solidFill>
+          </a:ln>
+        </p:spPr>
+        <p:style>
+          <a:lnRef idx="1">
+            <a:schemeClr val="accent1"/>
+          </a:lnRef>
+          <a:fillRef idx="0">
+            <a:schemeClr val="accent1"/>
+          </a:fillRef>
+          <a:effectRef idx="0">
+            <a:schemeClr val="accent1"/>
+          </a:effectRef>
+          <a:fontRef idx="minor">
+            <a:schemeClr val="tx1"/>
+          </a:fontRef>
+        </p:style>
+      </p:cxnSp>
+      <p:cxnSp>
+        <p:nvCxnSpPr>
+          <p:cNvPr id="1064" name="Straight Connector 1063">
+            <a:extLst>
+              <a:ext uri="{FF2B5EF4-FFF2-40B4-BE49-F238E27FC236}">
+                <a16:creationId xmlns:a16="http://schemas.microsoft.com/office/drawing/2014/main" id="{B8F2965B-5032-285E-6A7B-70C7B9F67E8A}"/>
+              </a:ext>
+            </a:extLst>
+          </p:cNvPr>
+          <p:cNvCxnSpPr>
+            <a:cxnSpLocks/>
+          </p:cNvCxnSpPr>
+          <p:nvPr/>
+        </p:nvCxnSpPr>
+        <p:spPr>
+          <a:xfrm>
+            <a:off x="7547741" y="3349181"/>
+            <a:ext cx="2053459" cy="0"/>
+          </a:xfrm>
+          <a:prstGeom prst="line">
+            <a:avLst/>
+          </a:prstGeom>
+          <a:ln w="38100">
+            <a:solidFill>
+              <a:srgbClr val="7030A0"/>
+            </a:solidFill>
+          </a:ln>
+        </p:spPr>
+        <p:style>
+          <a:lnRef idx="1">
+            <a:schemeClr val="accent1"/>
+          </a:lnRef>
+          <a:fillRef idx="0">
+            <a:schemeClr val="accent1"/>
+          </a:fillRef>
+          <a:effectRef idx="0">
+            <a:schemeClr val="accent1"/>
+          </a:effectRef>
+          <a:fontRef idx="minor">
+            <a:schemeClr val="tx1"/>
+          </a:fontRef>
+        </p:style>
+      </p:cxnSp>
+      <p:cxnSp>
+        <p:nvCxnSpPr>
+          <p:cNvPr id="1065" name="Straight Connector 1064">
+            <a:extLst>
+              <a:ext uri="{FF2B5EF4-FFF2-40B4-BE49-F238E27FC236}">
+                <a16:creationId xmlns:a16="http://schemas.microsoft.com/office/drawing/2014/main" id="{646C206E-F225-C7C4-10EB-65E395B05F82}"/>
+              </a:ext>
+            </a:extLst>
+          </p:cNvPr>
+          <p:cNvCxnSpPr>
+            <a:cxnSpLocks/>
+          </p:cNvCxnSpPr>
+          <p:nvPr/>
+        </p:nvCxnSpPr>
+        <p:spPr>
+          <a:xfrm>
+            <a:off x="7208670" y="3867553"/>
+            <a:ext cx="2392530" cy="0"/>
+          </a:xfrm>
+          <a:prstGeom prst="line">
+            <a:avLst/>
+          </a:prstGeom>
+          <a:ln w="38100">
+            <a:solidFill>
+              <a:srgbClr val="7030A0"/>
+            </a:solidFill>
+          </a:ln>
+        </p:spPr>
+        <p:style>
+          <a:lnRef idx="1">
+            <a:schemeClr val="accent1"/>
+          </a:lnRef>
+          <a:fillRef idx="0">
+            <a:schemeClr val="accent1"/>
+          </a:fillRef>
+          <a:effectRef idx="0">
+            <a:schemeClr val="accent1"/>
+          </a:effectRef>
+          <a:fontRef idx="minor">
+            <a:schemeClr val="tx1"/>
+          </a:fontRef>
+        </p:style>
+      </p:cxnSp>
+      <p:cxnSp>
+        <p:nvCxnSpPr>
+          <p:cNvPr id="1066" name="Straight Connector 1065">
+            <a:extLst>
+              <a:ext uri="{FF2B5EF4-FFF2-40B4-BE49-F238E27FC236}">
+                <a16:creationId xmlns:a16="http://schemas.microsoft.com/office/drawing/2014/main" id="{9532DB12-016A-EA96-5748-257F7CF159CE}"/>
+              </a:ext>
+            </a:extLst>
+          </p:cNvPr>
+          <p:cNvCxnSpPr>
+            <a:cxnSpLocks/>
+          </p:cNvCxnSpPr>
+          <p:nvPr/>
+        </p:nvCxnSpPr>
+        <p:spPr>
+          <a:xfrm>
+            <a:off x="6821214" y="3053255"/>
+            <a:ext cx="387456" cy="814298"/>
+          </a:xfrm>
+          <a:prstGeom prst="line">
+            <a:avLst/>
+          </a:prstGeom>
+          <a:ln w="38100">
+            <a:solidFill>
+              <a:srgbClr val="7030A0"/>
+            </a:solidFill>
+          </a:ln>
+        </p:spPr>
+        <p:style>
+          <a:lnRef idx="1">
+            <a:schemeClr val="accent1"/>
+          </a:lnRef>
+          <a:fillRef idx="0">
+            <a:schemeClr val="accent1"/>
+          </a:fillRef>
+          <a:effectRef idx="0">
+            <a:schemeClr val="accent1"/>
+          </a:effectRef>
+          <a:fontRef idx="minor">
+            <a:schemeClr val="tx1"/>
+          </a:fontRef>
+        </p:style>
+      </p:cxnSp>
+      <p:cxnSp>
+        <p:nvCxnSpPr>
+          <p:cNvPr id="1074" name="Straight Connector 1073">
+            <a:extLst>
+              <a:ext uri="{FF2B5EF4-FFF2-40B4-BE49-F238E27FC236}">
+                <a16:creationId xmlns:a16="http://schemas.microsoft.com/office/drawing/2014/main" id="{9F1A355B-5086-205E-715F-173B7723B9D2}"/>
+              </a:ext>
+            </a:extLst>
+          </p:cNvPr>
+          <p:cNvCxnSpPr>
+            <a:cxnSpLocks/>
+          </p:cNvCxnSpPr>
+          <p:nvPr/>
+        </p:nvCxnSpPr>
+        <p:spPr>
+          <a:xfrm>
+            <a:off x="7333536" y="1770739"/>
+            <a:ext cx="2178326" cy="0"/>
+          </a:xfrm>
+          <a:prstGeom prst="line">
+            <a:avLst/>
+          </a:prstGeom>
+          <a:ln w="38100">
+            <a:solidFill>
+              <a:srgbClr val="7030A0"/>
+            </a:solidFill>
+          </a:ln>
+        </p:spPr>
+        <p:style>
+          <a:lnRef idx="1">
+            <a:schemeClr val="accent1"/>
+          </a:lnRef>
+          <a:fillRef idx="0">
+            <a:schemeClr val="accent1"/>
+          </a:fillRef>
+          <a:effectRef idx="0">
+            <a:schemeClr val="accent1"/>
+          </a:effectRef>
+          <a:fontRef idx="minor">
+            <a:schemeClr val="tx1"/>
+          </a:fontRef>
+        </p:style>
+      </p:cxnSp>
+      <p:cxnSp>
+        <p:nvCxnSpPr>
+          <p:cNvPr id="1076" name="Straight Connector 1075">
+            <a:extLst>
+              <a:ext uri="{FF2B5EF4-FFF2-40B4-BE49-F238E27FC236}">
+                <a16:creationId xmlns:a16="http://schemas.microsoft.com/office/drawing/2014/main" id="{B8494A7A-65CA-7BE8-086F-A778E705B37D}"/>
+              </a:ext>
+            </a:extLst>
+          </p:cNvPr>
+          <p:cNvCxnSpPr>
+            <a:cxnSpLocks/>
+          </p:cNvCxnSpPr>
+          <p:nvPr/>
+        </p:nvCxnSpPr>
+        <p:spPr>
+          <a:xfrm flipV="1">
+            <a:off x="7158037" y="1271752"/>
+            <a:ext cx="225480" cy="357098"/>
+          </a:xfrm>
+          <a:prstGeom prst="line">
+            <a:avLst/>
+          </a:prstGeom>
+          <a:ln w="38100">
+            <a:solidFill>
+              <a:srgbClr val="7030A0"/>
+            </a:solidFill>
+          </a:ln>
+        </p:spPr>
+        <p:style>
+          <a:lnRef idx="1">
+            <a:schemeClr val="accent1"/>
+          </a:lnRef>
+          <a:fillRef idx="0">
+            <a:schemeClr val="accent1"/>
+          </a:fillRef>
+          <a:effectRef idx="0">
+            <a:schemeClr val="accent1"/>
+          </a:effectRef>
+          <a:fontRef idx="minor">
+            <a:schemeClr val="tx1"/>
+          </a:fontRef>
+        </p:style>
+      </p:cxnSp>
+      <p:cxnSp>
+        <p:nvCxnSpPr>
+          <p:cNvPr id="1078" name="Straight Connector 1077">
+            <a:extLst>
+              <a:ext uri="{FF2B5EF4-FFF2-40B4-BE49-F238E27FC236}">
+                <a16:creationId xmlns:a16="http://schemas.microsoft.com/office/drawing/2014/main" id="{6CBE27F8-E9B9-9245-168A-90C6159E5561}"/>
+              </a:ext>
+            </a:extLst>
+          </p:cNvPr>
+          <p:cNvCxnSpPr>
+            <a:cxnSpLocks/>
+          </p:cNvCxnSpPr>
+          <p:nvPr/>
+        </p:nvCxnSpPr>
+        <p:spPr>
+          <a:xfrm>
+            <a:off x="7381545" y="1287992"/>
+            <a:ext cx="2130317" cy="1762"/>
+          </a:xfrm>
+          <a:prstGeom prst="line">
+            <a:avLst/>
+          </a:prstGeom>
+          <a:ln w="38100">
+            <a:solidFill>
+              <a:srgbClr val="7030A0"/>
+            </a:solidFill>
+          </a:ln>
+        </p:spPr>
+        <p:style>
+          <a:lnRef idx="1">
+            <a:schemeClr val="accent1"/>
+          </a:lnRef>
+          <a:fillRef idx="0">
+            <a:schemeClr val="accent1"/>
+          </a:fillRef>
+          <a:effectRef idx="0">
+            <a:schemeClr val="accent1"/>
+          </a:effectRef>
+          <a:fontRef idx="minor">
+            <a:schemeClr val="tx1"/>
+          </a:fontRef>
+        </p:style>
+      </p:cxnSp>
+      <p:cxnSp>
+        <p:nvCxnSpPr>
+          <p:cNvPr id="1081" name="Straight Connector 1080">
+            <a:extLst>
+              <a:ext uri="{FF2B5EF4-FFF2-40B4-BE49-F238E27FC236}">
+                <a16:creationId xmlns:a16="http://schemas.microsoft.com/office/drawing/2014/main" id="{9E8A27F1-6326-90D4-91B0-0A6D898BEDEF}"/>
+              </a:ext>
+            </a:extLst>
+          </p:cNvPr>
+          <p:cNvCxnSpPr>
+            <a:cxnSpLocks/>
+          </p:cNvCxnSpPr>
+          <p:nvPr/>
+        </p:nvCxnSpPr>
+        <p:spPr>
+          <a:xfrm>
+            <a:off x="1596528" y="1221437"/>
+            <a:ext cx="1919182" cy="0"/>
+          </a:xfrm>
+          <a:prstGeom prst="line">
+            <a:avLst/>
+          </a:prstGeom>
+          <a:ln w="38100">
+            <a:solidFill>
+              <a:srgbClr val="7030A0"/>
+            </a:solidFill>
+          </a:ln>
+        </p:spPr>
+        <p:style>
+          <a:lnRef idx="1">
+            <a:schemeClr val="accent1"/>
+          </a:lnRef>
+          <a:fillRef idx="0">
+            <a:schemeClr val="accent1"/>
+          </a:fillRef>
+          <a:effectRef idx="0">
+            <a:schemeClr val="accent1"/>
+          </a:effectRef>
+          <a:fontRef idx="minor">
+            <a:schemeClr val="tx1"/>
+          </a:fontRef>
+        </p:style>
+      </p:cxnSp>
+      <p:cxnSp>
+        <p:nvCxnSpPr>
+          <p:cNvPr id="1082" name="Straight Connector 1081">
+            <a:extLst>
+              <a:ext uri="{FF2B5EF4-FFF2-40B4-BE49-F238E27FC236}">
+                <a16:creationId xmlns:a16="http://schemas.microsoft.com/office/drawing/2014/main" id="{5345F4AC-AB6F-5B5B-98B5-B156D2AA8163}"/>
+              </a:ext>
+            </a:extLst>
+          </p:cNvPr>
+          <p:cNvCxnSpPr>
+            <a:cxnSpLocks/>
+          </p:cNvCxnSpPr>
+          <p:nvPr/>
+        </p:nvCxnSpPr>
+        <p:spPr>
+          <a:xfrm>
+            <a:off x="3515710" y="1234821"/>
+            <a:ext cx="383628" cy="352241"/>
+          </a:xfrm>
+          <a:prstGeom prst="line">
+            <a:avLst/>
+          </a:prstGeom>
+          <a:ln w="38100">
+            <a:solidFill>
+              <a:srgbClr val="7030A0"/>
+            </a:solidFill>
+          </a:ln>
+        </p:spPr>
+        <p:style>
+          <a:lnRef idx="1">
+            <a:schemeClr val="accent1"/>
+          </a:lnRef>
+          <a:fillRef idx="0">
+            <a:schemeClr val="accent1"/>
+          </a:fillRef>
+          <a:effectRef idx="0">
+            <a:schemeClr val="accent1"/>
+          </a:effectRef>
+          <a:fontRef idx="minor">
+            <a:schemeClr val="tx1"/>
+          </a:fontRef>
+        </p:style>
+      </p:cxnSp>
+      <p:cxnSp>
+        <p:nvCxnSpPr>
+          <p:cNvPr id="1084" name="Straight Connector 1083">
+            <a:extLst>
+              <a:ext uri="{FF2B5EF4-FFF2-40B4-BE49-F238E27FC236}">
+                <a16:creationId xmlns:a16="http://schemas.microsoft.com/office/drawing/2014/main" id="{E4EB48D2-23EF-7B00-A743-5DD32E686060}"/>
+              </a:ext>
+            </a:extLst>
+          </p:cNvPr>
+          <p:cNvCxnSpPr>
+            <a:cxnSpLocks/>
+          </p:cNvCxnSpPr>
+          <p:nvPr/>
+        </p:nvCxnSpPr>
+        <p:spPr>
+          <a:xfrm>
+            <a:off x="1596528" y="1770739"/>
+            <a:ext cx="2178326" cy="0"/>
+          </a:xfrm>
+          <a:prstGeom prst="line">
+            <a:avLst/>
+          </a:prstGeom>
+          <a:ln w="38100">
+            <a:solidFill>
+              <a:srgbClr val="7030A0"/>
+            </a:solidFill>
+          </a:ln>
+        </p:spPr>
+        <p:style>
+          <a:lnRef idx="1">
+            <a:schemeClr val="accent1"/>
+          </a:lnRef>
+          <a:fillRef idx="0">
+            <a:schemeClr val="accent1"/>
+          </a:fillRef>
+          <a:effectRef idx="0">
+            <a:schemeClr val="accent1"/>
+          </a:effectRef>
+          <a:fontRef idx="minor">
+            <a:schemeClr val="tx1"/>
+          </a:fontRef>
+        </p:style>
+      </p:cxnSp>
+      <p:cxnSp>
+        <p:nvCxnSpPr>
+          <p:cNvPr id="1086" name="Straight Connector 1085">
+            <a:extLst>
+              <a:ext uri="{FF2B5EF4-FFF2-40B4-BE49-F238E27FC236}">
+                <a16:creationId xmlns:a16="http://schemas.microsoft.com/office/drawing/2014/main" id="{65961858-105B-929C-38FB-8CF6177FBA9B}"/>
+              </a:ext>
+            </a:extLst>
+          </p:cNvPr>
+          <p:cNvCxnSpPr>
+            <a:cxnSpLocks/>
+          </p:cNvCxnSpPr>
+          <p:nvPr/>
+        </p:nvCxnSpPr>
+        <p:spPr>
+          <a:xfrm>
+            <a:off x="1639614" y="2865451"/>
+            <a:ext cx="2135240" cy="0"/>
+          </a:xfrm>
+          <a:prstGeom prst="line">
+            <a:avLst/>
+          </a:prstGeom>
+          <a:ln w="38100">
+            <a:solidFill>
+              <a:srgbClr val="7030A0"/>
+            </a:solidFill>
+          </a:ln>
+        </p:spPr>
+        <p:style>
+          <a:lnRef idx="1">
+            <a:schemeClr val="accent1"/>
+          </a:lnRef>
+          <a:fillRef idx="0">
+            <a:schemeClr val="accent1"/>
+          </a:fillRef>
+          <a:effectRef idx="0">
+            <a:schemeClr val="accent1"/>
+          </a:effectRef>
+          <a:fontRef idx="minor">
+            <a:schemeClr val="tx1"/>
+          </a:fontRef>
+        </p:style>
+      </p:cxnSp>
+      <p:cxnSp>
+        <p:nvCxnSpPr>
+          <p:cNvPr id="3073" name="Straight Connector 3072">
+            <a:extLst>
+              <a:ext uri="{FF2B5EF4-FFF2-40B4-BE49-F238E27FC236}">
+                <a16:creationId xmlns:a16="http://schemas.microsoft.com/office/drawing/2014/main" id="{D20C9B77-F082-B0B7-1512-462986A4FC9C}"/>
+              </a:ext>
+            </a:extLst>
+          </p:cNvPr>
+          <p:cNvCxnSpPr>
+            <a:cxnSpLocks/>
+          </p:cNvCxnSpPr>
+          <p:nvPr/>
+        </p:nvCxnSpPr>
+        <p:spPr>
+          <a:xfrm>
+            <a:off x="6575144" y="3845763"/>
+            <a:ext cx="744078" cy="579876"/>
+          </a:xfrm>
+          <a:prstGeom prst="line">
+            <a:avLst/>
+          </a:prstGeom>
+          <a:ln w="38100">
+            <a:solidFill>
+              <a:srgbClr val="7030A0"/>
+            </a:solidFill>
+          </a:ln>
+        </p:spPr>
+        <p:style>
+          <a:lnRef idx="1">
+            <a:schemeClr val="accent1"/>
+          </a:lnRef>
+          <a:fillRef idx="0">
+            <a:schemeClr val="accent1"/>
+          </a:fillRef>
+          <a:effectRef idx="0">
+            <a:schemeClr val="accent1"/>
+          </a:effectRef>
+          <a:fontRef idx="minor">
+            <a:schemeClr val="tx1"/>
+          </a:fontRef>
+        </p:style>
+      </p:cxnSp>
+      <p:cxnSp>
+        <p:nvCxnSpPr>
+          <p:cNvPr id="3077" name="Straight Connector 3076">
+            <a:extLst>
+              <a:ext uri="{FF2B5EF4-FFF2-40B4-BE49-F238E27FC236}">
+                <a16:creationId xmlns:a16="http://schemas.microsoft.com/office/drawing/2014/main" id="{371B5843-DDAE-D64B-F3B9-CA66B0148069}"/>
+              </a:ext>
+            </a:extLst>
+          </p:cNvPr>
+          <p:cNvCxnSpPr>
+            <a:cxnSpLocks/>
+          </p:cNvCxnSpPr>
+          <p:nvPr/>
+        </p:nvCxnSpPr>
+        <p:spPr>
+          <a:xfrm>
+            <a:off x="7302097" y="4404638"/>
+            <a:ext cx="2393696" cy="26256"/>
+          </a:xfrm>
+          <a:prstGeom prst="line">
+            <a:avLst/>
+          </a:prstGeom>
+          <a:ln w="38100">
+            <a:solidFill>
+              <a:srgbClr val="7030A0"/>
+            </a:solidFill>
+          </a:ln>
+        </p:spPr>
+        <p:style>
+          <a:lnRef idx="1">
+            <a:schemeClr val="accent1"/>
+          </a:lnRef>
+          <a:fillRef idx="0">
+            <a:schemeClr val="accent1"/>
+          </a:fillRef>
+          <a:effectRef idx="0">
+            <a:schemeClr val="accent1"/>
+          </a:effectRef>
+          <a:fontRef idx="minor">
+            <a:schemeClr val="tx1"/>
+          </a:fontRef>
+        </p:style>
+      </p:cxnSp>
+      <p:cxnSp>
+        <p:nvCxnSpPr>
+          <p:cNvPr id="3081" name="Straight Connector 3080">
+            <a:extLst>
+              <a:ext uri="{FF2B5EF4-FFF2-40B4-BE49-F238E27FC236}">
+                <a16:creationId xmlns:a16="http://schemas.microsoft.com/office/drawing/2014/main" id="{DE19CC03-0251-4C56-D986-92D4BBB210C3}"/>
+              </a:ext>
+            </a:extLst>
+          </p:cNvPr>
+          <p:cNvCxnSpPr>
+            <a:cxnSpLocks/>
+          </p:cNvCxnSpPr>
+          <p:nvPr/>
+        </p:nvCxnSpPr>
+        <p:spPr>
+          <a:xfrm flipH="1">
+            <a:off x="4742211" y="4318897"/>
+            <a:ext cx="14963" cy="1017256"/>
+          </a:xfrm>
+          <a:prstGeom prst="line">
+            <a:avLst/>
+          </a:prstGeom>
+          <a:ln w="38100">
+            <a:solidFill>
+              <a:srgbClr val="7030A0"/>
+            </a:solidFill>
+          </a:ln>
+        </p:spPr>
+        <p:style>
+          <a:lnRef idx="1">
+            <a:schemeClr val="accent1"/>
+          </a:lnRef>
+          <a:fillRef idx="0">
+            <a:schemeClr val="accent1"/>
+          </a:fillRef>
+          <a:effectRef idx="0">
+            <a:schemeClr val="accent1"/>
+          </a:effectRef>
+          <a:fontRef idx="minor">
+            <a:schemeClr val="tx1"/>
+          </a:fontRef>
+        </p:style>
+      </p:cxnSp>
+      <p:cxnSp>
+        <p:nvCxnSpPr>
+          <p:cNvPr id="3084" name="Straight Connector 3083">
+            <a:extLst>
+              <a:ext uri="{FF2B5EF4-FFF2-40B4-BE49-F238E27FC236}">
+                <a16:creationId xmlns:a16="http://schemas.microsoft.com/office/drawing/2014/main" id="{D7EF510B-A354-3A12-8A64-A0CF7E4EC358}"/>
+              </a:ext>
+            </a:extLst>
+          </p:cNvPr>
+          <p:cNvCxnSpPr>
+            <a:cxnSpLocks/>
+          </p:cNvCxnSpPr>
+          <p:nvPr/>
+        </p:nvCxnSpPr>
+        <p:spPr>
+          <a:xfrm flipH="1">
+            <a:off x="6096000" y="877723"/>
+            <a:ext cx="291385" cy="1941475"/>
+          </a:xfrm>
+          <a:prstGeom prst="line">
+            <a:avLst/>
+          </a:prstGeom>
+          <a:ln w="38100">
+            <a:solidFill>
+              <a:srgbClr val="7030A0"/>
+            </a:solidFill>
+          </a:ln>
+        </p:spPr>
+        <p:style>
+          <a:lnRef idx="1">
+            <a:schemeClr val="accent1"/>
+          </a:lnRef>
+          <a:fillRef idx="0">
+            <a:schemeClr val="accent1"/>
+          </a:fillRef>
+          <a:effectRef idx="0">
+            <a:schemeClr val="accent1"/>
+          </a:effectRef>
+          <a:fontRef idx="minor">
+            <a:schemeClr val="tx1"/>
+          </a:fontRef>
+        </p:style>
+      </p:cxnSp>
+      <p:cxnSp>
+        <p:nvCxnSpPr>
+          <p:cNvPr id="3086" name="Straight Connector 3085">
+            <a:extLst>
+              <a:ext uri="{FF2B5EF4-FFF2-40B4-BE49-F238E27FC236}">
+                <a16:creationId xmlns:a16="http://schemas.microsoft.com/office/drawing/2014/main" id="{D8E06C82-0D16-79D9-D250-712A73EFF71D}"/>
+              </a:ext>
+            </a:extLst>
+          </p:cNvPr>
+          <p:cNvCxnSpPr>
+            <a:cxnSpLocks/>
+          </p:cNvCxnSpPr>
+          <p:nvPr/>
+        </p:nvCxnSpPr>
+        <p:spPr>
+          <a:xfrm>
+            <a:off x="4638895" y="956441"/>
+            <a:ext cx="478987" cy="1909010"/>
+          </a:xfrm>
+          <a:prstGeom prst="line">
+            <a:avLst/>
+          </a:prstGeom>
+          <a:ln w="38100">
+            <a:solidFill>
+              <a:srgbClr val="7030A0"/>
+            </a:solidFill>
+          </a:ln>
+        </p:spPr>
+        <p:style>
+          <a:lnRef idx="1">
+            <a:schemeClr val="accent1"/>
+          </a:lnRef>
+          <a:fillRef idx="0">
+            <a:schemeClr val="accent1"/>
+          </a:fillRef>
+          <a:effectRef idx="0">
+            <a:schemeClr val="accent1"/>
+          </a:effectRef>
+          <a:fontRef idx="minor">
+            <a:schemeClr val="tx1"/>
+          </a:fontRef>
+        </p:style>
+      </p:cxnSp>
+      <p:cxnSp>
+        <p:nvCxnSpPr>
+          <p:cNvPr id="3088" name="Straight Connector 3087">
+            <a:extLst>
+              <a:ext uri="{FF2B5EF4-FFF2-40B4-BE49-F238E27FC236}">
+                <a16:creationId xmlns:a16="http://schemas.microsoft.com/office/drawing/2014/main" id="{375ACA47-0B4C-E7D2-6AB3-B45A95E66761}"/>
+              </a:ext>
+            </a:extLst>
+          </p:cNvPr>
+          <p:cNvCxnSpPr>
+            <a:cxnSpLocks/>
+          </p:cNvCxnSpPr>
+          <p:nvPr/>
+        </p:nvCxnSpPr>
+        <p:spPr>
+          <a:xfrm>
+            <a:off x="5117882" y="3986212"/>
+            <a:ext cx="218863" cy="1120762"/>
+          </a:xfrm>
+          <a:prstGeom prst="line">
+            <a:avLst/>
+          </a:prstGeom>
+          <a:ln w="38100">
+            <a:solidFill>
+              <a:srgbClr val="7030A0"/>
+            </a:solidFill>
+          </a:ln>
+        </p:spPr>
+        <p:style>
+          <a:lnRef idx="1">
+            <a:schemeClr val="accent1"/>
+          </a:lnRef>
+          <a:fillRef idx="0">
+            <a:schemeClr val="accent1"/>
+          </a:fillRef>
+          <a:effectRef idx="0">
+            <a:schemeClr val="accent1"/>
+          </a:effectRef>
+          <a:fontRef idx="minor">
+            <a:schemeClr val="tx1"/>
+          </a:fontRef>
+        </p:style>
+      </p:cxnSp>
+      <p:cxnSp>
+        <p:nvCxnSpPr>
+          <p:cNvPr id="3090" name="Straight Connector 3089">
+            <a:extLst>
+              <a:ext uri="{FF2B5EF4-FFF2-40B4-BE49-F238E27FC236}">
+                <a16:creationId xmlns:a16="http://schemas.microsoft.com/office/drawing/2014/main" id="{28F0B7D6-8DD1-BD9C-12E7-984AB91089CA}"/>
+              </a:ext>
+            </a:extLst>
+          </p:cNvPr>
+          <p:cNvCxnSpPr>
+            <a:cxnSpLocks/>
+          </p:cNvCxnSpPr>
+          <p:nvPr/>
+        </p:nvCxnSpPr>
+        <p:spPr>
+          <a:xfrm flipH="1">
+            <a:off x="4056726" y="3974098"/>
+            <a:ext cx="385097" cy="1132876"/>
+          </a:xfrm>
+          <a:prstGeom prst="line">
+            <a:avLst/>
+          </a:prstGeom>
+          <a:ln w="38100">
+            <a:solidFill>
+              <a:srgbClr val="7030A0"/>
+            </a:solidFill>
+          </a:ln>
+        </p:spPr>
+        <p:style>
+          <a:lnRef idx="1">
+            <a:schemeClr val="accent1"/>
+          </a:lnRef>
+          <a:fillRef idx="0">
+            <a:schemeClr val="accent1"/>
+          </a:fillRef>
+          <a:effectRef idx="0">
+            <a:schemeClr val="accent1"/>
+          </a:effectRef>
+          <a:fontRef idx="minor">
+            <a:schemeClr val="tx1"/>
+          </a:fontRef>
+        </p:style>
+      </p:cxnSp>
+    </p:spTree>
+    <p:extLst>
+      <p:ext uri="{BB962C8B-B14F-4D97-AF65-F5344CB8AC3E}">
+        <p14:creationId xmlns:p14="http://schemas.microsoft.com/office/powerpoint/2010/main" val="1844468882"/>
+      </p:ext>
+    </p:extLst>
+  </p:cSld>
+  <p:clrMapOvr>
+    <a:masterClrMapping/>
+  </p:clrMapOvr>
+</p:sld>
+</file>
+
+<file path=ppt/slides/slide5.xml><?xml version="1.0" encoding="utf-8"?>
+<p:sld xmlns:a="http://schemas.openxmlformats.org/drawingml/2006/main" xmlns:r="http://schemas.openxmlformats.org/officeDocument/2006/relationships" xmlns:p="http://schemas.openxmlformats.org/presentationml/2006/main">
+  <p:cSld>
+    <p:spTree>
+      <p:nvGrpSpPr>
+        <p:cNvPr id="1" name=""/>
+        <p:cNvGrpSpPr/>
+        <p:nvPr/>
+      </p:nvGrpSpPr>
+      <p:grpSpPr>
+        <a:xfrm>
+          <a:off x="0" y="0"/>
+          <a:ext cx="0" cy="0"/>
+          <a:chOff x="0" y="0"/>
+          <a:chExt cx="0" cy="0"/>
+        </a:xfrm>
+      </p:grpSpPr>
+      <p:pic>
+        <p:nvPicPr>
+          <p:cNvPr id="3094" name="Picture 3093" descr="A screenshot of a video game&#10;&#10;Description automatically generated with medium confidence">
+            <a:extLst>
+              <a:ext uri="{FF2B5EF4-FFF2-40B4-BE49-F238E27FC236}">
+                <a16:creationId xmlns:a16="http://schemas.microsoft.com/office/drawing/2014/main" id="{79364013-CCCD-A130-ACAF-CC880C45AD97}"/>
+              </a:ext>
+            </a:extLst>
+          </p:cNvPr>
+          <p:cNvPicPr>
+            <a:picLocks noChangeAspect="1"/>
+          </p:cNvPicPr>
+          <p:nvPr/>
+        </p:nvPicPr>
+        <p:blipFill rotWithShape="1">
+          <a:blip r:embed="rId2">
+            <a:extLst>
+              <a:ext uri="{28A0092B-C50C-407E-A947-70E740481C1C}">
+                <a14:useLocalDpi xmlns:a14="http://schemas.microsoft.com/office/drawing/2010/main" val="0"/>
+              </a:ext>
+            </a:extLst>
+          </a:blip>
+          <a:srcRect/>
+          <a:stretch/>
+        </p:blipFill>
+        <p:spPr>
+          <a:xfrm>
+            <a:off x="1515816" y="625965"/>
+            <a:ext cx="7585225" cy="5001590"/>
+          </a:xfrm>
+          <a:prstGeom prst="rect">
+            <a:avLst/>
+          </a:prstGeom>
+        </p:spPr>
+      </p:pic>
+    </p:spTree>
+    <p:extLst>
+      <p:ext uri="{BB962C8B-B14F-4D97-AF65-F5344CB8AC3E}">
+        <p14:creationId xmlns:p14="http://schemas.microsoft.com/office/powerpoint/2010/main" val="1969125986"/>
+      </p:ext>
+    </p:extLst>
+  </p:cSld>
+  <p:clrMapOvr>
+    <a:masterClrMapping/>
+  </p:clrMapOvr>
+</p:sld>
+</file>
+
+<file path=ppt/slides/slide6.xml><?xml version="1.0" encoding="utf-8"?>
 <p:sld xmlns:a="http://schemas.openxmlformats.org/drawingml/2006/main" xmlns:r="http://schemas.openxmlformats.org/officeDocument/2006/relationships" xmlns:p="http://schemas.openxmlformats.org/presentationml/2006/main">
   <p:cSld>
     <p:spTree>
@@ -19104,7 +20097,7 @@
 </p:sld>
 </file>
 
-<file path=ppt/slides/slide5.xml><?xml version="1.0" encoding="utf-8"?>
+<file path=ppt/slides/slide7.xml><?xml version="1.0" encoding="utf-8"?>
 <p:sld xmlns:a="http://schemas.openxmlformats.org/drawingml/2006/main" xmlns:r="http://schemas.openxmlformats.org/officeDocument/2006/relationships" xmlns:p="http://schemas.openxmlformats.org/presentationml/2006/main">
   <p:cSld>
     <p:spTree>
@@ -20711,7 +21704,7 @@
 </p:sld>
 </file>
 
-<file path=ppt/slides/slide6.xml><?xml version="1.0" encoding="utf-8"?>
+<file path=ppt/slides/slide8.xml><?xml version="1.0" encoding="utf-8"?>
 <p:sld xmlns:a="http://schemas.openxmlformats.org/drawingml/2006/main" xmlns:r="http://schemas.openxmlformats.org/officeDocument/2006/relationships" xmlns:p="http://schemas.openxmlformats.org/presentationml/2006/main">
   <p:cSld>
     <p:spTree>

</xml_diff>

<commit_message>
Removed some features, textures, and classes. Redesigning viewport layouts.
</commit_message>
<xml_diff>
--- a/Beware/Content/designs.pptx
+++ b/Beware/Content/designs.pptx
@@ -280,7 +280,7 @@
           <a:p>
             <a:fld id="{355FB770-CC93-4F24-BE14-030DA79629D9}" type="datetimeFigureOut">
               <a:rPr lang="en-US" smtClean="0"/>
-              <a:t>2/19/2023</a:t>
+              <a:t>3/4/2023</a:t>
             </a:fld>
             <a:endParaRPr lang="en-US"/>
           </a:p>
@@ -478,7 +478,7 @@
           <a:p>
             <a:fld id="{355FB770-CC93-4F24-BE14-030DA79629D9}" type="datetimeFigureOut">
               <a:rPr lang="en-US" smtClean="0"/>
-              <a:t>2/19/2023</a:t>
+              <a:t>3/4/2023</a:t>
             </a:fld>
             <a:endParaRPr lang="en-US"/>
           </a:p>
@@ -686,7 +686,7 @@
           <a:p>
             <a:fld id="{355FB770-CC93-4F24-BE14-030DA79629D9}" type="datetimeFigureOut">
               <a:rPr lang="en-US" smtClean="0"/>
-              <a:t>2/19/2023</a:t>
+              <a:t>3/4/2023</a:t>
             </a:fld>
             <a:endParaRPr lang="en-US"/>
           </a:p>
@@ -884,7 +884,7 @@
           <a:p>
             <a:fld id="{355FB770-CC93-4F24-BE14-030DA79629D9}" type="datetimeFigureOut">
               <a:rPr lang="en-US" smtClean="0"/>
-              <a:t>2/19/2023</a:t>
+              <a:t>3/4/2023</a:t>
             </a:fld>
             <a:endParaRPr lang="en-US"/>
           </a:p>
@@ -1457,7 +1457,7 @@
           <a:p>
             <a:fld id="{355FB770-CC93-4F24-BE14-030DA79629D9}" type="datetimeFigureOut">
               <a:rPr lang="en-US" smtClean="0"/>
-              <a:t>2/19/2023</a:t>
+              <a:t>3/4/2023</a:t>
             </a:fld>
             <a:endParaRPr lang="en-US"/>
           </a:p>
@@ -1598,7 +1598,7 @@
           <a:p>
             <a:fld id="{355FB770-CC93-4F24-BE14-030DA79629D9}" type="datetimeFigureOut">
               <a:rPr lang="en-US" smtClean="0"/>
-              <a:t>2/19/2023</a:t>
+              <a:t>3/4/2023</a:t>
             </a:fld>
             <a:endParaRPr lang="en-US"/>
           </a:p>
@@ -1711,7 +1711,7 @@
           <a:p>
             <a:fld id="{355FB770-CC93-4F24-BE14-030DA79629D9}" type="datetimeFigureOut">
               <a:rPr lang="en-US" smtClean="0"/>
-              <a:t>2/19/2023</a:t>
+              <a:t>3/4/2023</a:t>
             </a:fld>
             <a:endParaRPr lang="en-US"/>
           </a:p>
@@ -2022,7 +2022,7 @@
           <a:p>
             <a:fld id="{355FB770-CC93-4F24-BE14-030DA79629D9}" type="datetimeFigureOut">
               <a:rPr lang="en-US" smtClean="0"/>
-              <a:t>2/19/2023</a:t>
+              <a:t>3/4/2023</a:t>
             </a:fld>
             <a:endParaRPr lang="en-US"/>
           </a:p>
@@ -2310,7 +2310,7 @@
           <a:p>
             <a:fld id="{355FB770-CC93-4F24-BE14-030DA79629D9}" type="datetimeFigureOut">
               <a:rPr lang="en-US" smtClean="0"/>
-              <a:t>2/19/2023</a:t>
+              <a:t>3/4/2023</a:t>
             </a:fld>
             <a:endParaRPr lang="en-US"/>
           </a:p>
@@ -2551,7 +2551,7 @@
           <a:p>
             <a:fld id="{355FB770-CC93-4F24-BE14-030DA79629D9}" type="datetimeFigureOut">
               <a:rPr lang="en-US" smtClean="0"/>
-              <a:t>2/19/2023</a:t>
+              <a:t>3/4/2023</a:t>
             </a:fld>
             <a:endParaRPr lang="en-US"/>
           </a:p>
@@ -10827,12 +10827,365 @@
           <a:chExt cx="0" cy="0"/>
         </a:xfrm>
       </p:grpSpPr>
+      <p:sp>
+        <p:nvSpPr>
+          <p:cNvPr id="12" name="Rectangle 11">
+            <a:extLst>
+              <a:ext uri="{FF2B5EF4-FFF2-40B4-BE49-F238E27FC236}">
+                <a16:creationId xmlns:a16="http://schemas.microsoft.com/office/drawing/2014/main" id="{C1FBB932-252C-1AD3-0C7D-0E8A30A264F8}"/>
+              </a:ext>
+            </a:extLst>
+          </p:cNvPr>
+          <p:cNvSpPr/>
+          <p:nvPr/>
+        </p:nvSpPr>
+        <p:spPr>
+          <a:xfrm>
+            <a:off x="381323" y="168749"/>
+            <a:ext cx="5486400" cy="3429000"/>
+          </a:xfrm>
+          <a:prstGeom prst="rect">
+            <a:avLst/>
+          </a:prstGeom>
+          <a:solidFill>
+            <a:schemeClr val="tx1">
+              <a:lumMod val="85000"/>
+              <a:lumOff val="15000"/>
+            </a:schemeClr>
+          </a:solidFill>
+        </p:spPr>
+        <p:style>
+          <a:lnRef idx="2">
+            <a:schemeClr val="accent1">
+              <a:shade val="50000"/>
+            </a:schemeClr>
+          </a:lnRef>
+          <a:fillRef idx="1">
+            <a:schemeClr val="accent1"/>
+          </a:fillRef>
+          <a:effectRef idx="0">
+            <a:schemeClr val="accent1"/>
+          </a:effectRef>
+          <a:fontRef idx="minor">
+            <a:schemeClr val="lt1"/>
+          </a:fontRef>
+        </p:style>
+        <p:txBody>
+          <a:bodyPr rtlCol="0" anchor="ctr"/>
+          <a:lstStyle/>
+          <a:p>
+            <a:pPr algn="ctr"/>
+            <a:endParaRPr lang="en-US"/>
+          </a:p>
+        </p:txBody>
+      </p:sp>
+      <p:sp>
+        <p:nvSpPr>
+          <p:cNvPr id="13" name="Rectangle 12">
+            <a:extLst>
+              <a:ext uri="{FF2B5EF4-FFF2-40B4-BE49-F238E27FC236}">
+                <a16:creationId xmlns:a16="http://schemas.microsoft.com/office/drawing/2014/main" id="{8015612E-3D72-A7F2-02AF-81C666B91ABF}"/>
+              </a:ext>
+            </a:extLst>
+          </p:cNvPr>
+          <p:cNvSpPr/>
+          <p:nvPr/>
+        </p:nvSpPr>
+        <p:spPr>
+          <a:xfrm>
+            <a:off x="381322" y="168749"/>
+            <a:ext cx="1346412" cy="3429000"/>
+          </a:xfrm>
+          <a:prstGeom prst="rect">
+            <a:avLst/>
+          </a:prstGeom>
+          <a:solidFill>
+            <a:srgbClr val="0070C0"/>
+          </a:solidFill>
+          <a:ln>
+            <a:noFill/>
+          </a:ln>
+        </p:spPr>
+        <p:style>
+          <a:lnRef idx="2">
+            <a:schemeClr val="accent1">
+              <a:shade val="50000"/>
+            </a:schemeClr>
+          </a:lnRef>
+          <a:fillRef idx="1">
+            <a:schemeClr val="accent1"/>
+          </a:fillRef>
+          <a:effectRef idx="0">
+            <a:schemeClr val="accent1"/>
+          </a:effectRef>
+          <a:fontRef idx="minor">
+            <a:schemeClr val="lt1"/>
+          </a:fontRef>
+        </p:style>
+        <p:txBody>
+          <a:bodyPr rtlCol="0" anchor="ctr"/>
+          <a:lstStyle/>
+          <a:p>
+            <a:pPr algn="ctr"/>
+            <a:endParaRPr lang="en-US"/>
+          </a:p>
+        </p:txBody>
+      </p:sp>
+      <p:pic>
+        <p:nvPicPr>
+          <p:cNvPr id="31" name="Picture 30" descr="Shape&#10;&#10;Description automatically generated">
+            <a:extLst>
+              <a:ext uri="{FF2B5EF4-FFF2-40B4-BE49-F238E27FC236}">
+                <a16:creationId xmlns:a16="http://schemas.microsoft.com/office/drawing/2014/main" id="{0C91E640-4A0B-3004-1FC1-03BD862F8CAE}"/>
+              </a:ext>
+            </a:extLst>
+          </p:cNvPr>
+          <p:cNvPicPr>
+            <a:picLocks noChangeAspect="1"/>
+          </p:cNvPicPr>
+          <p:nvPr/>
+        </p:nvPicPr>
+        <p:blipFill>
+          <a:blip r:embed="rId2">
+            <a:extLst>
+              <a:ext uri="{28A0092B-C50C-407E-A947-70E740481C1C}">
+                <a14:useLocalDpi xmlns:a14="http://schemas.microsoft.com/office/drawing/2010/main" val="0"/>
+              </a:ext>
+            </a:extLst>
+          </a:blip>
+          <a:stretch>
+            <a:fillRect/>
+          </a:stretch>
+        </p:blipFill>
+        <p:spPr>
+          <a:xfrm>
+            <a:off x="6086627" y="3829262"/>
+            <a:ext cx="811884" cy="2601909"/>
+          </a:xfrm>
+          <a:prstGeom prst="rect">
+            <a:avLst/>
+          </a:prstGeom>
+        </p:spPr>
+      </p:pic>
+      <p:pic>
+        <p:nvPicPr>
+          <p:cNvPr id="33" name="Picture 32" descr="Shape&#10;&#10;Description automatically generated with low confidence">
+            <a:extLst>
+              <a:ext uri="{FF2B5EF4-FFF2-40B4-BE49-F238E27FC236}">
+                <a16:creationId xmlns:a16="http://schemas.microsoft.com/office/drawing/2014/main" id="{7C001A22-8393-0D14-929E-ECD6A3FBF8DD}"/>
+              </a:ext>
+            </a:extLst>
+          </p:cNvPr>
+          <p:cNvPicPr>
+            <a:picLocks noChangeAspect="1"/>
+          </p:cNvPicPr>
+          <p:nvPr/>
+        </p:nvPicPr>
+        <p:blipFill>
+          <a:blip r:embed="rId3">
+            <a:extLst>
+              <a:ext uri="{28A0092B-C50C-407E-A947-70E740481C1C}">
+                <a14:useLocalDpi xmlns:a14="http://schemas.microsoft.com/office/drawing/2010/main" val="0"/>
+              </a:ext>
+            </a:extLst>
+          </a:blip>
+          <a:stretch>
+            <a:fillRect/>
+          </a:stretch>
+        </p:blipFill>
+        <p:spPr>
+          <a:xfrm>
+            <a:off x="11309211" y="3829262"/>
+            <a:ext cx="822968" cy="2601909"/>
+          </a:xfrm>
+          <a:prstGeom prst="rect">
+            <a:avLst/>
+          </a:prstGeom>
+        </p:spPr>
+      </p:pic>
+      <p:sp>
+        <p:nvSpPr>
+          <p:cNvPr id="34" name="Rectangle 33">
+            <a:extLst>
+              <a:ext uri="{FF2B5EF4-FFF2-40B4-BE49-F238E27FC236}">
+                <a16:creationId xmlns:a16="http://schemas.microsoft.com/office/drawing/2014/main" id="{ADCDA667-3B05-520F-CEF0-62A5C51E5B97}"/>
+              </a:ext>
+            </a:extLst>
+          </p:cNvPr>
+          <p:cNvSpPr/>
+          <p:nvPr/>
+        </p:nvSpPr>
+        <p:spPr>
+          <a:xfrm>
+            <a:off x="6876777" y="3829262"/>
+            <a:ext cx="4432434" cy="2601909"/>
+          </a:xfrm>
+          <a:prstGeom prst="rect">
+            <a:avLst/>
+          </a:prstGeom>
+          <a:ln>
+            <a:noFill/>
+          </a:ln>
+        </p:spPr>
+        <p:style>
+          <a:lnRef idx="2">
+            <a:schemeClr val="dk1">
+              <a:shade val="50000"/>
+            </a:schemeClr>
+          </a:lnRef>
+          <a:fillRef idx="1">
+            <a:schemeClr val="dk1"/>
+          </a:fillRef>
+          <a:effectRef idx="0">
+            <a:schemeClr val="dk1"/>
+          </a:effectRef>
+          <a:fontRef idx="minor">
+            <a:schemeClr val="lt1"/>
+          </a:fontRef>
+        </p:style>
+        <p:txBody>
+          <a:bodyPr rtlCol="0" anchor="ctr"/>
+          <a:lstStyle/>
+          <a:p>
+            <a:pPr algn="ctr"/>
+            <a:endParaRPr lang="en-US"/>
+          </a:p>
+        </p:txBody>
+      </p:sp>
+      <p:sp>
+        <p:nvSpPr>
+          <p:cNvPr id="35" name="Oval 34">
+            <a:extLst>
+              <a:ext uri="{FF2B5EF4-FFF2-40B4-BE49-F238E27FC236}">
+                <a16:creationId xmlns:a16="http://schemas.microsoft.com/office/drawing/2014/main" id="{08D2EBAC-8268-7B9F-1550-4BE75BF0F404}"/>
+              </a:ext>
+            </a:extLst>
+          </p:cNvPr>
+          <p:cNvSpPr/>
+          <p:nvPr/>
+        </p:nvSpPr>
+        <p:spPr>
+          <a:xfrm>
+            <a:off x="11540918" y="5098161"/>
+            <a:ext cx="359555" cy="359555"/>
+          </a:xfrm>
+          <a:prstGeom prst="ellipse">
+            <a:avLst/>
+          </a:prstGeom>
+          <a:scene3d>
+            <a:camera prst="orthographicFront"/>
+            <a:lightRig rig="balanced" dir="t"/>
+          </a:scene3d>
+          <a:sp3d extrusionH="127000" prstMaterial="plastic">
+            <a:bevelT w="127000" h="127000"/>
+            <a:extrusionClr>
+              <a:schemeClr val="bg1">
+                <a:lumMod val="95000"/>
+              </a:schemeClr>
+            </a:extrusionClr>
+          </a:sp3d>
+        </p:spPr>
+        <p:style>
+          <a:lnRef idx="2">
+            <a:schemeClr val="dk1">
+              <a:shade val="50000"/>
+            </a:schemeClr>
+          </a:lnRef>
+          <a:fillRef idx="1">
+            <a:schemeClr val="dk1"/>
+          </a:fillRef>
+          <a:effectRef idx="0">
+            <a:schemeClr val="dk1"/>
+          </a:effectRef>
+          <a:fontRef idx="minor">
+            <a:schemeClr val="lt1"/>
+          </a:fontRef>
+        </p:style>
+        <p:txBody>
+          <a:bodyPr rtlCol="0" anchor="ctr"/>
+          <a:lstStyle/>
+          <a:p>
+            <a:pPr algn="ctr"/>
+            <a:endParaRPr lang="en-US">
+              <a:solidFill>
+                <a:schemeClr val="bg1">
+                  <a:lumMod val="95000"/>
+                </a:schemeClr>
+              </a:solidFill>
+            </a:endParaRPr>
+          </a:p>
+        </p:txBody>
+      </p:sp>
+      <p:sp>
+        <p:nvSpPr>
+          <p:cNvPr id="36" name="Oval 35">
+            <a:extLst>
+              <a:ext uri="{FF2B5EF4-FFF2-40B4-BE49-F238E27FC236}">
+                <a16:creationId xmlns:a16="http://schemas.microsoft.com/office/drawing/2014/main" id="{A7605739-E284-7483-7F42-3530D61CEB72}"/>
+              </a:ext>
+            </a:extLst>
+          </p:cNvPr>
+          <p:cNvSpPr/>
+          <p:nvPr/>
+        </p:nvSpPr>
+        <p:spPr>
+          <a:xfrm>
+            <a:off x="6312792" y="4340134"/>
+            <a:ext cx="359555" cy="359555"/>
+          </a:xfrm>
+          <a:prstGeom prst="ellipse">
+            <a:avLst/>
+          </a:prstGeom>
+          <a:scene3d>
+            <a:camera prst="orthographicFront"/>
+            <a:lightRig rig="balanced" dir="t"/>
+          </a:scene3d>
+          <a:sp3d extrusionH="127000" prstMaterial="plastic">
+            <a:bevelT w="127000" h="127000"/>
+            <a:extrusionClr>
+              <a:schemeClr val="bg1">
+                <a:lumMod val="95000"/>
+              </a:schemeClr>
+            </a:extrusionClr>
+          </a:sp3d>
+        </p:spPr>
+        <p:style>
+          <a:lnRef idx="2">
+            <a:schemeClr val="dk1">
+              <a:shade val="50000"/>
+            </a:schemeClr>
+          </a:lnRef>
+          <a:fillRef idx="1">
+            <a:schemeClr val="dk1"/>
+          </a:fillRef>
+          <a:effectRef idx="0">
+            <a:schemeClr val="dk1"/>
+          </a:effectRef>
+          <a:fontRef idx="minor">
+            <a:schemeClr val="lt1"/>
+          </a:fontRef>
+        </p:style>
+        <p:txBody>
+          <a:bodyPr rtlCol="0" anchor="ctr"/>
+          <a:lstStyle/>
+          <a:p>
+            <a:pPr algn="ctr"/>
+            <a:endParaRPr lang="en-US">
+              <a:solidFill>
+                <a:schemeClr val="bg1">
+                  <a:lumMod val="95000"/>
+                </a:schemeClr>
+              </a:solidFill>
+            </a:endParaRPr>
+          </a:p>
+        </p:txBody>
+      </p:sp>
       <p:grpSp>
         <p:nvGrpSpPr>
-          <p:cNvPr id="10" name="Group 9">
-            <a:extLst>
-              <a:ext uri="{FF2B5EF4-FFF2-40B4-BE49-F238E27FC236}">
-                <a16:creationId xmlns:a16="http://schemas.microsoft.com/office/drawing/2014/main" id="{BC93CD59-454F-3EFE-484F-5F0A803F8B10}"/>
+          <p:cNvPr id="45" name="Group 44">
+            <a:extLst>
+              <a:ext uri="{FF2B5EF4-FFF2-40B4-BE49-F238E27FC236}">
+                <a16:creationId xmlns:a16="http://schemas.microsoft.com/office/drawing/2014/main" id="{80A909C2-FB9E-4FCE-A0D1-968396809909}"/>
               </a:ext>
             </a:extLst>
           </p:cNvPr>
@@ -10841,901 +11194,785 @@
         </p:nvGrpSpPr>
         <p:grpSpPr>
           <a:xfrm>
-            <a:off x="609600" y="0"/>
-            <a:ext cx="5486400" cy="3429000"/>
-            <a:chOff x="609600" y="0"/>
-            <a:chExt cx="5486400" cy="3429000"/>
+            <a:off x="11442679" y="4325765"/>
+            <a:ext cx="556033" cy="556033"/>
+            <a:chOff x="1685582" y="3178638"/>
+            <a:chExt cx="556033" cy="556033"/>
           </a:xfrm>
         </p:grpSpPr>
-        <p:sp>
-          <p:nvSpPr>
-            <p:cNvPr id="4" name="Rectangle 3">
+        <p:grpSp>
+          <p:nvGrpSpPr>
+            <p:cNvPr id="41" name="Group 40">
               <a:extLst>
                 <a:ext uri="{FF2B5EF4-FFF2-40B4-BE49-F238E27FC236}">
-                  <a16:creationId xmlns:a16="http://schemas.microsoft.com/office/drawing/2014/main" id="{042740F2-ABDB-2859-9EB9-EA5A9D1669E8}"/>
+                  <a16:creationId xmlns:a16="http://schemas.microsoft.com/office/drawing/2014/main" id="{2772F9D1-2B68-097D-6B4C-450401B1BB22}"/>
                 </a:ext>
               </a:extLst>
             </p:cNvPr>
-            <p:cNvSpPr/>
+            <p:cNvGrpSpPr/>
             <p:nvPr/>
-          </p:nvSpPr>
-          <p:spPr>
+          </p:nvGrpSpPr>
+          <p:grpSpPr>
             <a:xfrm>
-              <a:off x="609600" y="0"/>
-              <a:ext cx="5486400" cy="3429000"/>
+              <a:off x="1884350" y="3178638"/>
+              <a:ext cx="158497" cy="556033"/>
+              <a:chOff x="2562617" y="3181289"/>
+              <a:chExt cx="158497" cy="556033"/>
             </a:xfrm>
-            <a:prstGeom prst="rect">
-              <a:avLst/>
-            </a:prstGeom>
-          </p:spPr>
-          <p:style>
-            <a:lnRef idx="2">
-              <a:schemeClr val="accent1">
-                <a:shade val="50000"/>
-              </a:schemeClr>
-            </a:lnRef>
-            <a:fillRef idx="1">
-              <a:schemeClr val="accent1"/>
-            </a:fillRef>
-            <a:effectRef idx="0">
-              <a:schemeClr val="accent1"/>
-            </a:effectRef>
-            <a:fontRef idx="minor">
-              <a:schemeClr val="lt1"/>
-            </a:fontRef>
-          </p:style>
-          <p:txBody>
-            <a:bodyPr rtlCol="0" anchor="ctr"/>
-            <a:lstStyle/>
-            <a:p>
-              <a:pPr algn="ctr"/>
-              <a:endParaRPr lang="en-US"/>
-            </a:p>
-          </p:txBody>
-        </p:sp>
-        <p:sp>
-          <p:nvSpPr>
-            <p:cNvPr id="5" name="Rectangle 4">
+          </p:grpSpPr>
+          <p:sp>
+            <p:nvSpPr>
+              <p:cNvPr id="37" name="Oval 36">
+                <a:extLst>
+                  <a:ext uri="{FF2B5EF4-FFF2-40B4-BE49-F238E27FC236}">
+                    <a16:creationId xmlns:a16="http://schemas.microsoft.com/office/drawing/2014/main" id="{719B4559-30E0-4E45-FA8D-36BED726649F}"/>
+                  </a:ext>
+                </a:extLst>
+              </p:cNvPr>
+              <p:cNvSpPr/>
+              <p:nvPr/>
+            </p:nvSpPr>
+            <p:spPr>
+              <a:xfrm>
+                <a:off x="2562617" y="3181289"/>
+                <a:ext cx="158497" cy="158497"/>
+              </a:xfrm>
+              <a:prstGeom prst="ellipse">
+                <a:avLst/>
+              </a:prstGeom>
+              <a:scene3d>
+                <a:camera prst="orthographicFront"/>
+                <a:lightRig rig="balanced" dir="t"/>
+              </a:scene3d>
+              <a:sp3d extrusionH="127000" prstMaterial="plastic">
+                <a:bevelT w="127000" h="127000"/>
+                <a:extrusionClr>
+                  <a:schemeClr val="bg1">
+                    <a:lumMod val="95000"/>
+                  </a:schemeClr>
+                </a:extrusionClr>
+              </a:sp3d>
+            </p:spPr>
+            <p:style>
+              <a:lnRef idx="2">
+                <a:schemeClr val="dk1">
+                  <a:shade val="50000"/>
+                </a:schemeClr>
+              </a:lnRef>
+              <a:fillRef idx="1">
+                <a:schemeClr val="dk1"/>
+              </a:fillRef>
+              <a:effectRef idx="0">
+                <a:schemeClr val="dk1"/>
+              </a:effectRef>
+              <a:fontRef idx="minor">
+                <a:schemeClr val="lt1"/>
+              </a:fontRef>
+            </p:style>
+            <p:txBody>
+              <a:bodyPr rtlCol="0" anchor="ctr"/>
+              <a:lstStyle/>
+              <a:p>
+                <a:pPr algn="ctr"/>
+                <a:endParaRPr lang="en-US" sz="2000">
+                  <a:solidFill>
+                    <a:schemeClr val="bg1">
+                      <a:lumMod val="95000"/>
+                    </a:schemeClr>
+                  </a:solidFill>
+                </a:endParaRPr>
+              </a:p>
+            </p:txBody>
+          </p:sp>
+          <p:sp>
+            <p:nvSpPr>
+              <p:cNvPr id="40" name="Oval 39">
+                <a:extLst>
+                  <a:ext uri="{FF2B5EF4-FFF2-40B4-BE49-F238E27FC236}">
+                    <a16:creationId xmlns:a16="http://schemas.microsoft.com/office/drawing/2014/main" id="{830EAFCC-6ED1-284B-FA7B-9198B89CD24F}"/>
+                  </a:ext>
+                </a:extLst>
+              </p:cNvPr>
+              <p:cNvSpPr/>
+              <p:nvPr/>
+            </p:nvSpPr>
+            <p:spPr>
+              <a:xfrm>
+                <a:off x="2562617" y="3578825"/>
+                <a:ext cx="158497" cy="158497"/>
+              </a:xfrm>
+              <a:prstGeom prst="ellipse">
+                <a:avLst/>
+              </a:prstGeom>
+              <a:scene3d>
+                <a:camera prst="orthographicFront"/>
+                <a:lightRig rig="balanced" dir="t"/>
+              </a:scene3d>
+              <a:sp3d extrusionH="127000" prstMaterial="plastic">
+                <a:bevelT w="127000" h="127000"/>
+                <a:extrusionClr>
+                  <a:schemeClr val="bg1">
+                    <a:lumMod val="95000"/>
+                  </a:schemeClr>
+                </a:extrusionClr>
+              </a:sp3d>
+            </p:spPr>
+            <p:style>
+              <a:lnRef idx="2">
+                <a:schemeClr val="dk1">
+                  <a:shade val="50000"/>
+                </a:schemeClr>
+              </a:lnRef>
+              <a:fillRef idx="1">
+                <a:schemeClr val="dk1"/>
+              </a:fillRef>
+              <a:effectRef idx="0">
+                <a:schemeClr val="dk1"/>
+              </a:effectRef>
+              <a:fontRef idx="minor">
+                <a:schemeClr val="lt1"/>
+              </a:fontRef>
+            </p:style>
+            <p:txBody>
+              <a:bodyPr rtlCol="0" anchor="ctr"/>
+              <a:lstStyle/>
+              <a:p>
+                <a:pPr algn="ctr"/>
+                <a:endParaRPr lang="en-US" sz="2000">
+                  <a:solidFill>
+                    <a:schemeClr val="bg1">
+                      <a:lumMod val="95000"/>
+                    </a:schemeClr>
+                  </a:solidFill>
+                </a:endParaRPr>
+              </a:p>
+            </p:txBody>
+          </p:sp>
+        </p:grpSp>
+        <p:grpSp>
+          <p:nvGrpSpPr>
+            <p:cNvPr id="42" name="Group 41">
               <a:extLst>
                 <a:ext uri="{FF2B5EF4-FFF2-40B4-BE49-F238E27FC236}">
-                  <a16:creationId xmlns:a16="http://schemas.microsoft.com/office/drawing/2014/main" id="{8DBB6DB4-8FF6-18B0-DE1A-3D2E090ECA3F}"/>
+                  <a16:creationId xmlns:a16="http://schemas.microsoft.com/office/drawing/2014/main" id="{90D9CE71-8727-9A14-55E0-BF7BB1175F2D}"/>
                 </a:ext>
               </a:extLst>
             </p:cNvPr>
-            <p:cNvSpPr/>
+            <p:cNvGrpSpPr/>
             <p:nvPr/>
-          </p:nvSpPr>
-          <p:spPr>
-            <a:xfrm>
-              <a:off x="609600" y="0"/>
-              <a:ext cx="932329" cy="3429000"/>
+          </p:nvGrpSpPr>
+          <p:grpSpPr>
+            <a:xfrm rot="5400000">
+              <a:off x="1884350" y="3178638"/>
+              <a:ext cx="158497" cy="556033"/>
+              <a:chOff x="2562617" y="3181289"/>
+              <a:chExt cx="158497" cy="556033"/>
             </a:xfrm>
-            <a:prstGeom prst="rect">
-              <a:avLst/>
-            </a:prstGeom>
-            <a:solidFill>
-              <a:schemeClr val="accent2"/>
-            </a:solidFill>
-            <a:ln>
-              <a:solidFill>
-                <a:schemeClr val="accent2"/>
-              </a:solidFill>
-            </a:ln>
-          </p:spPr>
-          <p:style>
-            <a:lnRef idx="2">
-              <a:schemeClr val="accent1">
-                <a:shade val="50000"/>
-              </a:schemeClr>
-            </a:lnRef>
-            <a:fillRef idx="1">
-              <a:schemeClr val="accent1"/>
-            </a:fillRef>
-            <a:effectRef idx="0">
-              <a:schemeClr val="accent1"/>
-            </a:effectRef>
-            <a:fontRef idx="minor">
-              <a:schemeClr val="lt1"/>
-            </a:fontRef>
-          </p:style>
-          <p:txBody>
-            <a:bodyPr rtlCol="0" anchor="ctr"/>
-            <a:lstStyle/>
-            <a:p>
-              <a:pPr algn="ctr"/>
-              <a:endParaRPr lang="en-US"/>
-            </a:p>
-          </p:txBody>
-        </p:sp>
-        <p:sp>
-          <p:nvSpPr>
-            <p:cNvPr id="6" name="Rectangle 5">
+          </p:grpSpPr>
+          <p:sp>
+            <p:nvSpPr>
+              <p:cNvPr id="43" name="Oval 42">
+                <a:extLst>
+                  <a:ext uri="{FF2B5EF4-FFF2-40B4-BE49-F238E27FC236}">
+                    <a16:creationId xmlns:a16="http://schemas.microsoft.com/office/drawing/2014/main" id="{8CA4D550-8CE9-8E23-7C3B-F35507DE7515}"/>
+                  </a:ext>
+                </a:extLst>
+              </p:cNvPr>
+              <p:cNvSpPr/>
+              <p:nvPr/>
+            </p:nvSpPr>
+            <p:spPr>
+              <a:xfrm>
+                <a:off x="2562617" y="3181289"/>
+                <a:ext cx="158497" cy="158497"/>
+              </a:xfrm>
+              <a:prstGeom prst="ellipse">
+                <a:avLst/>
+              </a:prstGeom>
+              <a:scene3d>
+                <a:camera prst="orthographicFront"/>
+                <a:lightRig rig="balanced" dir="t"/>
+              </a:scene3d>
+              <a:sp3d extrusionH="127000" prstMaterial="plastic">
+                <a:bevelT w="127000" h="127000"/>
+                <a:extrusionClr>
+                  <a:schemeClr val="bg1">
+                    <a:lumMod val="95000"/>
+                  </a:schemeClr>
+                </a:extrusionClr>
+              </a:sp3d>
+            </p:spPr>
+            <p:style>
+              <a:lnRef idx="2">
+                <a:schemeClr val="dk1">
+                  <a:shade val="50000"/>
+                </a:schemeClr>
+              </a:lnRef>
+              <a:fillRef idx="1">
+                <a:schemeClr val="dk1"/>
+              </a:fillRef>
+              <a:effectRef idx="0">
+                <a:schemeClr val="dk1"/>
+              </a:effectRef>
+              <a:fontRef idx="minor">
+                <a:schemeClr val="lt1"/>
+              </a:fontRef>
+            </p:style>
+            <p:txBody>
+              <a:bodyPr rtlCol="0" anchor="ctr"/>
+              <a:lstStyle/>
+              <a:p>
+                <a:pPr algn="ctr"/>
+                <a:endParaRPr lang="en-US" sz="2000">
+                  <a:solidFill>
+                    <a:schemeClr val="bg1">
+                      <a:lumMod val="95000"/>
+                    </a:schemeClr>
+                  </a:solidFill>
+                </a:endParaRPr>
+              </a:p>
+            </p:txBody>
+          </p:sp>
+          <p:sp>
+            <p:nvSpPr>
+              <p:cNvPr id="44" name="Oval 43">
+                <a:extLst>
+                  <a:ext uri="{FF2B5EF4-FFF2-40B4-BE49-F238E27FC236}">
+                    <a16:creationId xmlns:a16="http://schemas.microsoft.com/office/drawing/2014/main" id="{272891A5-6F0E-8467-007B-68809E4A3F7F}"/>
+                  </a:ext>
+                </a:extLst>
+              </p:cNvPr>
+              <p:cNvSpPr/>
+              <p:nvPr/>
+            </p:nvSpPr>
+            <p:spPr>
+              <a:xfrm>
+                <a:off x="2562617" y="3578825"/>
+                <a:ext cx="158497" cy="158497"/>
+              </a:xfrm>
+              <a:prstGeom prst="ellipse">
+                <a:avLst/>
+              </a:prstGeom>
+              <a:scene3d>
+                <a:camera prst="orthographicFront"/>
+                <a:lightRig rig="balanced" dir="t"/>
+              </a:scene3d>
+              <a:sp3d extrusionH="127000" prstMaterial="plastic">
+                <a:bevelT w="127000" h="127000"/>
+                <a:extrusionClr>
+                  <a:schemeClr val="bg1">
+                    <a:lumMod val="95000"/>
+                  </a:schemeClr>
+                </a:extrusionClr>
+              </a:sp3d>
+            </p:spPr>
+            <p:style>
+              <a:lnRef idx="2">
+                <a:schemeClr val="dk1">
+                  <a:shade val="50000"/>
+                </a:schemeClr>
+              </a:lnRef>
+              <a:fillRef idx="1">
+                <a:schemeClr val="dk1"/>
+              </a:fillRef>
+              <a:effectRef idx="0">
+                <a:schemeClr val="dk1"/>
+              </a:effectRef>
+              <a:fontRef idx="minor">
+                <a:schemeClr val="lt1"/>
+              </a:fontRef>
+            </p:style>
+            <p:txBody>
+              <a:bodyPr rtlCol="0" anchor="ctr"/>
+              <a:lstStyle/>
+              <a:p>
+                <a:pPr algn="ctr"/>
+                <a:endParaRPr lang="en-US" sz="2000">
+                  <a:solidFill>
+                    <a:schemeClr val="bg1">
+                      <a:lumMod val="95000"/>
+                    </a:schemeClr>
+                  </a:solidFill>
+                </a:endParaRPr>
+              </a:p>
+            </p:txBody>
+          </p:sp>
+        </p:grpSp>
+      </p:grpSp>
+      <p:grpSp>
+        <p:nvGrpSpPr>
+          <p:cNvPr id="46" name="Group 45">
+            <a:extLst>
+              <a:ext uri="{FF2B5EF4-FFF2-40B4-BE49-F238E27FC236}">
+                <a16:creationId xmlns:a16="http://schemas.microsoft.com/office/drawing/2014/main" id="{186C88AA-8BA6-E515-34D9-321A02B6A263}"/>
+              </a:ext>
+            </a:extLst>
+          </p:cNvPr>
+          <p:cNvGrpSpPr/>
+          <p:nvPr/>
+        </p:nvGrpSpPr>
+        <p:grpSpPr>
+          <a:xfrm>
+            <a:off x="6214553" y="4911468"/>
+            <a:ext cx="556033" cy="556033"/>
+            <a:chOff x="1685582" y="3178638"/>
+            <a:chExt cx="556033" cy="556033"/>
+          </a:xfrm>
+        </p:grpSpPr>
+        <p:grpSp>
+          <p:nvGrpSpPr>
+            <p:cNvPr id="47" name="Group 46">
               <a:extLst>
                 <a:ext uri="{FF2B5EF4-FFF2-40B4-BE49-F238E27FC236}">
-                  <a16:creationId xmlns:a16="http://schemas.microsoft.com/office/drawing/2014/main" id="{11573062-5F0B-CCCD-D445-B7CB4AC2D03C}"/>
+                  <a16:creationId xmlns:a16="http://schemas.microsoft.com/office/drawing/2014/main" id="{0B209E9F-5A92-A695-DBD4-450B97D45EB1}"/>
                 </a:ext>
               </a:extLst>
             </p:cNvPr>
-            <p:cNvSpPr/>
+            <p:cNvGrpSpPr/>
             <p:nvPr/>
-          </p:nvSpPr>
-          <p:spPr>
+          </p:nvGrpSpPr>
+          <p:grpSpPr>
             <a:xfrm>
-              <a:off x="5163671" y="0"/>
-              <a:ext cx="932329" cy="3429000"/>
+              <a:off x="1884350" y="3178638"/>
+              <a:ext cx="158497" cy="556033"/>
+              <a:chOff x="2562617" y="3181289"/>
+              <a:chExt cx="158497" cy="556033"/>
             </a:xfrm>
-            <a:prstGeom prst="rect">
-              <a:avLst/>
-            </a:prstGeom>
-            <a:solidFill>
-              <a:srgbClr val="7030A0"/>
-            </a:solidFill>
-            <a:ln>
-              <a:solidFill>
-                <a:srgbClr val="7030A0"/>
-              </a:solidFill>
-            </a:ln>
-          </p:spPr>
-          <p:style>
-            <a:lnRef idx="2">
-              <a:schemeClr val="accent1">
-                <a:shade val="50000"/>
-              </a:schemeClr>
-            </a:lnRef>
-            <a:fillRef idx="1">
-              <a:schemeClr val="accent1"/>
-            </a:fillRef>
-            <a:effectRef idx="0">
-              <a:schemeClr val="accent1"/>
-            </a:effectRef>
-            <a:fontRef idx="minor">
-              <a:schemeClr val="lt1"/>
-            </a:fontRef>
-          </p:style>
-          <p:txBody>
-            <a:bodyPr rtlCol="0" anchor="ctr"/>
-            <a:lstStyle/>
-            <a:p>
-              <a:pPr algn="ctr"/>
-              <a:endParaRPr lang="en-US"/>
-            </a:p>
-          </p:txBody>
-        </p:sp>
-        <p:sp>
-          <p:nvSpPr>
-            <p:cNvPr id="7" name="Rectangle 6">
+          </p:grpSpPr>
+          <p:sp>
+            <p:nvSpPr>
+              <p:cNvPr id="51" name="Oval 50">
+                <a:extLst>
+                  <a:ext uri="{FF2B5EF4-FFF2-40B4-BE49-F238E27FC236}">
+                    <a16:creationId xmlns:a16="http://schemas.microsoft.com/office/drawing/2014/main" id="{4723A209-DD93-D9DB-7E5F-508951BA1400}"/>
+                  </a:ext>
+                </a:extLst>
+              </p:cNvPr>
+              <p:cNvSpPr/>
+              <p:nvPr/>
+            </p:nvSpPr>
+            <p:spPr>
+              <a:xfrm>
+                <a:off x="2562617" y="3181289"/>
+                <a:ext cx="158497" cy="158497"/>
+              </a:xfrm>
+              <a:prstGeom prst="ellipse">
+                <a:avLst/>
+              </a:prstGeom>
+              <a:scene3d>
+                <a:camera prst="orthographicFront"/>
+                <a:lightRig rig="balanced" dir="t"/>
+              </a:scene3d>
+              <a:sp3d extrusionH="127000" prstMaterial="plastic">
+                <a:bevelT w="127000" h="127000"/>
+                <a:extrusionClr>
+                  <a:schemeClr val="bg1">
+                    <a:lumMod val="95000"/>
+                  </a:schemeClr>
+                </a:extrusionClr>
+              </a:sp3d>
+            </p:spPr>
+            <p:style>
+              <a:lnRef idx="2">
+                <a:schemeClr val="dk1">
+                  <a:shade val="50000"/>
+                </a:schemeClr>
+              </a:lnRef>
+              <a:fillRef idx="1">
+                <a:schemeClr val="dk1"/>
+              </a:fillRef>
+              <a:effectRef idx="0">
+                <a:schemeClr val="dk1"/>
+              </a:effectRef>
+              <a:fontRef idx="minor">
+                <a:schemeClr val="lt1"/>
+              </a:fontRef>
+            </p:style>
+            <p:txBody>
+              <a:bodyPr rtlCol="0" anchor="ctr"/>
+              <a:lstStyle/>
+              <a:p>
+                <a:pPr algn="ctr"/>
+                <a:endParaRPr lang="en-US" sz="2000">
+                  <a:solidFill>
+                    <a:schemeClr val="bg1">
+                      <a:lumMod val="95000"/>
+                    </a:schemeClr>
+                  </a:solidFill>
+                </a:endParaRPr>
+              </a:p>
+            </p:txBody>
+          </p:sp>
+          <p:sp>
+            <p:nvSpPr>
+              <p:cNvPr id="52" name="Oval 51">
+                <a:extLst>
+                  <a:ext uri="{FF2B5EF4-FFF2-40B4-BE49-F238E27FC236}">
+                    <a16:creationId xmlns:a16="http://schemas.microsoft.com/office/drawing/2014/main" id="{E406F00F-8A54-47D9-B730-2B93A2CCD538}"/>
+                  </a:ext>
+                </a:extLst>
+              </p:cNvPr>
+              <p:cNvSpPr/>
+              <p:nvPr/>
+            </p:nvSpPr>
+            <p:spPr>
+              <a:xfrm>
+                <a:off x="2562617" y="3578825"/>
+                <a:ext cx="158497" cy="158497"/>
+              </a:xfrm>
+              <a:prstGeom prst="ellipse">
+                <a:avLst/>
+              </a:prstGeom>
+              <a:scene3d>
+                <a:camera prst="orthographicFront"/>
+                <a:lightRig rig="balanced" dir="t"/>
+              </a:scene3d>
+              <a:sp3d extrusionH="127000" prstMaterial="plastic">
+                <a:bevelT w="127000" h="127000"/>
+                <a:extrusionClr>
+                  <a:schemeClr val="bg1">
+                    <a:lumMod val="95000"/>
+                  </a:schemeClr>
+                </a:extrusionClr>
+              </a:sp3d>
+            </p:spPr>
+            <p:style>
+              <a:lnRef idx="2">
+                <a:schemeClr val="dk1">
+                  <a:shade val="50000"/>
+                </a:schemeClr>
+              </a:lnRef>
+              <a:fillRef idx="1">
+                <a:schemeClr val="dk1"/>
+              </a:fillRef>
+              <a:effectRef idx="0">
+                <a:schemeClr val="dk1"/>
+              </a:effectRef>
+              <a:fontRef idx="minor">
+                <a:schemeClr val="lt1"/>
+              </a:fontRef>
+            </p:style>
+            <p:txBody>
+              <a:bodyPr rtlCol="0" anchor="ctr"/>
+              <a:lstStyle/>
+              <a:p>
+                <a:pPr algn="ctr"/>
+                <a:endParaRPr lang="en-US" sz="2000">
+                  <a:solidFill>
+                    <a:schemeClr val="bg1">
+                      <a:lumMod val="95000"/>
+                    </a:schemeClr>
+                  </a:solidFill>
+                </a:endParaRPr>
+              </a:p>
+            </p:txBody>
+          </p:sp>
+        </p:grpSp>
+        <p:grpSp>
+          <p:nvGrpSpPr>
+            <p:cNvPr id="48" name="Group 47">
               <a:extLst>
                 <a:ext uri="{FF2B5EF4-FFF2-40B4-BE49-F238E27FC236}">
-                  <a16:creationId xmlns:a16="http://schemas.microsoft.com/office/drawing/2014/main" id="{6135AAA9-AC67-0B31-008C-A7957BB44ECB}"/>
+                  <a16:creationId xmlns:a16="http://schemas.microsoft.com/office/drawing/2014/main" id="{D13EAFF3-7D4C-F91D-8B6E-073DCA416E93}"/>
                 </a:ext>
               </a:extLst>
             </p:cNvPr>
-            <p:cNvSpPr/>
+            <p:cNvGrpSpPr/>
             <p:nvPr/>
-          </p:nvSpPr>
-          <p:spPr>
-            <a:xfrm>
-              <a:off x="1541929" y="3110752"/>
-              <a:ext cx="3621742" cy="318247"/>
+          </p:nvGrpSpPr>
+          <p:grpSpPr>
+            <a:xfrm rot="5400000">
+              <a:off x="1884350" y="3178638"/>
+              <a:ext cx="158497" cy="556033"/>
+              <a:chOff x="2562617" y="3181289"/>
+              <a:chExt cx="158497" cy="556033"/>
             </a:xfrm>
-            <a:prstGeom prst="rect">
-              <a:avLst/>
-            </a:prstGeom>
+          </p:grpSpPr>
+          <p:sp>
+            <p:nvSpPr>
+              <p:cNvPr id="49" name="Oval 48">
+                <a:extLst>
+                  <a:ext uri="{FF2B5EF4-FFF2-40B4-BE49-F238E27FC236}">
+                    <a16:creationId xmlns:a16="http://schemas.microsoft.com/office/drawing/2014/main" id="{F6900E8E-E44A-EB7D-40B3-3A42B0CD0042}"/>
+                  </a:ext>
+                </a:extLst>
+              </p:cNvPr>
+              <p:cNvSpPr/>
+              <p:nvPr/>
+            </p:nvSpPr>
+            <p:spPr>
+              <a:xfrm>
+                <a:off x="2562617" y="3181289"/>
+                <a:ext cx="158497" cy="158497"/>
+              </a:xfrm>
+              <a:prstGeom prst="ellipse">
+                <a:avLst/>
+              </a:prstGeom>
+              <a:scene3d>
+                <a:camera prst="orthographicFront"/>
+                <a:lightRig rig="balanced" dir="t"/>
+              </a:scene3d>
+              <a:sp3d extrusionH="127000" prstMaterial="plastic">
+                <a:bevelT w="127000" h="127000"/>
+                <a:extrusionClr>
+                  <a:schemeClr val="bg1">
+                    <a:lumMod val="95000"/>
+                  </a:schemeClr>
+                </a:extrusionClr>
+              </a:sp3d>
+            </p:spPr>
+            <p:style>
+              <a:lnRef idx="2">
+                <a:schemeClr val="dk1">
+                  <a:shade val="50000"/>
+                </a:schemeClr>
+              </a:lnRef>
+              <a:fillRef idx="1">
+                <a:schemeClr val="dk1"/>
+              </a:fillRef>
+              <a:effectRef idx="0">
+                <a:schemeClr val="dk1"/>
+              </a:effectRef>
+              <a:fontRef idx="minor">
+                <a:schemeClr val="lt1"/>
+              </a:fontRef>
+            </p:style>
+            <p:txBody>
+              <a:bodyPr rtlCol="0" anchor="ctr"/>
+              <a:lstStyle/>
+              <a:p>
+                <a:pPr algn="ctr"/>
+                <a:endParaRPr lang="en-US" sz="2000">
+                  <a:solidFill>
+                    <a:schemeClr val="bg1">
+                      <a:lumMod val="95000"/>
+                    </a:schemeClr>
+                  </a:solidFill>
+                </a:endParaRPr>
+              </a:p>
+            </p:txBody>
+          </p:sp>
+          <p:sp>
+            <p:nvSpPr>
+              <p:cNvPr id="50" name="Oval 49">
+                <a:extLst>
+                  <a:ext uri="{FF2B5EF4-FFF2-40B4-BE49-F238E27FC236}">
+                    <a16:creationId xmlns:a16="http://schemas.microsoft.com/office/drawing/2014/main" id="{BE4FADA0-6588-385D-C7A1-24F8C77A1FCC}"/>
+                  </a:ext>
+                </a:extLst>
+              </p:cNvPr>
+              <p:cNvSpPr/>
+              <p:nvPr/>
+            </p:nvSpPr>
+            <p:spPr>
+              <a:xfrm>
+                <a:off x="2562617" y="3578825"/>
+                <a:ext cx="158497" cy="158497"/>
+              </a:xfrm>
+              <a:prstGeom prst="ellipse">
+                <a:avLst/>
+              </a:prstGeom>
+              <a:scene3d>
+                <a:camera prst="orthographicFront"/>
+                <a:lightRig rig="balanced" dir="t"/>
+              </a:scene3d>
+              <a:sp3d extrusionH="127000" prstMaterial="plastic">
+                <a:bevelT w="127000" h="127000"/>
+                <a:extrusionClr>
+                  <a:schemeClr val="bg1">
+                    <a:lumMod val="95000"/>
+                  </a:schemeClr>
+                </a:extrusionClr>
+              </a:sp3d>
+            </p:spPr>
+            <p:style>
+              <a:lnRef idx="2">
+                <a:schemeClr val="dk1">
+                  <a:shade val="50000"/>
+                </a:schemeClr>
+              </a:lnRef>
+              <a:fillRef idx="1">
+                <a:schemeClr val="dk1"/>
+              </a:fillRef>
+              <a:effectRef idx="0">
+                <a:schemeClr val="dk1"/>
+              </a:effectRef>
+              <a:fontRef idx="minor">
+                <a:schemeClr val="lt1"/>
+              </a:fontRef>
+            </p:style>
+            <p:txBody>
+              <a:bodyPr rtlCol="0" anchor="ctr"/>
+              <a:lstStyle/>
+              <a:p>
+                <a:pPr algn="ctr"/>
+                <a:endParaRPr lang="en-US" sz="2000">
+                  <a:solidFill>
+                    <a:schemeClr val="bg1">
+                      <a:lumMod val="95000"/>
+                    </a:schemeClr>
+                  </a:solidFill>
+                </a:endParaRPr>
+              </a:p>
+            </p:txBody>
+          </p:sp>
+        </p:grpSp>
+      </p:grpSp>
+      <p:sp>
+        <p:nvSpPr>
+          <p:cNvPr id="15" name="Rectangle 14">
+            <a:extLst>
+              <a:ext uri="{FF2B5EF4-FFF2-40B4-BE49-F238E27FC236}">
+                <a16:creationId xmlns:a16="http://schemas.microsoft.com/office/drawing/2014/main" id="{8EBD7C5D-4F73-C422-8CF4-3936905B7D25}"/>
+              </a:ext>
+            </a:extLst>
+          </p:cNvPr>
+          <p:cNvSpPr/>
+          <p:nvPr/>
+        </p:nvSpPr>
+        <p:spPr>
+          <a:xfrm>
+            <a:off x="381324" y="3279502"/>
+            <a:ext cx="5486400" cy="318247"/>
+          </a:xfrm>
+          <a:prstGeom prst="rect">
+            <a:avLst/>
+          </a:prstGeom>
+          <a:solidFill>
+            <a:srgbClr val="00B050"/>
+          </a:solidFill>
+          <a:ln>
             <a:solidFill>
               <a:srgbClr val="00B050"/>
             </a:solidFill>
-            <a:ln>
-              <a:solidFill>
-                <a:srgbClr val="00B050"/>
-              </a:solidFill>
-            </a:ln>
-          </p:spPr>
-          <p:style>
-            <a:lnRef idx="2">
-              <a:schemeClr val="accent1">
-                <a:shade val="50000"/>
-              </a:schemeClr>
-            </a:lnRef>
-            <a:fillRef idx="1">
-              <a:schemeClr val="accent1"/>
-            </a:fillRef>
-            <a:effectRef idx="0">
-              <a:schemeClr val="accent1"/>
-            </a:effectRef>
-            <a:fontRef idx="minor">
-              <a:schemeClr val="lt1"/>
-            </a:fontRef>
-          </p:style>
-          <p:txBody>
-            <a:bodyPr rtlCol="0" anchor="ctr"/>
-            <a:lstStyle/>
-            <a:p>
-              <a:pPr algn="ctr"/>
-              <a:endParaRPr lang="en-US"/>
-            </a:p>
-          </p:txBody>
-        </p:sp>
-        <p:pic>
-          <p:nvPicPr>
-            <p:cNvPr id="8" name="Picture 7" descr="Shape, icon&#10;&#10;Description automatically generated">
-              <a:extLst>
-                <a:ext uri="{FF2B5EF4-FFF2-40B4-BE49-F238E27FC236}">
-                  <a16:creationId xmlns:a16="http://schemas.microsoft.com/office/drawing/2014/main" id="{C66268D6-4118-B69B-E6E4-EE090246AAC1}"/>
-                </a:ext>
-              </a:extLst>
-            </p:cNvPr>
-            <p:cNvPicPr>
-              <a:picLocks noChangeAspect="1"/>
-            </p:cNvPicPr>
-            <p:nvPr/>
-          </p:nvPicPr>
-          <p:blipFill>
-            <a:blip r:embed="rId2">
-              <a:clrChange>
-                <a:clrFrom>
-                  <a:srgbClr val="FFFFFF"/>
-                </a:clrFrom>
-                <a:clrTo>
-                  <a:srgbClr val="FFFFFF">
-                    <a:alpha val="0"/>
-                  </a:srgbClr>
-                </a:clrTo>
-              </a:clrChange>
-              <a:extLst>
-                <a:ext uri="{28A0092B-C50C-407E-A947-70E740481C1C}">
-                  <a14:useLocalDpi xmlns:a14="http://schemas.microsoft.com/office/drawing/2010/main" val="0"/>
-                </a:ext>
-              </a:extLst>
-            </a:blip>
-            <a:stretch>
-              <a:fillRect/>
-            </a:stretch>
-          </p:blipFill>
-          <p:spPr>
-            <a:xfrm>
-              <a:off x="791536" y="435592"/>
-              <a:ext cx="568456" cy="568456"/>
-            </a:xfrm>
-            <a:prstGeom prst="rect">
-              <a:avLst/>
-            </a:prstGeom>
-          </p:spPr>
-        </p:pic>
-        <p:pic>
-          <p:nvPicPr>
-            <p:cNvPr id="9" name="Picture 8" descr="A picture containing queen&#10;&#10;Description automatically generated">
-              <a:extLst>
-                <a:ext uri="{FF2B5EF4-FFF2-40B4-BE49-F238E27FC236}">
-                  <a16:creationId xmlns:a16="http://schemas.microsoft.com/office/drawing/2014/main" id="{F4F995E9-CD56-4581-BB84-984AE1BD4127}"/>
-                </a:ext>
-              </a:extLst>
-            </p:cNvPr>
-            <p:cNvPicPr>
-              <a:picLocks noChangeAspect="1"/>
-            </p:cNvPicPr>
-            <p:nvPr/>
-          </p:nvPicPr>
-          <p:blipFill>
-            <a:blip r:embed="rId3">
-              <a:clrChange>
-                <a:clrFrom>
-                  <a:srgbClr val="FFFFFF"/>
-                </a:clrFrom>
-                <a:clrTo>
-                  <a:srgbClr val="FFFFFF">
-                    <a:alpha val="0"/>
-                  </a:srgbClr>
-                </a:clrTo>
-              </a:clrChange>
-              <a:extLst>
-                <a:ext uri="{28A0092B-C50C-407E-A947-70E740481C1C}">
-                  <a14:useLocalDpi xmlns:a14="http://schemas.microsoft.com/office/drawing/2010/main" val="0"/>
-                </a:ext>
-              </a:extLst>
-            </a:blip>
-            <a:stretch>
-              <a:fillRect/>
-            </a:stretch>
-          </p:blipFill>
-          <p:spPr>
-            <a:xfrm>
-              <a:off x="5332780" y="435592"/>
-              <a:ext cx="568456" cy="568456"/>
-            </a:xfrm>
-            <a:prstGeom prst="rect">
-              <a:avLst/>
-            </a:prstGeom>
-          </p:spPr>
-        </p:pic>
-      </p:grpSp>
-      <p:grpSp>
-        <p:nvGrpSpPr>
-          <p:cNvPr id="18" name="Group 17">
-            <a:extLst>
-              <a:ext uri="{FF2B5EF4-FFF2-40B4-BE49-F238E27FC236}">
-                <a16:creationId xmlns:a16="http://schemas.microsoft.com/office/drawing/2014/main" id="{EA85B2D6-8775-4D5D-FF78-9E505E5DB9F0}"/>
-              </a:ext>
-            </a:extLst>
-          </p:cNvPr>
-          <p:cNvGrpSpPr/>
-          <p:nvPr/>
-        </p:nvGrpSpPr>
-        <p:grpSpPr>
-          <a:xfrm>
-            <a:off x="6354041" y="0"/>
+          </a:ln>
+        </p:spPr>
+        <p:style>
+          <a:lnRef idx="2">
+            <a:schemeClr val="accent1">
+              <a:shade val="50000"/>
+            </a:schemeClr>
+          </a:lnRef>
+          <a:fillRef idx="1">
+            <a:schemeClr val="accent1"/>
+          </a:fillRef>
+          <a:effectRef idx="0">
+            <a:schemeClr val="accent1"/>
+          </a:effectRef>
+          <a:fontRef idx="minor">
+            <a:schemeClr val="lt1"/>
+          </a:fontRef>
+        </p:style>
+        <p:txBody>
+          <a:bodyPr rtlCol="0" anchor="ctr"/>
+          <a:lstStyle/>
+          <a:p>
+            <a:pPr algn="ctr"/>
+            <a:endParaRPr lang="en-US"/>
+          </a:p>
+        </p:txBody>
+      </p:sp>
+      <p:sp>
+        <p:nvSpPr>
+          <p:cNvPr id="53" name="Rectangle 52">
+            <a:extLst>
+              <a:ext uri="{FF2B5EF4-FFF2-40B4-BE49-F238E27FC236}">
+                <a16:creationId xmlns:a16="http://schemas.microsoft.com/office/drawing/2014/main" id="{88AD838E-EAD6-492A-4672-4B56A94B4DF1}"/>
+              </a:ext>
+            </a:extLst>
+          </p:cNvPr>
+          <p:cNvSpPr/>
+          <p:nvPr/>
+        </p:nvSpPr>
+        <p:spPr>
+          <a:xfrm>
+            <a:off x="6313544" y="161223"/>
             <a:ext cx="5486400" cy="3429000"/>
-            <a:chOff x="6400800" y="2537012"/>
-            <a:chExt cx="5486400" cy="3429000"/>
-          </a:xfrm>
-        </p:grpSpPr>
-        <p:sp>
-          <p:nvSpPr>
-            <p:cNvPr id="12" name="Rectangle 11">
-              <a:extLst>
-                <a:ext uri="{FF2B5EF4-FFF2-40B4-BE49-F238E27FC236}">
-                  <a16:creationId xmlns:a16="http://schemas.microsoft.com/office/drawing/2014/main" id="{C1FBB932-252C-1AD3-0C7D-0E8A30A264F8}"/>
-                </a:ext>
-              </a:extLst>
-            </p:cNvPr>
-            <p:cNvSpPr/>
-            <p:nvPr/>
-          </p:nvSpPr>
-          <p:spPr>
-            <a:xfrm>
-              <a:off x="6400800" y="2537012"/>
-              <a:ext cx="5486400" cy="3429000"/>
-            </a:xfrm>
-            <a:prstGeom prst="rect">
-              <a:avLst/>
-            </a:prstGeom>
-          </p:spPr>
-          <p:style>
-            <a:lnRef idx="2">
-              <a:schemeClr val="accent1">
-                <a:shade val="50000"/>
-              </a:schemeClr>
-            </a:lnRef>
-            <a:fillRef idx="1">
-              <a:schemeClr val="accent1"/>
-            </a:fillRef>
-            <a:effectRef idx="0">
-              <a:schemeClr val="accent1"/>
-            </a:effectRef>
-            <a:fontRef idx="minor">
-              <a:schemeClr val="lt1"/>
-            </a:fontRef>
-          </p:style>
-          <p:txBody>
-            <a:bodyPr rtlCol="0" anchor="ctr"/>
-            <a:lstStyle/>
-            <a:p>
-              <a:pPr algn="ctr"/>
-              <a:endParaRPr lang="en-US"/>
-            </a:p>
-          </p:txBody>
-        </p:sp>
-        <p:sp>
-          <p:nvSpPr>
-            <p:cNvPr id="14" name="Rectangle 13">
-              <a:extLst>
-                <a:ext uri="{FF2B5EF4-FFF2-40B4-BE49-F238E27FC236}">
-                  <a16:creationId xmlns:a16="http://schemas.microsoft.com/office/drawing/2014/main" id="{CD00C14B-84E4-B684-75F9-C03D8D4E587E}"/>
-                </a:ext>
-              </a:extLst>
-            </p:cNvPr>
-            <p:cNvSpPr/>
-            <p:nvPr/>
-          </p:nvSpPr>
-          <p:spPr>
-            <a:xfrm>
-              <a:off x="7333129" y="5100918"/>
-              <a:ext cx="4554071" cy="865094"/>
-            </a:xfrm>
-            <a:prstGeom prst="rect">
-              <a:avLst/>
-            </a:prstGeom>
-            <a:solidFill>
-              <a:srgbClr val="7030A0"/>
-            </a:solidFill>
-            <a:ln>
-              <a:solidFill>
-                <a:srgbClr val="7030A0"/>
-              </a:solidFill>
-            </a:ln>
-          </p:spPr>
-          <p:style>
-            <a:lnRef idx="2">
-              <a:schemeClr val="accent1">
-                <a:shade val="50000"/>
-              </a:schemeClr>
-            </a:lnRef>
-            <a:fillRef idx="1">
-              <a:schemeClr val="accent1"/>
-            </a:fillRef>
-            <a:effectRef idx="0">
-              <a:schemeClr val="accent1"/>
-            </a:effectRef>
-            <a:fontRef idx="minor">
-              <a:schemeClr val="lt1"/>
-            </a:fontRef>
-          </p:style>
-          <p:txBody>
-            <a:bodyPr rtlCol="0" anchor="ctr"/>
-            <a:lstStyle/>
-            <a:p>
-              <a:pPr algn="ctr"/>
-              <a:endParaRPr lang="en-US"/>
-            </a:p>
-          </p:txBody>
-        </p:sp>
-        <p:sp>
-          <p:nvSpPr>
-            <p:cNvPr id="15" name="Rectangle 14">
-              <a:extLst>
-                <a:ext uri="{FF2B5EF4-FFF2-40B4-BE49-F238E27FC236}">
-                  <a16:creationId xmlns:a16="http://schemas.microsoft.com/office/drawing/2014/main" id="{8EBD7C5D-4F73-C422-8CF4-3936905B7D25}"/>
-                </a:ext>
-              </a:extLst>
-            </p:cNvPr>
-            <p:cNvSpPr/>
-            <p:nvPr/>
-          </p:nvSpPr>
-          <p:spPr>
-            <a:xfrm>
-              <a:off x="7333128" y="4782671"/>
-              <a:ext cx="4554071" cy="318247"/>
-            </a:xfrm>
-            <a:prstGeom prst="rect">
-              <a:avLst/>
-            </a:prstGeom>
-            <a:solidFill>
-              <a:srgbClr val="00B050"/>
-            </a:solidFill>
-            <a:ln>
-              <a:solidFill>
-                <a:srgbClr val="00B050"/>
-              </a:solidFill>
-            </a:ln>
-          </p:spPr>
-          <p:style>
-            <a:lnRef idx="2">
-              <a:schemeClr val="accent1">
-                <a:shade val="50000"/>
-              </a:schemeClr>
-            </a:lnRef>
-            <a:fillRef idx="1">
-              <a:schemeClr val="accent1"/>
-            </a:fillRef>
-            <a:effectRef idx="0">
-              <a:schemeClr val="accent1"/>
-            </a:effectRef>
-            <a:fontRef idx="minor">
-              <a:schemeClr val="lt1"/>
-            </a:fontRef>
-          </p:style>
-          <p:txBody>
-            <a:bodyPr rtlCol="0" anchor="ctr"/>
-            <a:lstStyle/>
-            <a:p>
-              <a:pPr algn="ctr"/>
-              <a:endParaRPr lang="en-US"/>
-            </a:p>
-          </p:txBody>
-        </p:sp>
-        <p:pic>
-          <p:nvPicPr>
-            <p:cNvPr id="16" name="Picture 15" descr="Shape, icon&#10;&#10;Description automatically generated">
-              <a:extLst>
-                <a:ext uri="{FF2B5EF4-FFF2-40B4-BE49-F238E27FC236}">
-                  <a16:creationId xmlns:a16="http://schemas.microsoft.com/office/drawing/2014/main" id="{2DA8C226-7E5B-4F60-8BCD-E69FA2F2AC64}"/>
-                </a:ext>
-              </a:extLst>
-            </p:cNvPr>
-            <p:cNvPicPr>
-              <a:picLocks noChangeAspect="1"/>
-            </p:cNvPicPr>
-            <p:nvPr/>
-          </p:nvPicPr>
-          <p:blipFill>
-            <a:blip r:embed="rId2">
-              <a:clrChange>
-                <a:clrFrom>
-                  <a:srgbClr val="FFFFFF"/>
-                </a:clrFrom>
-                <a:clrTo>
-                  <a:srgbClr val="FFFFFF">
-                    <a:alpha val="0"/>
-                  </a:srgbClr>
-                </a:clrTo>
-              </a:clrChange>
-              <a:extLst>
-                <a:ext uri="{28A0092B-C50C-407E-A947-70E740481C1C}">
-                  <a14:useLocalDpi xmlns:a14="http://schemas.microsoft.com/office/drawing/2010/main" val="0"/>
-                </a:ext>
-              </a:extLst>
-            </a:blip>
-            <a:stretch>
-              <a:fillRect/>
-            </a:stretch>
-          </p:blipFill>
-          <p:spPr>
-            <a:xfrm>
-              <a:off x="7637929" y="5249237"/>
-              <a:ext cx="568456" cy="568456"/>
-            </a:xfrm>
-            <a:prstGeom prst="rect">
-              <a:avLst/>
-            </a:prstGeom>
-          </p:spPr>
-        </p:pic>
-        <p:pic>
-          <p:nvPicPr>
-            <p:cNvPr id="17" name="Picture 16" descr="A picture containing queen&#10;&#10;Description automatically generated">
-              <a:extLst>
-                <a:ext uri="{FF2B5EF4-FFF2-40B4-BE49-F238E27FC236}">
-                  <a16:creationId xmlns:a16="http://schemas.microsoft.com/office/drawing/2014/main" id="{BBFDFA68-AD9C-8504-96A1-5FD26D7BC6DC}"/>
-                </a:ext>
-              </a:extLst>
-            </p:cNvPr>
-            <p:cNvPicPr>
-              <a:picLocks noChangeAspect="1"/>
-            </p:cNvPicPr>
-            <p:nvPr/>
-          </p:nvPicPr>
-          <p:blipFill>
-            <a:blip r:embed="rId3">
-              <a:clrChange>
-                <a:clrFrom>
-                  <a:srgbClr val="FFFFFF"/>
-                </a:clrFrom>
-                <a:clrTo>
-                  <a:srgbClr val="FFFFFF">
-                    <a:alpha val="0"/>
-                  </a:srgbClr>
-                </a:clrTo>
-              </a:clrChange>
-              <a:extLst>
-                <a:ext uri="{28A0092B-C50C-407E-A947-70E740481C1C}">
-                  <a14:useLocalDpi xmlns:a14="http://schemas.microsoft.com/office/drawing/2010/main" val="0"/>
-                </a:ext>
-              </a:extLst>
-            </a:blip>
-            <a:stretch>
-              <a:fillRect/>
-            </a:stretch>
-          </p:blipFill>
-          <p:spPr>
-            <a:xfrm>
-              <a:off x="11039618" y="5249237"/>
-              <a:ext cx="568456" cy="568456"/>
-            </a:xfrm>
-            <a:prstGeom prst="rect">
-              <a:avLst/>
-            </a:prstGeom>
-          </p:spPr>
-        </p:pic>
-        <p:sp>
-          <p:nvSpPr>
-            <p:cNvPr id="13" name="Rectangle 12">
-              <a:extLst>
-                <a:ext uri="{FF2B5EF4-FFF2-40B4-BE49-F238E27FC236}">
-                  <a16:creationId xmlns:a16="http://schemas.microsoft.com/office/drawing/2014/main" id="{8015612E-3D72-A7F2-02AF-81C666B91ABF}"/>
-                </a:ext>
-              </a:extLst>
-            </p:cNvPr>
-            <p:cNvSpPr/>
-            <p:nvPr/>
-          </p:nvSpPr>
-          <p:spPr>
-            <a:xfrm>
-              <a:off x="6400800" y="2537012"/>
-              <a:ext cx="932329" cy="3429000"/>
-            </a:xfrm>
-            <a:prstGeom prst="rect">
-              <a:avLst/>
-            </a:prstGeom>
-            <a:solidFill>
-              <a:schemeClr val="accent2"/>
-            </a:solidFill>
-            <a:ln>
-              <a:solidFill>
-                <a:schemeClr val="accent2"/>
-              </a:solidFill>
-            </a:ln>
-          </p:spPr>
-          <p:style>
-            <a:lnRef idx="2">
-              <a:schemeClr val="accent1">
-                <a:shade val="50000"/>
-              </a:schemeClr>
-            </a:lnRef>
-            <a:fillRef idx="1">
-              <a:schemeClr val="accent1"/>
-            </a:fillRef>
-            <a:effectRef idx="0">
-              <a:schemeClr val="accent1"/>
-            </a:effectRef>
-            <a:fontRef idx="minor">
-              <a:schemeClr val="lt1"/>
-            </a:fontRef>
-          </p:style>
-          <p:txBody>
-            <a:bodyPr rtlCol="0" anchor="ctr"/>
-            <a:lstStyle/>
-            <a:p>
-              <a:pPr algn="ctr"/>
-              <a:endParaRPr lang="en-US"/>
-            </a:p>
-          </p:txBody>
-        </p:sp>
-      </p:grpSp>
-      <p:grpSp>
-        <p:nvGrpSpPr>
-          <p:cNvPr id="23" name="Group 22">
-            <a:extLst>
-              <a:ext uri="{FF2B5EF4-FFF2-40B4-BE49-F238E27FC236}">
-                <a16:creationId xmlns:a16="http://schemas.microsoft.com/office/drawing/2014/main" id="{68A5430B-B7EC-2F22-52D8-9A7ADD4A4401}"/>
-              </a:ext>
-            </a:extLst>
-          </p:cNvPr>
-          <p:cNvGrpSpPr/>
-          <p:nvPr/>
-        </p:nvGrpSpPr>
-        <p:grpSpPr>
-          <a:xfrm>
-            <a:off x="609600" y="3971058"/>
-            <a:ext cx="5486400" cy="2211533"/>
-            <a:chOff x="609600" y="3971058"/>
-            <a:chExt cx="5486400" cy="2211533"/>
-          </a:xfrm>
-        </p:grpSpPr>
-        <p:sp>
-          <p:nvSpPr>
-            <p:cNvPr id="3" name="Rectangle 2">
-              <a:extLst>
-                <a:ext uri="{FF2B5EF4-FFF2-40B4-BE49-F238E27FC236}">
-                  <a16:creationId xmlns:a16="http://schemas.microsoft.com/office/drawing/2014/main" id="{6C291D7B-DADD-2054-DC67-28537CA6F56B}"/>
-                </a:ext>
-              </a:extLst>
-            </p:cNvPr>
-            <p:cNvSpPr/>
-            <p:nvPr/>
-          </p:nvSpPr>
-          <p:spPr>
-            <a:xfrm>
-              <a:off x="609600" y="3971059"/>
-              <a:ext cx="5486400" cy="2211532"/>
-            </a:xfrm>
-            <a:prstGeom prst="rect">
-              <a:avLst/>
-            </a:prstGeom>
-          </p:spPr>
-          <p:style>
-            <a:lnRef idx="2">
-              <a:schemeClr val="accent1">
-                <a:shade val="50000"/>
-              </a:schemeClr>
-            </a:lnRef>
-            <a:fillRef idx="1">
-              <a:schemeClr val="accent1"/>
-            </a:fillRef>
-            <a:effectRef idx="0">
-              <a:schemeClr val="accent1"/>
-            </a:effectRef>
-            <a:fontRef idx="minor">
-              <a:schemeClr val="lt1"/>
-            </a:fontRef>
-          </p:style>
-          <p:txBody>
-            <a:bodyPr rtlCol="0" anchor="ctr"/>
-            <a:lstStyle/>
-            <a:p>
-              <a:pPr algn="ctr"/>
-              <a:endParaRPr lang="en-US"/>
-            </a:p>
-          </p:txBody>
-        </p:sp>
-        <p:sp>
-          <p:nvSpPr>
-            <p:cNvPr id="11" name="Rectangle 10">
-              <a:extLst>
-                <a:ext uri="{FF2B5EF4-FFF2-40B4-BE49-F238E27FC236}">
-                  <a16:creationId xmlns:a16="http://schemas.microsoft.com/office/drawing/2014/main" id="{C56C7F6E-F9F5-1248-E8D1-436B575D382A}"/>
-                </a:ext>
-              </a:extLst>
-            </p:cNvPr>
-            <p:cNvSpPr/>
-            <p:nvPr/>
-          </p:nvSpPr>
-          <p:spPr>
-            <a:xfrm>
-              <a:off x="5163671" y="3971058"/>
-              <a:ext cx="932329" cy="2211531"/>
-            </a:xfrm>
-            <a:prstGeom prst="rect">
-              <a:avLst/>
-            </a:prstGeom>
-            <a:solidFill>
-              <a:srgbClr val="7030A0"/>
-            </a:solidFill>
-            <a:ln>
-              <a:solidFill>
-                <a:srgbClr val="7030A0"/>
-              </a:solidFill>
-            </a:ln>
-          </p:spPr>
-          <p:style>
-            <a:lnRef idx="2">
-              <a:schemeClr val="accent1">
-                <a:shade val="50000"/>
-              </a:schemeClr>
-            </a:lnRef>
-            <a:fillRef idx="1">
-              <a:schemeClr val="accent1"/>
-            </a:fillRef>
-            <a:effectRef idx="0">
-              <a:schemeClr val="accent1"/>
-            </a:effectRef>
-            <a:fontRef idx="minor">
-              <a:schemeClr val="lt1"/>
-            </a:fontRef>
-          </p:style>
-          <p:txBody>
-            <a:bodyPr rtlCol="0" anchor="ctr"/>
-            <a:lstStyle/>
-            <a:p>
-              <a:pPr algn="ctr"/>
-              <a:endParaRPr lang="en-US"/>
-            </a:p>
-          </p:txBody>
-        </p:sp>
-        <p:pic>
-          <p:nvPicPr>
-            <p:cNvPr id="21" name="Picture 20" descr="A picture containing queen&#10;&#10;Description automatically generated">
-              <a:extLst>
-                <a:ext uri="{FF2B5EF4-FFF2-40B4-BE49-F238E27FC236}">
-                  <a16:creationId xmlns:a16="http://schemas.microsoft.com/office/drawing/2014/main" id="{BA228A09-6708-0E4D-8B85-0CE71967CD72}"/>
-                </a:ext>
-              </a:extLst>
-            </p:cNvPr>
-            <p:cNvPicPr>
-              <a:picLocks noChangeAspect="1"/>
-            </p:cNvPicPr>
-            <p:nvPr/>
-          </p:nvPicPr>
-          <p:blipFill>
-            <a:blip r:embed="rId3">
-              <a:clrChange>
-                <a:clrFrom>
-                  <a:srgbClr val="FFFFFF"/>
-                </a:clrFrom>
-                <a:clrTo>
-                  <a:srgbClr val="FFFFFF">
-                    <a:alpha val="0"/>
-                  </a:srgbClr>
-                </a:clrTo>
-              </a:clrChange>
-              <a:extLst>
-                <a:ext uri="{28A0092B-C50C-407E-A947-70E740481C1C}">
-                  <a14:useLocalDpi xmlns:a14="http://schemas.microsoft.com/office/drawing/2010/main" val="0"/>
-                </a:ext>
-              </a:extLst>
-            </a:blip>
-            <a:stretch>
-              <a:fillRect/>
-            </a:stretch>
-          </p:blipFill>
-          <p:spPr>
-            <a:xfrm>
-              <a:off x="5345607" y="4340134"/>
-              <a:ext cx="568456" cy="568456"/>
-            </a:xfrm>
-            <a:prstGeom prst="rect">
-              <a:avLst/>
-            </a:prstGeom>
-          </p:spPr>
-        </p:pic>
-        <p:sp>
-          <p:nvSpPr>
-            <p:cNvPr id="22" name="Rectangle 21">
-              <a:extLst>
-                <a:ext uri="{FF2B5EF4-FFF2-40B4-BE49-F238E27FC236}">
-                  <a16:creationId xmlns:a16="http://schemas.microsoft.com/office/drawing/2014/main" id="{BDAD8853-192D-FC84-B490-8A088189EEDB}"/>
-                </a:ext>
-              </a:extLst>
-            </p:cNvPr>
-            <p:cNvSpPr/>
-            <p:nvPr/>
-          </p:nvSpPr>
-          <p:spPr>
-            <a:xfrm>
-              <a:off x="609600" y="3971059"/>
-              <a:ext cx="932329" cy="2211532"/>
-            </a:xfrm>
-            <a:prstGeom prst="rect">
-              <a:avLst/>
-            </a:prstGeom>
-            <a:solidFill>
-              <a:schemeClr val="accent2"/>
-            </a:solidFill>
-            <a:ln>
-              <a:solidFill>
-                <a:schemeClr val="accent2"/>
-              </a:solidFill>
-            </a:ln>
-          </p:spPr>
-          <p:style>
-            <a:lnRef idx="2">
-              <a:schemeClr val="accent1">
-                <a:shade val="50000"/>
-              </a:schemeClr>
-            </a:lnRef>
-            <a:fillRef idx="1">
-              <a:schemeClr val="accent1"/>
-            </a:fillRef>
-            <a:effectRef idx="0">
-              <a:schemeClr val="accent1"/>
-            </a:effectRef>
-            <a:fontRef idx="minor">
-              <a:schemeClr val="lt1"/>
-            </a:fontRef>
-          </p:style>
-          <p:txBody>
-            <a:bodyPr rtlCol="0" anchor="ctr"/>
-            <a:lstStyle/>
-            <a:p>
-              <a:pPr algn="ctr"/>
-              <a:endParaRPr lang="en-US"/>
-            </a:p>
-          </p:txBody>
-        </p:sp>
-        <p:pic>
-          <p:nvPicPr>
-            <p:cNvPr id="20" name="Picture 19" descr="Shape, icon&#10;&#10;Description automatically generated">
-              <a:extLst>
-                <a:ext uri="{FF2B5EF4-FFF2-40B4-BE49-F238E27FC236}">
-                  <a16:creationId xmlns:a16="http://schemas.microsoft.com/office/drawing/2014/main" id="{CFB5A9B4-EAD3-BE2C-AC62-0D2F02D1E00D}"/>
-                </a:ext>
-              </a:extLst>
-            </p:cNvPr>
-            <p:cNvPicPr>
-              <a:picLocks noChangeAspect="1"/>
-            </p:cNvPicPr>
-            <p:nvPr/>
-          </p:nvPicPr>
-          <p:blipFill>
-            <a:blip r:embed="rId2">
-              <a:clrChange>
-                <a:clrFrom>
-                  <a:srgbClr val="FFFFFF"/>
-                </a:clrFrom>
-                <a:clrTo>
-                  <a:srgbClr val="FFFFFF">
-                    <a:alpha val="0"/>
-                  </a:srgbClr>
-                </a:clrTo>
-              </a:clrChange>
-              <a:extLst>
-                <a:ext uri="{28A0092B-C50C-407E-A947-70E740481C1C}">
-                  <a14:useLocalDpi xmlns:a14="http://schemas.microsoft.com/office/drawing/2010/main" val="0"/>
-                </a:ext>
-              </a:extLst>
-            </a:blip>
-            <a:stretch>
-              <a:fillRect/>
-            </a:stretch>
-          </p:blipFill>
-          <p:spPr>
-            <a:xfrm>
-              <a:off x="791536" y="4340134"/>
-              <a:ext cx="568456" cy="568456"/>
-            </a:xfrm>
-            <a:prstGeom prst="rect">
-              <a:avLst/>
-            </a:prstGeom>
-          </p:spPr>
-        </p:pic>
-      </p:grpSp>
+          </a:xfrm>
+          <a:prstGeom prst="rect">
+            <a:avLst/>
+          </a:prstGeom>
+          <a:solidFill>
+            <a:srgbClr val="0070C0"/>
+          </a:solidFill>
+        </p:spPr>
+        <p:style>
+          <a:lnRef idx="2">
+            <a:schemeClr val="accent1">
+              <a:shade val="50000"/>
+            </a:schemeClr>
+          </a:lnRef>
+          <a:fillRef idx="1">
+            <a:schemeClr val="accent1"/>
+          </a:fillRef>
+          <a:effectRef idx="0">
+            <a:schemeClr val="accent1"/>
+          </a:effectRef>
+          <a:fontRef idx="minor">
+            <a:schemeClr val="lt1"/>
+          </a:fontRef>
+        </p:style>
+        <p:txBody>
+          <a:bodyPr rtlCol="0" anchor="ctr"/>
+          <a:lstStyle/>
+          <a:p>
+            <a:pPr algn="ctr"/>
+            <a:endParaRPr lang="en-US"/>
+          </a:p>
+        </p:txBody>
+      </p:sp>
+      <p:sp>
+        <p:nvSpPr>
+          <p:cNvPr id="54" name="Rectangle 53">
+            <a:extLst>
+              <a:ext uri="{FF2B5EF4-FFF2-40B4-BE49-F238E27FC236}">
+                <a16:creationId xmlns:a16="http://schemas.microsoft.com/office/drawing/2014/main" id="{79B5EA58-8FC6-2860-D110-2B9BBFD2D235}"/>
+              </a:ext>
+            </a:extLst>
+          </p:cNvPr>
+          <p:cNvSpPr/>
+          <p:nvPr/>
+        </p:nvSpPr>
+        <p:spPr>
+          <a:xfrm>
+            <a:off x="6552827" y="310775"/>
+            <a:ext cx="5007834" cy="3129896"/>
+          </a:xfrm>
+          <a:prstGeom prst="rect">
+            <a:avLst/>
+          </a:prstGeom>
+          <a:solidFill>
+            <a:schemeClr val="tx1">
+              <a:lumMod val="85000"/>
+              <a:lumOff val="15000"/>
+            </a:schemeClr>
+          </a:solidFill>
+        </p:spPr>
+        <p:style>
+          <a:lnRef idx="2">
+            <a:schemeClr val="accent1">
+              <a:shade val="50000"/>
+            </a:schemeClr>
+          </a:lnRef>
+          <a:fillRef idx="1">
+            <a:schemeClr val="accent1"/>
+          </a:fillRef>
+          <a:effectRef idx="0">
+            <a:schemeClr val="accent1"/>
+          </a:effectRef>
+          <a:fontRef idx="minor">
+            <a:schemeClr val="lt1"/>
+          </a:fontRef>
+        </p:style>
+        <p:txBody>
+          <a:bodyPr rtlCol="0" anchor="ctr"/>
+          <a:lstStyle/>
+          <a:p>
+            <a:pPr algn="ctr"/>
+            <a:endParaRPr lang="en-US"/>
+          </a:p>
+        </p:txBody>
+      </p:sp>
     </p:spTree>
     <p:extLst>
       <p:ext uri="{BB962C8B-B14F-4D97-AF65-F5344CB8AC3E}">
@@ -11849,7 +12086,7 @@
         </p:blipFill>
         <p:spPr bwMode="auto">
           <a:xfrm rot="665913">
-            <a:off x="5375246" y="1773092"/>
+            <a:off x="3850174" y="1603382"/>
             <a:ext cx="7812472" cy="4393100"/>
           </a:xfrm>
           <a:prstGeom prst="rect">
@@ -13340,6 +13577,70 @@
               </a:rPr>
               <a:t>A</a:t>
             </a:r>
+          </a:p>
+        </p:txBody>
+      </p:sp>
+      <p:sp>
+        <p:nvSpPr>
+          <p:cNvPr id="34" name="Oval 33">
+            <a:extLst>
+              <a:ext uri="{FF2B5EF4-FFF2-40B4-BE49-F238E27FC236}">
+                <a16:creationId xmlns:a16="http://schemas.microsoft.com/office/drawing/2014/main" id="{2A24B8FD-83CC-3758-A940-8A626620F78B}"/>
+              </a:ext>
+            </a:extLst>
+          </p:cNvPr>
+          <p:cNvSpPr/>
+          <p:nvPr/>
+        </p:nvSpPr>
+        <p:spPr>
+          <a:xfrm>
+            <a:off x="602505" y="4533728"/>
+            <a:ext cx="359555" cy="359555"/>
+          </a:xfrm>
+          <a:prstGeom prst="ellipse">
+            <a:avLst/>
+          </a:prstGeom>
+          <a:scene3d>
+            <a:camera prst="orthographicFront"/>
+            <a:lightRig rig="balanced" dir="t"/>
+          </a:scene3d>
+          <a:sp3d extrusionH="127000" prstMaterial="plastic">
+            <a:bevelT w="127000" h="127000"/>
+            <a:extrusionClr>
+              <a:schemeClr val="bg1">
+                <a:lumMod val="95000"/>
+              </a:schemeClr>
+            </a:extrusionClr>
+          </a:sp3d>
+        </p:spPr>
+        <p:style>
+          <a:lnRef idx="2">
+            <a:schemeClr val="dk1">
+              <a:shade val="50000"/>
+            </a:schemeClr>
+          </a:lnRef>
+          <a:fillRef idx="1">
+            <a:schemeClr val="dk1"/>
+          </a:fillRef>
+          <a:effectRef idx="0">
+            <a:schemeClr val="dk1"/>
+          </a:effectRef>
+          <a:fontRef idx="minor">
+            <a:schemeClr val="lt1"/>
+          </a:fontRef>
+        </p:style>
+        <p:txBody>
+          <a:bodyPr rtlCol="0" anchor="ctr"/>
+          <a:lstStyle/>
+          <a:p>
+            <a:pPr algn="ctr"/>
+            <a:endParaRPr lang="en-US" sz="2000">
+              <a:solidFill>
+                <a:schemeClr val="bg1">
+                  <a:lumMod val="95000"/>
+                </a:schemeClr>
+              </a:solidFill>
+            </a:endParaRPr>
           </a:p>
         </p:txBody>
       </p:sp>

</xml_diff>